<commit_message>
Azure DP900 Section 1 Finished
</commit_message>
<xml_diff>
--- a/Azure_DP-900_Fundamentals/MJH_DP-900_Azure_Fundamentals_Notes.pptx
+++ b/Azure_DP-900_Fundamentals/MJH_DP-900_Azure_Fundamentals_Notes.pptx
@@ -274,7 +274,7 @@
           <a:p>
             <a:fld id="{655AA731-BE5F-44DA-AAEA-300254B29F16}" type="datetimeFigureOut">
               <a:rPr lang="en-GB" smtClean="0"/>
-              <a:t>27/02/2023</a:t>
+              <a:t>28/02/2023</a:t>
             </a:fld>
             <a:endParaRPr lang="en-GB"/>
           </a:p>
@@ -474,7 +474,7 @@
           <a:p>
             <a:fld id="{655AA731-BE5F-44DA-AAEA-300254B29F16}" type="datetimeFigureOut">
               <a:rPr lang="en-GB" smtClean="0"/>
-              <a:t>27/02/2023</a:t>
+              <a:t>28/02/2023</a:t>
             </a:fld>
             <a:endParaRPr lang="en-GB"/>
           </a:p>
@@ -684,7 +684,7 @@
           <a:p>
             <a:fld id="{655AA731-BE5F-44DA-AAEA-300254B29F16}" type="datetimeFigureOut">
               <a:rPr lang="en-GB" smtClean="0"/>
-              <a:t>27/02/2023</a:t>
+              <a:t>28/02/2023</a:t>
             </a:fld>
             <a:endParaRPr lang="en-GB"/>
           </a:p>
@@ -884,7 +884,7 @@
           <a:p>
             <a:fld id="{655AA731-BE5F-44DA-AAEA-300254B29F16}" type="datetimeFigureOut">
               <a:rPr lang="en-GB" smtClean="0"/>
-              <a:t>27/02/2023</a:t>
+              <a:t>28/02/2023</a:t>
             </a:fld>
             <a:endParaRPr lang="en-GB"/>
           </a:p>
@@ -1160,7 +1160,7 @@
           <a:p>
             <a:fld id="{655AA731-BE5F-44DA-AAEA-300254B29F16}" type="datetimeFigureOut">
               <a:rPr lang="en-GB" smtClean="0"/>
-              <a:t>27/02/2023</a:t>
+              <a:t>28/02/2023</a:t>
             </a:fld>
             <a:endParaRPr lang="en-GB"/>
           </a:p>
@@ -1428,7 +1428,7 @@
           <a:p>
             <a:fld id="{655AA731-BE5F-44DA-AAEA-300254B29F16}" type="datetimeFigureOut">
               <a:rPr lang="en-GB" smtClean="0"/>
-              <a:t>27/02/2023</a:t>
+              <a:t>28/02/2023</a:t>
             </a:fld>
             <a:endParaRPr lang="en-GB"/>
           </a:p>
@@ -1843,7 +1843,7 @@
           <a:p>
             <a:fld id="{655AA731-BE5F-44DA-AAEA-300254B29F16}" type="datetimeFigureOut">
               <a:rPr lang="en-GB" smtClean="0"/>
-              <a:t>27/02/2023</a:t>
+              <a:t>28/02/2023</a:t>
             </a:fld>
             <a:endParaRPr lang="en-GB"/>
           </a:p>
@@ -1985,7 +1985,7 @@
           <a:p>
             <a:fld id="{655AA731-BE5F-44DA-AAEA-300254B29F16}" type="datetimeFigureOut">
               <a:rPr lang="en-GB" smtClean="0"/>
-              <a:t>27/02/2023</a:t>
+              <a:t>28/02/2023</a:t>
             </a:fld>
             <a:endParaRPr lang="en-GB"/>
           </a:p>
@@ -2098,7 +2098,7 @@
           <a:p>
             <a:fld id="{655AA731-BE5F-44DA-AAEA-300254B29F16}" type="datetimeFigureOut">
               <a:rPr lang="en-GB" smtClean="0"/>
-              <a:t>27/02/2023</a:t>
+              <a:t>28/02/2023</a:t>
             </a:fld>
             <a:endParaRPr lang="en-GB"/>
           </a:p>
@@ -2411,7 +2411,7 @@
           <a:p>
             <a:fld id="{655AA731-BE5F-44DA-AAEA-300254B29F16}" type="datetimeFigureOut">
               <a:rPr lang="en-GB" smtClean="0"/>
-              <a:t>27/02/2023</a:t>
+              <a:t>28/02/2023</a:t>
             </a:fld>
             <a:endParaRPr lang="en-GB"/>
           </a:p>
@@ -2700,7 +2700,7 @@
           <a:p>
             <a:fld id="{655AA731-BE5F-44DA-AAEA-300254B29F16}" type="datetimeFigureOut">
               <a:rPr lang="en-GB" smtClean="0"/>
-              <a:t>27/02/2023</a:t>
+              <a:t>28/02/2023</a:t>
             </a:fld>
             <a:endParaRPr lang="en-GB"/>
           </a:p>
@@ -2943,7 +2943,7 @@
           <a:p>
             <a:fld id="{655AA731-BE5F-44DA-AAEA-300254B29F16}" type="datetimeFigureOut">
               <a:rPr lang="en-GB" smtClean="0"/>
-              <a:t>27/02/2023</a:t>
+              <a:t>28/02/2023</a:t>
             </a:fld>
             <a:endParaRPr lang="en-GB"/>
           </a:p>
@@ -4164,7 +4164,7 @@
         <p:spPr>
           <a:xfrm>
             <a:off x="208598" y="1100888"/>
-            <a:ext cx="11844858" cy="5061065"/>
+            <a:ext cx="11844858" cy="5615063"/>
           </a:xfrm>
           <a:prstGeom prst="rect">
             <a:avLst/>
@@ -4320,26 +4320,7 @@
                 <a:effectLst/>
                 <a:latin typeface="+mj-lt"/>
               </a:rPr>
-              <a:t>Azure Databricks is an Azure-integrated version of the popular Databricks platform, which combines the Apache Spark data processing platform with SQL database semantics and an integrated management interface to enable large-scale data analytics. </a:t>
-            </a:r>
-          </a:p>
-          <a:p>
-            <a:pPr marL="285750" indent="-285750">
-              <a:lnSpc>
-                <a:spcPct val="120000"/>
-              </a:lnSpc>
-              <a:buFontTx/>
-              <a:buChar char="-"/>
-            </a:pPr>
-            <a:r>
-              <a:rPr lang="en-US" sz="1400" i="0" dirty="0">
-                <a:solidFill>
-                  <a:srgbClr val="161616"/>
-                </a:solidFill>
-                <a:effectLst/>
-                <a:latin typeface="+mj-lt"/>
-              </a:rPr>
-              <a:t>This is very similar to Azure data factory, however ADF is primarily used for Data Integration services to perform ETL processes and orchestrate data movements at scale. In contrast, Databricks provides a collaborative platform for Data Engineers and Data Scientists to perform ETL as well as build Machine Learning models under a single platform.</a:t>
+              <a:t>Azure Databricks is an Azure-integrated version of the popular Databricks platform, which combines the Apache Spark data processing platform with SQL database semantics and an integrated management interface to enable large-scale data analytics. This is very similar to Azure data factory, however ADF is primarily used for Data Integration services to perform ETL processes and orchestrate data movements at scale. In contrast, Databricks provides a collaborative platform for Data Engineers and Data Scientists to perform ETL as well as build Machine Learning models under a single platform.</a:t>
             </a:r>
           </a:p>
           <a:p>
@@ -4375,6 +4356,22 @@
             </a:r>
           </a:p>
           <a:p>
+            <a:pPr>
+              <a:lnSpc>
+                <a:spcPct val="120000"/>
+              </a:lnSpc>
+            </a:pPr>
+            <a:r>
+              <a:rPr lang="en-US" sz="1400" dirty="0">
+                <a:solidFill>
+                  <a:srgbClr val="161616"/>
+                </a:solidFill>
+                <a:latin typeface="+mj-lt"/>
+              </a:rPr>
+              <a:t>Azure HDInsight is an Azure service that provides Azure-hosted clusters for popular Apache open-source big data processing technologies, including:</a:t>
+            </a:r>
+          </a:p>
+          <a:p>
             <a:pPr marL="285750" indent="-285750">
               <a:lnSpc>
                 <a:spcPct val="120000"/>
@@ -4389,7 +4386,7 @@
                 </a:solidFill>
                 <a:latin typeface="+mj-lt"/>
               </a:rPr>
-              <a:t>Text</a:t>
+              <a:t>Apache Spark - a distributed data processing system that supports multiple programming languages and APIs, including Java, Scala, Python, and SQL.</a:t>
             </a:r>
           </a:p>
           <a:p>
@@ -4400,13 +4397,15 @@
               <a:buFontTx/>
               <a:buChar char="-"/>
             </a:pPr>
-            <a:endParaRPr lang="en-US" sz="1400" i="0" dirty="0">
-              <a:solidFill>
-                <a:srgbClr val="161616"/>
-              </a:solidFill>
-              <a:effectLst/>
-              <a:latin typeface="+mj-lt"/>
-            </a:endParaRPr>
+            <a:r>
+              <a:rPr lang="en-US" sz="1400" dirty="0">
+                <a:solidFill>
+                  <a:srgbClr val="161616"/>
+                </a:solidFill>
+                <a:latin typeface="+mj-lt"/>
+              </a:rPr>
+              <a:t>Apache Hadoop - a distributed system that uses MapReduce jobs to process large volumes of data efficiently across multiple cluster nodes. MapReduce jobs can be written in Java or abstracted by interfaces such as Apache Hive - a SQL-based API that runs on Hadoop.</a:t>
+            </a:r>
           </a:p>
           <a:p>
             <a:pPr marL="285750" indent="-285750">
@@ -4416,6 +4415,33 @@
               <a:buFontTx/>
               <a:buChar char="-"/>
             </a:pPr>
+            <a:r>
+              <a:rPr lang="en-US" sz="1400" dirty="0">
+                <a:solidFill>
+                  <a:srgbClr val="161616"/>
+                </a:solidFill>
+                <a:latin typeface="+mj-lt"/>
+              </a:rPr>
+              <a:t>Apache HBase - an open-source system for large-scale NoSQL data storage and querying.</a:t>
+            </a:r>
+          </a:p>
+          <a:p>
+            <a:pPr marL="285750" indent="-285750">
+              <a:lnSpc>
+                <a:spcPct val="120000"/>
+              </a:lnSpc>
+              <a:buFontTx/>
+              <a:buChar char="-"/>
+            </a:pPr>
+            <a:r>
+              <a:rPr lang="en-US" sz="1400" dirty="0">
+                <a:solidFill>
+                  <a:srgbClr val="161616"/>
+                </a:solidFill>
+                <a:latin typeface="+mj-lt"/>
+              </a:rPr>
+              <a:t>Apache Kafka - a message broker for data stream processing.</a:t>
+            </a:r>
             <a:endParaRPr lang="en-US" sz="1400" i="0" dirty="0">
               <a:solidFill>
                 <a:srgbClr val="161616"/>
@@ -4651,7 +4677,7 @@
                   </a:solidFill>
                   <a:latin typeface="Calibri" panose="020F0502020204030204"/>
                 </a:rPr>
-                <a:t>27</a:t>
+                <a:t>28</a:t>
               </a:r>
               <a:r>
                 <a:rPr kumimoji="0" lang="en-GB" sz="1800" b="0" i="0" u="none" strike="noStrike" kern="1200" cap="none" spc="0" normalizeH="0" baseline="0" noProof="0" dirty="0">
@@ -4896,7 +4922,7 @@
         <p:spPr>
           <a:xfrm>
             <a:off x="208598" y="1100888"/>
-            <a:ext cx="11844858" cy="3251339"/>
+            <a:ext cx="11844858" cy="4839466"/>
           </a:xfrm>
           <a:prstGeom prst="rect">
             <a:avLst/>
@@ -4948,15 +4974,44 @@
                 <a:effectLst/>
                 <a:latin typeface="+mj-lt"/>
               </a:rPr>
-              <a:t>Text</a:t>
-            </a:r>
-          </a:p>
-          <a:p>
-            <a:pPr>
+              <a:t>Azure Stream Analytics is a real-time stream processing engine that captures a stream of data from an input, applies a query to extract and manipulate data from the input stream, and writes the results to an output for analysis or further processing.</a:t>
+            </a:r>
+          </a:p>
+          <a:p>
+            <a:pPr marL="285750" indent="-285750">
               <a:lnSpc>
                 <a:spcPct val="120000"/>
               </a:lnSpc>
-            </a:pPr>
+              <a:buFontTx/>
+              <a:buChar char="-"/>
+            </a:pPr>
+            <a:r>
+              <a:rPr lang="en-US" sz="1400" dirty="0">
+                <a:solidFill>
+                  <a:srgbClr val="161616"/>
+                </a:solidFill>
+                <a:latin typeface="+mj-lt"/>
+              </a:rPr>
+              <a:t>An example could be using companies house streaming </a:t>
+            </a:r>
+            <a:r>
+              <a:rPr lang="en-US" sz="1400" dirty="0" err="1">
+                <a:solidFill>
+                  <a:srgbClr val="161616"/>
+                </a:solidFill>
+                <a:latin typeface="+mj-lt"/>
+              </a:rPr>
+              <a:t>api</a:t>
+            </a:r>
+            <a:r>
+              <a:rPr lang="en-US" sz="1400" dirty="0">
+                <a:solidFill>
+                  <a:srgbClr val="161616"/>
+                </a:solidFill>
+                <a:latin typeface="+mj-lt"/>
+              </a:rPr>
+              <a:t> feeding data via azure stream analytics to collected the data and query the results for only what we need.</a:t>
+            </a:r>
             <a:endParaRPr lang="en-US" sz="1400" i="0" dirty="0">
               <a:solidFill>
                 <a:srgbClr val="161616"/>
@@ -4971,91 +5026,6 @@
                 <a:spcPct val="120000"/>
               </a:lnSpc>
             </a:pPr>
-            <a:r>
-              <a:rPr lang="en-US" sz="1600" b="1" dirty="0">
-                <a:solidFill>
-                  <a:srgbClr val="161616"/>
-                </a:solidFill>
-                <a:latin typeface="+mj-lt"/>
-              </a:rPr>
-              <a:t>Azure Data Explorer</a:t>
-            </a:r>
-          </a:p>
-          <a:p>
-            <a:pPr marL="285750" indent="-285750">
-              <a:lnSpc>
-                <a:spcPct val="120000"/>
-              </a:lnSpc>
-              <a:buFontTx/>
-              <a:buChar char="-"/>
-            </a:pPr>
-            <a:r>
-              <a:rPr lang="en-US" sz="1400" i="0" dirty="0">
-                <a:solidFill>
-                  <a:srgbClr val="161616"/>
-                </a:solidFill>
-                <a:effectLst/>
-                <a:latin typeface="+mj-lt"/>
-              </a:rPr>
-              <a:t>Text</a:t>
-            </a:r>
-          </a:p>
-          <a:p>
-            <a:pPr marL="285750" indent="-285750">
-              <a:lnSpc>
-                <a:spcPct val="120000"/>
-              </a:lnSpc>
-              <a:buFontTx/>
-              <a:buChar char="-"/>
-            </a:pPr>
-            <a:endParaRPr lang="en-US" sz="1400" dirty="0">
-              <a:solidFill>
-                <a:srgbClr val="161616"/>
-              </a:solidFill>
-              <a:latin typeface="+mj-lt"/>
-            </a:endParaRPr>
-          </a:p>
-          <a:p>
-            <a:pPr>
-              <a:lnSpc>
-                <a:spcPct val="120000"/>
-              </a:lnSpc>
-            </a:pPr>
-            <a:r>
-              <a:rPr lang="en-US" sz="1600" b="1" dirty="0">
-                <a:solidFill>
-                  <a:srgbClr val="161616"/>
-                </a:solidFill>
-                <a:latin typeface="+mj-lt"/>
-              </a:rPr>
-              <a:t>Microsoft Purview</a:t>
-            </a:r>
-          </a:p>
-          <a:p>
-            <a:pPr marL="285750" indent="-285750">
-              <a:lnSpc>
-                <a:spcPct val="120000"/>
-              </a:lnSpc>
-              <a:buFontTx/>
-              <a:buChar char="-"/>
-            </a:pPr>
-            <a:r>
-              <a:rPr lang="en-US" sz="1200" i="0" dirty="0">
-                <a:solidFill>
-                  <a:srgbClr val="161616"/>
-                </a:solidFill>
-                <a:effectLst/>
-                <a:latin typeface="+mj-lt"/>
-              </a:rPr>
-              <a:t>Text</a:t>
-            </a:r>
-          </a:p>
-          <a:p>
-            <a:pPr>
-              <a:lnSpc>
-                <a:spcPct val="120000"/>
-              </a:lnSpc>
-            </a:pPr>
             <a:endParaRPr lang="en-US" sz="1400" i="0" dirty="0">
               <a:solidFill>
                 <a:srgbClr val="161616"/>
@@ -5077,7 +5047,7 @@
                 </a:solidFill>
                 <a:latin typeface="+mj-lt"/>
               </a:rPr>
-              <a:t>Microsoft Power BI</a:t>
+              <a:t>Azure Data Explorer</a:t>
             </a:r>
           </a:p>
           <a:p>
@@ -5089,14 +5059,132 @@
               <a:buChar char="-"/>
             </a:pPr>
             <a:r>
-              <a:rPr lang="en-US" sz="1200" i="0" dirty="0">
+              <a:rPr lang="en-US" sz="1400" i="0" dirty="0">
                 <a:solidFill>
                   <a:srgbClr val="161616"/>
                 </a:solidFill>
                 <a:effectLst/>
                 <a:latin typeface="+mj-lt"/>
               </a:rPr>
-              <a:t>Text</a:t>
+              <a:t>Data analysts can use Azure Data Explorer to query and analyze data that includes a timestamp attribute, such as is typically found in log files and Internet-of-things (IoT) telemetry data.</a:t>
+            </a:r>
+          </a:p>
+          <a:p>
+            <a:pPr marL="285750" indent="-285750">
+              <a:lnSpc>
+                <a:spcPct val="120000"/>
+              </a:lnSpc>
+              <a:buFontTx/>
+              <a:buChar char="-"/>
+            </a:pPr>
+            <a:r>
+              <a:rPr lang="en-US" sz="1400" i="0" dirty="0">
+                <a:solidFill>
+                  <a:srgbClr val="161616"/>
+                </a:solidFill>
+                <a:effectLst/>
+                <a:latin typeface="+mj-lt"/>
+              </a:rPr>
+              <a:t>Just remember KQL for this one.</a:t>
+            </a:r>
+          </a:p>
+          <a:p>
+            <a:pPr marL="285750" indent="-285750">
+              <a:lnSpc>
+                <a:spcPct val="120000"/>
+              </a:lnSpc>
+              <a:buFontTx/>
+              <a:buChar char="-"/>
+            </a:pPr>
+            <a:endParaRPr lang="en-US" sz="1400" dirty="0">
+              <a:solidFill>
+                <a:srgbClr val="161616"/>
+              </a:solidFill>
+              <a:latin typeface="+mj-lt"/>
+            </a:endParaRPr>
+          </a:p>
+          <a:p>
+            <a:pPr>
+              <a:lnSpc>
+                <a:spcPct val="120000"/>
+              </a:lnSpc>
+            </a:pPr>
+            <a:r>
+              <a:rPr lang="en-US" sz="1600" b="1" dirty="0">
+                <a:solidFill>
+                  <a:srgbClr val="161616"/>
+                </a:solidFill>
+                <a:latin typeface="+mj-lt"/>
+              </a:rPr>
+              <a:t>Microsoft Purview</a:t>
+            </a:r>
+          </a:p>
+          <a:p>
+            <a:pPr marL="285750" indent="-285750">
+              <a:lnSpc>
+                <a:spcPct val="120000"/>
+              </a:lnSpc>
+              <a:buFontTx/>
+              <a:buChar char="-"/>
+            </a:pPr>
+            <a:r>
+              <a:rPr lang="en-US" sz="1400" i="0" dirty="0">
+                <a:solidFill>
+                  <a:srgbClr val="161616"/>
+                </a:solidFill>
+                <a:effectLst/>
+                <a:latin typeface="+mj-lt"/>
+              </a:rPr>
+              <a:t>You can use Microsoft Purview to create a map of your data and track data lineage across multiple data sources and systems, enabling you to find trustworthy data for analysis and reporting.</a:t>
+            </a:r>
+          </a:p>
+          <a:p>
+            <a:pPr>
+              <a:lnSpc>
+                <a:spcPct val="120000"/>
+              </a:lnSpc>
+            </a:pPr>
+            <a:endParaRPr lang="en-US" sz="1400" i="0" dirty="0">
+              <a:solidFill>
+                <a:srgbClr val="161616"/>
+              </a:solidFill>
+              <a:effectLst/>
+              <a:latin typeface="+mj-lt"/>
+            </a:endParaRPr>
+          </a:p>
+          <a:p>
+            <a:pPr>
+              <a:lnSpc>
+                <a:spcPct val="120000"/>
+              </a:lnSpc>
+            </a:pPr>
+            <a:r>
+              <a:rPr lang="en-US" sz="1600" b="1" dirty="0">
+                <a:solidFill>
+                  <a:srgbClr val="161616"/>
+                </a:solidFill>
+                <a:latin typeface="+mj-lt"/>
+              </a:rPr>
+              <a:t>Microsoft Power BI</a:t>
+            </a:r>
+          </a:p>
+          <a:p>
+            <a:pPr marL="285750" indent="-285750">
+              <a:lnSpc>
+                <a:spcPct val="120000"/>
+              </a:lnSpc>
+              <a:buFontTx/>
+              <a:buChar char="-"/>
+            </a:pPr>
+            <a:r>
+              <a:rPr lang="en-US" sz="1400" i="0" dirty="0">
+                <a:solidFill>
+                  <a:srgbClr val="161616"/>
+                </a:solidFill>
+                <a:effectLst/>
+                <a:latin typeface="+mj-lt"/>
+              </a:rPr>
+              <a:t>Microsoft Power BI is a platform for analytical data modeling and reporting that data analysts can use to create and share interactive data visualizations</a:t>
             </a:r>
           </a:p>
           <a:p>

</xml_diff>

<commit_message>
Azure DP900 Section 2 Module 1 First Half
</commit_message>
<xml_diff>
--- a/Azure_DP-900_Fundamentals/MJH_DP-900_Azure_Fundamentals_Notes.pptx
+++ b/Azure_DP-900_Fundamentals/MJH_DP-900_Azure_Fundamentals_Notes.pptx
@@ -17,8 +17,12 @@
     <p:sldId id="269" r:id="rId11"/>
     <p:sldId id="270" r:id="rId12"/>
     <p:sldId id="259" r:id="rId13"/>
-    <p:sldId id="260" r:id="rId14"/>
-    <p:sldId id="261" r:id="rId15"/>
+    <p:sldId id="271" r:id="rId14"/>
+    <p:sldId id="273" r:id="rId15"/>
+    <p:sldId id="274" r:id="rId16"/>
+    <p:sldId id="272" r:id="rId17"/>
+    <p:sldId id="260" r:id="rId18"/>
+    <p:sldId id="261" r:id="rId19"/>
   </p:sldIdLst>
   <p:sldSz cx="12192000" cy="6858000"/>
   <p:notesSz cx="6858000" cy="9144000"/>
@@ -274,7 +278,7 @@
           <a:p>
             <a:fld id="{655AA731-BE5F-44DA-AAEA-300254B29F16}" type="datetimeFigureOut">
               <a:rPr lang="en-GB" smtClean="0"/>
-              <a:t>28/02/2023</a:t>
+              <a:t>05/03/2023</a:t>
             </a:fld>
             <a:endParaRPr lang="en-GB"/>
           </a:p>
@@ -474,7 +478,7 @@
           <a:p>
             <a:fld id="{655AA731-BE5F-44DA-AAEA-300254B29F16}" type="datetimeFigureOut">
               <a:rPr lang="en-GB" smtClean="0"/>
-              <a:t>28/02/2023</a:t>
+              <a:t>05/03/2023</a:t>
             </a:fld>
             <a:endParaRPr lang="en-GB"/>
           </a:p>
@@ -684,7 +688,7 @@
           <a:p>
             <a:fld id="{655AA731-BE5F-44DA-AAEA-300254B29F16}" type="datetimeFigureOut">
               <a:rPr lang="en-GB" smtClean="0"/>
-              <a:t>28/02/2023</a:t>
+              <a:t>05/03/2023</a:t>
             </a:fld>
             <a:endParaRPr lang="en-GB"/>
           </a:p>
@@ -884,7 +888,7 @@
           <a:p>
             <a:fld id="{655AA731-BE5F-44DA-AAEA-300254B29F16}" type="datetimeFigureOut">
               <a:rPr lang="en-GB" smtClean="0"/>
-              <a:t>28/02/2023</a:t>
+              <a:t>05/03/2023</a:t>
             </a:fld>
             <a:endParaRPr lang="en-GB"/>
           </a:p>
@@ -1160,7 +1164,7 @@
           <a:p>
             <a:fld id="{655AA731-BE5F-44DA-AAEA-300254B29F16}" type="datetimeFigureOut">
               <a:rPr lang="en-GB" smtClean="0"/>
-              <a:t>28/02/2023</a:t>
+              <a:t>05/03/2023</a:t>
             </a:fld>
             <a:endParaRPr lang="en-GB"/>
           </a:p>
@@ -1428,7 +1432,7 @@
           <a:p>
             <a:fld id="{655AA731-BE5F-44DA-AAEA-300254B29F16}" type="datetimeFigureOut">
               <a:rPr lang="en-GB" smtClean="0"/>
-              <a:t>28/02/2023</a:t>
+              <a:t>05/03/2023</a:t>
             </a:fld>
             <a:endParaRPr lang="en-GB"/>
           </a:p>
@@ -1843,7 +1847,7 @@
           <a:p>
             <a:fld id="{655AA731-BE5F-44DA-AAEA-300254B29F16}" type="datetimeFigureOut">
               <a:rPr lang="en-GB" smtClean="0"/>
-              <a:t>28/02/2023</a:t>
+              <a:t>05/03/2023</a:t>
             </a:fld>
             <a:endParaRPr lang="en-GB"/>
           </a:p>
@@ -1985,7 +1989,7 @@
           <a:p>
             <a:fld id="{655AA731-BE5F-44DA-AAEA-300254B29F16}" type="datetimeFigureOut">
               <a:rPr lang="en-GB" smtClean="0"/>
-              <a:t>28/02/2023</a:t>
+              <a:t>05/03/2023</a:t>
             </a:fld>
             <a:endParaRPr lang="en-GB"/>
           </a:p>
@@ -2098,7 +2102,7 @@
           <a:p>
             <a:fld id="{655AA731-BE5F-44DA-AAEA-300254B29F16}" type="datetimeFigureOut">
               <a:rPr lang="en-GB" smtClean="0"/>
-              <a:t>28/02/2023</a:t>
+              <a:t>05/03/2023</a:t>
             </a:fld>
             <a:endParaRPr lang="en-GB"/>
           </a:p>
@@ -2411,7 +2415,7 @@
           <a:p>
             <a:fld id="{655AA731-BE5F-44DA-AAEA-300254B29F16}" type="datetimeFigureOut">
               <a:rPr lang="en-GB" smtClean="0"/>
-              <a:t>28/02/2023</a:t>
+              <a:t>05/03/2023</a:t>
             </a:fld>
             <a:endParaRPr lang="en-GB"/>
           </a:p>
@@ -2700,7 +2704,7 @@
           <a:p>
             <a:fld id="{655AA731-BE5F-44DA-AAEA-300254B29F16}" type="datetimeFigureOut">
               <a:rPr lang="en-GB" smtClean="0"/>
-              <a:t>28/02/2023</a:t>
+              <a:t>05/03/2023</a:t>
             </a:fld>
             <a:endParaRPr lang="en-GB"/>
           </a:p>
@@ -2943,7 +2947,7 @@
           <a:p>
             <a:fld id="{655AA731-BE5F-44DA-AAEA-300254B29F16}" type="datetimeFigureOut">
               <a:rPr lang="en-GB" smtClean="0"/>
-              <a:t>28/02/2023</a:t>
+              <a:t>05/03/2023</a:t>
             </a:fld>
             <a:endParaRPr lang="en-GB"/>
           </a:p>
@@ -5620,6 +5624,2921 @@
           <a:chExt cx="0" cy="0"/>
         </a:xfrm>
       </p:grpSpPr>
+      <p:grpSp>
+        <p:nvGrpSpPr>
+          <p:cNvPr id="18" name="Group 17">
+            <a:extLst>
+              <a:ext uri="{FF2B5EF4-FFF2-40B4-BE49-F238E27FC236}">
+                <a16:creationId xmlns:a16="http://schemas.microsoft.com/office/drawing/2014/main" id="{6185BE9B-87C8-4B46-9293-0E71CF17E76A}"/>
+              </a:ext>
+            </a:extLst>
+          </p:cNvPr>
+          <p:cNvGrpSpPr/>
+          <p:nvPr/>
+        </p:nvGrpSpPr>
+        <p:grpSpPr>
+          <a:xfrm>
+            <a:off x="99755" y="83129"/>
+            <a:ext cx="11953701" cy="872834"/>
+            <a:chOff x="99755" y="83129"/>
+            <a:chExt cx="11953701" cy="872834"/>
+          </a:xfrm>
+        </p:grpSpPr>
+        <p:cxnSp>
+          <p:nvCxnSpPr>
+            <p:cNvPr id="5" name="Straight Connector 4">
+              <a:extLst>
+                <a:ext uri="{FF2B5EF4-FFF2-40B4-BE49-F238E27FC236}">
+                  <a16:creationId xmlns:a16="http://schemas.microsoft.com/office/drawing/2014/main" id="{A8BE4EF8-406C-4035-940C-AB752B29BA18}"/>
+                </a:ext>
+              </a:extLst>
+            </p:cNvPr>
+            <p:cNvCxnSpPr/>
+            <p:nvPr/>
+          </p:nvCxnSpPr>
+          <p:spPr>
+            <a:xfrm>
+              <a:off x="99755" y="955963"/>
+              <a:ext cx="11953701" cy="0"/>
+            </a:xfrm>
+            <a:prstGeom prst="line">
+              <a:avLst/>
+            </a:prstGeom>
+            <a:ln w="19050">
+              <a:solidFill>
+                <a:srgbClr val="0072C6"/>
+              </a:solidFill>
+            </a:ln>
+          </p:spPr>
+          <p:style>
+            <a:lnRef idx="1">
+              <a:schemeClr val="accent1"/>
+            </a:lnRef>
+            <a:fillRef idx="0">
+              <a:schemeClr val="accent1"/>
+            </a:fillRef>
+            <a:effectRef idx="0">
+              <a:schemeClr val="accent1"/>
+            </a:effectRef>
+            <a:fontRef idx="minor">
+              <a:schemeClr val="tx1"/>
+            </a:fontRef>
+          </p:style>
+        </p:cxnSp>
+        <p:sp>
+          <p:nvSpPr>
+            <p:cNvPr id="8" name="TextBox 7">
+              <a:extLst>
+                <a:ext uri="{FF2B5EF4-FFF2-40B4-BE49-F238E27FC236}">
+                  <a16:creationId xmlns:a16="http://schemas.microsoft.com/office/drawing/2014/main" id="{C61B684E-FDA7-4625-9CC3-79C17CC59ED7}"/>
+                </a:ext>
+              </a:extLst>
+            </p:cNvPr>
+            <p:cNvSpPr txBox="1"/>
+            <p:nvPr/>
+          </p:nvSpPr>
+          <p:spPr>
+            <a:xfrm>
+              <a:off x="4372493" y="180818"/>
+              <a:ext cx="4989025" cy="646331"/>
+            </a:xfrm>
+            <a:prstGeom prst="rect">
+              <a:avLst/>
+            </a:prstGeom>
+            <a:noFill/>
+          </p:spPr>
+          <p:txBody>
+            <a:bodyPr wrap="square" rtlCol="0">
+              <a:spAutoFit/>
+            </a:bodyPr>
+            <a:lstStyle/>
+            <a:p>
+              <a:pPr marL="0" marR="0" lvl="0" indent="0" algn="l" defTabSz="914400" rtl="0" eaLnBrk="1" fontAlgn="auto" latinLnBrk="0" hangingPunct="1">
+                <a:lnSpc>
+                  <a:spcPct val="100000"/>
+                </a:lnSpc>
+                <a:spcBef>
+                  <a:spcPts val="0"/>
+                </a:spcBef>
+                <a:spcAft>
+                  <a:spcPts val="0"/>
+                </a:spcAft>
+                <a:buClrTx/>
+                <a:buSzTx/>
+                <a:buFontTx/>
+                <a:buNone/>
+                <a:tabLst/>
+                <a:defRPr/>
+              </a:pPr>
+              <a:r>
+                <a:rPr kumimoji="0" lang="en-GB" sz="1800" b="0" i="0" u="none" strike="noStrike" kern="1200" cap="none" spc="0" normalizeH="0" baseline="0" noProof="0" dirty="0">
+                  <a:ln>
+                    <a:noFill/>
+                  </a:ln>
+                  <a:solidFill>
+                    <a:prstClr val="black"/>
+                  </a:solidFill>
+                  <a:effectLst/>
+                  <a:uLnTx/>
+                  <a:uFillTx/>
+                  <a:latin typeface="Calibri" panose="020F0502020204030204"/>
+                  <a:ea typeface="+mn-ea"/>
+                  <a:cs typeface="+mn-cs"/>
+                </a:rPr>
+                <a:t>Microsoft Azure Data Fundamentals: Explore relational data in Azure</a:t>
+              </a:r>
+            </a:p>
+          </p:txBody>
+        </p:sp>
+        <p:sp>
+          <p:nvSpPr>
+            <p:cNvPr id="10" name="TextBox 9">
+              <a:extLst>
+                <a:ext uri="{FF2B5EF4-FFF2-40B4-BE49-F238E27FC236}">
+                  <a16:creationId xmlns:a16="http://schemas.microsoft.com/office/drawing/2014/main" id="{4E568F0D-7E90-4A0C-8070-6C806D992954}"/>
+                </a:ext>
+              </a:extLst>
+            </p:cNvPr>
+            <p:cNvSpPr txBox="1"/>
+            <p:nvPr/>
+          </p:nvSpPr>
+          <p:spPr>
+            <a:xfrm>
+              <a:off x="9534699" y="180818"/>
+              <a:ext cx="2155764" cy="369332"/>
+            </a:xfrm>
+            <a:prstGeom prst="rect">
+              <a:avLst/>
+            </a:prstGeom>
+            <a:noFill/>
+          </p:spPr>
+          <p:txBody>
+            <a:bodyPr wrap="square" rtlCol="0">
+              <a:spAutoFit/>
+            </a:bodyPr>
+            <a:lstStyle/>
+            <a:p>
+              <a:pPr marL="0" marR="0" lvl="0" indent="0" algn="l" defTabSz="914400" rtl="0" eaLnBrk="1" fontAlgn="auto" latinLnBrk="0" hangingPunct="1">
+                <a:lnSpc>
+                  <a:spcPct val="100000"/>
+                </a:lnSpc>
+                <a:spcBef>
+                  <a:spcPts val="0"/>
+                </a:spcBef>
+                <a:spcAft>
+                  <a:spcPts val="0"/>
+                </a:spcAft>
+                <a:buClrTx/>
+                <a:buSzTx/>
+                <a:buFontTx/>
+                <a:buNone/>
+                <a:tabLst/>
+                <a:defRPr/>
+              </a:pPr>
+              <a:r>
+                <a:rPr kumimoji="0" lang="en-GB" sz="1800" b="0" i="0" u="none" strike="noStrike" kern="1200" cap="none" spc="0" normalizeH="0" baseline="0" noProof="0" dirty="0">
+                  <a:ln>
+                    <a:noFill/>
+                  </a:ln>
+                  <a:solidFill>
+                    <a:prstClr val="black"/>
+                  </a:solidFill>
+                  <a:effectLst/>
+                  <a:uLnTx/>
+                  <a:uFillTx/>
+                  <a:latin typeface="Calibri" panose="020F0502020204030204"/>
+                  <a:ea typeface="+mn-ea"/>
+                  <a:cs typeface="+mn-cs"/>
+                </a:rPr>
+                <a:t>Date: 05/03/23 </a:t>
+              </a:r>
+            </a:p>
+          </p:txBody>
+        </p:sp>
+        <p:cxnSp>
+          <p:nvCxnSpPr>
+            <p:cNvPr id="11" name="Straight Connector 10">
+              <a:extLst>
+                <a:ext uri="{FF2B5EF4-FFF2-40B4-BE49-F238E27FC236}">
+                  <a16:creationId xmlns:a16="http://schemas.microsoft.com/office/drawing/2014/main" id="{F70ABCF3-BE60-426F-8C8C-059C854869C6}"/>
+                </a:ext>
+              </a:extLst>
+            </p:cNvPr>
+            <p:cNvCxnSpPr>
+              <a:cxnSpLocks/>
+            </p:cNvCxnSpPr>
+            <p:nvPr/>
+          </p:nvCxnSpPr>
+          <p:spPr>
+            <a:xfrm flipV="1">
+              <a:off x="4267202" y="93505"/>
+              <a:ext cx="1" cy="754394"/>
+            </a:xfrm>
+            <a:prstGeom prst="line">
+              <a:avLst/>
+            </a:prstGeom>
+            <a:ln w="19050">
+              <a:solidFill>
+                <a:srgbClr val="0072C6"/>
+              </a:solidFill>
+            </a:ln>
+          </p:spPr>
+          <p:style>
+            <a:lnRef idx="1">
+              <a:schemeClr val="accent1"/>
+            </a:lnRef>
+            <a:fillRef idx="0">
+              <a:schemeClr val="accent1"/>
+            </a:fillRef>
+            <a:effectRef idx="0">
+              <a:schemeClr val="accent1"/>
+            </a:effectRef>
+            <a:fontRef idx="minor">
+              <a:schemeClr val="tx1"/>
+            </a:fontRef>
+          </p:style>
+        </p:cxnSp>
+        <p:cxnSp>
+          <p:nvCxnSpPr>
+            <p:cNvPr id="16" name="Straight Connector 15">
+              <a:extLst>
+                <a:ext uri="{FF2B5EF4-FFF2-40B4-BE49-F238E27FC236}">
+                  <a16:creationId xmlns:a16="http://schemas.microsoft.com/office/drawing/2014/main" id="{90F03633-4CAB-4B57-BF94-CF91E87AB7AE}"/>
+                </a:ext>
+              </a:extLst>
+            </p:cNvPr>
+            <p:cNvCxnSpPr>
+              <a:cxnSpLocks/>
+            </p:cNvCxnSpPr>
+            <p:nvPr/>
+          </p:nvCxnSpPr>
+          <p:spPr>
+            <a:xfrm flipV="1">
+              <a:off x="9491750" y="83129"/>
+              <a:ext cx="1" cy="754394"/>
+            </a:xfrm>
+            <a:prstGeom prst="line">
+              <a:avLst/>
+            </a:prstGeom>
+            <a:ln w="19050">
+              <a:solidFill>
+                <a:srgbClr val="0072C6"/>
+              </a:solidFill>
+            </a:ln>
+          </p:spPr>
+          <p:style>
+            <a:lnRef idx="1">
+              <a:schemeClr val="accent1"/>
+            </a:lnRef>
+            <a:fillRef idx="0">
+              <a:schemeClr val="accent1"/>
+            </a:fillRef>
+            <a:effectRef idx="0">
+              <a:schemeClr val="accent1"/>
+            </a:effectRef>
+            <a:fontRef idx="minor">
+              <a:schemeClr val="tx1"/>
+            </a:fontRef>
+          </p:style>
+        </p:cxnSp>
+      </p:grpSp>
+      <p:pic>
+        <p:nvPicPr>
+          <p:cNvPr id="20" name="Picture 2">
+            <a:extLst>
+              <a:ext uri="{FF2B5EF4-FFF2-40B4-BE49-F238E27FC236}">
+                <a16:creationId xmlns:a16="http://schemas.microsoft.com/office/drawing/2014/main" id="{775211BE-DA3A-41DA-8578-4E52F07B6AB9}"/>
+              </a:ext>
+            </a:extLst>
+          </p:cNvPr>
+          <p:cNvPicPr>
+            <a:picLocks noChangeAspect="1" noChangeArrowheads="1"/>
+          </p:cNvPicPr>
+          <p:nvPr/>
+        </p:nvPicPr>
+        <p:blipFill>
+          <a:blip r:embed="rId2">
+            <a:extLst>
+              <a:ext uri="{28A0092B-C50C-407E-A947-70E740481C1C}">
+                <a14:useLocalDpi xmlns:a14="http://schemas.microsoft.com/office/drawing/2010/main" val="0"/>
+              </a:ext>
+            </a:extLst>
+          </a:blip>
+          <a:srcRect/>
+          <a:stretch>
+            <a:fillRect/>
+          </a:stretch>
+        </p:blipFill>
+        <p:spPr bwMode="auto">
+          <a:xfrm>
+            <a:off x="144770" y="111976"/>
+            <a:ext cx="725548" cy="725548"/>
+          </a:xfrm>
+          <a:prstGeom prst="rect">
+            <a:avLst/>
+          </a:prstGeom>
+          <a:noFill/>
+          <a:extLst>
+            <a:ext uri="{909E8E84-426E-40DD-AFC4-6F175D3DCCD1}">
+              <a14:hiddenFill xmlns:a14="http://schemas.microsoft.com/office/drawing/2010/main">
+                <a:solidFill>
+                  <a:srgbClr val="FFFFFF"/>
+                </a:solidFill>
+              </a14:hiddenFill>
+            </a:ext>
+          </a:extLst>
+        </p:spPr>
+      </p:pic>
+      <p:sp>
+        <p:nvSpPr>
+          <p:cNvPr id="21" name="TextBox 20">
+            <a:extLst>
+              <a:ext uri="{FF2B5EF4-FFF2-40B4-BE49-F238E27FC236}">
+                <a16:creationId xmlns:a16="http://schemas.microsoft.com/office/drawing/2014/main" id="{30404CBF-C3F9-43E0-81FA-E9D4D01BC004}"/>
+              </a:ext>
+            </a:extLst>
+          </p:cNvPr>
+          <p:cNvSpPr txBox="1"/>
+          <p:nvPr/>
+        </p:nvSpPr>
+        <p:spPr>
+          <a:xfrm>
+            <a:off x="914402" y="191193"/>
+            <a:ext cx="3483032" cy="646331"/>
+          </a:xfrm>
+          <a:prstGeom prst="rect">
+            <a:avLst/>
+          </a:prstGeom>
+          <a:noFill/>
+        </p:spPr>
+        <p:txBody>
+          <a:bodyPr wrap="square" rtlCol="0">
+            <a:spAutoFit/>
+          </a:bodyPr>
+          <a:lstStyle/>
+          <a:p>
+            <a:pPr marL="0" marR="0" lvl="0" indent="0" algn="l" defTabSz="914400" rtl="0" eaLnBrk="1" fontAlgn="auto" latinLnBrk="0" hangingPunct="1">
+              <a:lnSpc>
+                <a:spcPct val="100000"/>
+              </a:lnSpc>
+              <a:spcBef>
+                <a:spcPts val="0"/>
+              </a:spcBef>
+              <a:spcAft>
+                <a:spcPts val="0"/>
+              </a:spcAft>
+              <a:buClrTx/>
+              <a:buSzTx/>
+              <a:buFontTx/>
+              <a:buNone/>
+              <a:tabLst/>
+              <a:defRPr/>
+            </a:pPr>
+            <a:r>
+              <a:rPr lang="en-GB" dirty="0">
+                <a:solidFill>
+                  <a:prstClr val="black"/>
+                </a:solidFill>
+                <a:latin typeface="Calibri" panose="020F0502020204030204"/>
+              </a:rPr>
+              <a:t>DP</a:t>
+            </a:r>
+            <a:r>
+              <a:rPr kumimoji="0" lang="en-GB" sz="1800" b="0" i="0" u="none" strike="noStrike" kern="1200" cap="none" spc="0" normalizeH="0" baseline="0" noProof="0" dirty="0">
+                <a:ln>
+                  <a:noFill/>
+                </a:ln>
+                <a:solidFill>
+                  <a:prstClr val="black"/>
+                </a:solidFill>
+                <a:effectLst/>
+                <a:uLnTx/>
+                <a:uFillTx/>
+                <a:latin typeface="Calibri" panose="020F0502020204030204"/>
+                <a:ea typeface="+mn-ea"/>
+                <a:cs typeface="+mn-cs"/>
+              </a:rPr>
+              <a:t>-900 Microsoft Azure Fundamentals</a:t>
+            </a:r>
+          </a:p>
+        </p:txBody>
+      </p:sp>
+      <p:sp>
+        <p:nvSpPr>
+          <p:cNvPr id="13" name="TextBox 12">
+            <a:extLst>
+              <a:ext uri="{FF2B5EF4-FFF2-40B4-BE49-F238E27FC236}">
+                <a16:creationId xmlns:a16="http://schemas.microsoft.com/office/drawing/2014/main" id="{B740727E-091B-4846-AD35-09F01069570A}"/>
+              </a:ext>
+            </a:extLst>
+          </p:cNvPr>
+          <p:cNvSpPr txBox="1"/>
+          <p:nvPr/>
+        </p:nvSpPr>
+        <p:spPr>
+          <a:xfrm>
+            <a:off x="208598" y="1100888"/>
+            <a:ext cx="11844858" cy="5578130"/>
+          </a:xfrm>
+          <a:prstGeom prst="rect">
+            <a:avLst/>
+          </a:prstGeom>
+          <a:noFill/>
+        </p:spPr>
+        <p:txBody>
+          <a:bodyPr wrap="square" rtlCol="0">
+            <a:spAutoFit/>
+          </a:bodyPr>
+          <a:lstStyle/>
+          <a:p>
+            <a:pPr>
+              <a:lnSpc>
+                <a:spcPct val="120000"/>
+              </a:lnSpc>
+            </a:pPr>
+            <a:r>
+              <a:rPr lang="en-US" sz="1600" b="1" i="0" dirty="0">
+                <a:solidFill>
+                  <a:srgbClr val="161616"/>
+                </a:solidFill>
+                <a:effectLst/>
+                <a:latin typeface="+mj-lt"/>
+              </a:rPr>
+              <a:t>Relation Data</a:t>
+            </a:r>
+            <a:endParaRPr lang="en-US" sz="1400" b="1" i="0" dirty="0">
+              <a:solidFill>
+                <a:srgbClr val="161616"/>
+              </a:solidFill>
+              <a:effectLst/>
+              <a:latin typeface="+mj-lt"/>
+            </a:endParaRPr>
+          </a:p>
+          <a:p>
+            <a:pPr marL="285750" indent="-285750">
+              <a:lnSpc>
+                <a:spcPct val="120000"/>
+              </a:lnSpc>
+              <a:buFontTx/>
+              <a:buChar char="-"/>
+            </a:pPr>
+            <a:r>
+              <a:rPr lang="en-US" sz="1400" i="0" dirty="0">
+                <a:solidFill>
+                  <a:srgbClr val="161616"/>
+                </a:solidFill>
+                <a:effectLst/>
+                <a:latin typeface="+mj-lt"/>
+              </a:rPr>
+              <a:t>In a relational database, you model collections of entities from the real world as tables. An entity can be anything for which you want to record information, typically important objects and events.</a:t>
+            </a:r>
+          </a:p>
+          <a:p>
+            <a:pPr marL="285750" indent="-285750">
+              <a:lnSpc>
+                <a:spcPct val="120000"/>
+              </a:lnSpc>
+              <a:buFontTx/>
+              <a:buChar char="-"/>
+            </a:pPr>
+            <a:r>
+              <a:rPr lang="en-US" sz="1400" i="0" dirty="0">
+                <a:solidFill>
+                  <a:srgbClr val="161616"/>
+                </a:solidFill>
+                <a:effectLst/>
+                <a:latin typeface="+mj-lt"/>
+              </a:rPr>
+              <a:t>The available datatypes that you can use when defining a table depend on the database system you are using; though there are standard datatypes defined by the American National Standards Institute (ANSI) that are supported by most database systems.</a:t>
+            </a:r>
+          </a:p>
+          <a:p>
+            <a:pPr marL="285750" indent="-285750">
+              <a:lnSpc>
+                <a:spcPct val="120000"/>
+              </a:lnSpc>
+              <a:buFontTx/>
+              <a:buChar char="-"/>
+            </a:pPr>
+            <a:endParaRPr lang="en-US" sz="1400" dirty="0">
+              <a:solidFill>
+                <a:srgbClr val="161616"/>
+              </a:solidFill>
+              <a:latin typeface="+mj-lt"/>
+            </a:endParaRPr>
+          </a:p>
+          <a:p>
+            <a:pPr>
+              <a:lnSpc>
+                <a:spcPct val="120000"/>
+              </a:lnSpc>
+            </a:pPr>
+            <a:r>
+              <a:rPr lang="en-US" sz="1600" b="1" i="0" dirty="0">
+                <a:solidFill>
+                  <a:srgbClr val="161616"/>
+                </a:solidFill>
+                <a:effectLst/>
+                <a:latin typeface="+mj-lt"/>
+              </a:rPr>
+              <a:t>Normalisation </a:t>
+            </a:r>
+          </a:p>
+          <a:p>
+            <a:pPr>
+              <a:lnSpc>
+                <a:spcPct val="120000"/>
+              </a:lnSpc>
+            </a:pPr>
+            <a:r>
+              <a:rPr lang="en-US" sz="1400" i="0" dirty="0">
+                <a:solidFill>
+                  <a:srgbClr val="161616"/>
+                </a:solidFill>
+                <a:effectLst/>
+                <a:latin typeface="+mj-lt"/>
+              </a:rPr>
+              <a:t>While there are many complex rules that define the process of refactoring data into various levels (or forms) of normalization, a simple definition for practical purposes is:</a:t>
+            </a:r>
+          </a:p>
+          <a:p>
+            <a:pPr marL="285750" indent="-285750">
+              <a:lnSpc>
+                <a:spcPct val="120000"/>
+              </a:lnSpc>
+              <a:buFontTx/>
+              <a:buChar char="-"/>
+            </a:pPr>
+            <a:r>
+              <a:rPr lang="en-US" sz="1400" i="0" dirty="0">
+                <a:solidFill>
+                  <a:srgbClr val="161616"/>
+                </a:solidFill>
+                <a:effectLst/>
+                <a:latin typeface="+mj-lt"/>
+              </a:rPr>
+              <a:t>Separate each entity type into its own table (a person, organization, object type, or concept about which information is stored. Describes the type of the information that is being mastered. An entity type typically corresponds to one or several related tables in database.)</a:t>
+            </a:r>
+          </a:p>
+          <a:p>
+            <a:pPr marL="285750" indent="-285750">
+              <a:lnSpc>
+                <a:spcPct val="120000"/>
+              </a:lnSpc>
+              <a:buFontTx/>
+              <a:buChar char="-"/>
+            </a:pPr>
+            <a:r>
+              <a:rPr lang="en-US" sz="1400" i="0" dirty="0">
+                <a:solidFill>
+                  <a:srgbClr val="161616"/>
+                </a:solidFill>
+                <a:effectLst/>
+                <a:latin typeface="+mj-lt"/>
+              </a:rPr>
+              <a:t>Separate each discrete attribute into its own column.</a:t>
+            </a:r>
+          </a:p>
+          <a:p>
+            <a:pPr marL="285750" indent="-285750">
+              <a:lnSpc>
+                <a:spcPct val="120000"/>
+              </a:lnSpc>
+              <a:buFontTx/>
+              <a:buChar char="-"/>
+            </a:pPr>
+            <a:r>
+              <a:rPr lang="en-US" sz="1400" i="0" dirty="0">
+                <a:solidFill>
+                  <a:srgbClr val="161616"/>
+                </a:solidFill>
+                <a:effectLst/>
+                <a:latin typeface="+mj-lt"/>
+              </a:rPr>
+              <a:t>Uniquely identify each entity instance (row) using a primary key.</a:t>
+            </a:r>
+          </a:p>
+          <a:p>
+            <a:pPr marL="285750" indent="-285750">
+              <a:lnSpc>
+                <a:spcPct val="120000"/>
+              </a:lnSpc>
+              <a:buFontTx/>
+              <a:buChar char="-"/>
+            </a:pPr>
+            <a:r>
+              <a:rPr lang="en-US" sz="1400" i="0" dirty="0">
+                <a:solidFill>
+                  <a:srgbClr val="161616"/>
+                </a:solidFill>
+                <a:effectLst/>
+                <a:latin typeface="+mj-lt"/>
+              </a:rPr>
+              <a:t>Use foreign key columns to link related entities.</a:t>
+            </a:r>
+          </a:p>
+          <a:p>
+            <a:pPr>
+              <a:lnSpc>
+                <a:spcPct val="120000"/>
+              </a:lnSpc>
+            </a:pPr>
+            <a:endParaRPr lang="en-US" sz="1400" i="0" dirty="0">
+              <a:solidFill>
+                <a:srgbClr val="161616"/>
+              </a:solidFill>
+              <a:effectLst/>
+              <a:latin typeface="+mj-lt"/>
+            </a:endParaRPr>
+          </a:p>
+          <a:p>
+            <a:pPr>
+              <a:lnSpc>
+                <a:spcPct val="120000"/>
+              </a:lnSpc>
+            </a:pPr>
+            <a:r>
+              <a:rPr lang="en-US" sz="1400" i="0" dirty="0">
+                <a:solidFill>
+                  <a:srgbClr val="161616"/>
+                </a:solidFill>
+                <a:effectLst/>
+                <a:latin typeface="+mj-lt"/>
+              </a:rPr>
+              <a:t>Typically, a relational database management system (RDBMS) can enforce referential integrity to ensure that a value entered into a foreign key field has an existing corresponding primary key in the related table – for example, preventing orders for non-existent customers.</a:t>
+            </a:r>
+          </a:p>
+          <a:p>
+            <a:pPr marL="285750" indent="-285750">
+              <a:lnSpc>
+                <a:spcPct val="120000"/>
+              </a:lnSpc>
+              <a:buFontTx/>
+              <a:buChar char="-"/>
+            </a:pPr>
+            <a:r>
+              <a:rPr lang="en-US" sz="1400" dirty="0">
+                <a:solidFill>
+                  <a:srgbClr val="161616"/>
+                </a:solidFill>
+                <a:latin typeface="+mj-lt"/>
+              </a:rPr>
+              <a:t>Primary key: unique</a:t>
+            </a:r>
+          </a:p>
+          <a:p>
+            <a:pPr marL="285750" indent="-285750">
+              <a:lnSpc>
+                <a:spcPct val="120000"/>
+              </a:lnSpc>
+              <a:buFontTx/>
+              <a:buChar char="-"/>
+            </a:pPr>
+            <a:r>
+              <a:rPr lang="en-US" sz="1400" i="0" dirty="0">
+                <a:solidFill>
+                  <a:srgbClr val="161616"/>
+                </a:solidFill>
+                <a:effectLst/>
+                <a:latin typeface="+mj-lt"/>
+              </a:rPr>
+              <a:t>Foreig</a:t>
+            </a:r>
+            <a:r>
+              <a:rPr lang="en-US" sz="1400" dirty="0">
+                <a:solidFill>
+                  <a:srgbClr val="161616"/>
+                </a:solidFill>
+                <a:latin typeface="+mj-lt"/>
+              </a:rPr>
+              <a:t>n key: can be non unique</a:t>
+            </a:r>
+          </a:p>
+          <a:p>
+            <a:pPr>
+              <a:lnSpc>
+                <a:spcPct val="120000"/>
+              </a:lnSpc>
+            </a:pPr>
+            <a:r>
+              <a:rPr lang="en-US" sz="1400" dirty="0">
+                <a:solidFill>
+                  <a:srgbClr val="161616"/>
+                </a:solidFill>
+                <a:latin typeface="+mj-lt"/>
+              </a:rPr>
+              <a:t>If a primary key can link directly to another primary key consider combining those two tables. Primary keys should connect only to foreign keys. Two foreign keys connected produce a many to many relationship. </a:t>
+            </a:r>
+            <a:endParaRPr lang="en-US" sz="1400" i="0" dirty="0">
+              <a:solidFill>
+                <a:srgbClr val="161616"/>
+              </a:solidFill>
+              <a:effectLst/>
+              <a:latin typeface="+mj-lt"/>
+            </a:endParaRPr>
+          </a:p>
+        </p:txBody>
+      </p:sp>
+    </p:spTree>
+    <p:extLst>
+      <p:ext uri="{BB962C8B-B14F-4D97-AF65-F5344CB8AC3E}">
+        <p14:creationId xmlns:p14="http://schemas.microsoft.com/office/powerpoint/2010/main" val="1188139012"/>
+      </p:ext>
+    </p:extLst>
+  </p:cSld>
+  <p:clrMapOvr>
+    <a:masterClrMapping/>
+  </p:clrMapOvr>
+</p:sld>
+</file>
+
+<file path=ppt/slides/slide14.xml><?xml version="1.0" encoding="utf-8"?>
+<p:sld xmlns:a="http://schemas.openxmlformats.org/drawingml/2006/main" xmlns:r="http://schemas.openxmlformats.org/officeDocument/2006/relationships" xmlns:p="http://schemas.openxmlformats.org/presentationml/2006/main">
+  <p:cSld>
+    <p:spTree>
+      <p:nvGrpSpPr>
+        <p:cNvPr id="1" name=""/>
+        <p:cNvGrpSpPr/>
+        <p:nvPr/>
+      </p:nvGrpSpPr>
+      <p:grpSpPr>
+        <a:xfrm>
+          <a:off x="0" y="0"/>
+          <a:ext cx="0" cy="0"/>
+          <a:chOff x="0" y="0"/>
+          <a:chExt cx="0" cy="0"/>
+        </a:xfrm>
+      </p:grpSpPr>
+      <p:grpSp>
+        <p:nvGrpSpPr>
+          <p:cNvPr id="18" name="Group 17">
+            <a:extLst>
+              <a:ext uri="{FF2B5EF4-FFF2-40B4-BE49-F238E27FC236}">
+                <a16:creationId xmlns:a16="http://schemas.microsoft.com/office/drawing/2014/main" id="{6185BE9B-87C8-4B46-9293-0E71CF17E76A}"/>
+              </a:ext>
+            </a:extLst>
+          </p:cNvPr>
+          <p:cNvGrpSpPr/>
+          <p:nvPr/>
+        </p:nvGrpSpPr>
+        <p:grpSpPr>
+          <a:xfrm>
+            <a:off x="99755" y="83129"/>
+            <a:ext cx="11953701" cy="872834"/>
+            <a:chOff x="99755" y="83129"/>
+            <a:chExt cx="11953701" cy="872834"/>
+          </a:xfrm>
+        </p:grpSpPr>
+        <p:cxnSp>
+          <p:nvCxnSpPr>
+            <p:cNvPr id="5" name="Straight Connector 4">
+              <a:extLst>
+                <a:ext uri="{FF2B5EF4-FFF2-40B4-BE49-F238E27FC236}">
+                  <a16:creationId xmlns:a16="http://schemas.microsoft.com/office/drawing/2014/main" id="{A8BE4EF8-406C-4035-940C-AB752B29BA18}"/>
+                </a:ext>
+              </a:extLst>
+            </p:cNvPr>
+            <p:cNvCxnSpPr/>
+            <p:nvPr/>
+          </p:nvCxnSpPr>
+          <p:spPr>
+            <a:xfrm>
+              <a:off x="99755" y="955963"/>
+              <a:ext cx="11953701" cy="0"/>
+            </a:xfrm>
+            <a:prstGeom prst="line">
+              <a:avLst/>
+            </a:prstGeom>
+            <a:ln w="19050">
+              <a:solidFill>
+                <a:srgbClr val="0072C6"/>
+              </a:solidFill>
+            </a:ln>
+          </p:spPr>
+          <p:style>
+            <a:lnRef idx="1">
+              <a:schemeClr val="accent1"/>
+            </a:lnRef>
+            <a:fillRef idx="0">
+              <a:schemeClr val="accent1"/>
+            </a:fillRef>
+            <a:effectRef idx="0">
+              <a:schemeClr val="accent1"/>
+            </a:effectRef>
+            <a:fontRef idx="minor">
+              <a:schemeClr val="tx1"/>
+            </a:fontRef>
+          </p:style>
+        </p:cxnSp>
+        <p:sp>
+          <p:nvSpPr>
+            <p:cNvPr id="8" name="TextBox 7">
+              <a:extLst>
+                <a:ext uri="{FF2B5EF4-FFF2-40B4-BE49-F238E27FC236}">
+                  <a16:creationId xmlns:a16="http://schemas.microsoft.com/office/drawing/2014/main" id="{C61B684E-FDA7-4625-9CC3-79C17CC59ED7}"/>
+                </a:ext>
+              </a:extLst>
+            </p:cNvPr>
+            <p:cNvSpPr txBox="1"/>
+            <p:nvPr/>
+          </p:nvSpPr>
+          <p:spPr>
+            <a:xfrm>
+              <a:off x="4372493" y="180818"/>
+              <a:ext cx="4989025" cy="646331"/>
+            </a:xfrm>
+            <a:prstGeom prst="rect">
+              <a:avLst/>
+            </a:prstGeom>
+            <a:noFill/>
+          </p:spPr>
+          <p:txBody>
+            <a:bodyPr wrap="square" rtlCol="0">
+              <a:spAutoFit/>
+            </a:bodyPr>
+            <a:lstStyle/>
+            <a:p>
+              <a:pPr marL="0" marR="0" lvl="0" indent="0" algn="l" defTabSz="914400" rtl="0" eaLnBrk="1" fontAlgn="auto" latinLnBrk="0" hangingPunct="1">
+                <a:lnSpc>
+                  <a:spcPct val="100000"/>
+                </a:lnSpc>
+                <a:spcBef>
+                  <a:spcPts val="0"/>
+                </a:spcBef>
+                <a:spcAft>
+                  <a:spcPts val="0"/>
+                </a:spcAft>
+                <a:buClrTx/>
+                <a:buSzTx/>
+                <a:buFontTx/>
+                <a:buNone/>
+                <a:tabLst/>
+                <a:defRPr/>
+              </a:pPr>
+              <a:r>
+                <a:rPr kumimoji="0" lang="en-GB" sz="1800" b="0" i="0" u="none" strike="noStrike" kern="1200" cap="none" spc="0" normalizeH="0" baseline="0" noProof="0" dirty="0">
+                  <a:ln>
+                    <a:noFill/>
+                  </a:ln>
+                  <a:solidFill>
+                    <a:prstClr val="black"/>
+                  </a:solidFill>
+                  <a:effectLst/>
+                  <a:uLnTx/>
+                  <a:uFillTx/>
+                  <a:latin typeface="Calibri" panose="020F0502020204030204"/>
+                  <a:ea typeface="+mn-ea"/>
+                  <a:cs typeface="+mn-cs"/>
+                </a:rPr>
+                <a:t>Microsoft Azure Data Fundamentals: Explore relational data in Azure</a:t>
+              </a:r>
+            </a:p>
+          </p:txBody>
+        </p:sp>
+        <p:sp>
+          <p:nvSpPr>
+            <p:cNvPr id="10" name="TextBox 9">
+              <a:extLst>
+                <a:ext uri="{FF2B5EF4-FFF2-40B4-BE49-F238E27FC236}">
+                  <a16:creationId xmlns:a16="http://schemas.microsoft.com/office/drawing/2014/main" id="{4E568F0D-7E90-4A0C-8070-6C806D992954}"/>
+                </a:ext>
+              </a:extLst>
+            </p:cNvPr>
+            <p:cNvSpPr txBox="1"/>
+            <p:nvPr/>
+          </p:nvSpPr>
+          <p:spPr>
+            <a:xfrm>
+              <a:off x="9534699" y="180818"/>
+              <a:ext cx="2155764" cy="369332"/>
+            </a:xfrm>
+            <a:prstGeom prst="rect">
+              <a:avLst/>
+            </a:prstGeom>
+            <a:noFill/>
+          </p:spPr>
+          <p:txBody>
+            <a:bodyPr wrap="square" rtlCol="0">
+              <a:spAutoFit/>
+            </a:bodyPr>
+            <a:lstStyle/>
+            <a:p>
+              <a:pPr marL="0" marR="0" lvl="0" indent="0" algn="l" defTabSz="914400" rtl="0" eaLnBrk="1" fontAlgn="auto" latinLnBrk="0" hangingPunct="1">
+                <a:lnSpc>
+                  <a:spcPct val="100000"/>
+                </a:lnSpc>
+                <a:spcBef>
+                  <a:spcPts val="0"/>
+                </a:spcBef>
+                <a:spcAft>
+                  <a:spcPts val="0"/>
+                </a:spcAft>
+                <a:buClrTx/>
+                <a:buSzTx/>
+                <a:buFontTx/>
+                <a:buNone/>
+                <a:tabLst/>
+                <a:defRPr/>
+              </a:pPr>
+              <a:r>
+                <a:rPr kumimoji="0" lang="en-GB" sz="1800" b="0" i="0" u="none" strike="noStrike" kern="1200" cap="none" spc="0" normalizeH="0" baseline="0" noProof="0" dirty="0">
+                  <a:ln>
+                    <a:noFill/>
+                  </a:ln>
+                  <a:solidFill>
+                    <a:prstClr val="black"/>
+                  </a:solidFill>
+                  <a:effectLst/>
+                  <a:uLnTx/>
+                  <a:uFillTx/>
+                  <a:latin typeface="Calibri" panose="020F0502020204030204"/>
+                  <a:ea typeface="+mn-ea"/>
+                  <a:cs typeface="+mn-cs"/>
+                </a:rPr>
+                <a:t>Date: 05/03/23 </a:t>
+              </a:r>
+            </a:p>
+          </p:txBody>
+        </p:sp>
+        <p:cxnSp>
+          <p:nvCxnSpPr>
+            <p:cNvPr id="11" name="Straight Connector 10">
+              <a:extLst>
+                <a:ext uri="{FF2B5EF4-FFF2-40B4-BE49-F238E27FC236}">
+                  <a16:creationId xmlns:a16="http://schemas.microsoft.com/office/drawing/2014/main" id="{F70ABCF3-BE60-426F-8C8C-059C854869C6}"/>
+                </a:ext>
+              </a:extLst>
+            </p:cNvPr>
+            <p:cNvCxnSpPr>
+              <a:cxnSpLocks/>
+            </p:cNvCxnSpPr>
+            <p:nvPr/>
+          </p:nvCxnSpPr>
+          <p:spPr>
+            <a:xfrm flipV="1">
+              <a:off x="4267202" y="93505"/>
+              <a:ext cx="1" cy="754394"/>
+            </a:xfrm>
+            <a:prstGeom prst="line">
+              <a:avLst/>
+            </a:prstGeom>
+            <a:ln w="19050">
+              <a:solidFill>
+                <a:srgbClr val="0072C6"/>
+              </a:solidFill>
+            </a:ln>
+          </p:spPr>
+          <p:style>
+            <a:lnRef idx="1">
+              <a:schemeClr val="accent1"/>
+            </a:lnRef>
+            <a:fillRef idx="0">
+              <a:schemeClr val="accent1"/>
+            </a:fillRef>
+            <a:effectRef idx="0">
+              <a:schemeClr val="accent1"/>
+            </a:effectRef>
+            <a:fontRef idx="minor">
+              <a:schemeClr val="tx1"/>
+            </a:fontRef>
+          </p:style>
+        </p:cxnSp>
+        <p:cxnSp>
+          <p:nvCxnSpPr>
+            <p:cNvPr id="16" name="Straight Connector 15">
+              <a:extLst>
+                <a:ext uri="{FF2B5EF4-FFF2-40B4-BE49-F238E27FC236}">
+                  <a16:creationId xmlns:a16="http://schemas.microsoft.com/office/drawing/2014/main" id="{90F03633-4CAB-4B57-BF94-CF91E87AB7AE}"/>
+                </a:ext>
+              </a:extLst>
+            </p:cNvPr>
+            <p:cNvCxnSpPr>
+              <a:cxnSpLocks/>
+            </p:cNvCxnSpPr>
+            <p:nvPr/>
+          </p:nvCxnSpPr>
+          <p:spPr>
+            <a:xfrm flipV="1">
+              <a:off x="9491750" y="83129"/>
+              <a:ext cx="1" cy="754394"/>
+            </a:xfrm>
+            <a:prstGeom prst="line">
+              <a:avLst/>
+            </a:prstGeom>
+            <a:ln w="19050">
+              <a:solidFill>
+                <a:srgbClr val="0072C6"/>
+              </a:solidFill>
+            </a:ln>
+          </p:spPr>
+          <p:style>
+            <a:lnRef idx="1">
+              <a:schemeClr val="accent1"/>
+            </a:lnRef>
+            <a:fillRef idx="0">
+              <a:schemeClr val="accent1"/>
+            </a:fillRef>
+            <a:effectRef idx="0">
+              <a:schemeClr val="accent1"/>
+            </a:effectRef>
+            <a:fontRef idx="minor">
+              <a:schemeClr val="tx1"/>
+            </a:fontRef>
+          </p:style>
+        </p:cxnSp>
+      </p:grpSp>
+      <p:pic>
+        <p:nvPicPr>
+          <p:cNvPr id="20" name="Picture 2">
+            <a:extLst>
+              <a:ext uri="{FF2B5EF4-FFF2-40B4-BE49-F238E27FC236}">
+                <a16:creationId xmlns:a16="http://schemas.microsoft.com/office/drawing/2014/main" id="{775211BE-DA3A-41DA-8578-4E52F07B6AB9}"/>
+              </a:ext>
+            </a:extLst>
+          </p:cNvPr>
+          <p:cNvPicPr>
+            <a:picLocks noChangeAspect="1" noChangeArrowheads="1"/>
+          </p:cNvPicPr>
+          <p:nvPr/>
+        </p:nvPicPr>
+        <p:blipFill>
+          <a:blip r:embed="rId2">
+            <a:extLst>
+              <a:ext uri="{28A0092B-C50C-407E-A947-70E740481C1C}">
+                <a14:useLocalDpi xmlns:a14="http://schemas.microsoft.com/office/drawing/2010/main" val="0"/>
+              </a:ext>
+            </a:extLst>
+          </a:blip>
+          <a:srcRect/>
+          <a:stretch>
+            <a:fillRect/>
+          </a:stretch>
+        </p:blipFill>
+        <p:spPr bwMode="auto">
+          <a:xfrm>
+            <a:off x="144770" y="111976"/>
+            <a:ext cx="725548" cy="725548"/>
+          </a:xfrm>
+          <a:prstGeom prst="rect">
+            <a:avLst/>
+          </a:prstGeom>
+          <a:noFill/>
+          <a:extLst>
+            <a:ext uri="{909E8E84-426E-40DD-AFC4-6F175D3DCCD1}">
+              <a14:hiddenFill xmlns:a14="http://schemas.microsoft.com/office/drawing/2010/main">
+                <a:solidFill>
+                  <a:srgbClr val="FFFFFF"/>
+                </a:solidFill>
+              </a14:hiddenFill>
+            </a:ext>
+          </a:extLst>
+        </p:spPr>
+      </p:pic>
+      <p:sp>
+        <p:nvSpPr>
+          <p:cNvPr id="21" name="TextBox 20">
+            <a:extLst>
+              <a:ext uri="{FF2B5EF4-FFF2-40B4-BE49-F238E27FC236}">
+                <a16:creationId xmlns:a16="http://schemas.microsoft.com/office/drawing/2014/main" id="{30404CBF-C3F9-43E0-81FA-E9D4D01BC004}"/>
+              </a:ext>
+            </a:extLst>
+          </p:cNvPr>
+          <p:cNvSpPr txBox="1"/>
+          <p:nvPr/>
+        </p:nvSpPr>
+        <p:spPr>
+          <a:xfrm>
+            <a:off x="914402" y="191193"/>
+            <a:ext cx="3483032" cy="646331"/>
+          </a:xfrm>
+          <a:prstGeom prst="rect">
+            <a:avLst/>
+          </a:prstGeom>
+          <a:noFill/>
+        </p:spPr>
+        <p:txBody>
+          <a:bodyPr wrap="square" rtlCol="0">
+            <a:spAutoFit/>
+          </a:bodyPr>
+          <a:lstStyle/>
+          <a:p>
+            <a:pPr marL="0" marR="0" lvl="0" indent="0" algn="l" defTabSz="914400" rtl="0" eaLnBrk="1" fontAlgn="auto" latinLnBrk="0" hangingPunct="1">
+              <a:lnSpc>
+                <a:spcPct val="100000"/>
+              </a:lnSpc>
+              <a:spcBef>
+                <a:spcPts val="0"/>
+              </a:spcBef>
+              <a:spcAft>
+                <a:spcPts val="0"/>
+              </a:spcAft>
+              <a:buClrTx/>
+              <a:buSzTx/>
+              <a:buFontTx/>
+              <a:buNone/>
+              <a:tabLst/>
+              <a:defRPr/>
+            </a:pPr>
+            <a:r>
+              <a:rPr lang="en-GB" dirty="0">
+                <a:solidFill>
+                  <a:prstClr val="black"/>
+                </a:solidFill>
+                <a:latin typeface="Calibri" panose="020F0502020204030204"/>
+              </a:rPr>
+              <a:t>DP</a:t>
+            </a:r>
+            <a:r>
+              <a:rPr kumimoji="0" lang="en-GB" sz="1800" b="0" i="0" u="none" strike="noStrike" kern="1200" cap="none" spc="0" normalizeH="0" baseline="0" noProof="0" dirty="0">
+                <a:ln>
+                  <a:noFill/>
+                </a:ln>
+                <a:solidFill>
+                  <a:prstClr val="black"/>
+                </a:solidFill>
+                <a:effectLst/>
+                <a:uLnTx/>
+                <a:uFillTx/>
+                <a:latin typeface="Calibri" panose="020F0502020204030204"/>
+                <a:ea typeface="+mn-ea"/>
+                <a:cs typeface="+mn-cs"/>
+              </a:rPr>
+              <a:t>-900 Microsoft Azure Fundamentals</a:t>
+            </a:r>
+          </a:p>
+        </p:txBody>
+      </p:sp>
+      <p:sp>
+        <p:nvSpPr>
+          <p:cNvPr id="13" name="TextBox 12">
+            <a:extLst>
+              <a:ext uri="{FF2B5EF4-FFF2-40B4-BE49-F238E27FC236}">
+                <a16:creationId xmlns:a16="http://schemas.microsoft.com/office/drawing/2014/main" id="{B740727E-091B-4846-AD35-09F01069570A}"/>
+              </a:ext>
+            </a:extLst>
+          </p:cNvPr>
+          <p:cNvSpPr txBox="1"/>
+          <p:nvPr/>
+        </p:nvSpPr>
+        <p:spPr>
+          <a:xfrm>
+            <a:off x="208598" y="1100888"/>
+            <a:ext cx="11844858" cy="5356531"/>
+          </a:xfrm>
+          <a:prstGeom prst="rect">
+            <a:avLst/>
+          </a:prstGeom>
+          <a:noFill/>
+        </p:spPr>
+        <p:txBody>
+          <a:bodyPr wrap="square" rtlCol="0">
+            <a:spAutoFit/>
+          </a:bodyPr>
+          <a:lstStyle/>
+          <a:p>
+            <a:pPr>
+              <a:lnSpc>
+                <a:spcPct val="120000"/>
+              </a:lnSpc>
+            </a:pPr>
+            <a:r>
+              <a:rPr lang="en-US" sz="1600" b="1" i="0" dirty="0">
+                <a:solidFill>
+                  <a:srgbClr val="161616"/>
+                </a:solidFill>
+                <a:effectLst/>
+                <a:latin typeface="+mj-lt"/>
+              </a:rPr>
+              <a:t>SQL</a:t>
+            </a:r>
+            <a:endParaRPr lang="en-US" sz="1400" b="1" i="0" dirty="0">
+              <a:solidFill>
+                <a:srgbClr val="161616"/>
+              </a:solidFill>
+              <a:effectLst/>
+              <a:latin typeface="+mj-lt"/>
+            </a:endParaRPr>
+          </a:p>
+          <a:p>
+            <a:pPr marL="285750" indent="-285750">
+              <a:lnSpc>
+                <a:spcPct val="120000"/>
+              </a:lnSpc>
+              <a:buFontTx/>
+              <a:buChar char="-"/>
+            </a:pPr>
+            <a:r>
+              <a:rPr lang="en-US" sz="1400" i="0" dirty="0">
+                <a:solidFill>
+                  <a:srgbClr val="161616"/>
+                </a:solidFill>
+                <a:effectLst/>
+                <a:latin typeface="+mj-lt"/>
+              </a:rPr>
+              <a:t>SQL stands for Structured Query Language, and is used to communicate with a relational database. It's the standard language for relational database management systems. </a:t>
+            </a:r>
+          </a:p>
+          <a:p>
+            <a:pPr marL="285750" indent="-285750">
+              <a:lnSpc>
+                <a:spcPct val="120000"/>
+              </a:lnSpc>
+              <a:buFontTx/>
+              <a:buChar char="-"/>
+            </a:pPr>
+            <a:r>
+              <a:rPr lang="en-US" sz="1400" i="0" dirty="0">
+                <a:solidFill>
+                  <a:srgbClr val="161616"/>
+                </a:solidFill>
+                <a:effectLst/>
+                <a:latin typeface="+mj-lt"/>
+              </a:rPr>
+              <a:t>Some common relational database management systems that use SQL include Microsoft SQL Server, MySQL, PostgreSQL, MariaDB, and Oracle.</a:t>
+            </a:r>
+          </a:p>
+          <a:p>
+            <a:pPr marL="285750" indent="-285750">
+              <a:lnSpc>
+                <a:spcPct val="120000"/>
+              </a:lnSpc>
+              <a:buFontTx/>
+              <a:buChar char="-"/>
+            </a:pPr>
+            <a:r>
+              <a:rPr lang="en-US" sz="1400" dirty="0">
+                <a:solidFill>
+                  <a:srgbClr val="161616"/>
+                </a:solidFill>
+                <a:latin typeface="+mj-lt"/>
+              </a:rPr>
+              <a:t>Standardised in the 1980’s but since then, many database vendors include their own proprietary extensions that are not part of the standard, which has resulted in a variety of dialects of SQL.</a:t>
+            </a:r>
+          </a:p>
+          <a:p>
+            <a:pPr marL="285750" indent="-285750">
+              <a:lnSpc>
+                <a:spcPct val="120000"/>
+              </a:lnSpc>
+              <a:buFontTx/>
+              <a:buChar char="-"/>
+            </a:pPr>
+            <a:endParaRPr lang="en-US" sz="1400" i="0" dirty="0">
+              <a:solidFill>
+                <a:srgbClr val="161616"/>
+              </a:solidFill>
+              <a:effectLst/>
+              <a:latin typeface="+mj-lt"/>
+            </a:endParaRPr>
+          </a:p>
+          <a:p>
+            <a:pPr>
+              <a:lnSpc>
+                <a:spcPct val="120000"/>
+              </a:lnSpc>
+            </a:pPr>
+            <a:r>
+              <a:rPr lang="en-US" sz="1600" b="1" i="0" dirty="0">
+                <a:solidFill>
+                  <a:srgbClr val="161616"/>
+                </a:solidFill>
+                <a:effectLst/>
+                <a:latin typeface="+mj-lt"/>
+              </a:rPr>
+              <a:t>SQL statement types</a:t>
+            </a:r>
+          </a:p>
+          <a:p>
+            <a:pPr>
+              <a:lnSpc>
+                <a:spcPct val="120000"/>
+              </a:lnSpc>
+            </a:pPr>
+            <a:r>
+              <a:rPr lang="en-US" sz="1400" i="0" dirty="0">
+                <a:solidFill>
+                  <a:srgbClr val="161616"/>
+                </a:solidFill>
+                <a:effectLst/>
+                <a:latin typeface="+mj-lt"/>
+              </a:rPr>
+              <a:t>SQL statements are grouped into three main logical groups:</a:t>
+            </a:r>
+          </a:p>
+          <a:p>
+            <a:pPr marL="285750" indent="-285750">
+              <a:lnSpc>
+                <a:spcPct val="120000"/>
+              </a:lnSpc>
+              <a:buFontTx/>
+              <a:buChar char="-"/>
+            </a:pPr>
+            <a:r>
+              <a:rPr lang="en-US" sz="1400" i="0" dirty="0">
+                <a:solidFill>
+                  <a:srgbClr val="161616"/>
+                </a:solidFill>
+                <a:effectLst/>
+                <a:latin typeface="+mj-lt"/>
+              </a:rPr>
+              <a:t>Data </a:t>
+            </a:r>
+            <a:r>
+              <a:rPr lang="en-US" sz="1400" b="1" i="0" dirty="0">
+                <a:solidFill>
+                  <a:srgbClr val="161616"/>
+                </a:solidFill>
+                <a:effectLst/>
+                <a:latin typeface="+mj-lt"/>
+              </a:rPr>
+              <a:t>Definition</a:t>
+            </a:r>
+            <a:r>
+              <a:rPr lang="en-US" sz="1400" i="0" dirty="0">
+                <a:solidFill>
+                  <a:srgbClr val="161616"/>
+                </a:solidFill>
+                <a:effectLst/>
+                <a:latin typeface="+mj-lt"/>
+              </a:rPr>
+              <a:t> Language (DDL)</a:t>
+            </a:r>
+          </a:p>
+          <a:p>
+            <a:pPr marL="285750" indent="-285750">
+              <a:lnSpc>
+                <a:spcPct val="120000"/>
+              </a:lnSpc>
+              <a:buFontTx/>
+              <a:buChar char="-"/>
+            </a:pPr>
+            <a:r>
+              <a:rPr lang="en-US" sz="1400" i="0" dirty="0">
+                <a:solidFill>
+                  <a:srgbClr val="161616"/>
+                </a:solidFill>
+                <a:effectLst/>
+                <a:latin typeface="+mj-lt"/>
+              </a:rPr>
+              <a:t>Data </a:t>
+            </a:r>
+            <a:r>
+              <a:rPr lang="en-US" sz="1400" b="1" i="0" dirty="0">
+                <a:solidFill>
+                  <a:srgbClr val="161616"/>
+                </a:solidFill>
+                <a:effectLst/>
+                <a:latin typeface="+mj-lt"/>
+              </a:rPr>
+              <a:t>Control</a:t>
+            </a:r>
+            <a:r>
+              <a:rPr lang="en-US" sz="1400" i="0" dirty="0">
+                <a:solidFill>
+                  <a:srgbClr val="161616"/>
+                </a:solidFill>
+                <a:effectLst/>
+                <a:latin typeface="+mj-lt"/>
+              </a:rPr>
+              <a:t> Language (DCL)</a:t>
+            </a:r>
+          </a:p>
+          <a:p>
+            <a:pPr marL="285750" indent="-285750">
+              <a:lnSpc>
+                <a:spcPct val="120000"/>
+              </a:lnSpc>
+              <a:buFontTx/>
+              <a:buChar char="-"/>
+            </a:pPr>
+            <a:r>
+              <a:rPr lang="en-US" sz="1400" i="0" dirty="0">
+                <a:solidFill>
+                  <a:srgbClr val="161616"/>
+                </a:solidFill>
+                <a:effectLst/>
+                <a:latin typeface="+mj-lt"/>
+              </a:rPr>
+              <a:t>Data </a:t>
+            </a:r>
+            <a:r>
+              <a:rPr lang="en-US" sz="1400" b="1" i="0" dirty="0">
+                <a:solidFill>
+                  <a:srgbClr val="161616"/>
+                </a:solidFill>
+                <a:effectLst/>
+                <a:latin typeface="+mj-lt"/>
+              </a:rPr>
+              <a:t>Manipulation</a:t>
+            </a:r>
+            <a:r>
+              <a:rPr lang="en-US" sz="1400" i="0" dirty="0">
+                <a:solidFill>
+                  <a:srgbClr val="161616"/>
+                </a:solidFill>
+                <a:effectLst/>
+                <a:latin typeface="+mj-lt"/>
+              </a:rPr>
+              <a:t> Language (DML)</a:t>
+            </a:r>
+          </a:p>
+          <a:p>
+            <a:pPr>
+              <a:lnSpc>
+                <a:spcPct val="120000"/>
+              </a:lnSpc>
+            </a:pPr>
+            <a:endParaRPr lang="en-US" sz="1400" dirty="0">
+              <a:solidFill>
+                <a:srgbClr val="161616"/>
+              </a:solidFill>
+              <a:latin typeface="+mj-lt"/>
+            </a:endParaRPr>
+          </a:p>
+          <a:p>
+            <a:pPr>
+              <a:lnSpc>
+                <a:spcPct val="120000"/>
+              </a:lnSpc>
+            </a:pPr>
+            <a:r>
+              <a:rPr lang="en-US" sz="1600" b="1" dirty="0">
+                <a:solidFill>
+                  <a:srgbClr val="161616"/>
+                </a:solidFill>
+                <a:latin typeface="+mj-lt"/>
+              </a:rPr>
+              <a:t>DDL (Defining Tables and Schema)</a:t>
+            </a:r>
+          </a:p>
+          <a:p>
+            <a:pPr>
+              <a:lnSpc>
+                <a:spcPct val="120000"/>
+              </a:lnSpc>
+            </a:pPr>
+            <a:r>
+              <a:rPr lang="en-US" sz="1400" i="0" dirty="0">
+                <a:solidFill>
+                  <a:srgbClr val="161616"/>
+                </a:solidFill>
+                <a:effectLst/>
+                <a:latin typeface="+mj-lt"/>
+              </a:rPr>
+              <a:t>You use DDL statements to create, modify, and remove tables and other objects in a database (table, stored procedures, views, and so on). The most common DDL statements are:</a:t>
+            </a:r>
+          </a:p>
+          <a:p>
+            <a:pPr marL="285750" indent="-285750">
+              <a:lnSpc>
+                <a:spcPct val="120000"/>
+              </a:lnSpc>
+              <a:buFontTx/>
+              <a:buChar char="-"/>
+            </a:pPr>
+            <a:r>
+              <a:rPr lang="en-US" sz="1400" i="0" dirty="0">
+                <a:solidFill>
+                  <a:srgbClr val="161616"/>
+                </a:solidFill>
+                <a:effectLst/>
+                <a:latin typeface="+mj-lt"/>
+              </a:rPr>
+              <a:t>CREATE	          Create a new object in the database, such as a table or a view.</a:t>
+            </a:r>
+          </a:p>
+          <a:p>
+            <a:pPr marL="285750" indent="-285750">
+              <a:lnSpc>
+                <a:spcPct val="120000"/>
+              </a:lnSpc>
+              <a:buFontTx/>
+              <a:buChar char="-"/>
+            </a:pPr>
+            <a:r>
+              <a:rPr lang="en-US" sz="1400" i="0" dirty="0">
+                <a:solidFill>
+                  <a:srgbClr val="161616"/>
+                </a:solidFill>
+                <a:effectLst/>
+                <a:latin typeface="+mj-lt"/>
+              </a:rPr>
+              <a:t>ALTER	          Modify the structure of an object. For instance, altering a table to add a new column.</a:t>
+            </a:r>
+          </a:p>
+          <a:p>
+            <a:pPr marL="285750" indent="-285750">
+              <a:lnSpc>
+                <a:spcPct val="120000"/>
+              </a:lnSpc>
+              <a:buFontTx/>
+              <a:buChar char="-"/>
+            </a:pPr>
+            <a:r>
+              <a:rPr lang="en-US" sz="1400" i="0" dirty="0">
+                <a:solidFill>
+                  <a:srgbClr val="161616"/>
+                </a:solidFill>
+                <a:effectLst/>
+                <a:latin typeface="+mj-lt"/>
+              </a:rPr>
+              <a:t>DROP	          Remove an object from the database.</a:t>
+            </a:r>
+          </a:p>
+          <a:p>
+            <a:pPr marL="285750" indent="-285750">
+              <a:lnSpc>
+                <a:spcPct val="120000"/>
+              </a:lnSpc>
+              <a:buFontTx/>
+              <a:buChar char="-"/>
+            </a:pPr>
+            <a:r>
+              <a:rPr lang="en-US" sz="1400" i="0" dirty="0">
+                <a:solidFill>
+                  <a:srgbClr val="161616"/>
+                </a:solidFill>
+                <a:effectLst/>
+                <a:latin typeface="+mj-lt"/>
+              </a:rPr>
+              <a:t>RENAME          Rename an existing object.</a:t>
+            </a:r>
+          </a:p>
+        </p:txBody>
+      </p:sp>
+    </p:spTree>
+    <p:extLst>
+      <p:ext uri="{BB962C8B-B14F-4D97-AF65-F5344CB8AC3E}">
+        <p14:creationId xmlns:p14="http://schemas.microsoft.com/office/powerpoint/2010/main" val="541688073"/>
+      </p:ext>
+    </p:extLst>
+  </p:cSld>
+  <p:clrMapOvr>
+    <a:masterClrMapping/>
+  </p:clrMapOvr>
+</p:sld>
+</file>
+
+<file path=ppt/slides/slide15.xml><?xml version="1.0" encoding="utf-8"?>
+<p:sld xmlns:a="http://schemas.openxmlformats.org/drawingml/2006/main" xmlns:r="http://schemas.openxmlformats.org/officeDocument/2006/relationships" xmlns:p="http://schemas.openxmlformats.org/presentationml/2006/main">
+  <p:cSld>
+    <p:spTree>
+      <p:nvGrpSpPr>
+        <p:cNvPr id="1" name=""/>
+        <p:cNvGrpSpPr/>
+        <p:nvPr/>
+      </p:nvGrpSpPr>
+      <p:grpSpPr>
+        <a:xfrm>
+          <a:off x="0" y="0"/>
+          <a:ext cx="0" cy="0"/>
+          <a:chOff x="0" y="0"/>
+          <a:chExt cx="0" cy="0"/>
+        </a:xfrm>
+      </p:grpSpPr>
+      <p:grpSp>
+        <p:nvGrpSpPr>
+          <p:cNvPr id="18" name="Group 17">
+            <a:extLst>
+              <a:ext uri="{FF2B5EF4-FFF2-40B4-BE49-F238E27FC236}">
+                <a16:creationId xmlns:a16="http://schemas.microsoft.com/office/drawing/2014/main" id="{6185BE9B-87C8-4B46-9293-0E71CF17E76A}"/>
+              </a:ext>
+            </a:extLst>
+          </p:cNvPr>
+          <p:cNvGrpSpPr/>
+          <p:nvPr/>
+        </p:nvGrpSpPr>
+        <p:grpSpPr>
+          <a:xfrm>
+            <a:off x="99755" y="83129"/>
+            <a:ext cx="11953701" cy="872834"/>
+            <a:chOff x="99755" y="83129"/>
+            <a:chExt cx="11953701" cy="872834"/>
+          </a:xfrm>
+        </p:grpSpPr>
+        <p:cxnSp>
+          <p:nvCxnSpPr>
+            <p:cNvPr id="5" name="Straight Connector 4">
+              <a:extLst>
+                <a:ext uri="{FF2B5EF4-FFF2-40B4-BE49-F238E27FC236}">
+                  <a16:creationId xmlns:a16="http://schemas.microsoft.com/office/drawing/2014/main" id="{A8BE4EF8-406C-4035-940C-AB752B29BA18}"/>
+                </a:ext>
+              </a:extLst>
+            </p:cNvPr>
+            <p:cNvCxnSpPr/>
+            <p:nvPr/>
+          </p:nvCxnSpPr>
+          <p:spPr>
+            <a:xfrm>
+              <a:off x="99755" y="955963"/>
+              <a:ext cx="11953701" cy="0"/>
+            </a:xfrm>
+            <a:prstGeom prst="line">
+              <a:avLst/>
+            </a:prstGeom>
+            <a:ln w="19050">
+              <a:solidFill>
+                <a:srgbClr val="0072C6"/>
+              </a:solidFill>
+            </a:ln>
+          </p:spPr>
+          <p:style>
+            <a:lnRef idx="1">
+              <a:schemeClr val="accent1"/>
+            </a:lnRef>
+            <a:fillRef idx="0">
+              <a:schemeClr val="accent1"/>
+            </a:fillRef>
+            <a:effectRef idx="0">
+              <a:schemeClr val="accent1"/>
+            </a:effectRef>
+            <a:fontRef idx="minor">
+              <a:schemeClr val="tx1"/>
+            </a:fontRef>
+          </p:style>
+        </p:cxnSp>
+        <p:sp>
+          <p:nvSpPr>
+            <p:cNvPr id="8" name="TextBox 7">
+              <a:extLst>
+                <a:ext uri="{FF2B5EF4-FFF2-40B4-BE49-F238E27FC236}">
+                  <a16:creationId xmlns:a16="http://schemas.microsoft.com/office/drawing/2014/main" id="{C61B684E-FDA7-4625-9CC3-79C17CC59ED7}"/>
+                </a:ext>
+              </a:extLst>
+            </p:cNvPr>
+            <p:cNvSpPr txBox="1"/>
+            <p:nvPr/>
+          </p:nvSpPr>
+          <p:spPr>
+            <a:xfrm>
+              <a:off x="4372493" y="180818"/>
+              <a:ext cx="4989025" cy="646331"/>
+            </a:xfrm>
+            <a:prstGeom prst="rect">
+              <a:avLst/>
+            </a:prstGeom>
+            <a:noFill/>
+          </p:spPr>
+          <p:txBody>
+            <a:bodyPr wrap="square" rtlCol="0">
+              <a:spAutoFit/>
+            </a:bodyPr>
+            <a:lstStyle/>
+            <a:p>
+              <a:pPr marL="0" marR="0" lvl="0" indent="0" algn="l" defTabSz="914400" rtl="0" eaLnBrk="1" fontAlgn="auto" latinLnBrk="0" hangingPunct="1">
+                <a:lnSpc>
+                  <a:spcPct val="100000"/>
+                </a:lnSpc>
+                <a:spcBef>
+                  <a:spcPts val="0"/>
+                </a:spcBef>
+                <a:spcAft>
+                  <a:spcPts val="0"/>
+                </a:spcAft>
+                <a:buClrTx/>
+                <a:buSzTx/>
+                <a:buFontTx/>
+                <a:buNone/>
+                <a:tabLst/>
+                <a:defRPr/>
+              </a:pPr>
+              <a:r>
+                <a:rPr kumimoji="0" lang="en-GB" sz="1800" b="0" i="0" u="none" strike="noStrike" kern="1200" cap="none" spc="0" normalizeH="0" baseline="0" noProof="0" dirty="0">
+                  <a:ln>
+                    <a:noFill/>
+                  </a:ln>
+                  <a:solidFill>
+                    <a:prstClr val="black"/>
+                  </a:solidFill>
+                  <a:effectLst/>
+                  <a:uLnTx/>
+                  <a:uFillTx/>
+                  <a:latin typeface="Calibri" panose="020F0502020204030204"/>
+                  <a:ea typeface="+mn-ea"/>
+                  <a:cs typeface="+mn-cs"/>
+                </a:rPr>
+                <a:t>Microsoft Azure Data Fundamentals: Explore relational data in Azure</a:t>
+              </a:r>
+            </a:p>
+          </p:txBody>
+        </p:sp>
+        <p:sp>
+          <p:nvSpPr>
+            <p:cNvPr id="10" name="TextBox 9">
+              <a:extLst>
+                <a:ext uri="{FF2B5EF4-FFF2-40B4-BE49-F238E27FC236}">
+                  <a16:creationId xmlns:a16="http://schemas.microsoft.com/office/drawing/2014/main" id="{4E568F0D-7E90-4A0C-8070-6C806D992954}"/>
+                </a:ext>
+              </a:extLst>
+            </p:cNvPr>
+            <p:cNvSpPr txBox="1"/>
+            <p:nvPr/>
+          </p:nvSpPr>
+          <p:spPr>
+            <a:xfrm>
+              <a:off x="9534699" y="180818"/>
+              <a:ext cx="2155764" cy="369332"/>
+            </a:xfrm>
+            <a:prstGeom prst="rect">
+              <a:avLst/>
+            </a:prstGeom>
+            <a:noFill/>
+          </p:spPr>
+          <p:txBody>
+            <a:bodyPr wrap="square" rtlCol="0">
+              <a:spAutoFit/>
+            </a:bodyPr>
+            <a:lstStyle/>
+            <a:p>
+              <a:pPr marL="0" marR="0" lvl="0" indent="0" algn="l" defTabSz="914400" rtl="0" eaLnBrk="1" fontAlgn="auto" latinLnBrk="0" hangingPunct="1">
+                <a:lnSpc>
+                  <a:spcPct val="100000"/>
+                </a:lnSpc>
+                <a:spcBef>
+                  <a:spcPts val="0"/>
+                </a:spcBef>
+                <a:spcAft>
+                  <a:spcPts val="0"/>
+                </a:spcAft>
+                <a:buClrTx/>
+                <a:buSzTx/>
+                <a:buFontTx/>
+                <a:buNone/>
+                <a:tabLst/>
+                <a:defRPr/>
+              </a:pPr>
+              <a:r>
+                <a:rPr kumimoji="0" lang="en-GB" sz="1800" b="0" i="0" u="none" strike="noStrike" kern="1200" cap="none" spc="0" normalizeH="0" baseline="0" noProof="0" dirty="0">
+                  <a:ln>
+                    <a:noFill/>
+                  </a:ln>
+                  <a:solidFill>
+                    <a:prstClr val="black"/>
+                  </a:solidFill>
+                  <a:effectLst/>
+                  <a:uLnTx/>
+                  <a:uFillTx/>
+                  <a:latin typeface="Calibri" panose="020F0502020204030204"/>
+                  <a:ea typeface="+mn-ea"/>
+                  <a:cs typeface="+mn-cs"/>
+                </a:rPr>
+                <a:t>Date: 05/03/23 </a:t>
+              </a:r>
+            </a:p>
+          </p:txBody>
+        </p:sp>
+        <p:cxnSp>
+          <p:nvCxnSpPr>
+            <p:cNvPr id="11" name="Straight Connector 10">
+              <a:extLst>
+                <a:ext uri="{FF2B5EF4-FFF2-40B4-BE49-F238E27FC236}">
+                  <a16:creationId xmlns:a16="http://schemas.microsoft.com/office/drawing/2014/main" id="{F70ABCF3-BE60-426F-8C8C-059C854869C6}"/>
+                </a:ext>
+              </a:extLst>
+            </p:cNvPr>
+            <p:cNvCxnSpPr>
+              <a:cxnSpLocks/>
+            </p:cNvCxnSpPr>
+            <p:nvPr/>
+          </p:nvCxnSpPr>
+          <p:spPr>
+            <a:xfrm flipV="1">
+              <a:off x="4267202" y="93505"/>
+              <a:ext cx="1" cy="754394"/>
+            </a:xfrm>
+            <a:prstGeom prst="line">
+              <a:avLst/>
+            </a:prstGeom>
+            <a:ln w="19050">
+              <a:solidFill>
+                <a:srgbClr val="0072C6"/>
+              </a:solidFill>
+            </a:ln>
+          </p:spPr>
+          <p:style>
+            <a:lnRef idx="1">
+              <a:schemeClr val="accent1"/>
+            </a:lnRef>
+            <a:fillRef idx="0">
+              <a:schemeClr val="accent1"/>
+            </a:fillRef>
+            <a:effectRef idx="0">
+              <a:schemeClr val="accent1"/>
+            </a:effectRef>
+            <a:fontRef idx="minor">
+              <a:schemeClr val="tx1"/>
+            </a:fontRef>
+          </p:style>
+        </p:cxnSp>
+        <p:cxnSp>
+          <p:nvCxnSpPr>
+            <p:cNvPr id="16" name="Straight Connector 15">
+              <a:extLst>
+                <a:ext uri="{FF2B5EF4-FFF2-40B4-BE49-F238E27FC236}">
+                  <a16:creationId xmlns:a16="http://schemas.microsoft.com/office/drawing/2014/main" id="{90F03633-4CAB-4B57-BF94-CF91E87AB7AE}"/>
+                </a:ext>
+              </a:extLst>
+            </p:cNvPr>
+            <p:cNvCxnSpPr>
+              <a:cxnSpLocks/>
+            </p:cNvCxnSpPr>
+            <p:nvPr/>
+          </p:nvCxnSpPr>
+          <p:spPr>
+            <a:xfrm flipV="1">
+              <a:off x="9491750" y="83129"/>
+              <a:ext cx="1" cy="754394"/>
+            </a:xfrm>
+            <a:prstGeom prst="line">
+              <a:avLst/>
+            </a:prstGeom>
+            <a:ln w="19050">
+              <a:solidFill>
+                <a:srgbClr val="0072C6"/>
+              </a:solidFill>
+            </a:ln>
+          </p:spPr>
+          <p:style>
+            <a:lnRef idx="1">
+              <a:schemeClr val="accent1"/>
+            </a:lnRef>
+            <a:fillRef idx="0">
+              <a:schemeClr val="accent1"/>
+            </a:fillRef>
+            <a:effectRef idx="0">
+              <a:schemeClr val="accent1"/>
+            </a:effectRef>
+            <a:fontRef idx="minor">
+              <a:schemeClr val="tx1"/>
+            </a:fontRef>
+          </p:style>
+        </p:cxnSp>
+      </p:grpSp>
+      <p:pic>
+        <p:nvPicPr>
+          <p:cNvPr id="20" name="Picture 2">
+            <a:extLst>
+              <a:ext uri="{FF2B5EF4-FFF2-40B4-BE49-F238E27FC236}">
+                <a16:creationId xmlns:a16="http://schemas.microsoft.com/office/drawing/2014/main" id="{775211BE-DA3A-41DA-8578-4E52F07B6AB9}"/>
+              </a:ext>
+            </a:extLst>
+          </p:cNvPr>
+          <p:cNvPicPr>
+            <a:picLocks noChangeAspect="1" noChangeArrowheads="1"/>
+          </p:cNvPicPr>
+          <p:nvPr/>
+        </p:nvPicPr>
+        <p:blipFill>
+          <a:blip r:embed="rId2">
+            <a:extLst>
+              <a:ext uri="{28A0092B-C50C-407E-A947-70E740481C1C}">
+                <a14:useLocalDpi xmlns:a14="http://schemas.microsoft.com/office/drawing/2010/main" val="0"/>
+              </a:ext>
+            </a:extLst>
+          </a:blip>
+          <a:srcRect/>
+          <a:stretch>
+            <a:fillRect/>
+          </a:stretch>
+        </p:blipFill>
+        <p:spPr bwMode="auto">
+          <a:xfrm>
+            <a:off x="144770" y="111976"/>
+            <a:ext cx="725548" cy="725548"/>
+          </a:xfrm>
+          <a:prstGeom prst="rect">
+            <a:avLst/>
+          </a:prstGeom>
+          <a:noFill/>
+          <a:extLst>
+            <a:ext uri="{909E8E84-426E-40DD-AFC4-6F175D3DCCD1}">
+              <a14:hiddenFill xmlns:a14="http://schemas.microsoft.com/office/drawing/2010/main">
+                <a:solidFill>
+                  <a:srgbClr val="FFFFFF"/>
+                </a:solidFill>
+              </a14:hiddenFill>
+            </a:ext>
+          </a:extLst>
+        </p:spPr>
+      </p:pic>
+      <p:sp>
+        <p:nvSpPr>
+          <p:cNvPr id="21" name="TextBox 20">
+            <a:extLst>
+              <a:ext uri="{FF2B5EF4-FFF2-40B4-BE49-F238E27FC236}">
+                <a16:creationId xmlns:a16="http://schemas.microsoft.com/office/drawing/2014/main" id="{30404CBF-C3F9-43E0-81FA-E9D4D01BC004}"/>
+              </a:ext>
+            </a:extLst>
+          </p:cNvPr>
+          <p:cNvSpPr txBox="1"/>
+          <p:nvPr/>
+        </p:nvSpPr>
+        <p:spPr>
+          <a:xfrm>
+            <a:off x="914402" y="191193"/>
+            <a:ext cx="3483032" cy="646331"/>
+          </a:xfrm>
+          <a:prstGeom prst="rect">
+            <a:avLst/>
+          </a:prstGeom>
+          <a:noFill/>
+        </p:spPr>
+        <p:txBody>
+          <a:bodyPr wrap="square" rtlCol="0">
+            <a:spAutoFit/>
+          </a:bodyPr>
+          <a:lstStyle/>
+          <a:p>
+            <a:pPr marL="0" marR="0" lvl="0" indent="0" algn="l" defTabSz="914400" rtl="0" eaLnBrk="1" fontAlgn="auto" latinLnBrk="0" hangingPunct="1">
+              <a:lnSpc>
+                <a:spcPct val="100000"/>
+              </a:lnSpc>
+              <a:spcBef>
+                <a:spcPts val="0"/>
+              </a:spcBef>
+              <a:spcAft>
+                <a:spcPts val="0"/>
+              </a:spcAft>
+              <a:buClrTx/>
+              <a:buSzTx/>
+              <a:buFontTx/>
+              <a:buNone/>
+              <a:tabLst/>
+              <a:defRPr/>
+            </a:pPr>
+            <a:r>
+              <a:rPr lang="en-GB" dirty="0">
+                <a:solidFill>
+                  <a:prstClr val="black"/>
+                </a:solidFill>
+                <a:latin typeface="Calibri" panose="020F0502020204030204"/>
+              </a:rPr>
+              <a:t>DP</a:t>
+            </a:r>
+            <a:r>
+              <a:rPr kumimoji="0" lang="en-GB" sz="1800" b="0" i="0" u="none" strike="noStrike" kern="1200" cap="none" spc="0" normalizeH="0" baseline="0" noProof="0" dirty="0">
+                <a:ln>
+                  <a:noFill/>
+                </a:ln>
+                <a:solidFill>
+                  <a:prstClr val="black"/>
+                </a:solidFill>
+                <a:effectLst/>
+                <a:uLnTx/>
+                <a:uFillTx/>
+                <a:latin typeface="Calibri" panose="020F0502020204030204"/>
+                <a:ea typeface="+mn-ea"/>
+                <a:cs typeface="+mn-cs"/>
+              </a:rPr>
+              <a:t>-900 Microsoft Azure Fundamentals</a:t>
+            </a:r>
+          </a:p>
+        </p:txBody>
+      </p:sp>
+      <p:sp>
+        <p:nvSpPr>
+          <p:cNvPr id="13" name="TextBox 12">
+            <a:extLst>
+              <a:ext uri="{FF2B5EF4-FFF2-40B4-BE49-F238E27FC236}">
+                <a16:creationId xmlns:a16="http://schemas.microsoft.com/office/drawing/2014/main" id="{B740727E-091B-4846-AD35-09F01069570A}"/>
+              </a:ext>
+            </a:extLst>
+          </p:cNvPr>
+          <p:cNvSpPr txBox="1"/>
+          <p:nvPr/>
+        </p:nvSpPr>
+        <p:spPr>
+          <a:xfrm>
+            <a:off x="208598" y="1100888"/>
+            <a:ext cx="11844858" cy="4026936"/>
+          </a:xfrm>
+          <a:prstGeom prst="rect">
+            <a:avLst/>
+          </a:prstGeom>
+          <a:noFill/>
+        </p:spPr>
+        <p:txBody>
+          <a:bodyPr wrap="square" rtlCol="0">
+            <a:spAutoFit/>
+          </a:bodyPr>
+          <a:lstStyle/>
+          <a:p>
+            <a:pPr>
+              <a:lnSpc>
+                <a:spcPct val="120000"/>
+              </a:lnSpc>
+            </a:pPr>
+            <a:r>
+              <a:rPr lang="en-US" sz="1600" b="1" dirty="0">
+                <a:solidFill>
+                  <a:srgbClr val="161616"/>
+                </a:solidFill>
+                <a:latin typeface="+mj-lt"/>
+              </a:rPr>
+              <a:t>DCL statements (Controlling Users)</a:t>
+            </a:r>
+          </a:p>
+          <a:p>
+            <a:pPr>
+              <a:lnSpc>
+                <a:spcPct val="120000"/>
+              </a:lnSpc>
+            </a:pPr>
+            <a:r>
+              <a:rPr lang="en-US" sz="1400" dirty="0">
+                <a:solidFill>
+                  <a:srgbClr val="161616"/>
+                </a:solidFill>
+                <a:latin typeface="+mj-lt"/>
+              </a:rPr>
+              <a:t>Database administrators generally use DCL statements to manage access to objects in a database by granting, denying, or revoking permissions to specific users or groups. The three main DCL statements are:</a:t>
+            </a:r>
+          </a:p>
+          <a:p>
+            <a:pPr marL="285750" indent="-285750">
+              <a:lnSpc>
+                <a:spcPct val="120000"/>
+              </a:lnSpc>
+              <a:buFontTx/>
+              <a:buChar char="-"/>
+            </a:pPr>
+            <a:r>
+              <a:rPr lang="en-US" sz="1400" dirty="0">
+                <a:solidFill>
+                  <a:srgbClr val="161616"/>
+                </a:solidFill>
+                <a:latin typeface="+mj-lt"/>
+              </a:rPr>
+              <a:t>Statement     Description</a:t>
+            </a:r>
+          </a:p>
+          <a:p>
+            <a:pPr marL="285750" indent="-285750">
+              <a:lnSpc>
+                <a:spcPct val="120000"/>
+              </a:lnSpc>
+              <a:buFontTx/>
+              <a:buChar char="-"/>
+            </a:pPr>
+            <a:r>
+              <a:rPr lang="en-US" sz="1400" dirty="0">
+                <a:solidFill>
+                  <a:srgbClr val="161616"/>
+                </a:solidFill>
+                <a:latin typeface="+mj-lt"/>
+              </a:rPr>
+              <a:t>GRANT	        Grant permission to perform specific actions</a:t>
+            </a:r>
+          </a:p>
+          <a:p>
+            <a:pPr marL="285750" indent="-285750">
+              <a:lnSpc>
+                <a:spcPct val="120000"/>
+              </a:lnSpc>
+              <a:buFontTx/>
+              <a:buChar char="-"/>
+            </a:pPr>
+            <a:r>
+              <a:rPr lang="en-US" sz="1400" dirty="0">
+                <a:solidFill>
+                  <a:srgbClr val="161616"/>
+                </a:solidFill>
+                <a:latin typeface="+mj-lt"/>
+              </a:rPr>
+              <a:t>DENY	        Deny permission to perform specific actions</a:t>
+            </a:r>
+          </a:p>
+          <a:p>
+            <a:pPr marL="285750" indent="-285750">
+              <a:lnSpc>
+                <a:spcPct val="120000"/>
+              </a:lnSpc>
+              <a:buFontTx/>
+              <a:buChar char="-"/>
+            </a:pPr>
+            <a:r>
+              <a:rPr lang="en-US" sz="1400" dirty="0">
+                <a:solidFill>
+                  <a:srgbClr val="161616"/>
+                </a:solidFill>
+                <a:latin typeface="+mj-lt"/>
+              </a:rPr>
+              <a:t>REVOKE	        Remove a previously granted permission</a:t>
+            </a:r>
+          </a:p>
+          <a:p>
+            <a:pPr>
+              <a:lnSpc>
+                <a:spcPct val="120000"/>
+              </a:lnSpc>
+            </a:pPr>
+            <a:endParaRPr lang="en-US" sz="1400" i="0" dirty="0">
+              <a:solidFill>
+                <a:srgbClr val="161616"/>
+              </a:solidFill>
+              <a:effectLst/>
+              <a:latin typeface="+mj-lt"/>
+            </a:endParaRPr>
+          </a:p>
+          <a:p>
+            <a:pPr>
+              <a:lnSpc>
+                <a:spcPct val="120000"/>
+              </a:lnSpc>
+            </a:pPr>
+            <a:r>
+              <a:rPr lang="en-US" sz="1600" b="1" dirty="0">
+                <a:solidFill>
+                  <a:srgbClr val="161616"/>
+                </a:solidFill>
+                <a:latin typeface="+mj-lt"/>
+              </a:rPr>
+              <a:t>SML Statements (Finding and manipulating rows only)</a:t>
+            </a:r>
+            <a:endParaRPr lang="en-US" sz="1600" b="1" i="0" dirty="0">
+              <a:solidFill>
+                <a:srgbClr val="161616"/>
+              </a:solidFill>
+              <a:effectLst/>
+              <a:latin typeface="+mj-lt"/>
+            </a:endParaRPr>
+          </a:p>
+          <a:p>
+            <a:pPr>
+              <a:lnSpc>
+                <a:spcPct val="120000"/>
+              </a:lnSpc>
+            </a:pPr>
+            <a:r>
+              <a:rPr lang="en-US" sz="1400" i="0" dirty="0">
+                <a:solidFill>
+                  <a:srgbClr val="161616"/>
+                </a:solidFill>
+                <a:effectLst/>
+                <a:latin typeface="+mj-lt"/>
+              </a:rPr>
+              <a:t>You use DML statements to manipulate the rows in tables. These statements enable you to retrieve (query) data, insert new rows, or modify existing rows. You can also delete rows if you don't need them anymore. The four main DML statements are:</a:t>
+            </a:r>
+          </a:p>
+          <a:p>
+            <a:pPr marL="285750" indent="-285750">
+              <a:lnSpc>
+                <a:spcPct val="120000"/>
+              </a:lnSpc>
+              <a:buFontTx/>
+              <a:buChar char="-"/>
+            </a:pPr>
+            <a:r>
+              <a:rPr lang="en-US" sz="1400" i="0" dirty="0">
+                <a:solidFill>
+                  <a:srgbClr val="161616"/>
+                </a:solidFill>
+                <a:effectLst/>
+                <a:latin typeface="+mj-lt"/>
+              </a:rPr>
+              <a:t>SELECT	   Read rows from a table</a:t>
+            </a:r>
+          </a:p>
+          <a:p>
+            <a:pPr marL="285750" indent="-285750">
+              <a:lnSpc>
+                <a:spcPct val="120000"/>
+              </a:lnSpc>
+              <a:buFontTx/>
+              <a:buChar char="-"/>
+            </a:pPr>
+            <a:r>
+              <a:rPr lang="en-US" sz="1400" i="0" dirty="0">
+                <a:solidFill>
+                  <a:srgbClr val="161616"/>
+                </a:solidFill>
+                <a:effectLst/>
+                <a:latin typeface="+mj-lt"/>
+              </a:rPr>
+              <a:t>INSERT	   Insert new rows into a table</a:t>
+            </a:r>
+          </a:p>
+          <a:p>
+            <a:pPr marL="285750" indent="-285750">
+              <a:lnSpc>
+                <a:spcPct val="120000"/>
+              </a:lnSpc>
+              <a:buFontTx/>
+              <a:buChar char="-"/>
+            </a:pPr>
+            <a:r>
+              <a:rPr lang="en-US" sz="1400" i="0" dirty="0">
+                <a:solidFill>
+                  <a:srgbClr val="161616"/>
+                </a:solidFill>
+                <a:effectLst/>
+                <a:latin typeface="+mj-lt"/>
+              </a:rPr>
+              <a:t>UPDATE 	   Modify data in existing rows</a:t>
+            </a:r>
+          </a:p>
+          <a:p>
+            <a:pPr marL="285750" indent="-285750">
+              <a:lnSpc>
+                <a:spcPct val="120000"/>
+              </a:lnSpc>
+              <a:buFontTx/>
+              <a:buChar char="-"/>
+            </a:pPr>
+            <a:r>
+              <a:rPr lang="en-US" sz="1400" i="0" dirty="0">
+                <a:solidFill>
+                  <a:srgbClr val="161616"/>
+                </a:solidFill>
+                <a:effectLst/>
+                <a:latin typeface="+mj-lt"/>
+              </a:rPr>
+              <a:t>DELETE	   Delete existing rows</a:t>
+            </a:r>
+          </a:p>
+        </p:txBody>
+      </p:sp>
+    </p:spTree>
+    <p:extLst>
+      <p:ext uri="{BB962C8B-B14F-4D97-AF65-F5344CB8AC3E}">
+        <p14:creationId xmlns:p14="http://schemas.microsoft.com/office/powerpoint/2010/main" val="696225935"/>
+      </p:ext>
+    </p:extLst>
+  </p:cSld>
+  <p:clrMapOvr>
+    <a:masterClrMapping/>
+  </p:clrMapOvr>
+</p:sld>
+</file>
+
+<file path=ppt/slides/slide16.xml><?xml version="1.0" encoding="utf-8"?>
+<p:sld xmlns:a="http://schemas.openxmlformats.org/drawingml/2006/main" xmlns:r="http://schemas.openxmlformats.org/officeDocument/2006/relationships" xmlns:p="http://schemas.openxmlformats.org/presentationml/2006/main">
+  <p:cSld>
+    <p:spTree>
+      <p:nvGrpSpPr>
+        <p:cNvPr id="1" name=""/>
+        <p:cNvGrpSpPr/>
+        <p:nvPr/>
+      </p:nvGrpSpPr>
+      <p:grpSpPr>
+        <a:xfrm>
+          <a:off x="0" y="0"/>
+          <a:ext cx="0" cy="0"/>
+          <a:chOff x="0" y="0"/>
+          <a:chExt cx="0" cy="0"/>
+        </a:xfrm>
+      </p:grpSpPr>
+      <p:grpSp>
+        <p:nvGrpSpPr>
+          <p:cNvPr id="18" name="Group 17">
+            <a:extLst>
+              <a:ext uri="{FF2B5EF4-FFF2-40B4-BE49-F238E27FC236}">
+                <a16:creationId xmlns:a16="http://schemas.microsoft.com/office/drawing/2014/main" id="{6185BE9B-87C8-4B46-9293-0E71CF17E76A}"/>
+              </a:ext>
+            </a:extLst>
+          </p:cNvPr>
+          <p:cNvGrpSpPr/>
+          <p:nvPr/>
+        </p:nvGrpSpPr>
+        <p:grpSpPr>
+          <a:xfrm>
+            <a:off x="99755" y="83129"/>
+            <a:ext cx="11953701" cy="872834"/>
+            <a:chOff x="99755" y="83129"/>
+            <a:chExt cx="11953701" cy="872834"/>
+          </a:xfrm>
+        </p:grpSpPr>
+        <p:cxnSp>
+          <p:nvCxnSpPr>
+            <p:cNvPr id="5" name="Straight Connector 4">
+              <a:extLst>
+                <a:ext uri="{FF2B5EF4-FFF2-40B4-BE49-F238E27FC236}">
+                  <a16:creationId xmlns:a16="http://schemas.microsoft.com/office/drawing/2014/main" id="{A8BE4EF8-406C-4035-940C-AB752B29BA18}"/>
+                </a:ext>
+              </a:extLst>
+            </p:cNvPr>
+            <p:cNvCxnSpPr/>
+            <p:nvPr/>
+          </p:nvCxnSpPr>
+          <p:spPr>
+            <a:xfrm>
+              <a:off x="99755" y="955963"/>
+              <a:ext cx="11953701" cy="0"/>
+            </a:xfrm>
+            <a:prstGeom prst="line">
+              <a:avLst/>
+            </a:prstGeom>
+            <a:ln w="19050">
+              <a:solidFill>
+                <a:srgbClr val="0072C6"/>
+              </a:solidFill>
+            </a:ln>
+          </p:spPr>
+          <p:style>
+            <a:lnRef idx="1">
+              <a:schemeClr val="accent1"/>
+            </a:lnRef>
+            <a:fillRef idx="0">
+              <a:schemeClr val="accent1"/>
+            </a:fillRef>
+            <a:effectRef idx="0">
+              <a:schemeClr val="accent1"/>
+            </a:effectRef>
+            <a:fontRef idx="minor">
+              <a:schemeClr val="tx1"/>
+            </a:fontRef>
+          </p:style>
+        </p:cxnSp>
+        <p:sp>
+          <p:nvSpPr>
+            <p:cNvPr id="8" name="TextBox 7">
+              <a:extLst>
+                <a:ext uri="{FF2B5EF4-FFF2-40B4-BE49-F238E27FC236}">
+                  <a16:creationId xmlns:a16="http://schemas.microsoft.com/office/drawing/2014/main" id="{C61B684E-FDA7-4625-9CC3-79C17CC59ED7}"/>
+                </a:ext>
+              </a:extLst>
+            </p:cNvPr>
+            <p:cNvSpPr txBox="1"/>
+            <p:nvPr/>
+          </p:nvSpPr>
+          <p:spPr>
+            <a:xfrm>
+              <a:off x="4372493" y="180818"/>
+              <a:ext cx="4989025" cy="646331"/>
+            </a:xfrm>
+            <a:prstGeom prst="rect">
+              <a:avLst/>
+            </a:prstGeom>
+            <a:noFill/>
+          </p:spPr>
+          <p:txBody>
+            <a:bodyPr wrap="square" rtlCol="0">
+              <a:spAutoFit/>
+            </a:bodyPr>
+            <a:lstStyle/>
+            <a:p>
+              <a:pPr marL="0" marR="0" lvl="0" indent="0" algn="l" defTabSz="914400" rtl="0" eaLnBrk="1" fontAlgn="auto" latinLnBrk="0" hangingPunct="1">
+                <a:lnSpc>
+                  <a:spcPct val="100000"/>
+                </a:lnSpc>
+                <a:spcBef>
+                  <a:spcPts val="0"/>
+                </a:spcBef>
+                <a:spcAft>
+                  <a:spcPts val="0"/>
+                </a:spcAft>
+                <a:buClrTx/>
+                <a:buSzTx/>
+                <a:buFontTx/>
+                <a:buNone/>
+                <a:tabLst/>
+                <a:defRPr/>
+              </a:pPr>
+              <a:r>
+                <a:rPr kumimoji="0" lang="en-GB" sz="1800" b="0" i="0" u="none" strike="noStrike" kern="1200" cap="none" spc="0" normalizeH="0" baseline="0" noProof="0" dirty="0">
+                  <a:ln>
+                    <a:noFill/>
+                  </a:ln>
+                  <a:solidFill>
+                    <a:prstClr val="black"/>
+                  </a:solidFill>
+                  <a:effectLst/>
+                  <a:uLnTx/>
+                  <a:uFillTx/>
+                  <a:latin typeface="Calibri" panose="020F0502020204030204"/>
+                  <a:ea typeface="+mn-ea"/>
+                  <a:cs typeface="+mn-cs"/>
+                </a:rPr>
+                <a:t>Microsoft Azure Data Fundamentals: Explore relational data in Azure</a:t>
+              </a:r>
+            </a:p>
+          </p:txBody>
+        </p:sp>
+        <p:sp>
+          <p:nvSpPr>
+            <p:cNvPr id="10" name="TextBox 9">
+              <a:extLst>
+                <a:ext uri="{FF2B5EF4-FFF2-40B4-BE49-F238E27FC236}">
+                  <a16:creationId xmlns:a16="http://schemas.microsoft.com/office/drawing/2014/main" id="{4E568F0D-7E90-4A0C-8070-6C806D992954}"/>
+                </a:ext>
+              </a:extLst>
+            </p:cNvPr>
+            <p:cNvSpPr txBox="1"/>
+            <p:nvPr/>
+          </p:nvSpPr>
+          <p:spPr>
+            <a:xfrm>
+              <a:off x="9534699" y="180818"/>
+              <a:ext cx="2155764" cy="369332"/>
+            </a:xfrm>
+            <a:prstGeom prst="rect">
+              <a:avLst/>
+            </a:prstGeom>
+            <a:noFill/>
+          </p:spPr>
+          <p:txBody>
+            <a:bodyPr wrap="square" rtlCol="0">
+              <a:spAutoFit/>
+            </a:bodyPr>
+            <a:lstStyle/>
+            <a:p>
+              <a:pPr marL="0" marR="0" lvl="0" indent="0" algn="l" defTabSz="914400" rtl="0" eaLnBrk="1" fontAlgn="auto" latinLnBrk="0" hangingPunct="1">
+                <a:lnSpc>
+                  <a:spcPct val="100000"/>
+                </a:lnSpc>
+                <a:spcBef>
+                  <a:spcPts val="0"/>
+                </a:spcBef>
+                <a:spcAft>
+                  <a:spcPts val="0"/>
+                </a:spcAft>
+                <a:buClrTx/>
+                <a:buSzTx/>
+                <a:buFontTx/>
+                <a:buNone/>
+                <a:tabLst/>
+                <a:defRPr/>
+              </a:pPr>
+              <a:r>
+                <a:rPr kumimoji="0" lang="en-GB" sz="1800" b="0" i="0" u="none" strike="noStrike" kern="1200" cap="none" spc="0" normalizeH="0" baseline="0" noProof="0" dirty="0">
+                  <a:ln>
+                    <a:noFill/>
+                  </a:ln>
+                  <a:solidFill>
+                    <a:prstClr val="black"/>
+                  </a:solidFill>
+                  <a:effectLst/>
+                  <a:uLnTx/>
+                  <a:uFillTx/>
+                  <a:latin typeface="Calibri" panose="020F0502020204030204"/>
+                  <a:ea typeface="+mn-ea"/>
+                  <a:cs typeface="+mn-cs"/>
+                </a:rPr>
+                <a:t>Date: 05/03/23 </a:t>
+              </a:r>
+            </a:p>
+          </p:txBody>
+        </p:sp>
+        <p:cxnSp>
+          <p:nvCxnSpPr>
+            <p:cNvPr id="11" name="Straight Connector 10">
+              <a:extLst>
+                <a:ext uri="{FF2B5EF4-FFF2-40B4-BE49-F238E27FC236}">
+                  <a16:creationId xmlns:a16="http://schemas.microsoft.com/office/drawing/2014/main" id="{F70ABCF3-BE60-426F-8C8C-059C854869C6}"/>
+                </a:ext>
+              </a:extLst>
+            </p:cNvPr>
+            <p:cNvCxnSpPr>
+              <a:cxnSpLocks/>
+            </p:cNvCxnSpPr>
+            <p:nvPr/>
+          </p:nvCxnSpPr>
+          <p:spPr>
+            <a:xfrm flipV="1">
+              <a:off x="4267202" y="93505"/>
+              <a:ext cx="1" cy="754394"/>
+            </a:xfrm>
+            <a:prstGeom prst="line">
+              <a:avLst/>
+            </a:prstGeom>
+            <a:ln w="19050">
+              <a:solidFill>
+                <a:srgbClr val="0072C6"/>
+              </a:solidFill>
+            </a:ln>
+          </p:spPr>
+          <p:style>
+            <a:lnRef idx="1">
+              <a:schemeClr val="accent1"/>
+            </a:lnRef>
+            <a:fillRef idx="0">
+              <a:schemeClr val="accent1"/>
+            </a:fillRef>
+            <a:effectRef idx="0">
+              <a:schemeClr val="accent1"/>
+            </a:effectRef>
+            <a:fontRef idx="minor">
+              <a:schemeClr val="tx1"/>
+            </a:fontRef>
+          </p:style>
+        </p:cxnSp>
+        <p:cxnSp>
+          <p:nvCxnSpPr>
+            <p:cNvPr id="16" name="Straight Connector 15">
+              <a:extLst>
+                <a:ext uri="{FF2B5EF4-FFF2-40B4-BE49-F238E27FC236}">
+                  <a16:creationId xmlns:a16="http://schemas.microsoft.com/office/drawing/2014/main" id="{90F03633-4CAB-4B57-BF94-CF91E87AB7AE}"/>
+                </a:ext>
+              </a:extLst>
+            </p:cNvPr>
+            <p:cNvCxnSpPr>
+              <a:cxnSpLocks/>
+            </p:cNvCxnSpPr>
+            <p:nvPr/>
+          </p:nvCxnSpPr>
+          <p:spPr>
+            <a:xfrm flipV="1">
+              <a:off x="9491750" y="83129"/>
+              <a:ext cx="1" cy="754394"/>
+            </a:xfrm>
+            <a:prstGeom prst="line">
+              <a:avLst/>
+            </a:prstGeom>
+            <a:ln w="19050">
+              <a:solidFill>
+                <a:srgbClr val="0072C6"/>
+              </a:solidFill>
+            </a:ln>
+          </p:spPr>
+          <p:style>
+            <a:lnRef idx="1">
+              <a:schemeClr val="accent1"/>
+            </a:lnRef>
+            <a:fillRef idx="0">
+              <a:schemeClr val="accent1"/>
+            </a:fillRef>
+            <a:effectRef idx="0">
+              <a:schemeClr val="accent1"/>
+            </a:effectRef>
+            <a:fontRef idx="minor">
+              <a:schemeClr val="tx1"/>
+            </a:fontRef>
+          </p:style>
+        </p:cxnSp>
+      </p:grpSp>
+      <p:pic>
+        <p:nvPicPr>
+          <p:cNvPr id="20" name="Picture 2">
+            <a:extLst>
+              <a:ext uri="{FF2B5EF4-FFF2-40B4-BE49-F238E27FC236}">
+                <a16:creationId xmlns:a16="http://schemas.microsoft.com/office/drawing/2014/main" id="{775211BE-DA3A-41DA-8578-4E52F07B6AB9}"/>
+              </a:ext>
+            </a:extLst>
+          </p:cNvPr>
+          <p:cNvPicPr>
+            <a:picLocks noChangeAspect="1" noChangeArrowheads="1"/>
+          </p:cNvPicPr>
+          <p:nvPr/>
+        </p:nvPicPr>
+        <p:blipFill>
+          <a:blip r:embed="rId2">
+            <a:extLst>
+              <a:ext uri="{28A0092B-C50C-407E-A947-70E740481C1C}">
+                <a14:useLocalDpi xmlns:a14="http://schemas.microsoft.com/office/drawing/2010/main" val="0"/>
+              </a:ext>
+            </a:extLst>
+          </a:blip>
+          <a:srcRect/>
+          <a:stretch>
+            <a:fillRect/>
+          </a:stretch>
+        </p:blipFill>
+        <p:spPr bwMode="auto">
+          <a:xfrm>
+            <a:off x="144770" y="111976"/>
+            <a:ext cx="725548" cy="725548"/>
+          </a:xfrm>
+          <a:prstGeom prst="rect">
+            <a:avLst/>
+          </a:prstGeom>
+          <a:noFill/>
+          <a:extLst>
+            <a:ext uri="{909E8E84-426E-40DD-AFC4-6F175D3DCCD1}">
+              <a14:hiddenFill xmlns:a14="http://schemas.microsoft.com/office/drawing/2010/main">
+                <a:solidFill>
+                  <a:srgbClr val="FFFFFF"/>
+                </a:solidFill>
+              </a14:hiddenFill>
+            </a:ext>
+          </a:extLst>
+        </p:spPr>
+      </p:pic>
+      <p:sp>
+        <p:nvSpPr>
+          <p:cNvPr id="21" name="TextBox 20">
+            <a:extLst>
+              <a:ext uri="{FF2B5EF4-FFF2-40B4-BE49-F238E27FC236}">
+                <a16:creationId xmlns:a16="http://schemas.microsoft.com/office/drawing/2014/main" id="{30404CBF-C3F9-43E0-81FA-E9D4D01BC004}"/>
+              </a:ext>
+            </a:extLst>
+          </p:cNvPr>
+          <p:cNvSpPr txBox="1"/>
+          <p:nvPr/>
+        </p:nvSpPr>
+        <p:spPr>
+          <a:xfrm>
+            <a:off x="914402" y="191193"/>
+            <a:ext cx="3483032" cy="646331"/>
+          </a:xfrm>
+          <a:prstGeom prst="rect">
+            <a:avLst/>
+          </a:prstGeom>
+          <a:noFill/>
+        </p:spPr>
+        <p:txBody>
+          <a:bodyPr wrap="square" rtlCol="0">
+            <a:spAutoFit/>
+          </a:bodyPr>
+          <a:lstStyle/>
+          <a:p>
+            <a:pPr marL="0" marR="0" lvl="0" indent="0" algn="l" defTabSz="914400" rtl="0" eaLnBrk="1" fontAlgn="auto" latinLnBrk="0" hangingPunct="1">
+              <a:lnSpc>
+                <a:spcPct val="100000"/>
+              </a:lnSpc>
+              <a:spcBef>
+                <a:spcPts val="0"/>
+              </a:spcBef>
+              <a:spcAft>
+                <a:spcPts val="0"/>
+              </a:spcAft>
+              <a:buClrTx/>
+              <a:buSzTx/>
+              <a:buFontTx/>
+              <a:buNone/>
+              <a:tabLst/>
+              <a:defRPr/>
+            </a:pPr>
+            <a:r>
+              <a:rPr lang="en-GB" dirty="0">
+                <a:solidFill>
+                  <a:prstClr val="black"/>
+                </a:solidFill>
+                <a:latin typeface="Calibri" panose="020F0502020204030204"/>
+              </a:rPr>
+              <a:t>DP</a:t>
+            </a:r>
+            <a:r>
+              <a:rPr kumimoji="0" lang="en-GB" sz="1800" b="0" i="0" u="none" strike="noStrike" kern="1200" cap="none" spc="0" normalizeH="0" baseline="0" noProof="0" dirty="0">
+                <a:ln>
+                  <a:noFill/>
+                </a:ln>
+                <a:solidFill>
+                  <a:prstClr val="black"/>
+                </a:solidFill>
+                <a:effectLst/>
+                <a:uLnTx/>
+                <a:uFillTx/>
+                <a:latin typeface="Calibri" panose="020F0502020204030204"/>
+                <a:ea typeface="+mn-ea"/>
+                <a:cs typeface="+mn-cs"/>
+              </a:rPr>
+              <a:t>-900 Microsoft Azure Fundamentals</a:t>
+            </a:r>
+          </a:p>
+        </p:txBody>
+      </p:sp>
+      <p:sp>
+        <p:nvSpPr>
+          <p:cNvPr id="13" name="TextBox 12">
+            <a:extLst>
+              <a:ext uri="{FF2B5EF4-FFF2-40B4-BE49-F238E27FC236}">
+                <a16:creationId xmlns:a16="http://schemas.microsoft.com/office/drawing/2014/main" id="{B740727E-091B-4846-AD35-09F01069570A}"/>
+              </a:ext>
+            </a:extLst>
+          </p:cNvPr>
+          <p:cNvSpPr txBox="1"/>
+          <p:nvPr/>
+        </p:nvSpPr>
+        <p:spPr>
+          <a:xfrm>
+            <a:off x="208598" y="1100888"/>
+            <a:ext cx="11844858" cy="2180277"/>
+          </a:xfrm>
+          <a:prstGeom prst="rect">
+            <a:avLst/>
+          </a:prstGeom>
+          <a:noFill/>
+        </p:spPr>
+        <p:txBody>
+          <a:bodyPr wrap="square" rtlCol="0">
+            <a:spAutoFit/>
+          </a:bodyPr>
+          <a:lstStyle/>
+          <a:p>
+            <a:pPr>
+              <a:lnSpc>
+                <a:spcPct val="120000"/>
+              </a:lnSpc>
+            </a:pPr>
+            <a:r>
+              <a:rPr lang="en-US" sz="1600" b="1" dirty="0">
+                <a:solidFill>
+                  <a:srgbClr val="161616"/>
+                </a:solidFill>
+                <a:latin typeface="+mj-lt"/>
+              </a:rPr>
+              <a:t>Extra: Junction Tables</a:t>
+            </a:r>
+            <a:endParaRPr lang="en-US" sz="1400" b="1" i="0" dirty="0">
+              <a:solidFill>
+                <a:srgbClr val="161616"/>
+              </a:solidFill>
+              <a:effectLst/>
+              <a:latin typeface="+mj-lt"/>
+            </a:endParaRPr>
+          </a:p>
+          <a:p>
+            <a:pPr marL="285750" indent="-285750">
+              <a:lnSpc>
+                <a:spcPct val="120000"/>
+              </a:lnSpc>
+              <a:buFontTx/>
+              <a:buChar char="-"/>
+            </a:pPr>
+            <a:r>
+              <a:rPr lang="en-US" sz="1400" dirty="0">
+                <a:solidFill>
+                  <a:srgbClr val="161616"/>
+                </a:solidFill>
+                <a:latin typeface="+mj-lt"/>
+              </a:rPr>
+              <a:t>This is not in the course notes, but I stumbled across it when assessing why “every table should contain a primary key, although SQL does not enforce this”. In my mind, often when doing data modelling in power bi, my dimension tables will each have a primary key, my fact table will often have many foreign keys but no primary key.  </a:t>
+            </a:r>
+          </a:p>
+          <a:p>
+            <a:pPr marL="285750" indent="-285750">
+              <a:lnSpc>
+                <a:spcPct val="120000"/>
+              </a:lnSpc>
+              <a:buFontTx/>
+              <a:buChar char="-"/>
+            </a:pPr>
+            <a:r>
+              <a:rPr lang="en-US" sz="1400" i="0" dirty="0">
+                <a:solidFill>
+                  <a:srgbClr val="161616"/>
+                </a:solidFill>
+                <a:effectLst/>
+                <a:latin typeface="+mj-lt"/>
+              </a:rPr>
+              <a:t>Many people on </a:t>
+            </a:r>
+            <a:r>
+              <a:rPr lang="en-US" sz="1400" i="0" dirty="0" err="1">
+                <a:solidFill>
+                  <a:srgbClr val="161616"/>
+                </a:solidFill>
+                <a:effectLst/>
+                <a:latin typeface="+mj-lt"/>
+              </a:rPr>
+              <a:t>stackoverflow</a:t>
+            </a:r>
+            <a:r>
+              <a:rPr lang="en-US" sz="1400" i="0" dirty="0">
+                <a:solidFill>
+                  <a:srgbClr val="161616"/>
+                </a:solidFill>
+                <a:effectLst/>
+                <a:latin typeface="+mj-lt"/>
+              </a:rPr>
+              <a:t> state that a unique identifier even in a fact table is often necessary when selecting, deleting and linking. </a:t>
+            </a:r>
+          </a:p>
+          <a:p>
+            <a:pPr marL="285750" indent="-285750">
+              <a:lnSpc>
+                <a:spcPct val="120000"/>
+              </a:lnSpc>
+              <a:buFontTx/>
+              <a:buChar char="-"/>
+            </a:pPr>
+            <a:r>
+              <a:rPr lang="en-US" sz="1400" dirty="0">
+                <a:solidFill>
+                  <a:srgbClr val="161616"/>
+                </a:solidFill>
+                <a:latin typeface="+mj-lt"/>
+              </a:rPr>
+              <a:t>It also becomes important when dealing with many to many relationships. If we have two tables with a different primary key in each but that we want to link up, we can instead do this mapping in a junction table. For this we need primary keys in each table. </a:t>
+            </a:r>
+          </a:p>
+          <a:p>
+            <a:pPr marL="285750" indent="-285750">
+              <a:lnSpc>
+                <a:spcPct val="120000"/>
+              </a:lnSpc>
+              <a:buFontTx/>
+              <a:buChar char="-"/>
+            </a:pPr>
+            <a:r>
+              <a:rPr lang="en-US" sz="1400" i="0" dirty="0">
+                <a:solidFill>
+                  <a:srgbClr val="161616"/>
+                </a:solidFill>
+                <a:effectLst/>
+                <a:latin typeface="+mj-lt"/>
+              </a:rPr>
+              <a:t>Two e</a:t>
+            </a:r>
+            <a:r>
+              <a:rPr lang="en-US" sz="1400" dirty="0">
+                <a:solidFill>
+                  <a:srgbClr val="161616"/>
+                </a:solidFill>
+                <a:latin typeface="+mj-lt"/>
+              </a:rPr>
+              <a:t>xamples are shown below:</a:t>
+            </a:r>
+            <a:endParaRPr lang="en-US" sz="1400" i="0" dirty="0">
+              <a:solidFill>
+                <a:srgbClr val="161616"/>
+              </a:solidFill>
+              <a:effectLst/>
+              <a:latin typeface="+mj-lt"/>
+            </a:endParaRPr>
+          </a:p>
+        </p:txBody>
+      </p:sp>
+      <p:pic>
+        <p:nvPicPr>
+          <p:cNvPr id="3" name="Picture 2">
+            <a:extLst>
+              <a:ext uri="{FF2B5EF4-FFF2-40B4-BE49-F238E27FC236}">
+                <a16:creationId xmlns:a16="http://schemas.microsoft.com/office/drawing/2014/main" id="{06B78446-454C-B8F4-7383-D30AA9747809}"/>
+              </a:ext>
+            </a:extLst>
+          </p:cNvPr>
+          <p:cNvPicPr>
+            <a:picLocks noChangeAspect="1"/>
+          </p:cNvPicPr>
+          <p:nvPr/>
+        </p:nvPicPr>
+        <p:blipFill>
+          <a:blip r:embed="rId3"/>
+          <a:stretch>
+            <a:fillRect/>
+          </a:stretch>
+        </p:blipFill>
+        <p:spPr>
+          <a:xfrm>
+            <a:off x="7265819" y="4010029"/>
+            <a:ext cx="4315895" cy="2166410"/>
+          </a:xfrm>
+          <a:prstGeom prst="rect">
+            <a:avLst/>
+          </a:prstGeom>
+        </p:spPr>
+      </p:pic>
+      <p:pic>
+        <p:nvPicPr>
+          <p:cNvPr id="6" name="Picture 5">
+            <a:extLst>
+              <a:ext uri="{FF2B5EF4-FFF2-40B4-BE49-F238E27FC236}">
+                <a16:creationId xmlns:a16="http://schemas.microsoft.com/office/drawing/2014/main" id="{6C316E40-1785-A1F4-5F0C-C45A7A0F1A69}"/>
+              </a:ext>
+            </a:extLst>
+          </p:cNvPr>
+          <p:cNvPicPr>
+            <a:picLocks noChangeAspect="1"/>
+          </p:cNvPicPr>
+          <p:nvPr/>
+        </p:nvPicPr>
+        <p:blipFill>
+          <a:blip r:embed="rId4"/>
+          <a:stretch>
+            <a:fillRect/>
+          </a:stretch>
+        </p:blipFill>
+        <p:spPr>
+          <a:xfrm>
+            <a:off x="610286" y="3576836"/>
+            <a:ext cx="5820099" cy="1304505"/>
+          </a:xfrm>
+          <a:prstGeom prst="rect">
+            <a:avLst/>
+          </a:prstGeom>
+        </p:spPr>
+      </p:pic>
+    </p:spTree>
+    <p:extLst>
+      <p:ext uri="{BB962C8B-B14F-4D97-AF65-F5344CB8AC3E}">
+        <p14:creationId xmlns:p14="http://schemas.microsoft.com/office/powerpoint/2010/main" val="523222186"/>
+      </p:ext>
+    </p:extLst>
+  </p:cSld>
+  <p:clrMapOvr>
+    <a:masterClrMapping/>
+  </p:clrMapOvr>
+</p:sld>
+</file>
+
+<file path=ppt/slides/slide17.xml><?xml version="1.0" encoding="utf-8"?>
+<p:sld xmlns:a="http://schemas.openxmlformats.org/drawingml/2006/main" xmlns:r="http://schemas.openxmlformats.org/officeDocument/2006/relationships" xmlns:p="http://schemas.openxmlformats.org/presentationml/2006/main">
+  <p:cSld>
+    <p:spTree>
+      <p:nvGrpSpPr>
+        <p:cNvPr id="1" name=""/>
+        <p:cNvGrpSpPr/>
+        <p:nvPr/>
+      </p:nvGrpSpPr>
+      <p:grpSpPr>
+        <a:xfrm>
+          <a:off x="0" y="0"/>
+          <a:ext cx="0" cy="0"/>
+          <a:chOff x="0" y="0"/>
+          <a:chExt cx="0" cy="0"/>
+        </a:xfrm>
+      </p:grpSpPr>
       <p:pic>
         <p:nvPicPr>
           <p:cNvPr id="7" name="Picture 2">
@@ -5990,7 +8909,7 @@
 </p:sld>
 </file>
 
-<file path=ppt/slides/slide14.xml><?xml version="1.0" encoding="utf-8"?>
+<file path=ppt/slides/slide18.xml><?xml version="1.0" encoding="utf-8"?>
 <p:sld xmlns:a="http://schemas.openxmlformats.org/drawingml/2006/main" xmlns:r="http://schemas.openxmlformats.org/officeDocument/2006/relationships" xmlns:p="http://schemas.openxmlformats.org/presentationml/2006/main">
   <p:cSld>
     <p:spTree>

</xml_diff>

<commit_message>
Azure DP900 Section 2 Module 2
</commit_message>
<xml_diff>
--- a/Azure_DP-900_Fundamentals/MJH_DP-900_Azure_Fundamentals_Notes.pptx
+++ b/Azure_DP-900_Fundamentals/MJH_DP-900_Azure_Fundamentals_Notes.pptx
@@ -21,8 +21,12 @@
     <p:sldId id="273" r:id="rId15"/>
     <p:sldId id="274" r:id="rId16"/>
     <p:sldId id="272" r:id="rId17"/>
-    <p:sldId id="260" r:id="rId18"/>
-    <p:sldId id="261" r:id="rId19"/>
+    <p:sldId id="275" r:id="rId18"/>
+    <p:sldId id="276" r:id="rId19"/>
+    <p:sldId id="277" r:id="rId20"/>
+    <p:sldId id="260" r:id="rId21"/>
+    <p:sldId id="278" r:id="rId22"/>
+    <p:sldId id="261" r:id="rId23"/>
   </p:sldIdLst>
   <p:sldSz cx="12192000" cy="6858000"/>
   <p:notesSz cx="6858000" cy="9144000"/>
@@ -278,7 +282,7 @@
           <a:p>
             <a:fld id="{655AA731-BE5F-44DA-AAEA-300254B29F16}" type="datetimeFigureOut">
               <a:rPr lang="en-GB" smtClean="0"/>
-              <a:t>05/03/2023</a:t>
+              <a:t>15/03/2023</a:t>
             </a:fld>
             <a:endParaRPr lang="en-GB"/>
           </a:p>
@@ -478,7 +482,7 @@
           <a:p>
             <a:fld id="{655AA731-BE5F-44DA-AAEA-300254B29F16}" type="datetimeFigureOut">
               <a:rPr lang="en-GB" smtClean="0"/>
-              <a:t>05/03/2023</a:t>
+              <a:t>15/03/2023</a:t>
             </a:fld>
             <a:endParaRPr lang="en-GB"/>
           </a:p>
@@ -688,7 +692,7 @@
           <a:p>
             <a:fld id="{655AA731-BE5F-44DA-AAEA-300254B29F16}" type="datetimeFigureOut">
               <a:rPr lang="en-GB" smtClean="0"/>
-              <a:t>05/03/2023</a:t>
+              <a:t>15/03/2023</a:t>
             </a:fld>
             <a:endParaRPr lang="en-GB"/>
           </a:p>
@@ -888,7 +892,7 @@
           <a:p>
             <a:fld id="{655AA731-BE5F-44DA-AAEA-300254B29F16}" type="datetimeFigureOut">
               <a:rPr lang="en-GB" smtClean="0"/>
-              <a:t>05/03/2023</a:t>
+              <a:t>15/03/2023</a:t>
             </a:fld>
             <a:endParaRPr lang="en-GB"/>
           </a:p>
@@ -1164,7 +1168,7 @@
           <a:p>
             <a:fld id="{655AA731-BE5F-44DA-AAEA-300254B29F16}" type="datetimeFigureOut">
               <a:rPr lang="en-GB" smtClean="0"/>
-              <a:t>05/03/2023</a:t>
+              <a:t>15/03/2023</a:t>
             </a:fld>
             <a:endParaRPr lang="en-GB"/>
           </a:p>
@@ -1432,7 +1436,7 @@
           <a:p>
             <a:fld id="{655AA731-BE5F-44DA-AAEA-300254B29F16}" type="datetimeFigureOut">
               <a:rPr lang="en-GB" smtClean="0"/>
-              <a:t>05/03/2023</a:t>
+              <a:t>15/03/2023</a:t>
             </a:fld>
             <a:endParaRPr lang="en-GB"/>
           </a:p>
@@ -1847,7 +1851,7 @@
           <a:p>
             <a:fld id="{655AA731-BE5F-44DA-AAEA-300254B29F16}" type="datetimeFigureOut">
               <a:rPr lang="en-GB" smtClean="0"/>
-              <a:t>05/03/2023</a:t>
+              <a:t>15/03/2023</a:t>
             </a:fld>
             <a:endParaRPr lang="en-GB"/>
           </a:p>
@@ -1989,7 +1993,7 @@
           <a:p>
             <a:fld id="{655AA731-BE5F-44DA-AAEA-300254B29F16}" type="datetimeFigureOut">
               <a:rPr lang="en-GB" smtClean="0"/>
-              <a:t>05/03/2023</a:t>
+              <a:t>15/03/2023</a:t>
             </a:fld>
             <a:endParaRPr lang="en-GB"/>
           </a:p>
@@ -2102,7 +2106,7 @@
           <a:p>
             <a:fld id="{655AA731-BE5F-44DA-AAEA-300254B29F16}" type="datetimeFigureOut">
               <a:rPr lang="en-GB" smtClean="0"/>
-              <a:t>05/03/2023</a:t>
+              <a:t>15/03/2023</a:t>
             </a:fld>
             <a:endParaRPr lang="en-GB"/>
           </a:p>
@@ -2415,7 +2419,7 @@
           <a:p>
             <a:fld id="{655AA731-BE5F-44DA-AAEA-300254B29F16}" type="datetimeFigureOut">
               <a:rPr lang="en-GB" smtClean="0"/>
-              <a:t>05/03/2023</a:t>
+              <a:t>15/03/2023</a:t>
             </a:fld>
             <a:endParaRPr lang="en-GB"/>
           </a:p>
@@ -2704,7 +2708,7 @@
           <a:p>
             <a:fld id="{655AA731-BE5F-44DA-AAEA-300254B29F16}" type="datetimeFigureOut">
               <a:rPr lang="en-GB" smtClean="0"/>
-              <a:t>05/03/2023</a:t>
+              <a:t>15/03/2023</a:t>
             </a:fld>
             <a:endParaRPr lang="en-GB"/>
           </a:p>
@@ -2947,7 +2951,7 @@
           <a:p>
             <a:fld id="{655AA731-BE5F-44DA-AAEA-300254B29F16}" type="datetimeFigureOut">
               <a:rPr lang="en-GB" smtClean="0"/>
-              <a:t>05/03/2023</a:t>
+              <a:t>15/03/2023</a:t>
             </a:fld>
             <a:endParaRPr lang="en-GB"/>
           </a:p>
@@ -8539,12 +8543,290 @@
           <a:chExt cx="0" cy="0"/>
         </a:xfrm>
       </p:grpSpPr>
+      <p:grpSp>
+        <p:nvGrpSpPr>
+          <p:cNvPr id="18" name="Group 17">
+            <a:extLst>
+              <a:ext uri="{FF2B5EF4-FFF2-40B4-BE49-F238E27FC236}">
+                <a16:creationId xmlns:a16="http://schemas.microsoft.com/office/drawing/2014/main" id="{6185BE9B-87C8-4B46-9293-0E71CF17E76A}"/>
+              </a:ext>
+            </a:extLst>
+          </p:cNvPr>
+          <p:cNvGrpSpPr/>
+          <p:nvPr/>
+        </p:nvGrpSpPr>
+        <p:grpSpPr>
+          <a:xfrm>
+            <a:off x="99755" y="83129"/>
+            <a:ext cx="11953701" cy="872834"/>
+            <a:chOff x="99755" y="83129"/>
+            <a:chExt cx="11953701" cy="872834"/>
+          </a:xfrm>
+        </p:grpSpPr>
+        <p:cxnSp>
+          <p:nvCxnSpPr>
+            <p:cNvPr id="5" name="Straight Connector 4">
+              <a:extLst>
+                <a:ext uri="{FF2B5EF4-FFF2-40B4-BE49-F238E27FC236}">
+                  <a16:creationId xmlns:a16="http://schemas.microsoft.com/office/drawing/2014/main" id="{A8BE4EF8-406C-4035-940C-AB752B29BA18}"/>
+                </a:ext>
+              </a:extLst>
+            </p:cNvPr>
+            <p:cNvCxnSpPr/>
+            <p:nvPr/>
+          </p:nvCxnSpPr>
+          <p:spPr>
+            <a:xfrm>
+              <a:off x="99755" y="955963"/>
+              <a:ext cx="11953701" cy="0"/>
+            </a:xfrm>
+            <a:prstGeom prst="line">
+              <a:avLst/>
+            </a:prstGeom>
+            <a:ln w="19050">
+              <a:solidFill>
+                <a:srgbClr val="0072C6"/>
+              </a:solidFill>
+            </a:ln>
+          </p:spPr>
+          <p:style>
+            <a:lnRef idx="1">
+              <a:schemeClr val="accent1"/>
+            </a:lnRef>
+            <a:fillRef idx="0">
+              <a:schemeClr val="accent1"/>
+            </a:fillRef>
+            <a:effectRef idx="0">
+              <a:schemeClr val="accent1"/>
+            </a:effectRef>
+            <a:fontRef idx="minor">
+              <a:schemeClr val="tx1"/>
+            </a:fontRef>
+          </p:style>
+        </p:cxnSp>
+        <p:sp>
+          <p:nvSpPr>
+            <p:cNvPr id="8" name="TextBox 7">
+              <a:extLst>
+                <a:ext uri="{FF2B5EF4-FFF2-40B4-BE49-F238E27FC236}">
+                  <a16:creationId xmlns:a16="http://schemas.microsoft.com/office/drawing/2014/main" id="{C61B684E-FDA7-4625-9CC3-79C17CC59ED7}"/>
+                </a:ext>
+              </a:extLst>
+            </p:cNvPr>
+            <p:cNvSpPr txBox="1"/>
+            <p:nvPr/>
+          </p:nvSpPr>
+          <p:spPr>
+            <a:xfrm>
+              <a:off x="4372493" y="180818"/>
+              <a:ext cx="4989025" cy="646331"/>
+            </a:xfrm>
+            <a:prstGeom prst="rect">
+              <a:avLst/>
+            </a:prstGeom>
+            <a:noFill/>
+          </p:spPr>
+          <p:txBody>
+            <a:bodyPr wrap="square" rtlCol="0">
+              <a:spAutoFit/>
+            </a:bodyPr>
+            <a:lstStyle/>
+            <a:p>
+              <a:pPr marL="0" marR="0" lvl="0" indent="0" algn="l" defTabSz="914400" rtl="0" eaLnBrk="1" fontAlgn="auto" latinLnBrk="0" hangingPunct="1">
+                <a:lnSpc>
+                  <a:spcPct val="100000"/>
+                </a:lnSpc>
+                <a:spcBef>
+                  <a:spcPts val="0"/>
+                </a:spcBef>
+                <a:spcAft>
+                  <a:spcPts val="0"/>
+                </a:spcAft>
+                <a:buClrTx/>
+                <a:buSzTx/>
+                <a:buFontTx/>
+                <a:buNone/>
+                <a:tabLst/>
+                <a:defRPr/>
+              </a:pPr>
+              <a:r>
+                <a:rPr kumimoji="0" lang="en-GB" sz="1800" b="0" i="0" u="none" strike="noStrike" kern="1200" cap="none" spc="0" normalizeH="0" baseline="0" noProof="0" dirty="0">
+                  <a:ln>
+                    <a:noFill/>
+                  </a:ln>
+                  <a:solidFill>
+                    <a:prstClr val="black"/>
+                  </a:solidFill>
+                  <a:effectLst/>
+                  <a:uLnTx/>
+                  <a:uFillTx/>
+                  <a:latin typeface="Calibri" panose="020F0502020204030204"/>
+                  <a:ea typeface="+mn-ea"/>
+                  <a:cs typeface="+mn-cs"/>
+                </a:rPr>
+                <a:t>Microsoft Azure Data Fundamentals: Explore relational data in Azure</a:t>
+              </a:r>
+            </a:p>
+          </p:txBody>
+        </p:sp>
+        <p:sp>
+          <p:nvSpPr>
+            <p:cNvPr id="10" name="TextBox 9">
+              <a:extLst>
+                <a:ext uri="{FF2B5EF4-FFF2-40B4-BE49-F238E27FC236}">
+                  <a16:creationId xmlns:a16="http://schemas.microsoft.com/office/drawing/2014/main" id="{4E568F0D-7E90-4A0C-8070-6C806D992954}"/>
+                </a:ext>
+              </a:extLst>
+            </p:cNvPr>
+            <p:cNvSpPr txBox="1"/>
+            <p:nvPr/>
+          </p:nvSpPr>
+          <p:spPr>
+            <a:xfrm>
+              <a:off x="9534699" y="180818"/>
+              <a:ext cx="2155764" cy="369332"/>
+            </a:xfrm>
+            <a:prstGeom prst="rect">
+              <a:avLst/>
+            </a:prstGeom>
+            <a:noFill/>
+          </p:spPr>
+          <p:txBody>
+            <a:bodyPr wrap="square" rtlCol="0">
+              <a:spAutoFit/>
+            </a:bodyPr>
+            <a:lstStyle/>
+            <a:p>
+              <a:pPr marL="0" marR="0" lvl="0" indent="0" algn="l" defTabSz="914400" rtl="0" eaLnBrk="1" fontAlgn="auto" latinLnBrk="0" hangingPunct="1">
+                <a:lnSpc>
+                  <a:spcPct val="100000"/>
+                </a:lnSpc>
+                <a:spcBef>
+                  <a:spcPts val="0"/>
+                </a:spcBef>
+                <a:spcAft>
+                  <a:spcPts val="0"/>
+                </a:spcAft>
+                <a:buClrTx/>
+                <a:buSzTx/>
+                <a:buFontTx/>
+                <a:buNone/>
+                <a:tabLst/>
+                <a:defRPr/>
+              </a:pPr>
+              <a:r>
+                <a:rPr kumimoji="0" lang="en-GB" sz="1800" b="0" i="0" u="none" strike="noStrike" kern="1200" cap="none" spc="0" normalizeH="0" baseline="0" noProof="0" dirty="0">
+                  <a:ln>
+                    <a:noFill/>
+                  </a:ln>
+                  <a:solidFill>
+                    <a:prstClr val="black"/>
+                  </a:solidFill>
+                  <a:effectLst/>
+                  <a:uLnTx/>
+                  <a:uFillTx/>
+                  <a:latin typeface="Calibri" panose="020F0502020204030204"/>
+                  <a:ea typeface="+mn-ea"/>
+                  <a:cs typeface="+mn-cs"/>
+                </a:rPr>
+                <a:t>Date: 15/03/23 </a:t>
+              </a:r>
+            </a:p>
+          </p:txBody>
+        </p:sp>
+        <p:cxnSp>
+          <p:nvCxnSpPr>
+            <p:cNvPr id="11" name="Straight Connector 10">
+              <a:extLst>
+                <a:ext uri="{FF2B5EF4-FFF2-40B4-BE49-F238E27FC236}">
+                  <a16:creationId xmlns:a16="http://schemas.microsoft.com/office/drawing/2014/main" id="{F70ABCF3-BE60-426F-8C8C-059C854869C6}"/>
+                </a:ext>
+              </a:extLst>
+            </p:cNvPr>
+            <p:cNvCxnSpPr>
+              <a:cxnSpLocks/>
+            </p:cNvCxnSpPr>
+            <p:nvPr/>
+          </p:nvCxnSpPr>
+          <p:spPr>
+            <a:xfrm flipV="1">
+              <a:off x="4267202" y="93505"/>
+              <a:ext cx="1" cy="754394"/>
+            </a:xfrm>
+            <a:prstGeom prst="line">
+              <a:avLst/>
+            </a:prstGeom>
+            <a:ln w="19050">
+              <a:solidFill>
+                <a:srgbClr val="0072C6"/>
+              </a:solidFill>
+            </a:ln>
+          </p:spPr>
+          <p:style>
+            <a:lnRef idx="1">
+              <a:schemeClr val="accent1"/>
+            </a:lnRef>
+            <a:fillRef idx="0">
+              <a:schemeClr val="accent1"/>
+            </a:fillRef>
+            <a:effectRef idx="0">
+              <a:schemeClr val="accent1"/>
+            </a:effectRef>
+            <a:fontRef idx="minor">
+              <a:schemeClr val="tx1"/>
+            </a:fontRef>
+          </p:style>
+        </p:cxnSp>
+        <p:cxnSp>
+          <p:nvCxnSpPr>
+            <p:cNvPr id="16" name="Straight Connector 15">
+              <a:extLst>
+                <a:ext uri="{FF2B5EF4-FFF2-40B4-BE49-F238E27FC236}">
+                  <a16:creationId xmlns:a16="http://schemas.microsoft.com/office/drawing/2014/main" id="{90F03633-4CAB-4B57-BF94-CF91E87AB7AE}"/>
+                </a:ext>
+              </a:extLst>
+            </p:cNvPr>
+            <p:cNvCxnSpPr>
+              <a:cxnSpLocks/>
+            </p:cNvCxnSpPr>
+            <p:nvPr/>
+          </p:nvCxnSpPr>
+          <p:spPr>
+            <a:xfrm flipV="1">
+              <a:off x="9491750" y="83129"/>
+              <a:ext cx="1" cy="754394"/>
+            </a:xfrm>
+            <a:prstGeom prst="line">
+              <a:avLst/>
+            </a:prstGeom>
+            <a:ln w="19050">
+              <a:solidFill>
+                <a:srgbClr val="0072C6"/>
+              </a:solidFill>
+            </a:ln>
+          </p:spPr>
+          <p:style>
+            <a:lnRef idx="1">
+              <a:schemeClr val="accent1"/>
+            </a:lnRef>
+            <a:fillRef idx="0">
+              <a:schemeClr val="accent1"/>
+            </a:fillRef>
+            <a:effectRef idx="0">
+              <a:schemeClr val="accent1"/>
+            </a:effectRef>
+            <a:fontRef idx="minor">
+              <a:schemeClr val="tx1"/>
+            </a:fontRef>
+          </p:style>
+        </p:cxnSp>
+      </p:grpSp>
       <p:pic>
         <p:nvPicPr>
-          <p:cNvPr id="7" name="Picture 2">
+          <p:cNvPr id="20" name="Picture 2">
             <a:extLst>
               <a:ext uri="{FF2B5EF4-FFF2-40B4-BE49-F238E27FC236}">
-                <a16:creationId xmlns:a16="http://schemas.microsoft.com/office/drawing/2014/main" id="{656D77DE-6845-4DF0-A4E8-FCEE79C806B5}"/>
+                <a16:creationId xmlns:a16="http://schemas.microsoft.com/office/drawing/2014/main" id="{775211BE-DA3A-41DA-8578-4E52F07B6AB9}"/>
               </a:ext>
             </a:extLst>
           </p:cNvPr>
@@ -8586,53 +8868,12 @@
           </a:extLst>
         </p:spPr>
       </p:pic>
-      <p:cxnSp>
-        <p:nvCxnSpPr>
-          <p:cNvPr id="5" name="Straight Connector 4">
+      <p:sp>
+        <p:nvSpPr>
+          <p:cNvPr id="21" name="TextBox 20">
             <a:extLst>
               <a:ext uri="{FF2B5EF4-FFF2-40B4-BE49-F238E27FC236}">
-                <a16:creationId xmlns:a16="http://schemas.microsoft.com/office/drawing/2014/main" id="{A8BE4EF8-406C-4035-940C-AB752B29BA18}"/>
-              </a:ext>
-            </a:extLst>
-          </p:cNvPr>
-          <p:cNvCxnSpPr/>
-          <p:nvPr/>
-        </p:nvCxnSpPr>
-        <p:spPr>
-          <a:xfrm>
-            <a:off x="99755" y="955963"/>
-            <a:ext cx="11953701" cy="0"/>
-          </a:xfrm>
-          <a:prstGeom prst="line">
-            <a:avLst/>
-          </a:prstGeom>
-          <a:ln w="19050">
-            <a:solidFill>
-              <a:srgbClr val="0072C6"/>
-            </a:solidFill>
-          </a:ln>
-        </p:spPr>
-        <p:style>
-          <a:lnRef idx="1">
-            <a:schemeClr val="accent1"/>
-          </a:lnRef>
-          <a:fillRef idx="0">
-            <a:schemeClr val="accent1"/>
-          </a:fillRef>
-          <a:effectRef idx="0">
-            <a:schemeClr val="accent1"/>
-          </a:effectRef>
-          <a:fontRef idx="minor">
-            <a:schemeClr val="tx1"/>
-          </a:fontRef>
-        </p:style>
-      </p:cxnSp>
-      <p:sp>
-        <p:nvSpPr>
-          <p:cNvPr id="6" name="TextBox 5">
-            <a:extLst>
-              <a:ext uri="{FF2B5EF4-FFF2-40B4-BE49-F238E27FC236}">
-                <a16:creationId xmlns:a16="http://schemas.microsoft.com/office/drawing/2014/main" id="{4A5E75BC-B6AC-4138-AB81-9DEC0096C5A8}"/>
+                <a16:creationId xmlns:a16="http://schemas.microsoft.com/office/drawing/2014/main" id="{30404CBF-C3F9-43E0-81FA-E9D4D01BC004}"/>
               </a:ext>
             </a:extLst>
           </p:cNvPr>
@@ -8703,10 +8944,10 @@
       </p:sp>
       <p:sp>
         <p:nvSpPr>
-          <p:cNvPr id="8" name="TextBox 7">
+          <p:cNvPr id="13" name="TextBox 12">
             <a:extLst>
               <a:ext uri="{FF2B5EF4-FFF2-40B4-BE49-F238E27FC236}">
-                <a16:creationId xmlns:a16="http://schemas.microsoft.com/office/drawing/2014/main" id="{C61B684E-FDA7-4625-9CC3-79C17CC59ED7}"/>
+                <a16:creationId xmlns:a16="http://schemas.microsoft.com/office/drawing/2014/main" id="{B740727E-091B-4846-AD35-09F01069570A}"/>
               </a:ext>
             </a:extLst>
           </p:cNvPr>
@@ -8715,8 +8956,8 @@
         </p:nvSpPr>
         <p:spPr>
           <a:xfrm>
-            <a:off x="320040" y="2479578"/>
-            <a:ext cx="11484864" cy="2062103"/>
+            <a:off x="208598" y="1100888"/>
+            <a:ext cx="11844858" cy="3879203"/>
           </a:xfrm>
           <a:prstGeom prst="rect">
             <a:avLst/>
@@ -8729,177 +8970,242 @@
           </a:bodyPr>
           <a:lstStyle/>
           <a:p>
-            <a:pPr marL="0" marR="0" lvl="0" indent="0" algn="ctr" defTabSz="914400" rtl="0" eaLnBrk="1" fontAlgn="auto" latinLnBrk="0" hangingPunct="1">
-              <a:lnSpc>
-                <a:spcPct val="100000"/>
-              </a:lnSpc>
-              <a:spcBef>
-                <a:spcPts val="0"/>
-              </a:spcBef>
-              <a:spcAft>
-                <a:spcPts val="0"/>
-              </a:spcAft>
-              <a:buClrTx/>
-              <a:buSzTx/>
-              <a:buFontTx/>
-              <a:buNone/>
-              <a:tabLst/>
-              <a:defRPr/>
-            </a:pPr>
-            <a:r>
-              <a:rPr kumimoji="0" lang="en-GB" sz="3200" i="0" u="none" strike="noStrike" kern="1200" cap="none" spc="0" normalizeH="0" baseline="0" noProof="0" dirty="0">
-                <a:ln>
-                  <a:noFill/>
-                </a:ln>
-                <a:solidFill>
-                  <a:prstClr val="black"/>
-                </a:solidFill>
-                <a:effectLst/>
-                <a:uLnTx/>
-                <a:uFillTx/>
-                <a:latin typeface="Calibri" panose="020F0502020204030204"/>
-                <a:ea typeface="+mn-ea"/>
-                <a:cs typeface="+mn-cs"/>
-              </a:rPr>
-              <a:t>Section </a:t>
-            </a:r>
-            <a:r>
-              <a:rPr lang="en-GB" sz="3200" dirty="0">
-                <a:solidFill>
-                  <a:prstClr val="black"/>
-                </a:solidFill>
-                <a:latin typeface="Calibri" panose="020F0502020204030204"/>
-              </a:rPr>
-              <a:t>3</a:t>
-            </a:r>
-            <a:endParaRPr kumimoji="0" lang="en-GB" sz="3200" i="0" u="none" strike="noStrike" kern="1200" cap="none" spc="0" normalizeH="0" baseline="0" noProof="0" dirty="0">
-              <a:ln>
-                <a:noFill/>
-              </a:ln>
+            <a:pPr>
+              <a:lnSpc>
+                <a:spcPct val="120000"/>
+              </a:lnSpc>
+            </a:pPr>
+            <a:r>
+              <a:rPr lang="en-US" sz="1600" b="1" dirty="0">
+                <a:solidFill>
+                  <a:srgbClr val="161616"/>
+                </a:solidFill>
+                <a:latin typeface="+mj-lt"/>
+              </a:rPr>
+              <a:t>Database objects</a:t>
+            </a:r>
+          </a:p>
+          <a:p>
+            <a:pPr>
+              <a:lnSpc>
+                <a:spcPct val="120000"/>
+              </a:lnSpc>
+            </a:pPr>
+            <a:r>
+              <a:rPr lang="en-US" sz="1400" dirty="0">
+                <a:solidFill>
+                  <a:srgbClr val="161616"/>
+                </a:solidFill>
+                <a:latin typeface="+mj-lt"/>
+              </a:rPr>
+              <a:t>Designed to optimize data organisation and encapsulate programmatic actions.</a:t>
+            </a:r>
+          </a:p>
+          <a:p>
+            <a:pPr>
+              <a:lnSpc>
+                <a:spcPct val="120000"/>
+              </a:lnSpc>
+            </a:pPr>
+            <a:endParaRPr lang="en-US" sz="1400" i="0" dirty="0">
               <a:solidFill>
-                <a:prstClr val="black"/>
+                <a:srgbClr val="161616"/>
               </a:solidFill>
               <a:effectLst/>
-              <a:uLnTx/>
-              <a:uFillTx/>
-              <a:latin typeface="Calibri" panose="020F0502020204030204"/>
-              <a:ea typeface="+mn-ea"/>
-              <a:cs typeface="+mn-cs"/>
+              <a:latin typeface="+mj-lt"/>
             </a:endParaRPr>
           </a:p>
           <a:p>
-            <a:pPr marL="0" marR="0" lvl="0" indent="0" algn="ctr" defTabSz="914400" rtl="0" eaLnBrk="1" fontAlgn="auto" latinLnBrk="0" hangingPunct="1">
-              <a:lnSpc>
-                <a:spcPct val="100000"/>
-              </a:lnSpc>
-              <a:spcBef>
-                <a:spcPts val="0"/>
-              </a:spcBef>
-              <a:spcAft>
-                <a:spcPts val="0"/>
-              </a:spcAft>
-              <a:buClrTx/>
-              <a:buSzTx/>
-              <a:buFontTx/>
-              <a:buNone/>
-              <a:tabLst/>
-              <a:defRPr/>
-            </a:pPr>
-            <a:endParaRPr kumimoji="0" lang="en-GB" sz="3200" b="1" i="0" u="none" strike="noStrike" kern="1200" cap="none" spc="0" normalizeH="0" baseline="0" noProof="0" dirty="0">
-              <a:ln>
-                <a:noFill/>
-              </a:ln>
+            <a:pPr>
+              <a:lnSpc>
+                <a:spcPct val="120000"/>
+              </a:lnSpc>
+            </a:pPr>
+            <a:r>
+              <a:rPr lang="en-US" sz="1600" b="1" dirty="0">
+                <a:solidFill>
+                  <a:srgbClr val="161616"/>
+                </a:solidFill>
+                <a:latin typeface="+mj-lt"/>
+              </a:rPr>
+              <a:t>View</a:t>
+            </a:r>
+            <a:endParaRPr lang="en-US" sz="1600" b="1" i="0" dirty="0">
               <a:solidFill>
-                <a:prstClr val="black"/>
+                <a:srgbClr val="161616"/>
               </a:solidFill>
               <a:effectLst/>
-              <a:uLnTx/>
-              <a:uFillTx/>
-              <a:latin typeface="Calibri" panose="020F0502020204030204"/>
-              <a:ea typeface="+mn-ea"/>
-              <a:cs typeface="+mn-cs"/>
+              <a:latin typeface="+mj-lt"/>
             </a:endParaRPr>
           </a:p>
           <a:p>
-            <a:pPr marL="0" marR="0" lvl="0" indent="0" algn="ctr" defTabSz="914400" rtl="0" eaLnBrk="1" fontAlgn="auto" latinLnBrk="0" hangingPunct="1">
-              <a:lnSpc>
-                <a:spcPct val="100000"/>
-              </a:lnSpc>
-              <a:spcBef>
-                <a:spcPts val="0"/>
-              </a:spcBef>
-              <a:spcAft>
-                <a:spcPts val="0"/>
-              </a:spcAft>
-              <a:buClrTx/>
-              <a:buSzTx/>
+            <a:pPr>
+              <a:lnSpc>
+                <a:spcPct val="120000"/>
+              </a:lnSpc>
+            </a:pPr>
+            <a:r>
+              <a:rPr lang="en-US" sz="1400" dirty="0">
+                <a:solidFill>
+                  <a:srgbClr val="161616"/>
+                </a:solidFill>
+                <a:latin typeface="+mj-lt"/>
+              </a:rPr>
+              <a:t>A view is a virtual table consisting of data which is viewed from one or more tables in the database. It is created using the SELECT statement just like any other query. It behaves just like another table and so can be directly queried itself. </a:t>
+            </a:r>
+            <a:endParaRPr lang="en-US" sz="1400" i="0" dirty="0">
+              <a:solidFill>
+                <a:srgbClr val="161616"/>
+              </a:solidFill>
+              <a:effectLst/>
+              <a:latin typeface="+mj-lt"/>
+            </a:endParaRPr>
+          </a:p>
+          <a:p>
+            <a:pPr marL="285750" indent="-285750">
+              <a:lnSpc>
+                <a:spcPct val="120000"/>
+              </a:lnSpc>
               <a:buFontTx/>
-              <a:buNone/>
-              <a:tabLst/>
-              <a:defRPr/>
-            </a:pPr>
-            <a:r>
-              <a:rPr kumimoji="0" lang="en-GB" sz="3200" b="1" i="0" u="none" strike="noStrike" kern="1200" cap="none" spc="0" normalizeH="0" baseline="0" noProof="0" dirty="0">
-                <a:ln>
-                  <a:noFill/>
-                </a:ln>
-                <a:solidFill>
-                  <a:prstClr val="black"/>
+              <a:buChar char="-"/>
+            </a:pPr>
+            <a:endParaRPr lang="en-US" sz="1400" dirty="0">
+              <a:solidFill>
+                <a:srgbClr val="161616"/>
+              </a:solidFill>
+              <a:latin typeface="+mj-lt"/>
+            </a:endParaRPr>
+          </a:p>
+          <a:p>
+            <a:pPr>
+              <a:lnSpc>
+                <a:spcPct val="120000"/>
+              </a:lnSpc>
+            </a:pPr>
+            <a:r>
+              <a:rPr lang="en-US" sz="1600" b="1" dirty="0">
+                <a:solidFill>
+                  <a:srgbClr val="161616"/>
+                </a:solidFill>
+                <a:latin typeface="+mj-lt"/>
+              </a:rPr>
+              <a:t>Stored Procedure</a:t>
+            </a:r>
+            <a:endParaRPr lang="en-US" sz="1600" b="1" i="0" dirty="0">
+              <a:solidFill>
+                <a:srgbClr val="161616"/>
+              </a:solidFill>
+              <a:effectLst/>
+              <a:latin typeface="+mj-lt"/>
+            </a:endParaRPr>
+          </a:p>
+          <a:p>
+            <a:pPr>
+              <a:lnSpc>
+                <a:spcPct val="120000"/>
+              </a:lnSpc>
+            </a:pPr>
+            <a:r>
+              <a:rPr lang="en-US" sz="1400" i="0" dirty="0">
+                <a:solidFill>
+                  <a:srgbClr val="161616"/>
                 </a:solidFill>
                 <a:effectLst/>
-                <a:uLnTx/>
-                <a:uFillTx/>
-                <a:latin typeface="Calibri" panose="020F0502020204030204"/>
-                <a:ea typeface="+mn-ea"/>
-                <a:cs typeface="+mn-cs"/>
-              </a:rPr>
-              <a:t>Microsoft Azure Data Fundamentals: Explore non-relational data in Azure</a:t>
-            </a:r>
-          </a:p>
-        </p:txBody>
-      </p:sp>
-      <p:sp>
-        <p:nvSpPr>
-          <p:cNvPr id="3" name="TextBox 2">
-            <a:extLst>
-              <a:ext uri="{FF2B5EF4-FFF2-40B4-BE49-F238E27FC236}">
-                <a16:creationId xmlns:a16="http://schemas.microsoft.com/office/drawing/2014/main" id="{ED0FFF9A-D132-0D87-AC22-1CDA03ED9AEB}"/>
-              </a:ext>
-            </a:extLst>
-          </p:cNvPr>
-          <p:cNvSpPr txBox="1"/>
-          <p:nvPr/>
-        </p:nvSpPr>
-        <p:spPr>
-          <a:xfrm>
-            <a:off x="144770" y="1074403"/>
-            <a:ext cx="11484864" cy="369332"/>
-          </a:xfrm>
-          <a:prstGeom prst="rect">
-            <a:avLst/>
-          </a:prstGeom>
-          <a:noFill/>
-        </p:spPr>
-        <p:txBody>
-          <a:bodyPr wrap="square">
-            <a:spAutoFit/>
-          </a:bodyPr>
-          <a:lstStyle/>
-          <a:p>
-            <a:r>
-              <a:rPr lang="en-GB" dirty="0">
-                <a:hlinkClick r:id="rId3"/>
-              </a:rPr>
-              <a:t>https://learn.microsoft.com/en-us/training/paths/azure-data-fundamentals-explore-non-relational-data/</a:t>
-            </a:r>
-            <a:endParaRPr lang="en-GB" dirty="0"/>
+                <a:latin typeface="+mj-lt"/>
+              </a:rPr>
+              <a:t>This is defining functions. For example, you may want to define a function that relaces an entry given a certain input </a:t>
+            </a:r>
+            <a:r>
+              <a:rPr lang="en-US" sz="1400" dirty="0">
+                <a:solidFill>
+                  <a:srgbClr val="161616"/>
+                </a:solidFill>
+                <a:latin typeface="+mj-lt"/>
+              </a:rPr>
+              <a:t>id.</a:t>
+            </a:r>
+            <a:endParaRPr lang="en-US" sz="1400" i="0" dirty="0">
+              <a:solidFill>
+                <a:srgbClr val="161616"/>
+              </a:solidFill>
+              <a:effectLst/>
+              <a:latin typeface="+mj-lt"/>
+            </a:endParaRPr>
+          </a:p>
+          <a:p>
+            <a:pPr>
+              <a:lnSpc>
+                <a:spcPct val="120000"/>
+              </a:lnSpc>
+            </a:pPr>
+            <a:endParaRPr lang="en-US" sz="1600" i="0" dirty="0">
+              <a:solidFill>
+                <a:srgbClr val="161616"/>
+              </a:solidFill>
+              <a:effectLst/>
+              <a:latin typeface="+mj-lt"/>
+            </a:endParaRPr>
+          </a:p>
+          <a:p>
+            <a:pPr>
+              <a:lnSpc>
+                <a:spcPct val="120000"/>
+              </a:lnSpc>
+            </a:pPr>
+            <a:r>
+              <a:rPr lang="en-US" sz="1600" b="1" dirty="0">
+                <a:solidFill>
+                  <a:srgbClr val="161616"/>
+                </a:solidFill>
+                <a:latin typeface="+mj-lt"/>
+              </a:rPr>
+              <a:t>Index</a:t>
+            </a:r>
+            <a:endParaRPr lang="en-US" sz="1600" b="1" i="0" dirty="0">
+              <a:solidFill>
+                <a:srgbClr val="161616"/>
+              </a:solidFill>
+              <a:effectLst/>
+              <a:latin typeface="+mj-lt"/>
+            </a:endParaRPr>
+          </a:p>
+          <a:p>
+            <a:pPr>
+              <a:lnSpc>
+                <a:spcPct val="120000"/>
+              </a:lnSpc>
+            </a:pPr>
+            <a:r>
+              <a:rPr lang="en-US" sz="1400" i="0" dirty="0">
+                <a:solidFill>
+                  <a:srgbClr val="161616"/>
+                </a:solidFill>
+                <a:effectLst/>
+                <a:latin typeface="+mj-lt"/>
+              </a:rPr>
+              <a:t>An index can help speed up querying on a large table. When you create an index in a database, you specify a column from the table, and the index contains a copy of this data in a sorted order, with pointers to the corresponding rows in the table. </a:t>
+            </a:r>
+          </a:p>
+          <a:p>
+            <a:pPr>
+              <a:lnSpc>
+                <a:spcPct val="120000"/>
+              </a:lnSpc>
+            </a:pPr>
+            <a:endParaRPr lang="en-US" sz="1400" i="0" dirty="0">
+              <a:solidFill>
+                <a:srgbClr val="161616"/>
+              </a:solidFill>
+              <a:effectLst/>
+              <a:latin typeface="+mj-lt"/>
+            </a:endParaRPr>
           </a:p>
         </p:txBody>
       </p:sp>
     </p:spTree>
     <p:extLst>
       <p:ext uri="{BB962C8B-B14F-4D97-AF65-F5344CB8AC3E}">
-        <p14:creationId xmlns:p14="http://schemas.microsoft.com/office/powerpoint/2010/main" val="2471186844"/>
+        <p14:creationId xmlns:p14="http://schemas.microsoft.com/office/powerpoint/2010/main" val="2281765351"/>
       </p:ext>
     </p:extLst>
   </p:cSld>
@@ -8926,12 +9232,290 @@
           <a:chExt cx="0" cy="0"/>
         </a:xfrm>
       </p:grpSpPr>
+      <p:grpSp>
+        <p:nvGrpSpPr>
+          <p:cNvPr id="18" name="Group 17">
+            <a:extLst>
+              <a:ext uri="{FF2B5EF4-FFF2-40B4-BE49-F238E27FC236}">
+                <a16:creationId xmlns:a16="http://schemas.microsoft.com/office/drawing/2014/main" id="{6185BE9B-87C8-4B46-9293-0E71CF17E76A}"/>
+              </a:ext>
+            </a:extLst>
+          </p:cNvPr>
+          <p:cNvGrpSpPr/>
+          <p:nvPr/>
+        </p:nvGrpSpPr>
+        <p:grpSpPr>
+          <a:xfrm>
+            <a:off x="99755" y="83129"/>
+            <a:ext cx="11953701" cy="872834"/>
+            <a:chOff x="99755" y="83129"/>
+            <a:chExt cx="11953701" cy="872834"/>
+          </a:xfrm>
+        </p:grpSpPr>
+        <p:cxnSp>
+          <p:nvCxnSpPr>
+            <p:cNvPr id="5" name="Straight Connector 4">
+              <a:extLst>
+                <a:ext uri="{FF2B5EF4-FFF2-40B4-BE49-F238E27FC236}">
+                  <a16:creationId xmlns:a16="http://schemas.microsoft.com/office/drawing/2014/main" id="{A8BE4EF8-406C-4035-940C-AB752B29BA18}"/>
+                </a:ext>
+              </a:extLst>
+            </p:cNvPr>
+            <p:cNvCxnSpPr/>
+            <p:nvPr/>
+          </p:nvCxnSpPr>
+          <p:spPr>
+            <a:xfrm>
+              <a:off x="99755" y="955963"/>
+              <a:ext cx="11953701" cy="0"/>
+            </a:xfrm>
+            <a:prstGeom prst="line">
+              <a:avLst/>
+            </a:prstGeom>
+            <a:ln w="19050">
+              <a:solidFill>
+                <a:srgbClr val="0072C6"/>
+              </a:solidFill>
+            </a:ln>
+          </p:spPr>
+          <p:style>
+            <a:lnRef idx="1">
+              <a:schemeClr val="accent1"/>
+            </a:lnRef>
+            <a:fillRef idx="0">
+              <a:schemeClr val="accent1"/>
+            </a:fillRef>
+            <a:effectRef idx="0">
+              <a:schemeClr val="accent1"/>
+            </a:effectRef>
+            <a:fontRef idx="minor">
+              <a:schemeClr val="tx1"/>
+            </a:fontRef>
+          </p:style>
+        </p:cxnSp>
+        <p:sp>
+          <p:nvSpPr>
+            <p:cNvPr id="8" name="TextBox 7">
+              <a:extLst>
+                <a:ext uri="{FF2B5EF4-FFF2-40B4-BE49-F238E27FC236}">
+                  <a16:creationId xmlns:a16="http://schemas.microsoft.com/office/drawing/2014/main" id="{C61B684E-FDA7-4625-9CC3-79C17CC59ED7}"/>
+                </a:ext>
+              </a:extLst>
+            </p:cNvPr>
+            <p:cNvSpPr txBox="1"/>
+            <p:nvPr/>
+          </p:nvSpPr>
+          <p:spPr>
+            <a:xfrm>
+              <a:off x="4372493" y="180818"/>
+              <a:ext cx="4989025" cy="646331"/>
+            </a:xfrm>
+            <a:prstGeom prst="rect">
+              <a:avLst/>
+            </a:prstGeom>
+            <a:noFill/>
+          </p:spPr>
+          <p:txBody>
+            <a:bodyPr wrap="square" rtlCol="0">
+              <a:spAutoFit/>
+            </a:bodyPr>
+            <a:lstStyle/>
+            <a:p>
+              <a:pPr marL="0" marR="0" lvl="0" indent="0" algn="l" defTabSz="914400" rtl="0" eaLnBrk="1" fontAlgn="auto" latinLnBrk="0" hangingPunct="1">
+                <a:lnSpc>
+                  <a:spcPct val="100000"/>
+                </a:lnSpc>
+                <a:spcBef>
+                  <a:spcPts val="0"/>
+                </a:spcBef>
+                <a:spcAft>
+                  <a:spcPts val="0"/>
+                </a:spcAft>
+                <a:buClrTx/>
+                <a:buSzTx/>
+                <a:buFontTx/>
+                <a:buNone/>
+                <a:tabLst/>
+                <a:defRPr/>
+              </a:pPr>
+              <a:r>
+                <a:rPr kumimoji="0" lang="en-GB" sz="1800" b="0" i="0" u="none" strike="noStrike" kern="1200" cap="none" spc="0" normalizeH="0" baseline="0" noProof="0" dirty="0">
+                  <a:ln>
+                    <a:noFill/>
+                  </a:ln>
+                  <a:solidFill>
+                    <a:prstClr val="black"/>
+                  </a:solidFill>
+                  <a:effectLst/>
+                  <a:uLnTx/>
+                  <a:uFillTx/>
+                  <a:latin typeface="Calibri" panose="020F0502020204030204"/>
+                  <a:ea typeface="+mn-ea"/>
+                  <a:cs typeface="+mn-cs"/>
+                </a:rPr>
+                <a:t>Microsoft Azure Data Fundamentals: Explore relational data in Azure</a:t>
+              </a:r>
+            </a:p>
+          </p:txBody>
+        </p:sp>
+        <p:sp>
+          <p:nvSpPr>
+            <p:cNvPr id="10" name="TextBox 9">
+              <a:extLst>
+                <a:ext uri="{FF2B5EF4-FFF2-40B4-BE49-F238E27FC236}">
+                  <a16:creationId xmlns:a16="http://schemas.microsoft.com/office/drawing/2014/main" id="{4E568F0D-7E90-4A0C-8070-6C806D992954}"/>
+                </a:ext>
+              </a:extLst>
+            </p:cNvPr>
+            <p:cNvSpPr txBox="1"/>
+            <p:nvPr/>
+          </p:nvSpPr>
+          <p:spPr>
+            <a:xfrm>
+              <a:off x="9534699" y="180818"/>
+              <a:ext cx="2155764" cy="369332"/>
+            </a:xfrm>
+            <a:prstGeom prst="rect">
+              <a:avLst/>
+            </a:prstGeom>
+            <a:noFill/>
+          </p:spPr>
+          <p:txBody>
+            <a:bodyPr wrap="square" rtlCol="0">
+              <a:spAutoFit/>
+            </a:bodyPr>
+            <a:lstStyle/>
+            <a:p>
+              <a:pPr marL="0" marR="0" lvl="0" indent="0" algn="l" defTabSz="914400" rtl="0" eaLnBrk="1" fontAlgn="auto" latinLnBrk="0" hangingPunct="1">
+                <a:lnSpc>
+                  <a:spcPct val="100000"/>
+                </a:lnSpc>
+                <a:spcBef>
+                  <a:spcPts val="0"/>
+                </a:spcBef>
+                <a:spcAft>
+                  <a:spcPts val="0"/>
+                </a:spcAft>
+                <a:buClrTx/>
+                <a:buSzTx/>
+                <a:buFontTx/>
+                <a:buNone/>
+                <a:tabLst/>
+                <a:defRPr/>
+              </a:pPr>
+              <a:r>
+                <a:rPr kumimoji="0" lang="en-GB" sz="1800" b="0" i="0" u="none" strike="noStrike" kern="1200" cap="none" spc="0" normalizeH="0" baseline="0" noProof="0" dirty="0">
+                  <a:ln>
+                    <a:noFill/>
+                  </a:ln>
+                  <a:solidFill>
+                    <a:prstClr val="black"/>
+                  </a:solidFill>
+                  <a:effectLst/>
+                  <a:uLnTx/>
+                  <a:uFillTx/>
+                  <a:latin typeface="Calibri" panose="020F0502020204030204"/>
+                  <a:ea typeface="+mn-ea"/>
+                  <a:cs typeface="+mn-cs"/>
+                </a:rPr>
+                <a:t>Date: 15/03/23 </a:t>
+              </a:r>
+            </a:p>
+          </p:txBody>
+        </p:sp>
+        <p:cxnSp>
+          <p:nvCxnSpPr>
+            <p:cNvPr id="11" name="Straight Connector 10">
+              <a:extLst>
+                <a:ext uri="{FF2B5EF4-FFF2-40B4-BE49-F238E27FC236}">
+                  <a16:creationId xmlns:a16="http://schemas.microsoft.com/office/drawing/2014/main" id="{F70ABCF3-BE60-426F-8C8C-059C854869C6}"/>
+                </a:ext>
+              </a:extLst>
+            </p:cNvPr>
+            <p:cNvCxnSpPr>
+              <a:cxnSpLocks/>
+            </p:cNvCxnSpPr>
+            <p:nvPr/>
+          </p:nvCxnSpPr>
+          <p:spPr>
+            <a:xfrm flipV="1">
+              <a:off x="4267202" y="93505"/>
+              <a:ext cx="1" cy="754394"/>
+            </a:xfrm>
+            <a:prstGeom prst="line">
+              <a:avLst/>
+            </a:prstGeom>
+            <a:ln w="19050">
+              <a:solidFill>
+                <a:srgbClr val="0072C6"/>
+              </a:solidFill>
+            </a:ln>
+          </p:spPr>
+          <p:style>
+            <a:lnRef idx="1">
+              <a:schemeClr val="accent1"/>
+            </a:lnRef>
+            <a:fillRef idx="0">
+              <a:schemeClr val="accent1"/>
+            </a:fillRef>
+            <a:effectRef idx="0">
+              <a:schemeClr val="accent1"/>
+            </a:effectRef>
+            <a:fontRef idx="minor">
+              <a:schemeClr val="tx1"/>
+            </a:fontRef>
+          </p:style>
+        </p:cxnSp>
+        <p:cxnSp>
+          <p:nvCxnSpPr>
+            <p:cNvPr id="16" name="Straight Connector 15">
+              <a:extLst>
+                <a:ext uri="{FF2B5EF4-FFF2-40B4-BE49-F238E27FC236}">
+                  <a16:creationId xmlns:a16="http://schemas.microsoft.com/office/drawing/2014/main" id="{90F03633-4CAB-4B57-BF94-CF91E87AB7AE}"/>
+                </a:ext>
+              </a:extLst>
+            </p:cNvPr>
+            <p:cNvCxnSpPr>
+              <a:cxnSpLocks/>
+            </p:cNvCxnSpPr>
+            <p:nvPr/>
+          </p:nvCxnSpPr>
+          <p:spPr>
+            <a:xfrm flipV="1">
+              <a:off x="9491750" y="83129"/>
+              <a:ext cx="1" cy="754394"/>
+            </a:xfrm>
+            <a:prstGeom prst="line">
+              <a:avLst/>
+            </a:prstGeom>
+            <a:ln w="19050">
+              <a:solidFill>
+                <a:srgbClr val="0072C6"/>
+              </a:solidFill>
+            </a:ln>
+          </p:spPr>
+          <p:style>
+            <a:lnRef idx="1">
+              <a:schemeClr val="accent1"/>
+            </a:lnRef>
+            <a:fillRef idx="0">
+              <a:schemeClr val="accent1"/>
+            </a:fillRef>
+            <a:effectRef idx="0">
+              <a:schemeClr val="accent1"/>
+            </a:effectRef>
+            <a:fontRef idx="minor">
+              <a:schemeClr val="tx1"/>
+            </a:fontRef>
+          </p:style>
+        </p:cxnSp>
+      </p:grpSp>
       <p:pic>
         <p:nvPicPr>
-          <p:cNvPr id="7" name="Picture 2">
+          <p:cNvPr id="20" name="Picture 2">
             <a:extLst>
               <a:ext uri="{FF2B5EF4-FFF2-40B4-BE49-F238E27FC236}">
-                <a16:creationId xmlns:a16="http://schemas.microsoft.com/office/drawing/2014/main" id="{656D77DE-6845-4DF0-A4E8-FCEE79C806B5}"/>
+                <a16:creationId xmlns:a16="http://schemas.microsoft.com/office/drawing/2014/main" id="{775211BE-DA3A-41DA-8578-4E52F07B6AB9}"/>
               </a:ext>
             </a:extLst>
           </p:cNvPr>
@@ -8973,53 +9557,12 @@
           </a:extLst>
         </p:spPr>
       </p:pic>
-      <p:cxnSp>
-        <p:nvCxnSpPr>
-          <p:cNvPr id="5" name="Straight Connector 4">
+      <p:sp>
+        <p:nvSpPr>
+          <p:cNvPr id="21" name="TextBox 20">
             <a:extLst>
               <a:ext uri="{FF2B5EF4-FFF2-40B4-BE49-F238E27FC236}">
-                <a16:creationId xmlns:a16="http://schemas.microsoft.com/office/drawing/2014/main" id="{A8BE4EF8-406C-4035-940C-AB752B29BA18}"/>
-              </a:ext>
-            </a:extLst>
-          </p:cNvPr>
-          <p:cNvCxnSpPr/>
-          <p:nvPr/>
-        </p:nvCxnSpPr>
-        <p:spPr>
-          <a:xfrm>
-            <a:off x="99755" y="955963"/>
-            <a:ext cx="11953701" cy="0"/>
-          </a:xfrm>
-          <a:prstGeom prst="line">
-            <a:avLst/>
-          </a:prstGeom>
-          <a:ln w="19050">
-            <a:solidFill>
-              <a:srgbClr val="0072C6"/>
-            </a:solidFill>
-          </a:ln>
-        </p:spPr>
-        <p:style>
-          <a:lnRef idx="1">
-            <a:schemeClr val="accent1"/>
-          </a:lnRef>
-          <a:fillRef idx="0">
-            <a:schemeClr val="accent1"/>
-          </a:fillRef>
-          <a:effectRef idx="0">
-            <a:schemeClr val="accent1"/>
-          </a:effectRef>
-          <a:fontRef idx="minor">
-            <a:schemeClr val="tx1"/>
-          </a:fontRef>
-        </p:style>
-      </p:cxnSp>
-      <p:sp>
-        <p:nvSpPr>
-          <p:cNvPr id="6" name="TextBox 5">
-            <a:extLst>
-              <a:ext uri="{FF2B5EF4-FFF2-40B4-BE49-F238E27FC236}">
-                <a16:creationId xmlns:a16="http://schemas.microsoft.com/office/drawing/2014/main" id="{4A5E75BC-B6AC-4138-AB81-9DEC0096C5A8}"/>
+                <a16:creationId xmlns:a16="http://schemas.microsoft.com/office/drawing/2014/main" id="{30404CBF-C3F9-43E0-81FA-E9D4D01BC004}"/>
               </a:ext>
             </a:extLst>
           </p:cNvPr>
@@ -9090,10 +9633,10 @@
       </p:sp>
       <p:sp>
         <p:nvSpPr>
-          <p:cNvPr id="8" name="TextBox 7">
+          <p:cNvPr id="13" name="TextBox 12">
             <a:extLst>
               <a:ext uri="{FF2B5EF4-FFF2-40B4-BE49-F238E27FC236}">
-                <a16:creationId xmlns:a16="http://schemas.microsoft.com/office/drawing/2014/main" id="{C61B684E-FDA7-4625-9CC3-79C17CC59ED7}"/>
+                <a16:creationId xmlns:a16="http://schemas.microsoft.com/office/drawing/2014/main" id="{B740727E-091B-4846-AD35-09F01069570A}"/>
               </a:ext>
             </a:extLst>
           </p:cNvPr>
@@ -9102,8 +9645,8 @@
         </p:nvSpPr>
         <p:spPr>
           <a:xfrm>
-            <a:off x="320040" y="2479578"/>
-            <a:ext cx="11484864" cy="2062103"/>
+            <a:off x="208598" y="1100888"/>
+            <a:ext cx="6212750" cy="4839466"/>
           </a:xfrm>
           <a:prstGeom prst="rect">
             <a:avLst/>
@@ -9116,9 +9659,60 @@
           </a:bodyPr>
           <a:lstStyle/>
           <a:p>
-            <a:pPr marL="0" marR="0" lvl="0" indent="0" algn="ctr" defTabSz="914400" rtl="0" eaLnBrk="1" fontAlgn="auto" latinLnBrk="0" hangingPunct="1">
-              <a:lnSpc>
-                <a:spcPct val="100000"/>
+            <a:pPr>
+              <a:lnSpc>
+                <a:spcPct val="120000"/>
+              </a:lnSpc>
+            </a:pPr>
+            <a:r>
+              <a:rPr lang="en-US" sz="1600" b="1" dirty="0">
+                <a:solidFill>
+                  <a:srgbClr val="161616"/>
+                </a:solidFill>
+                <a:latin typeface="+mj-lt"/>
+              </a:rPr>
+              <a:t>SQL Server on Azure Virtual Machines (VMs) </a:t>
+            </a:r>
+            <a:endParaRPr lang="en-US" sz="1400" dirty="0">
+              <a:solidFill>
+                <a:srgbClr val="161616"/>
+              </a:solidFill>
+              <a:latin typeface="+mj-lt"/>
+            </a:endParaRPr>
+          </a:p>
+          <a:p>
+            <a:pPr>
+              <a:lnSpc>
+                <a:spcPct val="120000"/>
+              </a:lnSpc>
+            </a:pPr>
+            <a:r>
+              <a:rPr lang="en-US" sz="1400" dirty="0">
+                <a:solidFill>
+                  <a:srgbClr val="161616"/>
+                </a:solidFill>
+                <a:latin typeface="+mj-lt"/>
+              </a:rPr>
+              <a:t>A virtual machine (IaaS) running in Azure with an installation of SQL Server. to optimize data organisation and encapsulate programmatic actions.</a:t>
+            </a:r>
+          </a:p>
+          <a:p>
+            <a:pPr>
+              <a:lnSpc>
+                <a:spcPct val="120000"/>
+              </a:lnSpc>
+            </a:pPr>
+            <a:endParaRPr lang="en-US" sz="1400" dirty="0">
+              <a:solidFill>
+                <a:srgbClr val="161616"/>
+              </a:solidFill>
+              <a:latin typeface="+mj-lt"/>
+            </a:endParaRPr>
+          </a:p>
+          <a:p>
+            <a:pPr marL="0" marR="0" lvl="0" indent="0" algn="l" defTabSz="914400" rtl="0" eaLnBrk="1" fontAlgn="auto" latinLnBrk="0" hangingPunct="1">
+              <a:lnSpc>
+                <a:spcPct val="120000"/>
               </a:lnSpc>
               <a:spcBef>
                 <a:spcPts val="0"/>
@@ -9134,27 +9728,27 @@
               <a:defRPr/>
             </a:pPr>
             <a:r>
-              <a:rPr kumimoji="0" lang="en-GB" sz="3200" i="0" u="none" strike="noStrike" kern="1200" cap="none" spc="0" normalizeH="0" baseline="0" noProof="0" dirty="0">
+              <a:rPr kumimoji="0" lang="en-US" sz="1600" b="1" i="0" u="none" strike="noStrike" kern="1200" cap="none" spc="0" normalizeH="0" baseline="0" noProof="0" dirty="0">
                 <a:ln>
                   <a:noFill/>
                 </a:ln>
                 <a:solidFill>
-                  <a:prstClr val="black"/>
+                  <a:srgbClr val="161616"/>
                 </a:solidFill>
                 <a:effectLst/>
                 <a:uLnTx/>
                 <a:uFillTx/>
-                <a:latin typeface="Calibri" panose="020F0502020204030204"/>
+                <a:latin typeface="Calibri Light" panose="020F0302020204030204"/>
                 <a:ea typeface="+mn-ea"/>
                 <a:cs typeface="+mn-cs"/>
               </a:rPr>
-              <a:t>Section 4</a:t>
-            </a:r>
-          </a:p>
-          <a:p>
-            <a:pPr marL="0" marR="0" lvl="0" indent="0" algn="ctr" defTabSz="914400" rtl="0" eaLnBrk="1" fontAlgn="auto" latinLnBrk="0" hangingPunct="1">
-              <a:lnSpc>
-                <a:spcPct val="100000"/>
+              <a:t>Azure SQL Managed Instance </a:t>
+            </a:r>
+          </a:p>
+          <a:p>
+            <a:pPr marL="0" marR="0" lvl="0" indent="0" algn="l" defTabSz="914400" rtl="0" eaLnBrk="1" fontAlgn="auto" latinLnBrk="0" hangingPunct="1">
+              <a:lnSpc>
+                <a:spcPct val="120000"/>
               </a:lnSpc>
               <a:spcBef>
                 <a:spcPts val="0"/>
@@ -9169,25 +9763,33 @@
               <a:tabLst/>
               <a:defRPr/>
             </a:pPr>
-            <a:endParaRPr kumimoji="0" lang="en-GB" sz="3200" b="1" i="0" u="none" strike="noStrike" kern="1200" cap="none" spc="0" normalizeH="0" baseline="0" noProof="0" dirty="0">
-              <a:ln>
-                <a:noFill/>
-              </a:ln>
+            <a:r>
+              <a:rPr lang="en-US" sz="1400" dirty="0">
+                <a:solidFill>
+                  <a:srgbClr val="161616"/>
+                </a:solidFill>
+                <a:latin typeface="+mj-lt"/>
+              </a:rPr>
+              <a:t>A platform-as-a-service (PaaS) option that provides near-100% compatibility with on-premises SQL Server instances while abstracting the underlying hardware and operating system</a:t>
+            </a:r>
+          </a:p>
+          <a:p>
+            <a:pPr>
+              <a:lnSpc>
+                <a:spcPct val="120000"/>
+              </a:lnSpc>
+            </a:pPr>
+            <a:endParaRPr lang="en-US" sz="1400" dirty="0">
               <a:solidFill>
-                <a:prstClr val="black"/>
+                <a:srgbClr val="161616"/>
               </a:solidFill>
-              <a:effectLst/>
-              <a:uLnTx/>
-              <a:uFillTx/>
-              <a:latin typeface="Calibri" panose="020F0502020204030204"/>
-              <a:ea typeface="+mn-ea"/>
-              <a:cs typeface="+mn-cs"/>
+              <a:latin typeface="+mj-lt"/>
             </a:endParaRPr>
           </a:p>
           <a:p>
-            <a:pPr marL="0" marR="0" lvl="0" indent="0" algn="ctr" defTabSz="914400" rtl="0" eaLnBrk="1" fontAlgn="auto" latinLnBrk="0" hangingPunct="1">
-              <a:lnSpc>
-                <a:spcPct val="100000"/>
+            <a:pPr marL="0" marR="0" lvl="0" indent="0" algn="l" defTabSz="914400" rtl="0" eaLnBrk="1" fontAlgn="auto" latinLnBrk="0" hangingPunct="1">
+              <a:lnSpc>
+                <a:spcPct val="120000"/>
               </a:lnSpc>
               <a:spcBef>
                 <a:spcPts val="0"/>
@@ -9203,31 +9805,527 @@
               <a:defRPr/>
             </a:pPr>
             <a:r>
-              <a:rPr kumimoji="0" lang="en-GB" sz="3200" b="1" i="0" u="none" strike="noStrike" kern="1200" cap="none" spc="0" normalizeH="0" baseline="0" noProof="0" dirty="0">
+              <a:rPr kumimoji="0" lang="en-US" sz="1600" b="1" i="0" u="none" strike="noStrike" kern="1200" cap="none" spc="0" normalizeH="0" baseline="0" noProof="0" dirty="0">
                 <a:ln>
                   <a:noFill/>
                 </a:ln>
                 <a:solidFill>
-                  <a:prstClr val="black"/>
+                  <a:srgbClr val="161616"/>
                 </a:solidFill>
                 <a:effectLst/>
                 <a:uLnTx/>
                 <a:uFillTx/>
-                <a:latin typeface="Calibri" panose="020F0502020204030204"/>
+                <a:latin typeface="Calibri Light" panose="020F0302020204030204"/>
                 <a:ea typeface="+mn-ea"/>
                 <a:cs typeface="+mn-cs"/>
               </a:rPr>
-              <a:t>Microsoft Azure Data Fundamentals: Explore data analytics in Azure</a:t>
-            </a:r>
+              <a:t>Azure SQL Database </a:t>
+            </a:r>
+            <a:endParaRPr lang="en-US" sz="1400" dirty="0">
+              <a:solidFill>
+                <a:srgbClr val="161616"/>
+              </a:solidFill>
+              <a:latin typeface="+mj-lt"/>
+            </a:endParaRPr>
+          </a:p>
+          <a:p>
+            <a:pPr>
+              <a:lnSpc>
+                <a:spcPct val="120000"/>
+              </a:lnSpc>
+            </a:pPr>
+            <a:r>
+              <a:rPr lang="en-US" sz="1400" i="0" dirty="0">
+                <a:solidFill>
+                  <a:srgbClr val="161616"/>
+                </a:solidFill>
+                <a:effectLst/>
+                <a:latin typeface="+mj-lt"/>
+              </a:rPr>
+              <a:t>A fully managed, highly scalable PaaS database service that is designed for the cloud. This is a good option when you need to create a new application in the cloud.</a:t>
+            </a:r>
+          </a:p>
+          <a:p>
+            <a:pPr>
+              <a:lnSpc>
+                <a:spcPct val="120000"/>
+              </a:lnSpc>
+            </a:pPr>
+            <a:endParaRPr lang="en-US" sz="1400" i="0" dirty="0">
+              <a:solidFill>
+                <a:srgbClr val="161616"/>
+              </a:solidFill>
+              <a:effectLst/>
+              <a:latin typeface="+mj-lt"/>
+            </a:endParaRPr>
+          </a:p>
+          <a:p>
+            <a:pPr>
+              <a:lnSpc>
+                <a:spcPct val="120000"/>
+              </a:lnSpc>
+            </a:pPr>
+            <a:r>
+              <a:rPr lang="en-US" sz="1400" i="0" dirty="0">
+                <a:solidFill>
+                  <a:srgbClr val="161616"/>
+                </a:solidFill>
+                <a:effectLst/>
+                <a:latin typeface="+mj-lt"/>
+              </a:rPr>
+              <a:t>Single pool – resources can be pre-allocated (only you use that server) or </a:t>
+            </a:r>
+            <a:r>
+              <a:rPr lang="en-US" sz="1400" i="0" dirty="0" err="1">
+                <a:solidFill>
+                  <a:srgbClr val="161616"/>
+                </a:solidFill>
+                <a:effectLst/>
+                <a:latin typeface="+mj-lt"/>
+              </a:rPr>
+              <a:t>serveless</a:t>
+            </a:r>
+            <a:r>
+              <a:rPr lang="en-US" sz="1400" i="0" dirty="0">
+                <a:solidFill>
+                  <a:srgbClr val="161616"/>
+                </a:solidFill>
+                <a:effectLst/>
+                <a:latin typeface="+mj-lt"/>
+              </a:rPr>
+              <a:t> (where multiple different databases are stored and not just for your company)</a:t>
+            </a:r>
+          </a:p>
+          <a:p>
+            <a:pPr>
+              <a:lnSpc>
+                <a:spcPct val="120000"/>
+              </a:lnSpc>
+            </a:pPr>
+            <a:endParaRPr lang="en-US" sz="1400" i="0" dirty="0">
+              <a:solidFill>
+                <a:srgbClr val="161616"/>
+              </a:solidFill>
+              <a:effectLst/>
+              <a:latin typeface="+mj-lt"/>
+            </a:endParaRPr>
+          </a:p>
+          <a:p>
+            <a:pPr>
+              <a:lnSpc>
+                <a:spcPct val="120000"/>
+              </a:lnSpc>
+            </a:pPr>
+            <a:r>
+              <a:rPr lang="en-US" sz="1400" dirty="0">
+                <a:solidFill>
+                  <a:srgbClr val="161616"/>
+                </a:solidFill>
+                <a:latin typeface="+mj-lt"/>
+              </a:rPr>
+              <a:t>Elastic pool – only your company has access to the elastic pool but you can have multiple databases on that pool.</a:t>
+            </a:r>
+            <a:endParaRPr lang="en-US" sz="1400" i="0" dirty="0">
+              <a:solidFill>
+                <a:srgbClr val="161616"/>
+              </a:solidFill>
+              <a:effectLst/>
+              <a:latin typeface="+mj-lt"/>
+            </a:endParaRPr>
           </a:p>
         </p:txBody>
       </p:sp>
+      <p:pic>
+        <p:nvPicPr>
+          <p:cNvPr id="6" name="Picture 5">
+            <a:extLst>
+              <a:ext uri="{FF2B5EF4-FFF2-40B4-BE49-F238E27FC236}">
+                <a16:creationId xmlns:a16="http://schemas.microsoft.com/office/drawing/2014/main" id="{D876755A-80B5-C25E-C133-EC6E7D15179F}"/>
+              </a:ext>
+            </a:extLst>
+          </p:cNvPr>
+          <p:cNvPicPr>
+            <a:picLocks noChangeAspect="1"/>
+          </p:cNvPicPr>
+          <p:nvPr/>
+        </p:nvPicPr>
+        <p:blipFill>
+          <a:blip r:embed="rId3"/>
+          <a:stretch>
+            <a:fillRect/>
+          </a:stretch>
+        </p:blipFill>
+        <p:spPr>
+          <a:xfrm>
+            <a:off x="6893960" y="1084778"/>
+            <a:ext cx="4992809" cy="5655838"/>
+          </a:xfrm>
+          <a:prstGeom prst="rect">
+            <a:avLst/>
+          </a:prstGeom>
+        </p:spPr>
+      </p:pic>
+    </p:spTree>
+    <p:extLst>
+      <p:ext uri="{BB962C8B-B14F-4D97-AF65-F5344CB8AC3E}">
+        <p14:creationId xmlns:p14="http://schemas.microsoft.com/office/powerpoint/2010/main" val="1980302324"/>
+      </p:ext>
+    </p:extLst>
+  </p:cSld>
+  <p:clrMapOvr>
+    <a:masterClrMapping/>
+  </p:clrMapOvr>
+</p:sld>
+</file>
+
+<file path=ppt/slides/slide19.xml><?xml version="1.0" encoding="utf-8"?>
+<p:sld xmlns:a="http://schemas.openxmlformats.org/drawingml/2006/main" xmlns:r="http://schemas.openxmlformats.org/officeDocument/2006/relationships" xmlns:p="http://schemas.openxmlformats.org/presentationml/2006/main">
+  <p:cSld>
+    <p:spTree>
+      <p:nvGrpSpPr>
+        <p:cNvPr id="1" name=""/>
+        <p:cNvGrpSpPr/>
+        <p:nvPr/>
+      </p:nvGrpSpPr>
+      <p:grpSpPr>
+        <a:xfrm>
+          <a:off x="0" y="0"/>
+          <a:ext cx="0" cy="0"/>
+          <a:chOff x="0" y="0"/>
+          <a:chExt cx="0" cy="0"/>
+        </a:xfrm>
+      </p:grpSpPr>
+      <p:grpSp>
+        <p:nvGrpSpPr>
+          <p:cNvPr id="18" name="Group 17">
+            <a:extLst>
+              <a:ext uri="{FF2B5EF4-FFF2-40B4-BE49-F238E27FC236}">
+                <a16:creationId xmlns:a16="http://schemas.microsoft.com/office/drawing/2014/main" id="{6185BE9B-87C8-4B46-9293-0E71CF17E76A}"/>
+              </a:ext>
+            </a:extLst>
+          </p:cNvPr>
+          <p:cNvGrpSpPr/>
+          <p:nvPr/>
+        </p:nvGrpSpPr>
+        <p:grpSpPr>
+          <a:xfrm>
+            <a:off x="99755" y="83129"/>
+            <a:ext cx="11953701" cy="872834"/>
+            <a:chOff x="99755" y="83129"/>
+            <a:chExt cx="11953701" cy="872834"/>
+          </a:xfrm>
+        </p:grpSpPr>
+        <p:cxnSp>
+          <p:nvCxnSpPr>
+            <p:cNvPr id="5" name="Straight Connector 4">
+              <a:extLst>
+                <a:ext uri="{FF2B5EF4-FFF2-40B4-BE49-F238E27FC236}">
+                  <a16:creationId xmlns:a16="http://schemas.microsoft.com/office/drawing/2014/main" id="{A8BE4EF8-406C-4035-940C-AB752B29BA18}"/>
+                </a:ext>
+              </a:extLst>
+            </p:cNvPr>
+            <p:cNvCxnSpPr/>
+            <p:nvPr/>
+          </p:nvCxnSpPr>
+          <p:spPr>
+            <a:xfrm>
+              <a:off x="99755" y="955963"/>
+              <a:ext cx="11953701" cy="0"/>
+            </a:xfrm>
+            <a:prstGeom prst="line">
+              <a:avLst/>
+            </a:prstGeom>
+            <a:ln w="19050">
+              <a:solidFill>
+                <a:srgbClr val="0072C6"/>
+              </a:solidFill>
+            </a:ln>
+          </p:spPr>
+          <p:style>
+            <a:lnRef idx="1">
+              <a:schemeClr val="accent1"/>
+            </a:lnRef>
+            <a:fillRef idx="0">
+              <a:schemeClr val="accent1"/>
+            </a:fillRef>
+            <a:effectRef idx="0">
+              <a:schemeClr val="accent1"/>
+            </a:effectRef>
+            <a:fontRef idx="minor">
+              <a:schemeClr val="tx1"/>
+            </a:fontRef>
+          </p:style>
+        </p:cxnSp>
+        <p:sp>
+          <p:nvSpPr>
+            <p:cNvPr id="8" name="TextBox 7">
+              <a:extLst>
+                <a:ext uri="{FF2B5EF4-FFF2-40B4-BE49-F238E27FC236}">
+                  <a16:creationId xmlns:a16="http://schemas.microsoft.com/office/drawing/2014/main" id="{C61B684E-FDA7-4625-9CC3-79C17CC59ED7}"/>
+                </a:ext>
+              </a:extLst>
+            </p:cNvPr>
+            <p:cNvSpPr txBox="1"/>
+            <p:nvPr/>
+          </p:nvSpPr>
+          <p:spPr>
+            <a:xfrm>
+              <a:off x="4372493" y="180818"/>
+              <a:ext cx="4989025" cy="646331"/>
+            </a:xfrm>
+            <a:prstGeom prst="rect">
+              <a:avLst/>
+            </a:prstGeom>
+            <a:noFill/>
+          </p:spPr>
+          <p:txBody>
+            <a:bodyPr wrap="square" rtlCol="0">
+              <a:spAutoFit/>
+            </a:bodyPr>
+            <a:lstStyle/>
+            <a:p>
+              <a:pPr marL="0" marR="0" lvl="0" indent="0" algn="l" defTabSz="914400" rtl="0" eaLnBrk="1" fontAlgn="auto" latinLnBrk="0" hangingPunct="1">
+                <a:lnSpc>
+                  <a:spcPct val="100000"/>
+                </a:lnSpc>
+                <a:spcBef>
+                  <a:spcPts val="0"/>
+                </a:spcBef>
+                <a:spcAft>
+                  <a:spcPts val="0"/>
+                </a:spcAft>
+                <a:buClrTx/>
+                <a:buSzTx/>
+                <a:buFontTx/>
+                <a:buNone/>
+                <a:tabLst/>
+                <a:defRPr/>
+              </a:pPr>
+              <a:r>
+                <a:rPr kumimoji="0" lang="en-GB" sz="1800" b="0" i="0" u="none" strike="noStrike" kern="1200" cap="none" spc="0" normalizeH="0" baseline="0" noProof="0" dirty="0">
+                  <a:ln>
+                    <a:noFill/>
+                  </a:ln>
+                  <a:solidFill>
+                    <a:prstClr val="black"/>
+                  </a:solidFill>
+                  <a:effectLst/>
+                  <a:uLnTx/>
+                  <a:uFillTx/>
+                  <a:latin typeface="Calibri" panose="020F0502020204030204"/>
+                  <a:ea typeface="+mn-ea"/>
+                  <a:cs typeface="+mn-cs"/>
+                </a:rPr>
+                <a:t>Microsoft Azure Data Fundamentals: Explore relational data in Azure</a:t>
+              </a:r>
+            </a:p>
+          </p:txBody>
+        </p:sp>
+        <p:sp>
+          <p:nvSpPr>
+            <p:cNvPr id="10" name="TextBox 9">
+              <a:extLst>
+                <a:ext uri="{FF2B5EF4-FFF2-40B4-BE49-F238E27FC236}">
+                  <a16:creationId xmlns:a16="http://schemas.microsoft.com/office/drawing/2014/main" id="{4E568F0D-7E90-4A0C-8070-6C806D992954}"/>
+                </a:ext>
+              </a:extLst>
+            </p:cNvPr>
+            <p:cNvSpPr txBox="1"/>
+            <p:nvPr/>
+          </p:nvSpPr>
+          <p:spPr>
+            <a:xfrm>
+              <a:off x="9534699" y="180818"/>
+              <a:ext cx="2155764" cy="369332"/>
+            </a:xfrm>
+            <a:prstGeom prst="rect">
+              <a:avLst/>
+            </a:prstGeom>
+            <a:noFill/>
+          </p:spPr>
+          <p:txBody>
+            <a:bodyPr wrap="square" rtlCol="0">
+              <a:spAutoFit/>
+            </a:bodyPr>
+            <a:lstStyle/>
+            <a:p>
+              <a:pPr marL="0" marR="0" lvl="0" indent="0" algn="l" defTabSz="914400" rtl="0" eaLnBrk="1" fontAlgn="auto" latinLnBrk="0" hangingPunct="1">
+                <a:lnSpc>
+                  <a:spcPct val="100000"/>
+                </a:lnSpc>
+                <a:spcBef>
+                  <a:spcPts val="0"/>
+                </a:spcBef>
+                <a:spcAft>
+                  <a:spcPts val="0"/>
+                </a:spcAft>
+                <a:buClrTx/>
+                <a:buSzTx/>
+                <a:buFontTx/>
+                <a:buNone/>
+                <a:tabLst/>
+                <a:defRPr/>
+              </a:pPr>
+              <a:r>
+                <a:rPr kumimoji="0" lang="en-GB" sz="1800" b="0" i="0" u="none" strike="noStrike" kern="1200" cap="none" spc="0" normalizeH="0" baseline="0" noProof="0" dirty="0">
+                  <a:ln>
+                    <a:noFill/>
+                  </a:ln>
+                  <a:solidFill>
+                    <a:prstClr val="black"/>
+                  </a:solidFill>
+                  <a:effectLst/>
+                  <a:uLnTx/>
+                  <a:uFillTx/>
+                  <a:latin typeface="Calibri" panose="020F0502020204030204"/>
+                  <a:ea typeface="+mn-ea"/>
+                  <a:cs typeface="+mn-cs"/>
+                </a:rPr>
+                <a:t>Date: 15/03/23 </a:t>
+              </a:r>
+            </a:p>
+          </p:txBody>
+        </p:sp>
+        <p:cxnSp>
+          <p:nvCxnSpPr>
+            <p:cNvPr id="11" name="Straight Connector 10">
+              <a:extLst>
+                <a:ext uri="{FF2B5EF4-FFF2-40B4-BE49-F238E27FC236}">
+                  <a16:creationId xmlns:a16="http://schemas.microsoft.com/office/drawing/2014/main" id="{F70ABCF3-BE60-426F-8C8C-059C854869C6}"/>
+                </a:ext>
+              </a:extLst>
+            </p:cNvPr>
+            <p:cNvCxnSpPr>
+              <a:cxnSpLocks/>
+            </p:cNvCxnSpPr>
+            <p:nvPr/>
+          </p:nvCxnSpPr>
+          <p:spPr>
+            <a:xfrm flipV="1">
+              <a:off x="4267202" y="93505"/>
+              <a:ext cx="1" cy="754394"/>
+            </a:xfrm>
+            <a:prstGeom prst="line">
+              <a:avLst/>
+            </a:prstGeom>
+            <a:ln w="19050">
+              <a:solidFill>
+                <a:srgbClr val="0072C6"/>
+              </a:solidFill>
+            </a:ln>
+          </p:spPr>
+          <p:style>
+            <a:lnRef idx="1">
+              <a:schemeClr val="accent1"/>
+            </a:lnRef>
+            <a:fillRef idx="0">
+              <a:schemeClr val="accent1"/>
+            </a:fillRef>
+            <a:effectRef idx="0">
+              <a:schemeClr val="accent1"/>
+            </a:effectRef>
+            <a:fontRef idx="minor">
+              <a:schemeClr val="tx1"/>
+            </a:fontRef>
+          </p:style>
+        </p:cxnSp>
+        <p:cxnSp>
+          <p:nvCxnSpPr>
+            <p:cNvPr id="16" name="Straight Connector 15">
+              <a:extLst>
+                <a:ext uri="{FF2B5EF4-FFF2-40B4-BE49-F238E27FC236}">
+                  <a16:creationId xmlns:a16="http://schemas.microsoft.com/office/drawing/2014/main" id="{90F03633-4CAB-4B57-BF94-CF91E87AB7AE}"/>
+                </a:ext>
+              </a:extLst>
+            </p:cNvPr>
+            <p:cNvCxnSpPr>
+              <a:cxnSpLocks/>
+            </p:cNvCxnSpPr>
+            <p:nvPr/>
+          </p:nvCxnSpPr>
+          <p:spPr>
+            <a:xfrm flipV="1">
+              <a:off x="9491750" y="83129"/>
+              <a:ext cx="1" cy="754394"/>
+            </a:xfrm>
+            <a:prstGeom prst="line">
+              <a:avLst/>
+            </a:prstGeom>
+            <a:ln w="19050">
+              <a:solidFill>
+                <a:srgbClr val="0072C6"/>
+              </a:solidFill>
+            </a:ln>
+          </p:spPr>
+          <p:style>
+            <a:lnRef idx="1">
+              <a:schemeClr val="accent1"/>
+            </a:lnRef>
+            <a:fillRef idx="0">
+              <a:schemeClr val="accent1"/>
+            </a:fillRef>
+            <a:effectRef idx="0">
+              <a:schemeClr val="accent1"/>
+            </a:effectRef>
+            <a:fontRef idx="minor">
+              <a:schemeClr val="tx1"/>
+            </a:fontRef>
+          </p:style>
+        </p:cxnSp>
+      </p:grpSp>
+      <p:pic>
+        <p:nvPicPr>
+          <p:cNvPr id="20" name="Picture 2">
+            <a:extLst>
+              <a:ext uri="{FF2B5EF4-FFF2-40B4-BE49-F238E27FC236}">
+                <a16:creationId xmlns:a16="http://schemas.microsoft.com/office/drawing/2014/main" id="{775211BE-DA3A-41DA-8578-4E52F07B6AB9}"/>
+              </a:ext>
+            </a:extLst>
+          </p:cNvPr>
+          <p:cNvPicPr>
+            <a:picLocks noChangeAspect="1" noChangeArrowheads="1"/>
+          </p:cNvPicPr>
+          <p:nvPr/>
+        </p:nvPicPr>
+        <p:blipFill>
+          <a:blip r:embed="rId2">
+            <a:extLst>
+              <a:ext uri="{28A0092B-C50C-407E-A947-70E740481C1C}">
+                <a14:useLocalDpi xmlns:a14="http://schemas.microsoft.com/office/drawing/2010/main" val="0"/>
+              </a:ext>
+            </a:extLst>
+          </a:blip>
+          <a:srcRect/>
+          <a:stretch>
+            <a:fillRect/>
+          </a:stretch>
+        </p:blipFill>
+        <p:spPr bwMode="auto">
+          <a:xfrm>
+            <a:off x="144770" y="111976"/>
+            <a:ext cx="725548" cy="725548"/>
+          </a:xfrm>
+          <a:prstGeom prst="rect">
+            <a:avLst/>
+          </a:prstGeom>
+          <a:noFill/>
+          <a:extLst>
+            <a:ext uri="{909E8E84-426E-40DD-AFC4-6F175D3DCCD1}">
+              <a14:hiddenFill xmlns:a14="http://schemas.microsoft.com/office/drawing/2010/main">
+                <a:solidFill>
+                  <a:srgbClr val="FFFFFF"/>
+                </a:solidFill>
+              </a14:hiddenFill>
+            </a:ext>
+          </a:extLst>
+        </p:spPr>
+      </p:pic>
       <p:sp>
         <p:nvSpPr>
-          <p:cNvPr id="3" name="TextBox 2">
+          <p:cNvPr id="21" name="TextBox 20">
             <a:extLst>
               <a:ext uri="{FF2B5EF4-FFF2-40B4-BE49-F238E27FC236}">
-                <a16:creationId xmlns:a16="http://schemas.microsoft.com/office/drawing/2014/main" id="{E9EC730B-063B-33B2-E17C-BAD74312F40B}"/>
+                <a16:creationId xmlns:a16="http://schemas.microsoft.com/office/drawing/2014/main" id="{30404CBF-C3F9-43E0-81FA-E9D4D01BC004}"/>
               </a:ext>
             </a:extLst>
           </p:cNvPr>
@@ -9236,8 +10334,8 @@
         </p:nvSpPr>
         <p:spPr>
           <a:xfrm>
-            <a:off x="238124" y="1074403"/>
-            <a:ext cx="11815331" cy="646331"/>
+            <a:off x="914402" y="191193"/>
+            <a:ext cx="3483032" cy="646331"/>
           </a:xfrm>
           <a:prstGeom prst="rect">
             <a:avLst/>
@@ -9245,28 +10343,365 @@
           <a:noFill/>
         </p:spPr>
         <p:txBody>
-          <a:bodyPr wrap="square">
+          <a:bodyPr wrap="square" rtlCol="0">
             <a:spAutoFit/>
           </a:bodyPr>
           <a:lstStyle/>
           <a:p>
+            <a:pPr marL="0" marR="0" lvl="0" indent="0" algn="l" defTabSz="914400" rtl="0" eaLnBrk="1" fontAlgn="auto" latinLnBrk="0" hangingPunct="1">
+              <a:lnSpc>
+                <a:spcPct val="100000"/>
+              </a:lnSpc>
+              <a:spcBef>
+                <a:spcPts val="0"/>
+              </a:spcBef>
+              <a:spcAft>
+                <a:spcPts val="0"/>
+              </a:spcAft>
+              <a:buClrTx/>
+              <a:buSzTx/>
+              <a:buFontTx/>
+              <a:buNone/>
+              <a:tabLst/>
+              <a:defRPr/>
+            </a:pPr>
             <a:r>
               <a:rPr lang="en-GB" dirty="0">
-                <a:hlinkClick r:id="rId3"/>
-              </a:rPr>
-              <a:t>https://learn.microsoft.com/en-us/training/paths/azure-data-fundamentals-explore-data-warehouse-analytics/</a:t>
-            </a:r>
-            <a:endParaRPr lang="en-GB" dirty="0"/>
-          </a:p>
-          <a:p>
-            <a:endParaRPr lang="en-GB" dirty="0"/>
+                <a:solidFill>
+                  <a:prstClr val="black"/>
+                </a:solidFill>
+                <a:latin typeface="Calibri" panose="020F0502020204030204"/>
+              </a:rPr>
+              <a:t>DP</a:t>
+            </a:r>
+            <a:r>
+              <a:rPr kumimoji="0" lang="en-GB" sz="1800" b="0" i="0" u="none" strike="noStrike" kern="1200" cap="none" spc="0" normalizeH="0" baseline="0" noProof="0" dirty="0">
+                <a:ln>
+                  <a:noFill/>
+                </a:ln>
+                <a:solidFill>
+                  <a:prstClr val="black"/>
+                </a:solidFill>
+                <a:effectLst/>
+                <a:uLnTx/>
+                <a:uFillTx/>
+                <a:latin typeface="Calibri" panose="020F0502020204030204"/>
+                <a:ea typeface="+mn-ea"/>
+                <a:cs typeface="+mn-cs"/>
+              </a:rPr>
+              <a:t>-900 Microsoft Azure Fundamentals</a:t>
+            </a:r>
+          </a:p>
+        </p:txBody>
+      </p:sp>
+      <p:sp>
+        <p:nvSpPr>
+          <p:cNvPr id="13" name="TextBox 12">
+            <a:extLst>
+              <a:ext uri="{FF2B5EF4-FFF2-40B4-BE49-F238E27FC236}">
+                <a16:creationId xmlns:a16="http://schemas.microsoft.com/office/drawing/2014/main" id="{B740727E-091B-4846-AD35-09F01069570A}"/>
+              </a:ext>
+            </a:extLst>
+          </p:cNvPr>
+          <p:cNvSpPr txBox="1"/>
+          <p:nvPr/>
+        </p:nvSpPr>
+        <p:spPr>
+          <a:xfrm>
+            <a:off x="208598" y="1100888"/>
+            <a:ext cx="11699150" cy="3546805"/>
+          </a:xfrm>
+          <a:prstGeom prst="rect">
+            <a:avLst/>
+          </a:prstGeom>
+          <a:noFill/>
+        </p:spPr>
+        <p:txBody>
+          <a:bodyPr wrap="square" rtlCol="0">
+            <a:spAutoFit/>
+          </a:bodyPr>
+          <a:lstStyle/>
+          <a:p>
+            <a:pPr>
+              <a:lnSpc>
+                <a:spcPct val="120000"/>
+              </a:lnSpc>
+            </a:pPr>
+            <a:r>
+              <a:rPr lang="en-US" sz="1600" b="1" dirty="0">
+                <a:solidFill>
+                  <a:srgbClr val="161616"/>
+                </a:solidFill>
+                <a:latin typeface="+mj-lt"/>
+              </a:rPr>
+              <a:t>Azure Database for MySQL</a:t>
+            </a:r>
+            <a:endParaRPr lang="en-US" sz="1400" dirty="0">
+              <a:solidFill>
+                <a:srgbClr val="161616"/>
+              </a:solidFill>
+              <a:latin typeface="+mj-lt"/>
+            </a:endParaRPr>
+          </a:p>
+          <a:p>
+            <a:pPr>
+              <a:lnSpc>
+                <a:spcPct val="120000"/>
+              </a:lnSpc>
+            </a:pPr>
+            <a:r>
+              <a:rPr lang="en-US" sz="1400" dirty="0">
+                <a:solidFill>
+                  <a:srgbClr val="161616"/>
+                </a:solidFill>
+                <a:latin typeface="+mj-lt"/>
+              </a:rPr>
+              <a:t>MySQL started life as a simple-to-use open-source database management system. It's available in several editions; Community (free – popular with web apps), Standard, and Enterprise (additional tools and features). LAMP standard for Linux, Apache, MySQL, and PHP.</a:t>
+            </a:r>
+          </a:p>
+          <a:p>
+            <a:pPr>
+              <a:lnSpc>
+                <a:spcPct val="120000"/>
+              </a:lnSpc>
+            </a:pPr>
+            <a:endParaRPr lang="en-US" sz="1400" dirty="0">
+              <a:solidFill>
+                <a:srgbClr val="161616"/>
+              </a:solidFill>
+              <a:latin typeface="+mj-lt"/>
+            </a:endParaRPr>
+          </a:p>
+          <a:p>
+            <a:pPr marL="0" marR="0" lvl="0" indent="0" algn="l" defTabSz="914400" rtl="0" eaLnBrk="1" fontAlgn="auto" latinLnBrk="0" hangingPunct="1">
+              <a:lnSpc>
+                <a:spcPct val="120000"/>
+              </a:lnSpc>
+              <a:spcBef>
+                <a:spcPts val="0"/>
+              </a:spcBef>
+              <a:spcAft>
+                <a:spcPts val="0"/>
+              </a:spcAft>
+              <a:buClrTx/>
+              <a:buSzTx/>
+              <a:buFontTx/>
+              <a:buNone/>
+              <a:tabLst/>
+              <a:defRPr/>
+            </a:pPr>
+            <a:r>
+              <a:rPr lang="en-US" sz="1600" b="1" dirty="0">
+                <a:solidFill>
+                  <a:srgbClr val="161616"/>
+                </a:solidFill>
+                <a:latin typeface="+mj-lt"/>
+              </a:rPr>
+              <a:t>Azure Database for </a:t>
+            </a:r>
+            <a:r>
+              <a:rPr kumimoji="0" lang="en-US" sz="1600" b="1" i="0" u="none" strike="noStrike" kern="1200" cap="none" spc="0" normalizeH="0" baseline="0" noProof="0" dirty="0">
+                <a:ln>
+                  <a:noFill/>
+                </a:ln>
+                <a:solidFill>
+                  <a:srgbClr val="161616"/>
+                </a:solidFill>
+                <a:effectLst/>
+                <a:uLnTx/>
+                <a:uFillTx/>
+                <a:latin typeface="Calibri Light" panose="020F0302020204030204"/>
+                <a:ea typeface="+mn-ea"/>
+                <a:cs typeface="+mn-cs"/>
+              </a:rPr>
+              <a:t>MariaDB</a:t>
+            </a:r>
+          </a:p>
+          <a:p>
+            <a:pPr marL="0" marR="0" lvl="0" indent="0" algn="l" defTabSz="914400" rtl="0" eaLnBrk="1" fontAlgn="auto" latinLnBrk="0" hangingPunct="1">
+              <a:lnSpc>
+                <a:spcPct val="120000"/>
+              </a:lnSpc>
+              <a:spcBef>
+                <a:spcPts val="0"/>
+              </a:spcBef>
+              <a:spcAft>
+                <a:spcPts val="0"/>
+              </a:spcAft>
+              <a:buClrTx/>
+              <a:buSzTx/>
+              <a:buFontTx/>
+              <a:buNone/>
+              <a:tabLst/>
+              <a:defRPr/>
+            </a:pPr>
+            <a:r>
+              <a:rPr lang="en-US" sz="1400" dirty="0">
+                <a:solidFill>
+                  <a:srgbClr val="161616"/>
+                </a:solidFill>
+                <a:latin typeface="+mj-lt"/>
+              </a:rPr>
+              <a:t>MariaDB is a newer database management system, created by the original developers of MySQL. The database engine has since been rewritten and optimized to improve performance. A table can hold </a:t>
+            </a:r>
+            <a:r>
+              <a:rPr lang="en-US" sz="1400" b="1" dirty="0">
+                <a:solidFill>
+                  <a:srgbClr val="161616"/>
+                </a:solidFill>
+                <a:latin typeface="+mj-lt"/>
+              </a:rPr>
+              <a:t>several versions of data</a:t>
+            </a:r>
+            <a:r>
+              <a:rPr lang="en-US" sz="1400" dirty="0">
+                <a:solidFill>
+                  <a:srgbClr val="161616"/>
+                </a:solidFill>
+                <a:latin typeface="+mj-lt"/>
+              </a:rPr>
+              <a:t>, enabling an application to query the data as it appeared at some point in the past.</a:t>
+            </a:r>
+          </a:p>
+          <a:p>
+            <a:pPr marL="0" marR="0" lvl="0" indent="0" algn="l" defTabSz="914400" rtl="0" eaLnBrk="1" fontAlgn="auto" latinLnBrk="0" hangingPunct="1">
+              <a:lnSpc>
+                <a:spcPct val="120000"/>
+              </a:lnSpc>
+              <a:spcBef>
+                <a:spcPts val="0"/>
+              </a:spcBef>
+              <a:spcAft>
+                <a:spcPts val="0"/>
+              </a:spcAft>
+              <a:buClrTx/>
+              <a:buSzTx/>
+              <a:buFontTx/>
+              <a:buNone/>
+              <a:tabLst/>
+              <a:defRPr/>
+            </a:pPr>
+            <a:endParaRPr lang="en-US" sz="1400" dirty="0">
+              <a:solidFill>
+                <a:srgbClr val="161616"/>
+              </a:solidFill>
+              <a:latin typeface="+mj-lt"/>
+            </a:endParaRPr>
+          </a:p>
+          <a:p>
+            <a:pPr marL="0" marR="0" lvl="0" indent="0" algn="l" defTabSz="914400" rtl="0" eaLnBrk="1" fontAlgn="auto" latinLnBrk="0" hangingPunct="1">
+              <a:lnSpc>
+                <a:spcPct val="120000"/>
+              </a:lnSpc>
+              <a:spcBef>
+                <a:spcPts val="0"/>
+              </a:spcBef>
+              <a:spcAft>
+                <a:spcPts val="0"/>
+              </a:spcAft>
+              <a:buClrTx/>
+              <a:buSzTx/>
+              <a:buFontTx/>
+              <a:buNone/>
+              <a:tabLst/>
+              <a:defRPr/>
+            </a:pPr>
+            <a:r>
+              <a:rPr lang="en-US" sz="1600" b="1" dirty="0">
+                <a:solidFill>
+                  <a:srgbClr val="161616"/>
+                </a:solidFill>
+                <a:latin typeface="+mj-lt"/>
+              </a:rPr>
+              <a:t>Azure Database for </a:t>
+            </a:r>
+            <a:r>
+              <a:rPr kumimoji="0" lang="en-US" sz="1600" b="1" i="0" u="none" strike="noStrike" kern="1200" cap="none" spc="0" normalizeH="0" baseline="0" noProof="0" dirty="0">
+                <a:ln>
+                  <a:noFill/>
+                </a:ln>
+                <a:solidFill>
+                  <a:srgbClr val="161616"/>
+                </a:solidFill>
+                <a:effectLst/>
+                <a:uLnTx/>
+                <a:uFillTx/>
+                <a:latin typeface="Calibri Light" panose="020F0302020204030204"/>
+                <a:ea typeface="+mn-ea"/>
+                <a:cs typeface="+mn-cs"/>
+              </a:rPr>
+              <a:t>PostgreSQL</a:t>
+            </a:r>
+            <a:endParaRPr lang="en-US" sz="1400" dirty="0">
+              <a:solidFill>
+                <a:srgbClr val="161616"/>
+              </a:solidFill>
+              <a:latin typeface="+mj-lt"/>
+            </a:endParaRPr>
+          </a:p>
+          <a:p>
+            <a:pPr>
+              <a:lnSpc>
+                <a:spcPct val="120000"/>
+              </a:lnSpc>
+            </a:pPr>
+            <a:r>
+              <a:rPr lang="en-US" sz="1400" i="0" dirty="0">
+                <a:solidFill>
+                  <a:srgbClr val="161616"/>
+                </a:solidFill>
+                <a:effectLst/>
+                <a:latin typeface="+mj-lt"/>
+              </a:rPr>
+              <a:t>Enables you to store custom data types, with their own non-relational properties. Another key feature is the ability to store and manipulate geometric data, such as lines, circles, and polygons. PostgreSQL has its own query language called </a:t>
+            </a:r>
+            <a:r>
+              <a:rPr lang="en-US" sz="1400" i="0" dirty="0" err="1">
+                <a:solidFill>
+                  <a:srgbClr val="161616"/>
+                </a:solidFill>
+                <a:effectLst/>
+                <a:latin typeface="+mj-lt"/>
+              </a:rPr>
+              <a:t>pgsql</a:t>
+            </a:r>
+            <a:r>
+              <a:rPr lang="en-US" sz="1400" i="0" dirty="0">
+                <a:solidFill>
+                  <a:srgbClr val="161616"/>
+                </a:solidFill>
+                <a:effectLst/>
+                <a:latin typeface="+mj-lt"/>
+              </a:rPr>
+              <a:t>. Some features of on-premises PostgreSQL databases aren't available in Azure Database for PostgreSQL. These features are mostly concerned with the extensions that users can add to a database to perform specialized tasks, such as writing stored procedures in various programming languages (other than </a:t>
+            </a:r>
+            <a:r>
+              <a:rPr lang="en-US" sz="1400" i="0" dirty="0" err="1">
+                <a:solidFill>
+                  <a:srgbClr val="161616"/>
+                </a:solidFill>
+                <a:effectLst/>
+                <a:latin typeface="+mj-lt"/>
+              </a:rPr>
+              <a:t>pgsql</a:t>
+            </a:r>
+            <a:r>
+              <a:rPr lang="en-US" sz="1400" i="0" dirty="0">
+                <a:solidFill>
+                  <a:srgbClr val="161616"/>
+                </a:solidFill>
+                <a:effectLst/>
+                <a:latin typeface="+mj-lt"/>
+              </a:rPr>
+              <a:t>, which is available)</a:t>
+            </a:r>
           </a:p>
         </p:txBody>
       </p:sp>
     </p:spTree>
     <p:extLst>
       <p:ext uri="{BB962C8B-B14F-4D97-AF65-F5344CB8AC3E}">
-        <p14:creationId xmlns:p14="http://schemas.microsoft.com/office/powerpoint/2010/main" val="55315787"/>
+        <p14:creationId xmlns:p14="http://schemas.microsoft.com/office/powerpoint/2010/main" val="2809140746"/>
       </p:ext>
     </p:extLst>
   </p:cSld>
@@ -9960,6 +11395,1682 @@
     <p:extLst>
       <p:ext uri="{BB962C8B-B14F-4D97-AF65-F5344CB8AC3E}">
         <p14:creationId xmlns:p14="http://schemas.microsoft.com/office/powerpoint/2010/main" val="4273393143"/>
+      </p:ext>
+    </p:extLst>
+  </p:cSld>
+  <p:clrMapOvr>
+    <a:masterClrMapping/>
+  </p:clrMapOvr>
+</p:sld>
+</file>
+
+<file path=ppt/slides/slide20.xml><?xml version="1.0" encoding="utf-8"?>
+<p:sld xmlns:a="http://schemas.openxmlformats.org/drawingml/2006/main" xmlns:r="http://schemas.openxmlformats.org/officeDocument/2006/relationships" xmlns:p="http://schemas.openxmlformats.org/presentationml/2006/main">
+  <p:cSld>
+    <p:spTree>
+      <p:nvGrpSpPr>
+        <p:cNvPr id="1" name=""/>
+        <p:cNvGrpSpPr/>
+        <p:nvPr/>
+      </p:nvGrpSpPr>
+      <p:grpSpPr>
+        <a:xfrm>
+          <a:off x="0" y="0"/>
+          <a:ext cx="0" cy="0"/>
+          <a:chOff x="0" y="0"/>
+          <a:chExt cx="0" cy="0"/>
+        </a:xfrm>
+      </p:grpSpPr>
+      <p:pic>
+        <p:nvPicPr>
+          <p:cNvPr id="7" name="Picture 2">
+            <a:extLst>
+              <a:ext uri="{FF2B5EF4-FFF2-40B4-BE49-F238E27FC236}">
+                <a16:creationId xmlns:a16="http://schemas.microsoft.com/office/drawing/2014/main" id="{656D77DE-6845-4DF0-A4E8-FCEE79C806B5}"/>
+              </a:ext>
+            </a:extLst>
+          </p:cNvPr>
+          <p:cNvPicPr>
+            <a:picLocks noChangeAspect="1" noChangeArrowheads="1"/>
+          </p:cNvPicPr>
+          <p:nvPr/>
+        </p:nvPicPr>
+        <p:blipFill>
+          <a:blip r:embed="rId2">
+            <a:extLst>
+              <a:ext uri="{28A0092B-C50C-407E-A947-70E740481C1C}">
+                <a14:useLocalDpi xmlns:a14="http://schemas.microsoft.com/office/drawing/2010/main" val="0"/>
+              </a:ext>
+            </a:extLst>
+          </a:blip>
+          <a:srcRect/>
+          <a:stretch>
+            <a:fillRect/>
+          </a:stretch>
+        </p:blipFill>
+        <p:spPr bwMode="auto">
+          <a:xfrm>
+            <a:off x="144770" y="111976"/>
+            <a:ext cx="725548" cy="725548"/>
+          </a:xfrm>
+          <a:prstGeom prst="rect">
+            <a:avLst/>
+          </a:prstGeom>
+          <a:noFill/>
+          <a:extLst>
+            <a:ext uri="{909E8E84-426E-40DD-AFC4-6F175D3DCCD1}">
+              <a14:hiddenFill xmlns:a14="http://schemas.microsoft.com/office/drawing/2010/main">
+                <a:solidFill>
+                  <a:srgbClr val="FFFFFF"/>
+                </a:solidFill>
+              </a14:hiddenFill>
+            </a:ext>
+          </a:extLst>
+        </p:spPr>
+      </p:pic>
+      <p:cxnSp>
+        <p:nvCxnSpPr>
+          <p:cNvPr id="5" name="Straight Connector 4">
+            <a:extLst>
+              <a:ext uri="{FF2B5EF4-FFF2-40B4-BE49-F238E27FC236}">
+                <a16:creationId xmlns:a16="http://schemas.microsoft.com/office/drawing/2014/main" id="{A8BE4EF8-406C-4035-940C-AB752B29BA18}"/>
+              </a:ext>
+            </a:extLst>
+          </p:cNvPr>
+          <p:cNvCxnSpPr/>
+          <p:nvPr/>
+        </p:nvCxnSpPr>
+        <p:spPr>
+          <a:xfrm>
+            <a:off x="99755" y="955963"/>
+            <a:ext cx="11953701" cy="0"/>
+          </a:xfrm>
+          <a:prstGeom prst="line">
+            <a:avLst/>
+          </a:prstGeom>
+          <a:ln w="19050">
+            <a:solidFill>
+              <a:srgbClr val="0072C6"/>
+            </a:solidFill>
+          </a:ln>
+        </p:spPr>
+        <p:style>
+          <a:lnRef idx="1">
+            <a:schemeClr val="accent1"/>
+          </a:lnRef>
+          <a:fillRef idx="0">
+            <a:schemeClr val="accent1"/>
+          </a:fillRef>
+          <a:effectRef idx="0">
+            <a:schemeClr val="accent1"/>
+          </a:effectRef>
+          <a:fontRef idx="minor">
+            <a:schemeClr val="tx1"/>
+          </a:fontRef>
+        </p:style>
+      </p:cxnSp>
+      <p:sp>
+        <p:nvSpPr>
+          <p:cNvPr id="6" name="TextBox 5">
+            <a:extLst>
+              <a:ext uri="{FF2B5EF4-FFF2-40B4-BE49-F238E27FC236}">
+                <a16:creationId xmlns:a16="http://schemas.microsoft.com/office/drawing/2014/main" id="{4A5E75BC-B6AC-4138-AB81-9DEC0096C5A8}"/>
+              </a:ext>
+            </a:extLst>
+          </p:cNvPr>
+          <p:cNvSpPr txBox="1"/>
+          <p:nvPr/>
+        </p:nvSpPr>
+        <p:spPr>
+          <a:xfrm>
+            <a:off x="914402" y="191193"/>
+            <a:ext cx="3483032" cy="646331"/>
+          </a:xfrm>
+          <a:prstGeom prst="rect">
+            <a:avLst/>
+          </a:prstGeom>
+          <a:noFill/>
+        </p:spPr>
+        <p:txBody>
+          <a:bodyPr wrap="square" rtlCol="0">
+            <a:spAutoFit/>
+          </a:bodyPr>
+          <a:lstStyle/>
+          <a:p>
+            <a:pPr marL="0" marR="0" lvl="0" indent="0" algn="l" defTabSz="914400" rtl="0" eaLnBrk="1" fontAlgn="auto" latinLnBrk="0" hangingPunct="1">
+              <a:lnSpc>
+                <a:spcPct val="100000"/>
+              </a:lnSpc>
+              <a:spcBef>
+                <a:spcPts val="0"/>
+              </a:spcBef>
+              <a:spcAft>
+                <a:spcPts val="0"/>
+              </a:spcAft>
+              <a:buClrTx/>
+              <a:buSzTx/>
+              <a:buFontTx/>
+              <a:buNone/>
+              <a:tabLst/>
+              <a:defRPr/>
+            </a:pPr>
+            <a:r>
+              <a:rPr lang="en-GB" dirty="0">
+                <a:solidFill>
+                  <a:prstClr val="black"/>
+                </a:solidFill>
+                <a:latin typeface="Calibri" panose="020F0502020204030204"/>
+              </a:rPr>
+              <a:t>DP</a:t>
+            </a:r>
+            <a:r>
+              <a:rPr kumimoji="0" lang="en-GB" sz="1800" b="0" i="0" u="none" strike="noStrike" kern="1200" cap="none" spc="0" normalizeH="0" baseline="0" noProof="0" dirty="0">
+                <a:ln>
+                  <a:noFill/>
+                </a:ln>
+                <a:solidFill>
+                  <a:prstClr val="black"/>
+                </a:solidFill>
+                <a:effectLst/>
+                <a:uLnTx/>
+                <a:uFillTx/>
+                <a:latin typeface="Calibri" panose="020F0502020204030204"/>
+                <a:ea typeface="+mn-ea"/>
+                <a:cs typeface="+mn-cs"/>
+              </a:rPr>
+              <a:t>-900 Microsoft Azure Fundamentals</a:t>
+            </a:r>
+          </a:p>
+        </p:txBody>
+      </p:sp>
+      <p:sp>
+        <p:nvSpPr>
+          <p:cNvPr id="8" name="TextBox 7">
+            <a:extLst>
+              <a:ext uri="{FF2B5EF4-FFF2-40B4-BE49-F238E27FC236}">
+                <a16:creationId xmlns:a16="http://schemas.microsoft.com/office/drawing/2014/main" id="{C61B684E-FDA7-4625-9CC3-79C17CC59ED7}"/>
+              </a:ext>
+            </a:extLst>
+          </p:cNvPr>
+          <p:cNvSpPr txBox="1"/>
+          <p:nvPr/>
+        </p:nvSpPr>
+        <p:spPr>
+          <a:xfrm>
+            <a:off x="320040" y="2479578"/>
+            <a:ext cx="11484864" cy="2062103"/>
+          </a:xfrm>
+          <a:prstGeom prst="rect">
+            <a:avLst/>
+          </a:prstGeom>
+          <a:noFill/>
+        </p:spPr>
+        <p:txBody>
+          <a:bodyPr wrap="square" rtlCol="0">
+            <a:spAutoFit/>
+          </a:bodyPr>
+          <a:lstStyle/>
+          <a:p>
+            <a:pPr marL="0" marR="0" lvl="0" indent="0" algn="ctr" defTabSz="914400" rtl="0" eaLnBrk="1" fontAlgn="auto" latinLnBrk="0" hangingPunct="1">
+              <a:lnSpc>
+                <a:spcPct val="100000"/>
+              </a:lnSpc>
+              <a:spcBef>
+                <a:spcPts val="0"/>
+              </a:spcBef>
+              <a:spcAft>
+                <a:spcPts val="0"/>
+              </a:spcAft>
+              <a:buClrTx/>
+              <a:buSzTx/>
+              <a:buFontTx/>
+              <a:buNone/>
+              <a:tabLst/>
+              <a:defRPr/>
+            </a:pPr>
+            <a:r>
+              <a:rPr kumimoji="0" lang="en-GB" sz="3200" i="0" u="none" strike="noStrike" kern="1200" cap="none" spc="0" normalizeH="0" baseline="0" noProof="0" dirty="0">
+                <a:ln>
+                  <a:noFill/>
+                </a:ln>
+                <a:solidFill>
+                  <a:prstClr val="black"/>
+                </a:solidFill>
+                <a:effectLst/>
+                <a:uLnTx/>
+                <a:uFillTx/>
+                <a:latin typeface="Calibri" panose="020F0502020204030204"/>
+                <a:ea typeface="+mn-ea"/>
+                <a:cs typeface="+mn-cs"/>
+              </a:rPr>
+              <a:t>Section </a:t>
+            </a:r>
+            <a:r>
+              <a:rPr lang="en-GB" sz="3200" dirty="0">
+                <a:solidFill>
+                  <a:prstClr val="black"/>
+                </a:solidFill>
+                <a:latin typeface="Calibri" panose="020F0502020204030204"/>
+              </a:rPr>
+              <a:t>3</a:t>
+            </a:r>
+            <a:endParaRPr kumimoji="0" lang="en-GB" sz="3200" i="0" u="none" strike="noStrike" kern="1200" cap="none" spc="0" normalizeH="0" baseline="0" noProof="0" dirty="0">
+              <a:ln>
+                <a:noFill/>
+              </a:ln>
+              <a:solidFill>
+                <a:prstClr val="black"/>
+              </a:solidFill>
+              <a:effectLst/>
+              <a:uLnTx/>
+              <a:uFillTx/>
+              <a:latin typeface="Calibri" panose="020F0502020204030204"/>
+              <a:ea typeface="+mn-ea"/>
+              <a:cs typeface="+mn-cs"/>
+            </a:endParaRPr>
+          </a:p>
+          <a:p>
+            <a:pPr marL="0" marR="0" lvl="0" indent="0" algn="ctr" defTabSz="914400" rtl="0" eaLnBrk="1" fontAlgn="auto" latinLnBrk="0" hangingPunct="1">
+              <a:lnSpc>
+                <a:spcPct val="100000"/>
+              </a:lnSpc>
+              <a:spcBef>
+                <a:spcPts val="0"/>
+              </a:spcBef>
+              <a:spcAft>
+                <a:spcPts val="0"/>
+              </a:spcAft>
+              <a:buClrTx/>
+              <a:buSzTx/>
+              <a:buFontTx/>
+              <a:buNone/>
+              <a:tabLst/>
+              <a:defRPr/>
+            </a:pPr>
+            <a:endParaRPr kumimoji="0" lang="en-GB" sz="3200" b="1" i="0" u="none" strike="noStrike" kern="1200" cap="none" spc="0" normalizeH="0" baseline="0" noProof="0" dirty="0">
+              <a:ln>
+                <a:noFill/>
+              </a:ln>
+              <a:solidFill>
+                <a:prstClr val="black"/>
+              </a:solidFill>
+              <a:effectLst/>
+              <a:uLnTx/>
+              <a:uFillTx/>
+              <a:latin typeface="Calibri" panose="020F0502020204030204"/>
+              <a:ea typeface="+mn-ea"/>
+              <a:cs typeface="+mn-cs"/>
+            </a:endParaRPr>
+          </a:p>
+          <a:p>
+            <a:pPr marL="0" marR="0" lvl="0" indent="0" algn="ctr" defTabSz="914400" rtl="0" eaLnBrk="1" fontAlgn="auto" latinLnBrk="0" hangingPunct="1">
+              <a:lnSpc>
+                <a:spcPct val="100000"/>
+              </a:lnSpc>
+              <a:spcBef>
+                <a:spcPts val="0"/>
+              </a:spcBef>
+              <a:spcAft>
+                <a:spcPts val="0"/>
+              </a:spcAft>
+              <a:buClrTx/>
+              <a:buSzTx/>
+              <a:buFontTx/>
+              <a:buNone/>
+              <a:tabLst/>
+              <a:defRPr/>
+            </a:pPr>
+            <a:r>
+              <a:rPr kumimoji="0" lang="en-GB" sz="3200" b="1" i="0" u="none" strike="noStrike" kern="1200" cap="none" spc="0" normalizeH="0" baseline="0" noProof="0" dirty="0">
+                <a:ln>
+                  <a:noFill/>
+                </a:ln>
+                <a:solidFill>
+                  <a:prstClr val="black"/>
+                </a:solidFill>
+                <a:effectLst/>
+                <a:uLnTx/>
+                <a:uFillTx/>
+                <a:latin typeface="Calibri" panose="020F0502020204030204"/>
+                <a:ea typeface="+mn-ea"/>
+                <a:cs typeface="+mn-cs"/>
+              </a:rPr>
+              <a:t>Microsoft Azure Data Fundamentals: Explore non-relational data in Azure</a:t>
+            </a:r>
+          </a:p>
+        </p:txBody>
+      </p:sp>
+      <p:sp>
+        <p:nvSpPr>
+          <p:cNvPr id="3" name="TextBox 2">
+            <a:extLst>
+              <a:ext uri="{FF2B5EF4-FFF2-40B4-BE49-F238E27FC236}">
+                <a16:creationId xmlns:a16="http://schemas.microsoft.com/office/drawing/2014/main" id="{ED0FFF9A-D132-0D87-AC22-1CDA03ED9AEB}"/>
+              </a:ext>
+            </a:extLst>
+          </p:cNvPr>
+          <p:cNvSpPr txBox="1"/>
+          <p:nvPr/>
+        </p:nvSpPr>
+        <p:spPr>
+          <a:xfrm>
+            <a:off x="144770" y="1074403"/>
+            <a:ext cx="11484864" cy="369332"/>
+          </a:xfrm>
+          <a:prstGeom prst="rect">
+            <a:avLst/>
+          </a:prstGeom>
+          <a:noFill/>
+        </p:spPr>
+        <p:txBody>
+          <a:bodyPr wrap="square">
+            <a:spAutoFit/>
+          </a:bodyPr>
+          <a:lstStyle/>
+          <a:p>
+            <a:r>
+              <a:rPr lang="en-GB" dirty="0">
+                <a:hlinkClick r:id="rId3"/>
+              </a:rPr>
+              <a:t>https://learn.microsoft.com/en-us/training/paths/azure-data-fundamentals-explore-non-relational-data/</a:t>
+            </a:r>
+            <a:endParaRPr lang="en-GB" dirty="0"/>
+          </a:p>
+        </p:txBody>
+      </p:sp>
+    </p:spTree>
+    <p:extLst>
+      <p:ext uri="{BB962C8B-B14F-4D97-AF65-F5344CB8AC3E}">
+        <p14:creationId xmlns:p14="http://schemas.microsoft.com/office/powerpoint/2010/main" val="2471186844"/>
+      </p:ext>
+    </p:extLst>
+  </p:cSld>
+  <p:clrMapOvr>
+    <a:masterClrMapping/>
+  </p:clrMapOvr>
+</p:sld>
+</file>
+
+<file path=ppt/slides/slide21.xml><?xml version="1.0" encoding="utf-8"?>
+<p:sld xmlns:a="http://schemas.openxmlformats.org/drawingml/2006/main" xmlns:r="http://schemas.openxmlformats.org/officeDocument/2006/relationships" xmlns:p="http://schemas.openxmlformats.org/presentationml/2006/main">
+  <p:cSld>
+    <p:spTree>
+      <p:nvGrpSpPr>
+        <p:cNvPr id="1" name=""/>
+        <p:cNvGrpSpPr/>
+        <p:nvPr/>
+      </p:nvGrpSpPr>
+      <p:grpSpPr>
+        <a:xfrm>
+          <a:off x="0" y="0"/>
+          <a:ext cx="0" cy="0"/>
+          <a:chOff x="0" y="0"/>
+          <a:chExt cx="0" cy="0"/>
+        </a:xfrm>
+      </p:grpSpPr>
+      <p:grpSp>
+        <p:nvGrpSpPr>
+          <p:cNvPr id="18" name="Group 17">
+            <a:extLst>
+              <a:ext uri="{FF2B5EF4-FFF2-40B4-BE49-F238E27FC236}">
+                <a16:creationId xmlns:a16="http://schemas.microsoft.com/office/drawing/2014/main" id="{6185BE9B-87C8-4B46-9293-0E71CF17E76A}"/>
+              </a:ext>
+            </a:extLst>
+          </p:cNvPr>
+          <p:cNvGrpSpPr/>
+          <p:nvPr/>
+        </p:nvGrpSpPr>
+        <p:grpSpPr>
+          <a:xfrm>
+            <a:off x="99755" y="83129"/>
+            <a:ext cx="11953701" cy="872834"/>
+            <a:chOff x="99755" y="83129"/>
+            <a:chExt cx="11953701" cy="872834"/>
+          </a:xfrm>
+        </p:grpSpPr>
+        <p:cxnSp>
+          <p:nvCxnSpPr>
+            <p:cNvPr id="5" name="Straight Connector 4">
+              <a:extLst>
+                <a:ext uri="{FF2B5EF4-FFF2-40B4-BE49-F238E27FC236}">
+                  <a16:creationId xmlns:a16="http://schemas.microsoft.com/office/drawing/2014/main" id="{A8BE4EF8-406C-4035-940C-AB752B29BA18}"/>
+                </a:ext>
+              </a:extLst>
+            </p:cNvPr>
+            <p:cNvCxnSpPr/>
+            <p:nvPr/>
+          </p:nvCxnSpPr>
+          <p:spPr>
+            <a:xfrm>
+              <a:off x="99755" y="955963"/>
+              <a:ext cx="11953701" cy="0"/>
+            </a:xfrm>
+            <a:prstGeom prst="line">
+              <a:avLst/>
+            </a:prstGeom>
+            <a:ln w="19050">
+              <a:solidFill>
+                <a:srgbClr val="0072C6"/>
+              </a:solidFill>
+            </a:ln>
+          </p:spPr>
+          <p:style>
+            <a:lnRef idx="1">
+              <a:schemeClr val="accent1"/>
+            </a:lnRef>
+            <a:fillRef idx="0">
+              <a:schemeClr val="accent1"/>
+            </a:fillRef>
+            <a:effectRef idx="0">
+              <a:schemeClr val="accent1"/>
+            </a:effectRef>
+            <a:fontRef idx="minor">
+              <a:schemeClr val="tx1"/>
+            </a:fontRef>
+          </p:style>
+        </p:cxnSp>
+        <p:sp>
+          <p:nvSpPr>
+            <p:cNvPr id="8" name="TextBox 7">
+              <a:extLst>
+                <a:ext uri="{FF2B5EF4-FFF2-40B4-BE49-F238E27FC236}">
+                  <a16:creationId xmlns:a16="http://schemas.microsoft.com/office/drawing/2014/main" id="{C61B684E-FDA7-4625-9CC3-79C17CC59ED7}"/>
+                </a:ext>
+              </a:extLst>
+            </p:cNvPr>
+            <p:cNvSpPr txBox="1"/>
+            <p:nvPr/>
+          </p:nvSpPr>
+          <p:spPr>
+            <a:xfrm>
+              <a:off x="4372493" y="180818"/>
+              <a:ext cx="4989025" cy="646331"/>
+            </a:xfrm>
+            <a:prstGeom prst="rect">
+              <a:avLst/>
+            </a:prstGeom>
+            <a:noFill/>
+          </p:spPr>
+          <p:txBody>
+            <a:bodyPr wrap="square" rtlCol="0">
+              <a:spAutoFit/>
+            </a:bodyPr>
+            <a:lstStyle/>
+            <a:p>
+              <a:pPr marL="0" marR="0" lvl="0" indent="0" algn="l" defTabSz="914400" rtl="0" eaLnBrk="1" fontAlgn="auto" latinLnBrk="0" hangingPunct="1">
+                <a:lnSpc>
+                  <a:spcPct val="100000"/>
+                </a:lnSpc>
+                <a:spcBef>
+                  <a:spcPts val="0"/>
+                </a:spcBef>
+                <a:spcAft>
+                  <a:spcPts val="0"/>
+                </a:spcAft>
+                <a:buClrTx/>
+                <a:buSzTx/>
+                <a:buFontTx/>
+                <a:buNone/>
+                <a:tabLst/>
+                <a:defRPr/>
+              </a:pPr>
+              <a:r>
+                <a:rPr kumimoji="0" lang="en-GB" sz="1800" b="0" i="0" u="none" strike="noStrike" kern="1200" cap="none" spc="0" normalizeH="0" baseline="0" noProof="0" dirty="0">
+                  <a:ln>
+                    <a:noFill/>
+                  </a:ln>
+                  <a:solidFill>
+                    <a:prstClr val="black"/>
+                  </a:solidFill>
+                  <a:effectLst/>
+                  <a:uLnTx/>
+                  <a:uFillTx/>
+                  <a:latin typeface="Calibri" panose="020F0502020204030204"/>
+                  <a:ea typeface="+mn-ea"/>
+                  <a:cs typeface="+mn-cs"/>
+                </a:rPr>
+                <a:t>Microsoft Azure Data Fundamentals: Explore non-relational data in Azure</a:t>
+              </a:r>
+            </a:p>
+          </p:txBody>
+        </p:sp>
+        <p:sp>
+          <p:nvSpPr>
+            <p:cNvPr id="10" name="TextBox 9">
+              <a:extLst>
+                <a:ext uri="{FF2B5EF4-FFF2-40B4-BE49-F238E27FC236}">
+                  <a16:creationId xmlns:a16="http://schemas.microsoft.com/office/drawing/2014/main" id="{4E568F0D-7E90-4A0C-8070-6C806D992954}"/>
+                </a:ext>
+              </a:extLst>
+            </p:cNvPr>
+            <p:cNvSpPr txBox="1"/>
+            <p:nvPr/>
+          </p:nvSpPr>
+          <p:spPr>
+            <a:xfrm>
+              <a:off x="9534699" y="180818"/>
+              <a:ext cx="2155764" cy="369332"/>
+            </a:xfrm>
+            <a:prstGeom prst="rect">
+              <a:avLst/>
+            </a:prstGeom>
+            <a:noFill/>
+          </p:spPr>
+          <p:txBody>
+            <a:bodyPr wrap="square" rtlCol="0">
+              <a:spAutoFit/>
+            </a:bodyPr>
+            <a:lstStyle/>
+            <a:p>
+              <a:pPr marL="0" marR="0" lvl="0" indent="0" algn="l" defTabSz="914400" rtl="0" eaLnBrk="1" fontAlgn="auto" latinLnBrk="0" hangingPunct="1">
+                <a:lnSpc>
+                  <a:spcPct val="100000"/>
+                </a:lnSpc>
+                <a:spcBef>
+                  <a:spcPts val="0"/>
+                </a:spcBef>
+                <a:spcAft>
+                  <a:spcPts val="0"/>
+                </a:spcAft>
+                <a:buClrTx/>
+                <a:buSzTx/>
+                <a:buFontTx/>
+                <a:buNone/>
+                <a:tabLst/>
+                <a:defRPr/>
+              </a:pPr>
+              <a:r>
+                <a:rPr kumimoji="0" lang="en-GB" sz="1800" b="0" i="0" u="none" strike="noStrike" kern="1200" cap="none" spc="0" normalizeH="0" baseline="0" noProof="0" dirty="0">
+                  <a:ln>
+                    <a:noFill/>
+                  </a:ln>
+                  <a:solidFill>
+                    <a:prstClr val="black"/>
+                  </a:solidFill>
+                  <a:effectLst/>
+                  <a:uLnTx/>
+                  <a:uFillTx/>
+                  <a:latin typeface="Calibri" panose="020F0502020204030204"/>
+                  <a:ea typeface="+mn-ea"/>
+                  <a:cs typeface="+mn-cs"/>
+                </a:rPr>
+                <a:t>Date: 15/03/23 </a:t>
+              </a:r>
+            </a:p>
+          </p:txBody>
+        </p:sp>
+        <p:cxnSp>
+          <p:nvCxnSpPr>
+            <p:cNvPr id="11" name="Straight Connector 10">
+              <a:extLst>
+                <a:ext uri="{FF2B5EF4-FFF2-40B4-BE49-F238E27FC236}">
+                  <a16:creationId xmlns:a16="http://schemas.microsoft.com/office/drawing/2014/main" id="{F70ABCF3-BE60-426F-8C8C-059C854869C6}"/>
+                </a:ext>
+              </a:extLst>
+            </p:cNvPr>
+            <p:cNvCxnSpPr>
+              <a:cxnSpLocks/>
+            </p:cNvCxnSpPr>
+            <p:nvPr/>
+          </p:nvCxnSpPr>
+          <p:spPr>
+            <a:xfrm flipV="1">
+              <a:off x="4267202" y="93505"/>
+              <a:ext cx="1" cy="754394"/>
+            </a:xfrm>
+            <a:prstGeom prst="line">
+              <a:avLst/>
+            </a:prstGeom>
+            <a:ln w="19050">
+              <a:solidFill>
+                <a:srgbClr val="0072C6"/>
+              </a:solidFill>
+            </a:ln>
+          </p:spPr>
+          <p:style>
+            <a:lnRef idx="1">
+              <a:schemeClr val="accent1"/>
+            </a:lnRef>
+            <a:fillRef idx="0">
+              <a:schemeClr val="accent1"/>
+            </a:fillRef>
+            <a:effectRef idx="0">
+              <a:schemeClr val="accent1"/>
+            </a:effectRef>
+            <a:fontRef idx="minor">
+              <a:schemeClr val="tx1"/>
+            </a:fontRef>
+          </p:style>
+        </p:cxnSp>
+        <p:cxnSp>
+          <p:nvCxnSpPr>
+            <p:cNvPr id="16" name="Straight Connector 15">
+              <a:extLst>
+                <a:ext uri="{FF2B5EF4-FFF2-40B4-BE49-F238E27FC236}">
+                  <a16:creationId xmlns:a16="http://schemas.microsoft.com/office/drawing/2014/main" id="{90F03633-4CAB-4B57-BF94-CF91E87AB7AE}"/>
+                </a:ext>
+              </a:extLst>
+            </p:cNvPr>
+            <p:cNvCxnSpPr>
+              <a:cxnSpLocks/>
+            </p:cNvCxnSpPr>
+            <p:nvPr/>
+          </p:nvCxnSpPr>
+          <p:spPr>
+            <a:xfrm flipV="1">
+              <a:off x="9491750" y="83129"/>
+              <a:ext cx="1" cy="754394"/>
+            </a:xfrm>
+            <a:prstGeom prst="line">
+              <a:avLst/>
+            </a:prstGeom>
+            <a:ln w="19050">
+              <a:solidFill>
+                <a:srgbClr val="0072C6"/>
+              </a:solidFill>
+            </a:ln>
+          </p:spPr>
+          <p:style>
+            <a:lnRef idx="1">
+              <a:schemeClr val="accent1"/>
+            </a:lnRef>
+            <a:fillRef idx="0">
+              <a:schemeClr val="accent1"/>
+            </a:fillRef>
+            <a:effectRef idx="0">
+              <a:schemeClr val="accent1"/>
+            </a:effectRef>
+            <a:fontRef idx="minor">
+              <a:schemeClr val="tx1"/>
+            </a:fontRef>
+          </p:style>
+        </p:cxnSp>
+      </p:grpSp>
+      <p:pic>
+        <p:nvPicPr>
+          <p:cNvPr id="20" name="Picture 2">
+            <a:extLst>
+              <a:ext uri="{FF2B5EF4-FFF2-40B4-BE49-F238E27FC236}">
+                <a16:creationId xmlns:a16="http://schemas.microsoft.com/office/drawing/2014/main" id="{775211BE-DA3A-41DA-8578-4E52F07B6AB9}"/>
+              </a:ext>
+            </a:extLst>
+          </p:cNvPr>
+          <p:cNvPicPr>
+            <a:picLocks noChangeAspect="1" noChangeArrowheads="1"/>
+          </p:cNvPicPr>
+          <p:nvPr/>
+        </p:nvPicPr>
+        <p:blipFill>
+          <a:blip r:embed="rId2">
+            <a:extLst>
+              <a:ext uri="{28A0092B-C50C-407E-A947-70E740481C1C}">
+                <a14:useLocalDpi xmlns:a14="http://schemas.microsoft.com/office/drawing/2010/main" val="0"/>
+              </a:ext>
+            </a:extLst>
+          </a:blip>
+          <a:srcRect/>
+          <a:stretch>
+            <a:fillRect/>
+          </a:stretch>
+        </p:blipFill>
+        <p:spPr bwMode="auto">
+          <a:xfrm>
+            <a:off x="144770" y="111976"/>
+            <a:ext cx="725548" cy="725548"/>
+          </a:xfrm>
+          <a:prstGeom prst="rect">
+            <a:avLst/>
+          </a:prstGeom>
+          <a:noFill/>
+          <a:extLst>
+            <a:ext uri="{909E8E84-426E-40DD-AFC4-6F175D3DCCD1}">
+              <a14:hiddenFill xmlns:a14="http://schemas.microsoft.com/office/drawing/2010/main">
+                <a:solidFill>
+                  <a:srgbClr val="FFFFFF"/>
+                </a:solidFill>
+              </a14:hiddenFill>
+            </a:ext>
+          </a:extLst>
+        </p:spPr>
+      </p:pic>
+      <p:sp>
+        <p:nvSpPr>
+          <p:cNvPr id="21" name="TextBox 20">
+            <a:extLst>
+              <a:ext uri="{FF2B5EF4-FFF2-40B4-BE49-F238E27FC236}">
+                <a16:creationId xmlns:a16="http://schemas.microsoft.com/office/drawing/2014/main" id="{30404CBF-C3F9-43E0-81FA-E9D4D01BC004}"/>
+              </a:ext>
+            </a:extLst>
+          </p:cNvPr>
+          <p:cNvSpPr txBox="1"/>
+          <p:nvPr/>
+        </p:nvSpPr>
+        <p:spPr>
+          <a:xfrm>
+            <a:off x="914402" y="191193"/>
+            <a:ext cx="3483032" cy="646331"/>
+          </a:xfrm>
+          <a:prstGeom prst="rect">
+            <a:avLst/>
+          </a:prstGeom>
+          <a:noFill/>
+        </p:spPr>
+        <p:txBody>
+          <a:bodyPr wrap="square" rtlCol="0">
+            <a:spAutoFit/>
+          </a:bodyPr>
+          <a:lstStyle/>
+          <a:p>
+            <a:pPr marL="0" marR="0" lvl="0" indent="0" algn="l" defTabSz="914400" rtl="0" eaLnBrk="1" fontAlgn="auto" latinLnBrk="0" hangingPunct="1">
+              <a:lnSpc>
+                <a:spcPct val="100000"/>
+              </a:lnSpc>
+              <a:spcBef>
+                <a:spcPts val="0"/>
+              </a:spcBef>
+              <a:spcAft>
+                <a:spcPts val="0"/>
+              </a:spcAft>
+              <a:buClrTx/>
+              <a:buSzTx/>
+              <a:buFontTx/>
+              <a:buNone/>
+              <a:tabLst/>
+              <a:defRPr/>
+            </a:pPr>
+            <a:r>
+              <a:rPr lang="en-GB" dirty="0">
+                <a:solidFill>
+                  <a:prstClr val="black"/>
+                </a:solidFill>
+                <a:latin typeface="Calibri" panose="020F0502020204030204"/>
+              </a:rPr>
+              <a:t>DP</a:t>
+            </a:r>
+            <a:r>
+              <a:rPr kumimoji="0" lang="en-GB" sz="1800" b="0" i="0" u="none" strike="noStrike" kern="1200" cap="none" spc="0" normalizeH="0" baseline="0" noProof="0" dirty="0">
+                <a:ln>
+                  <a:noFill/>
+                </a:ln>
+                <a:solidFill>
+                  <a:prstClr val="black"/>
+                </a:solidFill>
+                <a:effectLst/>
+                <a:uLnTx/>
+                <a:uFillTx/>
+                <a:latin typeface="Calibri" panose="020F0502020204030204"/>
+                <a:ea typeface="+mn-ea"/>
+                <a:cs typeface="+mn-cs"/>
+              </a:rPr>
+              <a:t>-900 Microsoft Azure Fundamentals</a:t>
+            </a:r>
+          </a:p>
+        </p:txBody>
+      </p:sp>
+      <p:pic>
+        <p:nvPicPr>
+          <p:cNvPr id="1026" name="Picture 2" descr="An Azure blob storage container with two blobs">
+            <a:extLst>
+              <a:ext uri="{FF2B5EF4-FFF2-40B4-BE49-F238E27FC236}">
+                <a16:creationId xmlns:a16="http://schemas.microsoft.com/office/drawing/2014/main" id="{C8435345-F97B-896D-B7D1-ABF2B51C84F9}"/>
+              </a:ext>
+            </a:extLst>
+          </p:cNvPr>
+          <p:cNvPicPr>
+            <a:picLocks noChangeAspect="1" noChangeArrowheads="1"/>
+          </p:cNvPicPr>
+          <p:nvPr/>
+        </p:nvPicPr>
+        <p:blipFill>
+          <a:blip r:embed="rId3">
+            <a:extLst>
+              <a:ext uri="{28A0092B-C50C-407E-A947-70E740481C1C}">
+                <a14:useLocalDpi xmlns:a14="http://schemas.microsoft.com/office/drawing/2010/main" val="0"/>
+              </a:ext>
+            </a:extLst>
+          </a:blip>
+          <a:srcRect/>
+          <a:stretch>
+            <a:fillRect/>
+          </a:stretch>
+        </p:blipFill>
+        <p:spPr bwMode="auto">
+          <a:xfrm>
+            <a:off x="9032209" y="1178568"/>
+            <a:ext cx="2857500" cy="1647825"/>
+          </a:xfrm>
+          <a:prstGeom prst="rect">
+            <a:avLst/>
+          </a:prstGeom>
+          <a:noFill/>
+          <a:extLst>
+            <a:ext uri="{909E8E84-426E-40DD-AFC4-6F175D3DCCD1}">
+              <a14:hiddenFill xmlns:a14="http://schemas.microsoft.com/office/drawing/2010/main">
+                <a:solidFill>
+                  <a:srgbClr val="FFFFFF"/>
+                </a:solidFill>
+              </a14:hiddenFill>
+            </a:ext>
+          </a:extLst>
+        </p:spPr>
+      </p:pic>
+      <p:sp>
+        <p:nvSpPr>
+          <p:cNvPr id="2" name="TextBox 1">
+            <a:extLst>
+              <a:ext uri="{FF2B5EF4-FFF2-40B4-BE49-F238E27FC236}">
+                <a16:creationId xmlns:a16="http://schemas.microsoft.com/office/drawing/2014/main" id="{C29D28AF-352E-30D0-C1A2-0E75AC714F1E}"/>
+              </a:ext>
+            </a:extLst>
+          </p:cNvPr>
+          <p:cNvSpPr txBox="1"/>
+          <p:nvPr/>
+        </p:nvSpPr>
+        <p:spPr>
+          <a:xfrm>
+            <a:off x="208598" y="1178568"/>
+            <a:ext cx="8729919" cy="2180277"/>
+          </a:xfrm>
+          <a:prstGeom prst="rect">
+            <a:avLst/>
+          </a:prstGeom>
+          <a:noFill/>
+        </p:spPr>
+        <p:txBody>
+          <a:bodyPr wrap="square" rtlCol="0">
+            <a:spAutoFit/>
+          </a:bodyPr>
+          <a:lstStyle/>
+          <a:p>
+            <a:pPr>
+              <a:lnSpc>
+                <a:spcPct val="120000"/>
+              </a:lnSpc>
+            </a:pPr>
+            <a:r>
+              <a:rPr lang="en-US" sz="1600" b="1" i="0" dirty="0">
+                <a:solidFill>
+                  <a:srgbClr val="161616"/>
+                </a:solidFill>
+                <a:effectLst/>
+                <a:latin typeface="+mj-lt"/>
+              </a:rPr>
+              <a:t>Azure Blob Storage</a:t>
+            </a:r>
+            <a:endParaRPr lang="en-US" sz="1600" b="1" dirty="0">
+              <a:solidFill>
+                <a:srgbClr val="161616"/>
+              </a:solidFill>
+              <a:latin typeface="+mj-lt"/>
+            </a:endParaRPr>
+          </a:p>
+          <a:p>
+            <a:pPr marL="285750" indent="-285750">
+              <a:lnSpc>
+                <a:spcPct val="120000"/>
+              </a:lnSpc>
+              <a:buFontTx/>
+              <a:buChar char="-"/>
+            </a:pPr>
+            <a:r>
+              <a:rPr lang="en-US" sz="1400" i="0" dirty="0">
+                <a:solidFill>
+                  <a:srgbClr val="161616"/>
+                </a:solidFill>
+                <a:effectLst/>
+                <a:latin typeface="+mj-lt"/>
+              </a:rPr>
+              <a:t>Azure Blob Storage is a service that enables you to store massive amounts of unstructured data as binary large objects, or blobs, in the cloud. </a:t>
+            </a:r>
+          </a:p>
+          <a:p>
+            <a:pPr marL="285750" indent="-285750">
+              <a:lnSpc>
+                <a:spcPct val="120000"/>
+              </a:lnSpc>
+              <a:buFontTx/>
+              <a:buChar char="-"/>
+            </a:pPr>
+            <a:r>
+              <a:rPr lang="en-US" sz="1400" dirty="0">
+                <a:solidFill>
+                  <a:srgbClr val="161616"/>
+                </a:solidFill>
+                <a:latin typeface="+mj-lt"/>
+              </a:rPr>
+              <a:t>A</a:t>
+            </a:r>
+            <a:r>
+              <a:rPr lang="en-US" sz="1400" i="0" dirty="0">
+                <a:solidFill>
+                  <a:srgbClr val="161616"/>
+                </a:solidFill>
+                <a:effectLst/>
+                <a:latin typeface="+mj-lt"/>
+              </a:rPr>
+              <a:t>pplications can read and write them by using the Azure blob storage API.</a:t>
+            </a:r>
+          </a:p>
+          <a:p>
+            <a:pPr marL="285750" indent="-285750">
+              <a:lnSpc>
+                <a:spcPct val="120000"/>
+              </a:lnSpc>
+              <a:buFontTx/>
+              <a:buChar char="-"/>
+            </a:pPr>
+            <a:r>
+              <a:rPr lang="en-US" sz="1400" i="0" dirty="0">
+                <a:solidFill>
+                  <a:srgbClr val="161616"/>
+                </a:solidFill>
+                <a:effectLst/>
+                <a:latin typeface="+mj-lt"/>
+              </a:rPr>
+              <a:t>However, by default, these folders are simply a way of using a "/" character in a blob name to organize the blobs into namespaces. The folders are purely virtual, and you can't perform folder-level operations to control access or perform bulk operations.</a:t>
+            </a:r>
+          </a:p>
+          <a:p>
+            <a:pPr marL="285750" indent="-285750">
+              <a:lnSpc>
+                <a:spcPct val="120000"/>
+              </a:lnSpc>
+              <a:buFontTx/>
+              <a:buChar char="-"/>
+            </a:pPr>
+            <a:endParaRPr lang="en-US" sz="1400" i="0" dirty="0">
+              <a:solidFill>
+                <a:srgbClr val="161616"/>
+              </a:solidFill>
+              <a:effectLst/>
+              <a:latin typeface="+mj-lt"/>
+            </a:endParaRPr>
+          </a:p>
+        </p:txBody>
+      </p:sp>
+      <p:sp>
+        <p:nvSpPr>
+          <p:cNvPr id="3" name="TextBox 2">
+            <a:extLst>
+              <a:ext uri="{FF2B5EF4-FFF2-40B4-BE49-F238E27FC236}">
+                <a16:creationId xmlns:a16="http://schemas.microsoft.com/office/drawing/2014/main" id="{B6B52027-410E-A6D7-A586-917CD92C41FC}"/>
+              </a:ext>
+            </a:extLst>
+          </p:cNvPr>
+          <p:cNvSpPr txBox="1"/>
+          <p:nvPr/>
+        </p:nvSpPr>
+        <p:spPr>
+          <a:xfrm>
+            <a:off x="189202" y="3048997"/>
+            <a:ext cx="11774805" cy="3953070"/>
+          </a:xfrm>
+          <a:prstGeom prst="rect">
+            <a:avLst/>
+          </a:prstGeom>
+          <a:noFill/>
+        </p:spPr>
+        <p:txBody>
+          <a:bodyPr wrap="square" rtlCol="0">
+            <a:spAutoFit/>
+          </a:bodyPr>
+          <a:lstStyle/>
+          <a:p>
+            <a:pPr marL="285750" indent="-285750">
+              <a:lnSpc>
+                <a:spcPct val="120000"/>
+              </a:lnSpc>
+              <a:buFontTx/>
+              <a:buChar char="-"/>
+            </a:pPr>
+            <a:endParaRPr lang="en-US" sz="1400" dirty="0">
+              <a:solidFill>
+                <a:srgbClr val="161616"/>
+              </a:solidFill>
+              <a:latin typeface="+mj-lt"/>
+            </a:endParaRPr>
+          </a:p>
+          <a:p>
+            <a:pPr>
+              <a:lnSpc>
+                <a:spcPct val="120000"/>
+              </a:lnSpc>
+            </a:pPr>
+            <a:r>
+              <a:rPr lang="en-US" sz="1400" dirty="0">
+                <a:solidFill>
+                  <a:srgbClr val="161616"/>
+                </a:solidFill>
+                <a:latin typeface="+mj-lt"/>
+              </a:rPr>
+              <a:t>Azure Blob Storage supports three different types of blob:</a:t>
+            </a:r>
+          </a:p>
+          <a:p>
+            <a:pPr marL="285750" indent="-285750">
+              <a:lnSpc>
+                <a:spcPct val="120000"/>
+              </a:lnSpc>
+              <a:buFontTx/>
+              <a:buChar char="-"/>
+            </a:pPr>
+            <a:r>
+              <a:rPr lang="en-US" sz="1400" b="1" dirty="0">
+                <a:solidFill>
+                  <a:srgbClr val="161616"/>
+                </a:solidFill>
+                <a:latin typeface="+mj-lt"/>
+              </a:rPr>
+              <a:t>Block blobs</a:t>
+            </a:r>
+            <a:r>
+              <a:rPr lang="en-US" sz="1400" dirty="0">
+                <a:solidFill>
+                  <a:srgbClr val="161616"/>
+                </a:solidFill>
+                <a:latin typeface="+mj-lt"/>
+              </a:rPr>
+              <a:t>. A block blob can contain up to 50,000 blocks (each up to 100mb), giving a maximum size of over 4.7 TB. The block is the smallest amount of data that can be read or written as an individual unit. Block blobs are best used to store discrete, large, binary objects that change infrequently.</a:t>
+            </a:r>
+          </a:p>
+          <a:p>
+            <a:pPr marL="285750" indent="-285750">
+              <a:lnSpc>
+                <a:spcPct val="120000"/>
+              </a:lnSpc>
+              <a:buFontTx/>
+              <a:buChar char="-"/>
+            </a:pPr>
+            <a:r>
+              <a:rPr lang="en-US" sz="1400" b="1" dirty="0">
+                <a:solidFill>
+                  <a:srgbClr val="161616"/>
+                </a:solidFill>
+                <a:latin typeface="+mj-lt"/>
+              </a:rPr>
+              <a:t>Page blobs</a:t>
+            </a:r>
+            <a:r>
+              <a:rPr lang="en-US" sz="1400" dirty="0">
+                <a:solidFill>
+                  <a:srgbClr val="161616"/>
+                </a:solidFill>
+                <a:latin typeface="+mj-lt"/>
+              </a:rPr>
+              <a:t>. A page blob is organized as a collection of fixed size 512-byte pages. A page blob is optimized to support random read and write operations; you can fetch and store data for a single page if necessary. A page blob can hold up to 8 TB of data. Azure uses page blobs to implement virtual disk storage for virtual machines.</a:t>
+            </a:r>
+          </a:p>
+          <a:p>
+            <a:pPr marL="285750" indent="-285750">
+              <a:lnSpc>
+                <a:spcPct val="120000"/>
+              </a:lnSpc>
+              <a:buFontTx/>
+              <a:buChar char="-"/>
+            </a:pPr>
+            <a:r>
+              <a:rPr lang="en-US" sz="1400" b="1" dirty="0">
+                <a:solidFill>
+                  <a:srgbClr val="161616"/>
+                </a:solidFill>
+                <a:latin typeface="+mj-lt"/>
+              </a:rPr>
+              <a:t>Append blobs</a:t>
+            </a:r>
+            <a:r>
+              <a:rPr lang="en-US" sz="1400" dirty="0">
+                <a:solidFill>
+                  <a:srgbClr val="161616"/>
+                </a:solidFill>
+                <a:latin typeface="+mj-lt"/>
+              </a:rPr>
+              <a:t>. An append blob is a block blob optimized to support append operations. You can only add blocks to the end of an append blob; updating or deleting existing blocks isn't supported. Each block can vary in size, up to 4 MB. The maximum size of an append blob is just over 195 GB.</a:t>
+            </a:r>
+          </a:p>
+          <a:p>
+            <a:pPr marL="285750" indent="-285750">
+              <a:lnSpc>
+                <a:spcPct val="120000"/>
+              </a:lnSpc>
+              <a:buFontTx/>
+              <a:buChar char="-"/>
+            </a:pPr>
+            <a:endParaRPr lang="en-US" sz="1400" dirty="0">
+              <a:solidFill>
+                <a:srgbClr val="161616"/>
+              </a:solidFill>
+              <a:latin typeface="+mj-lt"/>
+            </a:endParaRPr>
+          </a:p>
+          <a:p>
+            <a:pPr marL="285750" indent="-285750">
+              <a:lnSpc>
+                <a:spcPct val="120000"/>
+              </a:lnSpc>
+              <a:buFontTx/>
+              <a:buChar char="-"/>
+            </a:pPr>
+            <a:r>
+              <a:rPr lang="en-US" sz="1400" i="0" dirty="0">
+                <a:solidFill>
+                  <a:srgbClr val="161616"/>
+                </a:solidFill>
+                <a:effectLst/>
+                <a:latin typeface="+mj-lt"/>
+              </a:rPr>
+              <a:t>The </a:t>
+            </a:r>
+            <a:r>
+              <a:rPr lang="en-US" sz="1400" b="1" i="0" dirty="0">
+                <a:solidFill>
+                  <a:srgbClr val="161616"/>
+                </a:solidFill>
+                <a:effectLst/>
+                <a:latin typeface="+mj-lt"/>
+              </a:rPr>
+              <a:t>Hot</a:t>
+            </a:r>
+            <a:r>
+              <a:rPr lang="en-US" sz="1400" i="0" dirty="0">
+                <a:solidFill>
+                  <a:srgbClr val="161616"/>
+                </a:solidFill>
+                <a:effectLst/>
+                <a:latin typeface="+mj-lt"/>
+              </a:rPr>
+              <a:t> tier is the default. You use this tier for blobs that are accessed frequently. </a:t>
+            </a:r>
+          </a:p>
+          <a:p>
+            <a:pPr marL="285750" indent="-285750">
+              <a:lnSpc>
+                <a:spcPct val="120000"/>
+              </a:lnSpc>
+              <a:buFontTx/>
+              <a:buChar char="-"/>
+            </a:pPr>
+            <a:r>
+              <a:rPr lang="en-US" sz="1400" i="0" dirty="0">
+                <a:solidFill>
+                  <a:srgbClr val="161616"/>
+                </a:solidFill>
+                <a:effectLst/>
+                <a:latin typeface="+mj-lt"/>
+              </a:rPr>
+              <a:t>The </a:t>
+            </a:r>
+            <a:r>
+              <a:rPr lang="en-US" sz="1400" b="1" i="0" dirty="0">
+                <a:solidFill>
+                  <a:srgbClr val="161616"/>
+                </a:solidFill>
+                <a:effectLst/>
+                <a:latin typeface="+mj-lt"/>
+              </a:rPr>
+              <a:t>Cool</a:t>
+            </a:r>
+            <a:r>
+              <a:rPr lang="en-US" sz="1400" i="0" dirty="0">
+                <a:solidFill>
+                  <a:srgbClr val="161616"/>
+                </a:solidFill>
+                <a:effectLst/>
+                <a:latin typeface="+mj-lt"/>
+              </a:rPr>
+              <a:t> tier has lower performance and incurs reduced storage charges compared to the Hot tier. Use the Cool tier for data that is accessed infrequently</a:t>
+            </a:r>
+          </a:p>
+          <a:p>
+            <a:pPr marL="285750" indent="-285750">
+              <a:lnSpc>
+                <a:spcPct val="120000"/>
+              </a:lnSpc>
+              <a:buFontTx/>
+              <a:buChar char="-"/>
+            </a:pPr>
+            <a:r>
+              <a:rPr lang="en-US" sz="1400" i="0" dirty="0">
+                <a:solidFill>
+                  <a:srgbClr val="161616"/>
+                </a:solidFill>
+                <a:effectLst/>
+                <a:latin typeface="+mj-lt"/>
+              </a:rPr>
+              <a:t>The </a:t>
+            </a:r>
+            <a:r>
+              <a:rPr lang="en-US" sz="1400" b="1" i="0" dirty="0">
+                <a:solidFill>
+                  <a:srgbClr val="161616"/>
+                </a:solidFill>
+                <a:effectLst/>
+                <a:latin typeface="+mj-lt"/>
+              </a:rPr>
+              <a:t>Archive</a:t>
+            </a:r>
+            <a:r>
+              <a:rPr lang="en-US" sz="1400" i="0" dirty="0">
+                <a:solidFill>
+                  <a:srgbClr val="161616"/>
+                </a:solidFill>
+                <a:effectLst/>
+                <a:latin typeface="+mj-lt"/>
+              </a:rPr>
+              <a:t> tier provides the lowest storage cost, but with increased latency. The Archive tier is intended for historical data that mustn't be lost, but is required only rarely. </a:t>
+            </a:r>
+          </a:p>
+          <a:p>
+            <a:pPr marL="285750" indent="-285750">
+              <a:lnSpc>
+                <a:spcPct val="120000"/>
+              </a:lnSpc>
+              <a:buFontTx/>
+              <a:buChar char="-"/>
+            </a:pPr>
+            <a:endParaRPr lang="en-US" sz="1400" i="0" dirty="0">
+              <a:solidFill>
+                <a:srgbClr val="161616"/>
+              </a:solidFill>
+              <a:effectLst/>
+              <a:latin typeface="+mj-lt"/>
+            </a:endParaRPr>
+          </a:p>
+        </p:txBody>
+      </p:sp>
+    </p:spTree>
+    <p:extLst>
+      <p:ext uri="{BB962C8B-B14F-4D97-AF65-F5344CB8AC3E}">
+        <p14:creationId xmlns:p14="http://schemas.microsoft.com/office/powerpoint/2010/main" val="2542658277"/>
+      </p:ext>
+    </p:extLst>
+  </p:cSld>
+  <p:clrMapOvr>
+    <a:masterClrMapping/>
+  </p:clrMapOvr>
+</p:sld>
+</file>
+
+<file path=ppt/slides/slide22.xml><?xml version="1.0" encoding="utf-8"?>
+<p:sld xmlns:a="http://schemas.openxmlformats.org/drawingml/2006/main" xmlns:r="http://schemas.openxmlformats.org/officeDocument/2006/relationships" xmlns:p="http://schemas.openxmlformats.org/presentationml/2006/main">
+  <p:cSld>
+    <p:spTree>
+      <p:nvGrpSpPr>
+        <p:cNvPr id="1" name=""/>
+        <p:cNvGrpSpPr/>
+        <p:nvPr/>
+      </p:nvGrpSpPr>
+      <p:grpSpPr>
+        <a:xfrm>
+          <a:off x="0" y="0"/>
+          <a:ext cx="0" cy="0"/>
+          <a:chOff x="0" y="0"/>
+          <a:chExt cx="0" cy="0"/>
+        </a:xfrm>
+      </p:grpSpPr>
+      <p:pic>
+        <p:nvPicPr>
+          <p:cNvPr id="7" name="Picture 2">
+            <a:extLst>
+              <a:ext uri="{FF2B5EF4-FFF2-40B4-BE49-F238E27FC236}">
+                <a16:creationId xmlns:a16="http://schemas.microsoft.com/office/drawing/2014/main" id="{656D77DE-6845-4DF0-A4E8-FCEE79C806B5}"/>
+              </a:ext>
+            </a:extLst>
+          </p:cNvPr>
+          <p:cNvPicPr>
+            <a:picLocks noChangeAspect="1" noChangeArrowheads="1"/>
+          </p:cNvPicPr>
+          <p:nvPr/>
+        </p:nvPicPr>
+        <p:blipFill>
+          <a:blip r:embed="rId2">
+            <a:extLst>
+              <a:ext uri="{28A0092B-C50C-407E-A947-70E740481C1C}">
+                <a14:useLocalDpi xmlns:a14="http://schemas.microsoft.com/office/drawing/2010/main" val="0"/>
+              </a:ext>
+            </a:extLst>
+          </a:blip>
+          <a:srcRect/>
+          <a:stretch>
+            <a:fillRect/>
+          </a:stretch>
+        </p:blipFill>
+        <p:spPr bwMode="auto">
+          <a:xfrm>
+            <a:off x="144770" y="111976"/>
+            <a:ext cx="725548" cy="725548"/>
+          </a:xfrm>
+          <a:prstGeom prst="rect">
+            <a:avLst/>
+          </a:prstGeom>
+          <a:noFill/>
+          <a:extLst>
+            <a:ext uri="{909E8E84-426E-40DD-AFC4-6F175D3DCCD1}">
+              <a14:hiddenFill xmlns:a14="http://schemas.microsoft.com/office/drawing/2010/main">
+                <a:solidFill>
+                  <a:srgbClr val="FFFFFF"/>
+                </a:solidFill>
+              </a14:hiddenFill>
+            </a:ext>
+          </a:extLst>
+        </p:spPr>
+      </p:pic>
+      <p:cxnSp>
+        <p:nvCxnSpPr>
+          <p:cNvPr id="5" name="Straight Connector 4">
+            <a:extLst>
+              <a:ext uri="{FF2B5EF4-FFF2-40B4-BE49-F238E27FC236}">
+                <a16:creationId xmlns:a16="http://schemas.microsoft.com/office/drawing/2014/main" id="{A8BE4EF8-406C-4035-940C-AB752B29BA18}"/>
+              </a:ext>
+            </a:extLst>
+          </p:cNvPr>
+          <p:cNvCxnSpPr/>
+          <p:nvPr/>
+        </p:nvCxnSpPr>
+        <p:spPr>
+          <a:xfrm>
+            <a:off x="99755" y="955963"/>
+            <a:ext cx="11953701" cy="0"/>
+          </a:xfrm>
+          <a:prstGeom prst="line">
+            <a:avLst/>
+          </a:prstGeom>
+          <a:ln w="19050">
+            <a:solidFill>
+              <a:srgbClr val="0072C6"/>
+            </a:solidFill>
+          </a:ln>
+        </p:spPr>
+        <p:style>
+          <a:lnRef idx="1">
+            <a:schemeClr val="accent1"/>
+          </a:lnRef>
+          <a:fillRef idx="0">
+            <a:schemeClr val="accent1"/>
+          </a:fillRef>
+          <a:effectRef idx="0">
+            <a:schemeClr val="accent1"/>
+          </a:effectRef>
+          <a:fontRef idx="minor">
+            <a:schemeClr val="tx1"/>
+          </a:fontRef>
+        </p:style>
+      </p:cxnSp>
+      <p:sp>
+        <p:nvSpPr>
+          <p:cNvPr id="6" name="TextBox 5">
+            <a:extLst>
+              <a:ext uri="{FF2B5EF4-FFF2-40B4-BE49-F238E27FC236}">
+                <a16:creationId xmlns:a16="http://schemas.microsoft.com/office/drawing/2014/main" id="{4A5E75BC-B6AC-4138-AB81-9DEC0096C5A8}"/>
+              </a:ext>
+            </a:extLst>
+          </p:cNvPr>
+          <p:cNvSpPr txBox="1"/>
+          <p:nvPr/>
+        </p:nvSpPr>
+        <p:spPr>
+          <a:xfrm>
+            <a:off x="914402" y="191193"/>
+            <a:ext cx="3483032" cy="646331"/>
+          </a:xfrm>
+          <a:prstGeom prst="rect">
+            <a:avLst/>
+          </a:prstGeom>
+          <a:noFill/>
+        </p:spPr>
+        <p:txBody>
+          <a:bodyPr wrap="square" rtlCol="0">
+            <a:spAutoFit/>
+          </a:bodyPr>
+          <a:lstStyle/>
+          <a:p>
+            <a:pPr marL="0" marR="0" lvl="0" indent="0" algn="l" defTabSz="914400" rtl="0" eaLnBrk="1" fontAlgn="auto" latinLnBrk="0" hangingPunct="1">
+              <a:lnSpc>
+                <a:spcPct val="100000"/>
+              </a:lnSpc>
+              <a:spcBef>
+                <a:spcPts val="0"/>
+              </a:spcBef>
+              <a:spcAft>
+                <a:spcPts val="0"/>
+              </a:spcAft>
+              <a:buClrTx/>
+              <a:buSzTx/>
+              <a:buFontTx/>
+              <a:buNone/>
+              <a:tabLst/>
+              <a:defRPr/>
+            </a:pPr>
+            <a:r>
+              <a:rPr lang="en-GB" dirty="0">
+                <a:solidFill>
+                  <a:prstClr val="black"/>
+                </a:solidFill>
+                <a:latin typeface="Calibri" panose="020F0502020204030204"/>
+              </a:rPr>
+              <a:t>DP</a:t>
+            </a:r>
+            <a:r>
+              <a:rPr kumimoji="0" lang="en-GB" sz="1800" b="0" i="0" u="none" strike="noStrike" kern="1200" cap="none" spc="0" normalizeH="0" baseline="0" noProof="0" dirty="0">
+                <a:ln>
+                  <a:noFill/>
+                </a:ln>
+                <a:solidFill>
+                  <a:prstClr val="black"/>
+                </a:solidFill>
+                <a:effectLst/>
+                <a:uLnTx/>
+                <a:uFillTx/>
+                <a:latin typeface="Calibri" panose="020F0502020204030204"/>
+                <a:ea typeface="+mn-ea"/>
+                <a:cs typeface="+mn-cs"/>
+              </a:rPr>
+              <a:t>-900 Microsoft Azure Fundamentals</a:t>
+            </a:r>
+          </a:p>
+        </p:txBody>
+      </p:sp>
+      <p:sp>
+        <p:nvSpPr>
+          <p:cNvPr id="8" name="TextBox 7">
+            <a:extLst>
+              <a:ext uri="{FF2B5EF4-FFF2-40B4-BE49-F238E27FC236}">
+                <a16:creationId xmlns:a16="http://schemas.microsoft.com/office/drawing/2014/main" id="{C61B684E-FDA7-4625-9CC3-79C17CC59ED7}"/>
+              </a:ext>
+            </a:extLst>
+          </p:cNvPr>
+          <p:cNvSpPr txBox="1"/>
+          <p:nvPr/>
+        </p:nvSpPr>
+        <p:spPr>
+          <a:xfrm>
+            <a:off x="320040" y="2479578"/>
+            <a:ext cx="11484864" cy="2062103"/>
+          </a:xfrm>
+          <a:prstGeom prst="rect">
+            <a:avLst/>
+          </a:prstGeom>
+          <a:noFill/>
+        </p:spPr>
+        <p:txBody>
+          <a:bodyPr wrap="square" rtlCol="0">
+            <a:spAutoFit/>
+          </a:bodyPr>
+          <a:lstStyle/>
+          <a:p>
+            <a:pPr marL="0" marR="0" lvl="0" indent="0" algn="ctr" defTabSz="914400" rtl="0" eaLnBrk="1" fontAlgn="auto" latinLnBrk="0" hangingPunct="1">
+              <a:lnSpc>
+                <a:spcPct val="100000"/>
+              </a:lnSpc>
+              <a:spcBef>
+                <a:spcPts val="0"/>
+              </a:spcBef>
+              <a:spcAft>
+                <a:spcPts val="0"/>
+              </a:spcAft>
+              <a:buClrTx/>
+              <a:buSzTx/>
+              <a:buFontTx/>
+              <a:buNone/>
+              <a:tabLst/>
+              <a:defRPr/>
+            </a:pPr>
+            <a:r>
+              <a:rPr kumimoji="0" lang="en-GB" sz="3200" i="0" u="none" strike="noStrike" kern="1200" cap="none" spc="0" normalizeH="0" baseline="0" noProof="0" dirty="0">
+                <a:ln>
+                  <a:noFill/>
+                </a:ln>
+                <a:solidFill>
+                  <a:prstClr val="black"/>
+                </a:solidFill>
+                <a:effectLst/>
+                <a:uLnTx/>
+                <a:uFillTx/>
+                <a:latin typeface="Calibri" panose="020F0502020204030204"/>
+                <a:ea typeface="+mn-ea"/>
+                <a:cs typeface="+mn-cs"/>
+              </a:rPr>
+              <a:t>Section </a:t>
+            </a:r>
+            <a:r>
+              <a:rPr lang="en-GB" sz="3200" dirty="0">
+                <a:solidFill>
+                  <a:prstClr val="black"/>
+                </a:solidFill>
+                <a:latin typeface="Calibri" panose="020F0502020204030204"/>
+              </a:rPr>
+              <a:t>4</a:t>
+            </a:r>
+            <a:endParaRPr kumimoji="0" lang="en-GB" sz="3200" i="0" u="none" strike="noStrike" kern="1200" cap="none" spc="0" normalizeH="0" baseline="0" noProof="0" dirty="0">
+              <a:ln>
+                <a:noFill/>
+              </a:ln>
+              <a:solidFill>
+                <a:prstClr val="black"/>
+              </a:solidFill>
+              <a:effectLst/>
+              <a:uLnTx/>
+              <a:uFillTx/>
+              <a:latin typeface="Calibri" panose="020F0502020204030204"/>
+              <a:ea typeface="+mn-ea"/>
+              <a:cs typeface="+mn-cs"/>
+            </a:endParaRPr>
+          </a:p>
+          <a:p>
+            <a:pPr marL="0" marR="0" lvl="0" indent="0" algn="ctr" defTabSz="914400" rtl="0" eaLnBrk="1" fontAlgn="auto" latinLnBrk="0" hangingPunct="1">
+              <a:lnSpc>
+                <a:spcPct val="100000"/>
+              </a:lnSpc>
+              <a:spcBef>
+                <a:spcPts val="0"/>
+              </a:spcBef>
+              <a:spcAft>
+                <a:spcPts val="0"/>
+              </a:spcAft>
+              <a:buClrTx/>
+              <a:buSzTx/>
+              <a:buFontTx/>
+              <a:buNone/>
+              <a:tabLst/>
+              <a:defRPr/>
+            </a:pPr>
+            <a:endParaRPr kumimoji="0" lang="en-GB" sz="3200" b="1" i="0" u="none" strike="noStrike" kern="1200" cap="none" spc="0" normalizeH="0" baseline="0" noProof="0" dirty="0">
+              <a:ln>
+                <a:noFill/>
+              </a:ln>
+              <a:solidFill>
+                <a:prstClr val="black"/>
+              </a:solidFill>
+              <a:effectLst/>
+              <a:uLnTx/>
+              <a:uFillTx/>
+              <a:latin typeface="Calibri" panose="020F0502020204030204"/>
+              <a:ea typeface="+mn-ea"/>
+              <a:cs typeface="+mn-cs"/>
+            </a:endParaRPr>
+          </a:p>
+          <a:p>
+            <a:pPr marL="0" marR="0" lvl="0" indent="0" algn="ctr" defTabSz="914400" rtl="0" eaLnBrk="1" fontAlgn="auto" latinLnBrk="0" hangingPunct="1">
+              <a:lnSpc>
+                <a:spcPct val="100000"/>
+              </a:lnSpc>
+              <a:spcBef>
+                <a:spcPts val="0"/>
+              </a:spcBef>
+              <a:spcAft>
+                <a:spcPts val="0"/>
+              </a:spcAft>
+              <a:buClrTx/>
+              <a:buSzTx/>
+              <a:buFontTx/>
+              <a:buNone/>
+              <a:tabLst/>
+              <a:defRPr/>
+            </a:pPr>
+            <a:r>
+              <a:rPr kumimoji="0" lang="en-GB" sz="3200" b="1" i="0" u="none" strike="noStrike" kern="1200" cap="none" spc="0" normalizeH="0" baseline="0" noProof="0" dirty="0">
+                <a:ln>
+                  <a:noFill/>
+                </a:ln>
+                <a:solidFill>
+                  <a:prstClr val="black"/>
+                </a:solidFill>
+                <a:effectLst/>
+                <a:uLnTx/>
+                <a:uFillTx/>
+                <a:latin typeface="Calibri" panose="020F0502020204030204"/>
+                <a:ea typeface="+mn-ea"/>
+                <a:cs typeface="+mn-cs"/>
+              </a:rPr>
+              <a:t>Microsoft Azure Data Fundamentals: Explore data analytics in Azure</a:t>
+            </a:r>
+          </a:p>
+        </p:txBody>
+      </p:sp>
+      <p:sp>
+        <p:nvSpPr>
+          <p:cNvPr id="3" name="TextBox 2">
+            <a:extLst>
+              <a:ext uri="{FF2B5EF4-FFF2-40B4-BE49-F238E27FC236}">
+                <a16:creationId xmlns:a16="http://schemas.microsoft.com/office/drawing/2014/main" id="{E9EC730B-063B-33B2-E17C-BAD74312F40B}"/>
+              </a:ext>
+            </a:extLst>
+          </p:cNvPr>
+          <p:cNvSpPr txBox="1"/>
+          <p:nvPr/>
+        </p:nvSpPr>
+        <p:spPr>
+          <a:xfrm>
+            <a:off x="238124" y="1074403"/>
+            <a:ext cx="11815331" cy="646331"/>
+          </a:xfrm>
+          <a:prstGeom prst="rect">
+            <a:avLst/>
+          </a:prstGeom>
+          <a:noFill/>
+        </p:spPr>
+        <p:txBody>
+          <a:bodyPr wrap="square">
+            <a:spAutoFit/>
+          </a:bodyPr>
+          <a:lstStyle/>
+          <a:p>
+            <a:r>
+              <a:rPr lang="en-GB" dirty="0">
+                <a:hlinkClick r:id="rId3"/>
+              </a:rPr>
+              <a:t>https://learn.microsoft.com/en-us/training/paths/azure-data-fundamentals-explore-data-warehouse-analytics/</a:t>
+            </a:r>
+            <a:endParaRPr lang="en-GB" dirty="0"/>
+          </a:p>
+          <a:p>
+            <a:endParaRPr lang="en-GB" dirty="0"/>
+          </a:p>
+        </p:txBody>
+      </p:sp>
+    </p:spTree>
+    <p:extLst>
+      <p:ext uri="{BB962C8B-B14F-4D97-AF65-F5344CB8AC3E}">
+        <p14:creationId xmlns:p14="http://schemas.microsoft.com/office/powerpoint/2010/main" val="55315787"/>
       </p:ext>
     </p:extLst>
   </p:cSld>

</xml_diff>

<commit_message>
Azure DP900 Section 3 Module 1
</commit_message>
<xml_diff>
--- a/Azure_DP-900_Fundamentals/MJH_DP-900_Azure_Fundamentals_Notes.pptx
+++ b/Azure_DP-900_Fundamentals/MJH_DP-900_Azure_Fundamentals_Notes.pptx
@@ -26,7 +26,10 @@
     <p:sldId id="277" r:id="rId20"/>
     <p:sldId id="260" r:id="rId21"/>
     <p:sldId id="278" r:id="rId22"/>
-    <p:sldId id="261" r:id="rId23"/>
+    <p:sldId id="279" r:id="rId23"/>
+    <p:sldId id="280" r:id="rId24"/>
+    <p:sldId id="281" r:id="rId25"/>
+    <p:sldId id="261" r:id="rId26"/>
   </p:sldIdLst>
   <p:sldSz cx="12192000" cy="6858000"/>
   <p:notesSz cx="6858000" cy="9144000"/>
@@ -282,7 +285,7 @@
           <a:p>
             <a:fld id="{655AA731-BE5F-44DA-AAEA-300254B29F16}" type="datetimeFigureOut">
               <a:rPr lang="en-GB" smtClean="0"/>
-              <a:t>15/03/2023</a:t>
+              <a:t>18/03/2023</a:t>
             </a:fld>
             <a:endParaRPr lang="en-GB"/>
           </a:p>
@@ -482,7 +485,7 @@
           <a:p>
             <a:fld id="{655AA731-BE5F-44DA-AAEA-300254B29F16}" type="datetimeFigureOut">
               <a:rPr lang="en-GB" smtClean="0"/>
-              <a:t>15/03/2023</a:t>
+              <a:t>18/03/2023</a:t>
             </a:fld>
             <a:endParaRPr lang="en-GB"/>
           </a:p>
@@ -692,7 +695,7 @@
           <a:p>
             <a:fld id="{655AA731-BE5F-44DA-AAEA-300254B29F16}" type="datetimeFigureOut">
               <a:rPr lang="en-GB" smtClean="0"/>
-              <a:t>15/03/2023</a:t>
+              <a:t>18/03/2023</a:t>
             </a:fld>
             <a:endParaRPr lang="en-GB"/>
           </a:p>
@@ -892,7 +895,7 @@
           <a:p>
             <a:fld id="{655AA731-BE5F-44DA-AAEA-300254B29F16}" type="datetimeFigureOut">
               <a:rPr lang="en-GB" smtClean="0"/>
-              <a:t>15/03/2023</a:t>
+              <a:t>18/03/2023</a:t>
             </a:fld>
             <a:endParaRPr lang="en-GB"/>
           </a:p>
@@ -1168,7 +1171,7 @@
           <a:p>
             <a:fld id="{655AA731-BE5F-44DA-AAEA-300254B29F16}" type="datetimeFigureOut">
               <a:rPr lang="en-GB" smtClean="0"/>
-              <a:t>15/03/2023</a:t>
+              <a:t>18/03/2023</a:t>
             </a:fld>
             <a:endParaRPr lang="en-GB"/>
           </a:p>
@@ -1436,7 +1439,7 @@
           <a:p>
             <a:fld id="{655AA731-BE5F-44DA-AAEA-300254B29F16}" type="datetimeFigureOut">
               <a:rPr lang="en-GB" smtClean="0"/>
-              <a:t>15/03/2023</a:t>
+              <a:t>18/03/2023</a:t>
             </a:fld>
             <a:endParaRPr lang="en-GB"/>
           </a:p>
@@ -1851,7 +1854,7 @@
           <a:p>
             <a:fld id="{655AA731-BE5F-44DA-AAEA-300254B29F16}" type="datetimeFigureOut">
               <a:rPr lang="en-GB" smtClean="0"/>
-              <a:t>15/03/2023</a:t>
+              <a:t>18/03/2023</a:t>
             </a:fld>
             <a:endParaRPr lang="en-GB"/>
           </a:p>
@@ -1993,7 +1996,7 @@
           <a:p>
             <a:fld id="{655AA731-BE5F-44DA-AAEA-300254B29F16}" type="datetimeFigureOut">
               <a:rPr lang="en-GB" smtClean="0"/>
-              <a:t>15/03/2023</a:t>
+              <a:t>18/03/2023</a:t>
             </a:fld>
             <a:endParaRPr lang="en-GB"/>
           </a:p>
@@ -2106,7 +2109,7 @@
           <a:p>
             <a:fld id="{655AA731-BE5F-44DA-AAEA-300254B29F16}" type="datetimeFigureOut">
               <a:rPr lang="en-GB" smtClean="0"/>
-              <a:t>15/03/2023</a:t>
+              <a:t>18/03/2023</a:t>
             </a:fld>
             <a:endParaRPr lang="en-GB"/>
           </a:p>
@@ -2419,7 +2422,7 @@
           <a:p>
             <a:fld id="{655AA731-BE5F-44DA-AAEA-300254B29F16}" type="datetimeFigureOut">
               <a:rPr lang="en-GB" smtClean="0"/>
-              <a:t>15/03/2023</a:t>
+              <a:t>18/03/2023</a:t>
             </a:fld>
             <a:endParaRPr lang="en-GB"/>
           </a:p>
@@ -2708,7 +2711,7 @@
           <a:p>
             <a:fld id="{655AA731-BE5F-44DA-AAEA-300254B29F16}" type="datetimeFigureOut">
               <a:rPr lang="en-GB" smtClean="0"/>
-              <a:t>15/03/2023</a:t>
+              <a:t>18/03/2023</a:t>
             </a:fld>
             <a:endParaRPr lang="en-GB"/>
           </a:p>
@@ -2951,7 +2954,7 @@
           <a:p>
             <a:fld id="{655AA731-BE5F-44DA-AAEA-300254B29F16}" type="datetimeFigureOut">
               <a:rPr lang="en-GB" smtClean="0"/>
-              <a:t>15/03/2023</a:t>
+              <a:t>18/03/2023</a:t>
             </a:fld>
             <a:endParaRPr lang="en-GB"/>
           </a:p>
@@ -12691,6 +12694,2106 @@
 </file>
 
 <file path=ppt/slides/slide22.xml><?xml version="1.0" encoding="utf-8"?>
+<p:sld xmlns:a="http://schemas.openxmlformats.org/drawingml/2006/main" xmlns:r="http://schemas.openxmlformats.org/officeDocument/2006/relationships" xmlns:p="http://schemas.openxmlformats.org/presentationml/2006/main">
+  <p:cSld>
+    <p:spTree>
+      <p:nvGrpSpPr>
+        <p:cNvPr id="1" name=""/>
+        <p:cNvGrpSpPr/>
+        <p:nvPr/>
+      </p:nvGrpSpPr>
+      <p:grpSpPr>
+        <a:xfrm>
+          <a:off x="0" y="0"/>
+          <a:ext cx="0" cy="0"/>
+          <a:chOff x="0" y="0"/>
+          <a:chExt cx="0" cy="0"/>
+        </a:xfrm>
+      </p:grpSpPr>
+      <p:grpSp>
+        <p:nvGrpSpPr>
+          <p:cNvPr id="18" name="Group 17">
+            <a:extLst>
+              <a:ext uri="{FF2B5EF4-FFF2-40B4-BE49-F238E27FC236}">
+                <a16:creationId xmlns:a16="http://schemas.microsoft.com/office/drawing/2014/main" id="{6185BE9B-87C8-4B46-9293-0E71CF17E76A}"/>
+              </a:ext>
+            </a:extLst>
+          </p:cNvPr>
+          <p:cNvGrpSpPr/>
+          <p:nvPr/>
+        </p:nvGrpSpPr>
+        <p:grpSpPr>
+          <a:xfrm>
+            <a:off x="99755" y="83129"/>
+            <a:ext cx="11953701" cy="872834"/>
+            <a:chOff x="99755" y="83129"/>
+            <a:chExt cx="11953701" cy="872834"/>
+          </a:xfrm>
+        </p:grpSpPr>
+        <p:cxnSp>
+          <p:nvCxnSpPr>
+            <p:cNvPr id="5" name="Straight Connector 4">
+              <a:extLst>
+                <a:ext uri="{FF2B5EF4-FFF2-40B4-BE49-F238E27FC236}">
+                  <a16:creationId xmlns:a16="http://schemas.microsoft.com/office/drawing/2014/main" id="{A8BE4EF8-406C-4035-940C-AB752B29BA18}"/>
+                </a:ext>
+              </a:extLst>
+            </p:cNvPr>
+            <p:cNvCxnSpPr/>
+            <p:nvPr/>
+          </p:nvCxnSpPr>
+          <p:spPr>
+            <a:xfrm>
+              <a:off x="99755" y="955963"/>
+              <a:ext cx="11953701" cy="0"/>
+            </a:xfrm>
+            <a:prstGeom prst="line">
+              <a:avLst/>
+            </a:prstGeom>
+            <a:ln w="19050">
+              <a:solidFill>
+                <a:srgbClr val="0072C6"/>
+              </a:solidFill>
+            </a:ln>
+          </p:spPr>
+          <p:style>
+            <a:lnRef idx="1">
+              <a:schemeClr val="accent1"/>
+            </a:lnRef>
+            <a:fillRef idx="0">
+              <a:schemeClr val="accent1"/>
+            </a:fillRef>
+            <a:effectRef idx="0">
+              <a:schemeClr val="accent1"/>
+            </a:effectRef>
+            <a:fontRef idx="minor">
+              <a:schemeClr val="tx1"/>
+            </a:fontRef>
+          </p:style>
+        </p:cxnSp>
+        <p:sp>
+          <p:nvSpPr>
+            <p:cNvPr id="8" name="TextBox 7">
+              <a:extLst>
+                <a:ext uri="{FF2B5EF4-FFF2-40B4-BE49-F238E27FC236}">
+                  <a16:creationId xmlns:a16="http://schemas.microsoft.com/office/drawing/2014/main" id="{C61B684E-FDA7-4625-9CC3-79C17CC59ED7}"/>
+                </a:ext>
+              </a:extLst>
+            </p:cNvPr>
+            <p:cNvSpPr txBox="1"/>
+            <p:nvPr/>
+          </p:nvSpPr>
+          <p:spPr>
+            <a:xfrm>
+              <a:off x="4372493" y="180818"/>
+              <a:ext cx="4989025" cy="646331"/>
+            </a:xfrm>
+            <a:prstGeom prst="rect">
+              <a:avLst/>
+            </a:prstGeom>
+            <a:noFill/>
+          </p:spPr>
+          <p:txBody>
+            <a:bodyPr wrap="square" rtlCol="0">
+              <a:spAutoFit/>
+            </a:bodyPr>
+            <a:lstStyle/>
+            <a:p>
+              <a:pPr marL="0" marR="0" lvl="0" indent="0" algn="l" defTabSz="914400" rtl="0" eaLnBrk="1" fontAlgn="auto" latinLnBrk="0" hangingPunct="1">
+                <a:lnSpc>
+                  <a:spcPct val="100000"/>
+                </a:lnSpc>
+                <a:spcBef>
+                  <a:spcPts val="0"/>
+                </a:spcBef>
+                <a:spcAft>
+                  <a:spcPts val="0"/>
+                </a:spcAft>
+                <a:buClrTx/>
+                <a:buSzTx/>
+                <a:buFontTx/>
+                <a:buNone/>
+                <a:tabLst/>
+                <a:defRPr/>
+              </a:pPr>
+              <a:r>
+                <a:rPr kumimoji="0" lang="en-GB" sz="1800" b="0" i="0" u="none" strike="noStrike" kern="1200" cap="none" spc="0" normalizeH="0" baseline="0" noProof="0" dirty="0">
+                  <a:ln>
+                    <a:noFill/>
+                  </a:ln>
+                  <a:solidFill>
+                    <a:prstClr val="black"/>
+                  </a:solidFill>
+                  <a:effectLst/>
+                  <a:uLnTx/>
+                  <a:uFillTx/>
+                  <a:latin typeface="Calibri" panose="020F0502020204030204"/>
+                  <a:ea typeface="+mn-ea"/>
+                  <a:cs typeface="+mn-cs"/>
+                </a:rPr>
+                <a:t>Microsoft Azure Data Fundamentals: Explore non-relational data in Azure</a:t>
+              </a:r>
+            </a:p>
+          </p:txBody>
+        </p:sp>
+        <p:sp>
+          <p:nvSpPr>
+            <p:cNvPr id="10" name="TextBox 9">
+              <a:extLst>
+                <a:ext uri="{FF2B5EF4-FFF2-40B4-BE49-F238E27FC236}">
+                  <a16:creationId xmlns:a16="http://schemas.microsoft.com/office/drawing/2014/main" id="{4E568F0D-7E90-4A0C-8070-6C806D992954}"/>
+                </a:ext>
+              </a:extLst>
+            </p:cNvPr>
+            <p:cNvSpPr txBox="1"/>
+            <p:nvPr/>
+          </p:nvSpPr>
+          <p:spPr>
+            <a:xfrm>
+              <a:off x="9534699" y="180818"/>
+              <a:ext cx="2155764" cy="369332"/>
+            </a:xfrm>
+            <a:prstGeom prst="rect">
+              <a:avLst/>
+            </a:prstGeom>
+            <a:noFill/>
+          </p:spPr>
+          <p:txBody>
+            <a:bodyPr wrap="square" rtlCol="0">
+              <a:spAutoFit/>
+            </a:bodyPr>
+            <a:lstStyle/>
+            <a:p>
+              <a:pPr marL="0" marR="0" lvl="0" indent="0" algn="l" defTabSz="914400" rtl="0" eaLnBrk="1" fontAlgn="auto" latinLnBrk="0" hangingPunct="1">
+                <a:lnSpc>
+                  <a:spcPct val="100000"/>
+                </a:lnSpc>
+                <a:spcBef>
+                  <a:spcPts val="0"/>
+                </a:spcBef>
+                <a:spcAft>
+                  <a:spcPts val="0"/>
+                </a:spcAft>
+                <a:buClrTx/>
+                <a:buSzTx/>
+                <a:buFontTx/>
+                <a:buNone/>
+                <a:tabLst/>
+                <a:defRPr/>
+              </a:pPr>
+              <a:r>
+                <a:rPr kumimoji="0" lang="en-GB" sz="1800" b="0" i="0" u="none" strike="noStrike" kern="1200" cap="none" spc="0" normalizeH="0" baseline="0" noProof="0" dirty="0">
+                  <a:ln>
+                    <a:noFill/>
+                  </a:ln>
+                  <a:solidFill>
+                    <a:prstClr val="black"/>
+                  </a:solidFill>
+                  <a:effectLst/>
+                  <a:uLnTx/>
+                  <a:uFillTx/>
+                  <a:latin typeface="Calibri" panose="020F0502020204030204"/>
+                  <a:ea typeface="+mn-ea"/>
+                  <a:cs typeface="+mn-cs"/>
+                </a:rPr>
+                <a:t>Date: 18/03/23 </a:t>
+              </a:r>
+            </a:p>
+          </p:txBody>
+        </p:sp>
+        <p:cxnSp>
+          <p:nvCxnSpPr>
+            <p:cNvPr id="11" name="Straight Connector 10">
+              <a:extLst>
+                <a:ext uri="{FF2B5EF4-FFF2-40B4-BE49-F238E27FC236}">
+                  <a16:creationId xmlns:a16="http://schemas.microsoft.com/office/drawing/2014/main" id="{F70ABCF3-BE60-426F-8C8C-059C854869C6}"/>
+                </a:ext>
+              </a:extLst>
+            </p:cNvPr>
+            <p:cNvCxnSpPr>
+              <a:cxnSpLocks/>
+            </p:cNvCxnSpPr>
+            <p:nvPr/>
+          </p:nvCxnSpPr>
+          <p:spPr>
+            <a:xfrm flipV="1">
+              <a:off x="4267202" y="93505"/>
+              <a:ext cx="1" cy="754394"/>
+            </a:xfrm>
+            <a:prstGeom prst="line">
+              <a:avLst/>
+            </a:prstGeom>
+            <a:ln w="19050">
+              <a:solidFill>
+                <a:srgbClr val="0072C6"/>
+              </a:solidFill>
+            </a:ln>
+          </p:spPr>
+          <p:style>
+            <a:lnRef idx="1">
+              <a:schemeClr val="accent1"/>
+            </a:lnRef>
+            <a:fillRef idx="0">
+              <a:schemeClr val="accent1"/>
+            </a:fillRef>
+            <a:effectRef idx="0">
+              <a:schemeClr val="accent1"/>
+            </a:effectRef>
+            <a:fontRef idx="minor">
+              <a:schemeClr val="tx1"/>
+            </a:fontRef>
+          </p:style>
+        </p:cxnSp>
+        <p:cxnSp>
+          <p:nvCxnSpPr>
+            <p:cNvPr id="16" name="Straight Connector 15">
+              <a:extLst>
+                <a:ext uri="{FF2B5EF4-FFF2-40B4-BE49-F238E27FC236}">
+                  <a16:creationId xmlns:a16="http://schemas.microsoft.com/office/drawing/2014/main" id="{90F03633-4CAB-4B57-BF94-CF91E87AB7AE}"/>
+                </a:ext>
+              </a:extLst>
+            </p:cNvPr>
+            <p:cNvCxnSpPr>
+              <a:cxnSpLocks/>
+            </p:cNvCxnSpPr>
+            <p:nvPr/>
+          </p:nvCxnSpPr>
+          <p:spPr>
+            <a:xfrm flipV="1">
+              <a:off x="9491750" y="83129"/>
+              <a:ext cx="1" cy="754394"/>
+            </a:xfrm>
+            <a:prstGeom prst="line">
+              <a:avLst/>
+            </a:prstGeom>
+            <a:ln w="19050">
+              <a:solidFill>
+                <a:srgbClr val="0072C6"/>
+              </a:solidFill>
+            </a:ln>
+          </p:spPr>
+          <p:style>
+            <a:lnRef idx="1">
+              <a:schemeClr val="accent1"/>
+            </a:lnRef>
+            <a:fillRef idx="0">
+              <a:schemeClr val="accent1"/>
+            </a:fillRef>
+            <a:effectRef idx="0">
+              <a:schemeClr val="accent1"/>
+            </a:effectRef>
+            <a:fontRef idx="minor">
+              <a:schemeClr val="tx1"/>
+            </a:fontRef>
+          </p:style>
+        </p:cxnSp>
+      </p:grpSp>
+      <p:pic>
+        <p:nvPicPr>
+          <p:cNvPr id="20" name="Picture 2">
+            <a:extLst>
+              <a:ext uri="{FF2B5EF4-FFF2-40B4-BE49-F238E27FC236}">
+                <a16:creationId xmlns:a16="http://schemas.microsoft.com/office/drawing/2014/main" id="{775211BE-DA3A-41DA-8578-4E52F07B6AB9}"/>
+              </a:ext>
+            </a:extLst>
+          </p:cNvPr>
+          <p:cNvPicPr>
+            <a:picLocks noChangeAspect="1" noChangeArrowheads="1"/>
+          </p:cNvPicPr>
+          <p:nvPr/>
+        </p:nvPicPr>
+        <p:blipFill>
+          <a:blip r:embed="rId2">
+            <a:extLst>
+              <a:ext uri="{28A0092B-C50C-407E-A947-70E740481C1C}">
+                <a14:useLocalDpi xmlns:a14="http://schemas.microsoft.com/office/drawing/2010/main" val="0"/>
+              </a:ext>
+            </a:extLst>
+          </a:blip>
+          <a:srcRect/>
+          <a:stretch>
+            <a:fillRect/>
+          </a:stretch>
+        </p:blipFill>
+        <p:spPr bwMode="auto">
+          <a:xfrm>
+            <a:off x="144770" y="111976"/>
+            <a:ext cx="725548" cy="725548"/>
+          </a:xfrm>
+          <a:prstGeom prst="rect">
+            <a:avLst/>
+          </a:prstGeom>
+          <a:noFill/>
+          <a:extLst>
+            <a:ext uri="{909E8E84-426E-40DD-AFC4-6F175D3DCCD1}">
+              <a14:hiddenFill xmlns:a14="http://schemas.microsoft.com/office/drawing/2010/main">
+                <a:solidFill>
+                  <a:srgbClr val="FFFFFF"/>
+                </a:solidFill>
+              </a14:hiddenFill>
+            </a:ext>
+          </a:extLst>
+        </p:spPr>
+      </p:pic>
+      <p:sp>
+        <p:nvSpPr>
+          <p:cNvPr id="21" name="TextBox 20">
+            <a:extLst>
+              <a:ext uri="{FF2B5EF4-FFF2-40B4-BE49-F238E27FC236}">
+                <a16:creationId xmlns:a16="http://schemas.microsoft.com/office/drawing/2014/main" id="{30404CBF-C3F9-43E0-81FA-E9D4D01BC004}"/>
+              </a:ext>
+            </a:extLst>
+          </p:cNvPr>
+          <p:cNvSpPr txBox="1"/>
+          <p:nvPr/>
+        </p:nvSpPr>
+        <p:spPr>
+          <a:xfrm>
+            <a:off x="914402" y="191193"/>
+            <a:ext cx="3483032" cy="646331"/>
+          </a:xfrm>
+          <a:prstGeom prst="rect">
+            <a:avLst/>
+          </a:prstGeom>
+          <a:noFill/>
+        </p:spPr>
+        <p:txBody>
+          <a:bodyPr wrap="square" rtlCol="0">
+            <a:spAutoFit/>
+          </a:bodyPr>
+          <a:lstStyle/>
+          <a:p>
+            <a:pPr marL="0" marR="0" lvl="0" indent="0" algn="l" defTabSz="914400" rtl="0" eaLnBrk="1" fontAlgn="auto" latinLnBrk="0" hangingPunct="1">
+              <a:lnSpc>
+                <a:spcPct val="100000"/>
+              </a:lnSpc>
+              <a:spcBef>
+                <a:spcPts val="0"/>
+              </a:spcBef>
+              <a:spcAft>
+                <a:spcPts val="0"/>
+              </a:spcAft>
+              <a:buClrTx/>
+              <a:buSzTx/>
+              <a:buFontTx/>
+              <a:buNone/>
+              <a:tabLst/>
+              <a:defRPr/>
+            </a:pPr>
+            <a:r>
+              <a:rPr lang="en-GB" dirty="0">
+                <a:solidFill>
+                  <a:prstClr val="black"/>
+                </a:solidFill>
+                <a:latin typeface="Calibri" panose="020F0502020204030204"/>
+              </a:rPr>
+              <a:t>DP</a:t>
+            </a:r>
+            <a:r>
+              <a:rPr kumimoji="0" lang="en-GB" sz="1800" b="0" i="0" u="none" strike="noStrike" kern="1200" cap="none" spc="0" normalizeH="0" baseline="0" noProof="0" dirty="0">
+                <a:ln>
+                  <a:noFill/>
+                </a:ln>
+                <a:solidFill>
+                  <a:prstClr val="black"/>
+                </a:solidFill>
+                <a:effectLst/>
+                <a:uLnTx/>
+                <a:uFillTx/>
+                <a:latin typeface="Calibri" panose="020F0502020204030204"/>
+                <a:ea typeface="+mn-ea"/>
+                <a:cs typeface="+mn-cs"/>
+              </a:rPr>
+              <a:t>-900 Microsoft Azure Fundamentals</a:t>
+            </a:r>
+          </a:p>
+        </p:txBody>
+      </p:sp>
+      <p:sp>
+        <p:nvSpPr>
+          <p:cNvPr id="2" name="TextBox 1">
+            <a:extLst>
+              <a:ext uri="{FF2B5EF4-FFF2-40B4-BE49-F238E27FC236}">
+                <a16:creationId xmlns:a16="http://schemas.microsoft.com/office/drawing/2014/main" id="{C29D28AF-352E-30D0-C1A2-0E75AC714F1E}"/>
+              </a:ext>
+            </a:extLst>
+          </p:cNvPr>
+          <p:cNvSpPr txBox="1"/>
+          <p:nvPr/>
+        </p:nvSpPr>
+        <p:spPr>
+          <a:xfrm>
+            <a:off x="208598" y="1178568"/>
+            <a:ext cx="8729919" cy="4802533"/>
+          </a:xfrm>
+          <a:prstGeom prst="rect">
+            <a:avLst/>
+          </a:prstGeom>
+          <a:noFill/>
+        </p:spPr>
+        <p:txBody>
+          <a:bodyPr wrap="square" rtlCol="0">
+            <a:spAutoFit/>
+          </a:bodyPr>
+          <a:lstStyle/>
+          <a:p>
+            <a:pPr>
+              <a:lnSpc>
+                <a:spcPct val="120000"/>
+              </a:lnSpc>
+            </a:pPr>
+            <a:r>
+              <a:rPr lang="en-US" sz="1600" b="1" i="0" dirty="0">
+                <a:solidFill>
+                  <a:srgbClr val="161616"/>
+                </a:solidFill>
+                <a:effectLst/>
+                <a:latin typeface="+mj-lt"/>
+              </a:rPr>
+              <a:t>Azure </a:t>
+            </a:r>
+            <a:r>
+              <a:rPr lang="en-US" sz="1600" b="1" dirty="0">
+                <a:solidFill>
+                  <a:srgbClr val="161616"/>
+                </a:solidFill>
+                <a:latin typeface="+mj-lt"/>
+              </a:rPr>
+              <a:t>Data Lake Gen 2</a:t>
+            </a:r>
+          </a:p>
+          <a:p>
+            <a:pPr>
+              <a:lnSpc>
+                <a:spcPct val="120000"/>
+              </a:lnSpc>
+            </a:pPr>
+            <a:endParaRPr lang="en-US" sz="1600" b="1" dirty="0">
+              <a:solidFill>
+                <a:srgbClr val="161616"/>
+              </a:solidFill>
+              <a:latin typeface="+mj-lt"/>
+            </a:endParaRPr>
+          </a:p>
+          <a:p>
+            <a:pPr marL="285750" indent="-285750">
+              <a:lnSpc>
+                <a:spcPct val="120000"/>
+              </a:lnSpc>
+              <a:buFontTx/>
+              <a:buChar char="-"/>
+            </a:pPr>
+            <a:r>
+              <a:rPr lang="en-US" sz="1400" i="0" dirty="0">
+                <a:solidFill>
+                  <a:srgbClr val="161616"/>
+                </a:solidFill>
+                <a:effectLst/>
+                <a:latin typeface="+mj-lt"/>
+              </a:rPr>
+              <a:t>Built on blob storage so it has the hot cold access tier advantage.</a:t>
+            </a:r>
+          </a:p>
+          <a:p>
+            <a:pPr marL="285750" indent="-285750">
+              <a:lnSpc>
+                <a:spcPct val="120000"/>
+              </a:lnSpc>
+              <a:buFontTx/>
+              <a:buChar char="-"/>
+            </a:pPr>
+            <a:endParaRPr lang="en-US" sz="1400" i="0" dirty="0">
+              <a:solidFill>
+                <a:srgbClr val="161616"/>
+              </a:solidFill>
+              <a:effectLst/>
+              <a:latin typeface="+mj-lt"/>
+            </a:endParaRPr>
+          </a:p>
+          <a:p>
+            <a:pPr marL="285750" indent="-285750">
+              <a:lnSpc>
+                <a:spcPct val="120000"/>
+              </a:lnSpc>
+              <a:buFontTx/>
+              <a:buChar char="-"/>
+            </a:pPr>
+            <a:r>
+              <a:rPr lang="en-US" sz="1400" dirty="0">
+                <a:solidFill>
+                  <a:srgbClr val="161616"/>
+                </a:solidFill>
+                <a:latin typeface="+mj-lt"/>
+              </a:rPr>
+              <a:t>It is spun up by creating a blob storage account and ticking ‘Enable Hierarchical Namespace (HNS)’. This means the folders are no longer virtual and can be used perform folder level operations. This means the location of the file is stored in metadata and so when we move a file for example, we simply change this metadata. In gen 1 there are no hierarchical namespace, the ‘folder’ is actually just in the name of the file. Therefore, if we want to ‘move’ the file what actually happens is a copy of the file is made with the new name and the old file is deleted.</a:t>
+            </a:r>
+          </a:p>
+          <a:p>
+            <a:pPr marL="285750" indent="-285750">
+              <a:lnSpc>
+                <a:spcPct val="120000"/>
+              </a:lnSpc>
+              <a:buFontTx/>
+              <a:buChar char="-"/>
+            </a:pPr>
+            <a:endParaRPr lang="en-US" sz="1400" dirty="0">
+              <a:solidFill>
+                <a:srgbClr val="161616"/>
+              </a:solidFill>
+              <a:latin typeface="+mj-lt"/>
+            </a:endParaRPr>
+          </a:p>
+          <a:p>
+            <a:pPr marL="285750" indent="-285750">
+              <a:lnSpc>
+                <a:spcPct val="120000"/>
+              </a:lnSpc>
+              <a:buFontTx/>
+              <a:buChar char="-"/>
+            </a:pPr>
+            <a:r>
+              <a:rPr lang="en-US" sz="1400" dirty="0">
+                <a:solidFill>
+                  <a:srgbClr val="161616"/>
+                </a:solidFill>
+                <a:latin typeface="+mj-lt"/>
+              </a:rPr>
+              <a:t>With this ‘true’ file structure we can also use ACL (access control list) to control on a folder level who can read write and execute, something we couldn’t do before in non-HNS storage. </a:t>
+            </a:r>
+          </a:p>
+          <a:p>
+            <a:pPr marL="285750" indent="-285750">
+              <a:lnSpc>
+                <a:spcPct val="120000"/>
+              </a:lnSpc>
+              <a:buFontTx/>
+              <a:buChar char="-"/>
+            </a:pPr>
+            <a:endParaRPr lang="en-US" sz="1400" dirty="0">
+              <a:solidFill>
+                <a:srgbClr val="161616"/>
+              </a:solidFill>
+              <a:latin typeface="+mj-lt"/>
+            </a:endParaRPr>
+          </a:p>
+          <a:p>
+            <a:pPr marL="285750" indent="-285750">
+              <a:lnSpc>
+                <a:spcPct val="120000"/>
+              </a:lnSpc>
+              <a:buFontTx/>
+              <a:buChar char="-"/>
+            </a:pPr>
+            <a:r>
+              <a:rPr lang="en-US" sz="1400" i="0" dirty="0">
+                <a:solidFill>
+                  <a:srgbClr val="161616"/>
+                </a:solidFill>
+                <a:effectLst/>
+                <a:latin typeface="+mj-lt"/>
+              </a:rPr>
+              <a:t>Systems like Hadoop in Azure HDInsight, Azure Databricks, and Azure Synapse Analytics can mount a distributed file system hosted in Azure Data Lake Store Gen2 and use it to process huge volumes of data.</a:t>
+            </a:r>
+          </a:p>
+          <a:p>
+            <a:pPr marL="285750" indent="-285750">
+              <a:lnSpc>
+                <a:spcPct val="120000"/>
+              </a:lnSpc>
+              <a:buFontTx/>
+              <a:buChar char="-"/>
+            </a:pPr>
+            <a:endParaRPr lang="en-US" sz="1400" i="0" dirty="0">
+              <a:solidFill>
+                <a:srgbClr val="161616"/>
+              </a:solidFill>
+              <a:effectLst/>
+              <a:latin typeface="+mj-lt"/>
+            </a:endParaRPr>
+          </a:p>
+          <a:p>
+            <a:pPr marL="285750" indent="-285750">
+              <a:lnSpc>
+                <a:spcPct val="120000"/>
+              </a:lnSpc>
+              <a:buFontTx/>
+              <a:buChar char="-"/>
+            </a:pPr>
+            <a:endParaRPr lang="en-US" sz="1400" dirty="0">
+              <a:solidFill>
+                <a:srgbClr val="161616"/>
+              </a:solidFill>
+              <a:latin typeface="+mj-lt"/>
+            </a:endParaRPr>
+          </a:p>
+          <a:p>
+            <a:pPr marL="285750" indent="-285750">
+              <a:lnSpc>
+                <a:spcPct val="120000"/>
+              </a:lnSpc>
+              <a:buFontTx/>
+              <a:buChar char="-"/>
+            </a:pPr>
+            <a:endParaRPr lang="en-US" sz="1400" i="0" dirty="0">
+              <a:solidFill>
+                <a:srgbClr val="161616"/>
+              </a:solidFill>
+              <a:effectLst/>
+              <a:latin typeface="+mj-lt"/>
+            </a:endParaRPr>
+          </a:p>
+        </p:txBody>
+      </p:sp>
+      <p:pic>
+        <p:nvPicPr>
+          <p:cNvPr id="6" name="Picture 5">
+            <a:extLst>
+              <a:ext uri="{FF2B5EF4-FFF2-40B4-BE49-F238E27FC236}">
+                <a16:creationId xmlns:a16="http://schemas.microsoft.com/office/drawing/2014/main" id="{5BC850CF-5600-E92F-A36D-E2B93BF35F05}"/>
+              </a:ext>
+            </a:extLst>
+          </p:cNvPr>
+          <p:cNvPicPr>
+            <a:picLocks noChangeAspect="1"/>
+          </p:cNvPicPr>
+          <p:nvPr/>
+        </p:nvPicPr>
+        <p:blipFill>
+          <a:blip r:embed="rId3"/>
+          <a:stretch>
+            <a:fillRect/>
+          </a:stretch>
+        </p:blipFill>
+        <p:spPr>
+          <a:xfrm>
+            <a:off x="9289598" y="1178568"/>
+            <a:ext cx="2519475" cy="2183545"/>
+          </a:xfrm>
+          <a:prstGeom prst="rect">
+            <a:avLst/>
+          </a:prstGeom>
+        </p:spPr>
+      </p:pic>
+    </p:spTree>
+    <p:extLst>
+      <p:ext uri="{BB962C8B-B14F-4D97-AF65-F5344CB8AC3E}">
+        <p14:creationId xmlns:p14="http://schemas.microsoft.com/office/powerpoint/2010/main" val="101447778"/>
+      </p:ext>
+    </p:extLst>
+  </p:cSld>
+  <p:clrMapOvr>
+    <a:masterClrMapping/>
+  </p:clrMapOvr>
+</p:sld>
+</file>
+
+<file path=ppt/slides/slide23.xml><?xml version="1.0" encoding="utf-8"?>
+<p:sld xmlns:a="http://schemas.openxmlformats.org/drawingml/2006/main" xmlns:r="http://schemas.openxmlformats.org/officeDocument/2006/relationships" xmlns:p="http://schemas.openxmlformats.org/presentationml/2006/main">
+  <p:cSld>
+    <p:spTree>
+      <p:nvGrpSpPr>
+        <p:cNvPr id="1" name=""/>
+        <p:cNvGrpSpPr/>
+        <p:nvPr/>
+      </p:nvGrpSpPr>
+      <p:grpSpPr>
+        <a:xfrm>
+          <a:off x="0" y="0"/>
+          <a:ext cx="0" cy="0"/>
+          <a:chOff x="0" y="0"/>
+          <a:chExt cx="0" cy="0"/>
+        </a:xfrm>
+      </p:grpSpPr>
+      <p:grpSp>
+        <p:nvGrpSpPr>
+          <p:cNvPr id="18" name="Group 17">
+            <a:extLst>
+              <a:ext uri="{FF2B5EF4-FFF2-40B4-BE49-F238E27FC236}">
+                <a16:creationId xmlns:a16="http://schemas.microsoft.com/office/drawing/2014/main" id="{6185BE9B-87C8-4B46-9293-0E71CF17E76A}"/>
+              </a:ext>
+            </a:extLst>
+          </p:cNvPr>
+          <p:cNvGrpSpPr/>
+          <p:nvPr/>
+        </p:nvGrpSpPr>
+        <p:grpSpPr>
+          <a:xfrm>
+            <a:off x="99755" y="83129"/>
+            <a:ext cx="11953701" cy="872834"/>
+            <a:chOff x="99755" y="83129"/>
+            <a:chExt cx="11953701" cy="872834"/>
+          </a:xfrm>
+        </p:grpSpPr>
+        <p:cxnSp>
+          <p:nvCxnSpPr>
+            <p:cNvPr id="5" name="Straight Connector 4">
+              <a:extLst>
+                <a:ext uri="{FF2B5EF4-FFF2-40B4-BE49-F238E27FC236}">
+                  <a16:creationId xmlns:a16="http://schemas.microsoft.com/office/drawing/2014/main" id="{A8BE4EF8-406C-4035-940C-AB752B29BA18}"/>
+                </a:ext>
+              </a:extLst>
+            </p:cNvPr>
+            <p:cNvCxnSpPr/>
+            <p:nvPr/>
+          </p:nvCxnSpPr>
+          <p:spPr>
+            <a:xfrm>
+              <a:off x="99755" y="955963"/>
+              <a:ext cx="11953701" cy="0"/>
+            </a:xfrm>
+            <a:prstGeom prst="line">
+              <a:avLst/>
+            </a:prstGeom>
+            <a:ln w="19050">
+              <a:solidFill>
+                <a:srgbClr val="0072C6"/>
+              </a:solidFill>
+            </a:ln>
+          </p:spPr>
+          <p:style>
+            <a:lnRef idx="1">
+              <a:schemeClr val="accent1"/>
+            </a:lnRef>
+            <a:fillRef idx="0">
+              <a:schemeClr val="accent1"/>
+            </a:fillRef>
+            <a:effectRef idx="0">
+              <a:schemeClr val="accent1"/>
+            </a:effectRef>
+            <a:fontRef idx="minor">
+              <a:schemeClr val="tx1"/>
+            </a:fontRef>
+          </p:style>
+        </p:cxnSp>
+        <p:sp>
+          <p:nvSpPr>
+            <p:cNvPr id="8" name="TextBox 7">
+              <a:extLst>
+                <a:ext uri="{FF2B5EF4-FFF2-40B4-BE49-F238E27FC236}">
+                  <a16:creationId xmlns:a16="http://schemas.microsoft.com/office/drawing/2014/main" id="{C61B684E-FDA7-4625-9CC3-79C17CC59ED7}"/>
+                </a:ext>
+              </a:extLst>
+            </p:cNvPr>
+            <p:cNvSpPr txBox="1"/>
+            <p:nvPr/>
+          </p:nvSpPr>
+          <p:spPr>
+            <a:xfrm>
+              <a:off x="4372493" y="180818"/>
+              <a:ext cx="4989025" cy="646331"/>
+            </a:xfrm>
+            <a:prstGeom prst="rect">
+              <a:avLst/>
+            </a:prstGeom>
+            <a:noFill/>
+          </p:spPr>
+          <p:txBody>
+            <a:bodyPr wrap="square" rtlCol="0">
+              <a:spAutoFit/>
+            </a:bodyPr>
+            <a:lstStyle/>
+            <a:p>
+              <a:pPr marL="0" marR="0" lvl="0" indent="0" algn="l" defTabSz="914400" rtl="0" eaLnBrk="1" fontAlgn="auto" latinLnBrk="0" hangingPunct="1">
+                <a:lnSpc>
+                  <a:spcPct val="100000"/>
+                </a:lnSpc>
+                <a:spcBef>
+                  <a:spcPts val="0"/>
+                </a:spcBef>
+                <a:spcAft>
+                  <a:spcPts val="0"/>
+                </a:spcAft>
+                <a:buClrTx/>
+                <a:buSzTx/>
+                <a:buFontTx/>
+                <a:buNone/>
+                <a:tabLst/>
+                <a:defRPr/>
+              </a:pPr>
+              <a:r>
+                <a:rPr kumimoji="0" lang="en-GB" sz="1800" b="0" i="0" u="none" strike="noStrike" kern="1200" cap="none" spc="0" normalizeH="0" baseline="0" noProof="0" dirty="0">
+                  <a:ln>
+                    <a:noFill/>
+                  </a:ln>
+                  <a:solidFill>
+                    <a:prstClr val="black"/>
+                  </a:solidFill>
+                  <a:effectLst/>
+                  <a:uLnTx/>
+                  <a:uFillTx/>
+                  <a:latin typeface="Calibri" panose="020F0502020204030204"/>
+                  <a:ea typeface="+mn-ea"/>
+                  <a:cs typeface="+mn-cs"/>
+                </a:rPr>
+                <a:t>Microsoft Azure Data Fundamentals: Explore non-relational data in Azure</a:t>
+              </a:r>
+            </a:p>
+          </p:txBody>
+        </p:sp>
+        <p:sp>
+          <p:nvSpPr>
+            <p:cNvPr id="10" name="TextBox 9">
+              <a:extLst>
+                <a:ext uri="{FF2B5EF4-FFF2-40B4-BE49-F238E27FC236}">
+                  <a16:creationId xmlns:a16="http://schemas.microsoft.com/office/drawing/2014/main" id="{4E568F0D-7E90-4A0C-8070-6C806D992954}"/>
+                </a:ext>
+              </a:extLst>
+            </p:cNvPr>
+            <p:cNvSpPr txBox="1"/>
+            <p:nvPr/>
+          </p:nvSpPr>
+          <p:spPr>
+            <a:xfrm>
+              <a:off x="9534699" y="180818"/>
+              <a:ext cx="2155764" cy="369332"/>
+            </a:xfrm>
+            <a:prstGeom prst="rect">
+              <a:avLst/>
+            </a:prstGeom>
+            <a:noFill/>
+          </p:spPr>
+          <p:txBody>
+            <a:bodyPr wrap="square" rtlCol="0">
+              <a:spAutoFit/>
+            </a:bodyPr>
+            <a:lstStyle/>
+            <a:p>
+              <a:pPr marL="0" marR="0" lvl="0" indent="0" algn="l" defTabSz="914400" rtl="0" eaLnBrk="1" fontAlgn="auto" latinLnBrk="0" hangingPunct="1">
+                <a:lnSpc>
+                  <a:spcPct val="100000"/>
+                </a:lnSpc>
+                <a:spcBef>
+                  <a:spcPts val="0"/>
+                </a:spcBef>
+                <a:spcAft>
+                  <a:spcPts val="0"/>
+                </a:spcAft>
+                <a:buClrTx/>
+                <a:buSzTx/>
+                <a:buFontTx/>
+                <a:buNone/>
+                <a:tabLst/>
+                <a:defRPr/>
+              </a:pPr>
+              <a:r>
+                <a:rPr kumimoji="0" lang="en-GB" sz="1800" b="0" i="0" u="none" strike="noStrike" kern="1200" cap="none" spc="0" normalizeH="0" baseline="0" noProof="0" dirty="0">
+                  <a:ln>
+                    <a:noFill/>
+                  </a:ln>
+                  <a:solidFill>
+                    <a:prstClr val="black"/>
+                  </a:solidFill>
+                  <a:effectLst/>
+                  <a:uLnTx/>
+                  <a:uFillTx/>
+                  <a:latin typeface="Calibri" panose="020F0502020204030204"/>
+                  <a:ea typeface="+mn-ea"/>
+                  <a:cs typeface="+mn-cs"/>
+                </a:rPr>
+                <a:t>Date: 18/03/23 </a:t>
+              </a:r>
+            </a:p>
+          </p:txBody>
+        </p:sp>
+        <p:cxnSp>
+          <p:nvCxnSpPr>
+            <p:cNvPr id="11" name="Straight Connector 10">
+              <a:extLst>
+                <a:ext uri="{FF2B5EF4-FFF2-40B4-BE49-F238E27FC236}">
+                  <a16:creationId xmlns:a16="http://schemas.microsoft.com/office/drawing/2014/main" id="{F70ABCF3-BE60-426F-8C8C-059C854869C6}"/>
+                </a:ext>
+              </a:extLst>
+            </p:cNvPr>
+            <p:cNvCxnSpPr>
+              <a:cxnSpLocks/>
+            </p:cNvCxnSpPr>
+            <p:nvPr/>
+          </p:nvCxnSpPr>
+          <p:spPr>
+            <a:xfrm flipV="1">
+              <a:off x="4267202" y="93505"/>
+              <a:ext cx="1" cy="754394"/>
+            </a:xfrm>
+            <a:prstGeom prst="line">
+              <a:avLst/>
+            </a:prstGeom>
+            <a:ln w="19050">
+              <a:solidFill>
+                <a:srgbClr val="0072C6"/>
+              </a:solidFill>
+            </a:ln>
+          </p:spPr>
+          <p:style>
+            <a:lnRef idx="1">
+              <a:schemeClr val="accent1"/>
+            </a:lnRef>
+            <a:fillRef idx="0">
+              <a:schemeClr val="accent1"/>
+            </a:fillRef>
+            <a:effectRef idx="0">
+              <a:schemeClr val="accent1"/>
+            </a:effectRef>
+            <a:fontRef idx="minor">
+              <a:schemeClr val="tx1"/>
+            </a:fontRef>
+          </p:style>
+        </p:cxnSp>
+        <p:cxnSp>
+          <p:nvCxnSpPr>
+            <p:cNvPr id="16" name="Straight Connector 15">
+              <a:extLst>
+                <a:ext uri="{FF2B5EF4-FFF2-40B4-BE49-F238E27FC236}">
+                  <a16:creationId xmlns:a16="http://schemas.microsoft.com/office/drawing/2014/main" id="{90F03633-4CAB-4B57-BF94-CF91E87AB7AE}"/>
+                </a:ext>
+              </a:extLst>
+            </p:cNvPr>
+            <p:cNvCxnSpPr>
+              <a:cxnSpLocks/>
+            </p:cNvCxnSpPr>
+            <p:nvPr/>
+          </p:nvCxnSpPr>
+          <p:spPr>
+            <a:xfrm flipV="1">
+              <a:off x="9491750" y="83129"/>
+              <a:ext cx="1" cy="754394"/>
+            </a:xfrm>
+            <a:prstGeom prst="line">
+              <a:avLst/>
+            </a:prstGeom>
+            <a:ln w="19050">
+              <a:solidFill>
+                <a:srgbClr val="0072C6"/>
+              </a:solidFill>
+            </a:ln>
+          </p:spPr>
+          <p:style>
+            <a:lnRef idx="1">
+              <a:schemeClr val="accent1"/>
+            </a:lnRef>
+            <a:fillRef idx="0">
+              <a:schemeClr val="accent1"/>
+            </a:fillRef>
+            <a:effectRef idx="0">
+              <a:schemeClr val="accent1"/>
+            </a:effectRef>
+            <a:fontRef idx="minor">
+              <a:schemeClr val="tx1"/>
+            </a:fontRef>
+          </p:style>
+        </p:cxnSp>
+      </p:grpSp>
+      <p:pic>
+        <p:nvPicPr>
+          <p:cNvPr id="20" name="Picture 2">
+            <a:extLst>
+              <a:ext uri="{FF2B5EF4-FFF2-40B4-BE49-F238E27FC236}">
+                <a16:creationId xmlns:a16="http://schemas.microsoft.com/office/drawing/2014/main" id="{775211BE-DA3A-41DA-8578-4E52F07B6AB9}"/>
+              </a:ext>
+            </a:extLst>
+          </p:cNvPr>
+          <p:cNvPicPr>
+            <a:picLocks noChangeAspect="1" noChangeArrowheads="1"/>
+          </p:cNvPicPr>
+          <p:nvPr/>
+        </p:nvPicPr>
+        <p:blipFill>
+          <a:blip r:embed="rId2">
+            <a:extLst>
+              <a:ext uri="{28A0092B-C50C-407E-A947-70E740481C1C}">
+                <a14:useLocalDpi xmlns:a14="http://schemas.microsoft.com/office/drawing/2010/main" val="0"/>
+              </a:ext>
+            </a:extLst>
+          </a:blip>
+          <a:srcRect/>
+          <a:stretch>
+            <a:fillRect/>
+          </a:stretch>
+        </p:blipFill>
+        <p:spPr bwMode="auto">
+          <a:xfrm>
+            <a:off x="144770" y="111976"/>
+            <a:ext cx="725548" cy="725548"/>
+          </a:xfrm>
+          <a:prstGeom prst="rect">
+            <a:avLst/>
+          </a:prstGeom>
+          <a:noFill/>
+          <a:extLst>
+            <a:ext uri="{909E8E84-426E-40DD-AFC4-6F175D3DCCD1}">
+              <a14:hiddenFill xmlns:a14="http://schemas.microsoft.com/office/drawing/2010/main">
+                <a:solidFill>
+                  <a:srgbClr val="FFFFFF"/>
+                </a:solidFill>
+              </a14:hiddenFill>
+            </a:ext>
+          </a:extLst>
+        </p:spPr>
+      </p:pic>
+      <p:sp>
+        <p:nvSpPr>
+          <p:cNvPr id="21" name="TextBox 20">
+            <a:extLst>
+              <a:ext uri="{FF2B5EF4-FFF2-40B4-BE49-F238E27FC236}">
+                <a16:creationId xmlns:a16="http://schemas.microsoft.com/office/drawing/2014/main" id="{30404CBF-C3F9-43E0-81FA-E9D4D01BC004}"/>
+              </a:ext>
+            </a:extLst>
+          </p:cNvPr>
+          <p:cNvSpPr txBox="1"/>
+          <p:nvPr/>
+        </p:nvSpPr>
+        <p:spPr>
+          <a:xfrm>
+            <a:off x="914402" y="191193"/>
+            <a:ext cx="3483032" cy="646331"/>
+          </a:xfrm>
+          <a:prstGeom prst="rect">
+            <a:avLst/>
+          </a:prstGeom>
+          <a:noFill/>
+        </p:spPr>
+        <p:txBody>
+          <a:bodyPr wrap="square" rtlCol="0">
+            <a:spAutoFit/>
+          </a:bodyPr>
+          <a:lstStyle/>
+          <a:p>
+            <a:pPr marL="0" marR="0" lvl="0" indent="0" algn="l" defTabSz="914400" rtl="0" eaLnBrk="1" fontAlgn="auto" latinLnBrk="0" hangingPunct="1">
+              <a:lnSpc>
+                <a:spcPct val="100000"/>
+              </a:lnSpc>
+              <a:spcBef>
+                <a:spcPts val="0"/>
+              </a:spcBef>
+              <a:spcAft>
+                <a:spcPts val="0"/>
+              </a:spcAft>
+              <a:buClrTx/>
+              <a:buSzTx/>
+              <a:buFontTx/>
+              <a:buNone/>
+              <a:tabLst/>
+              <a:defRPr/>
+            </a:pPr>
+            <a:r>
+              <a:rPr lang="en-GB" dirty="0">
+                <a:solidFill>
+                  <a:prstClr val="black"/>
+                </a:solidFill>
+                <a:latin typeface="Calibri" panose="020F0502020204030204"/>
+              </a:rPr>
+              <a:t>DP</a:t>
+            </a:r>
+            <a:r>
+              <a:rPr kumimoji="0" lang="en-GB" sz="1800" b="0" i="0" u="none" strike="noStrike" kern="1200" cap="none" spc="0" normalizeH="0" baseline="0" noProof="0" dirty="0">
+                <a:ln>
+                  <a:noFill/>
+                </a:ln>
+                <a:solidFill>
+                  <a:prstClr val="black"/>
+                </a:solidFill>
+                <a:effectLst/>
+                <a:uLnTx/>
+                <a:uFillTx/>
+                <a:latin typeface="Calibri" panose="020F0502020204030204"/>
+                <a:ea typeface="+mn-ea"/>
+                <a:cs typeface="+mn-cs"/>
+              </a:rPr>
+              <a:t>-900 Microsoft Azure Fundamentals</a:t>
+            </a:r>
+          </a:p>
+        </p:txBody>
+      </p:sp>
+      <p:sp>
+        <p:nvSpPr>
+          <p:cNvPr id="2" name="TextBox 1">
+            <a:extLst>
+              <a:ext uri="{FF2B5EF4-FFF2-40B4-BE49-F238E27FC236}">
+                <a16:creationId xmlns:a16="http://schemas.microsoft.com/office/drawing/2014/main" id="{C29D28AF-352E-30D0-C1A2-0E75AC714F1E}"/>
+              </a:ext>
+            </a:extLst>
+          </p:cNvPr>
+          <p:cNvSpPr txBox="1"/>
+          <p:nvPr/>
+        </p:nvSpPr>
+        <p:spPr>
+          <a:xfrm>
+            <a:off x="208598" y="1178568"/>
+            <a:ext cx="8729919" cy="5061065"/>
+          </a:xfrm>
+          <a:prstGeom prst="rect">
+            <a:avLst/>
+          </a:prstGeom>
+          <a:noFill/>
+        </p:spPr>
+        <p:txBody>
+          <a:bodyPr wrap="square" rtlCol="0">
+            <a:spAutoFit/>
+          </a:bodyPr>
+          <a:lstStyle/>
+          <a:p>
+            <a:pPr>
+              <a:lnSpc>
+                <a:spcPct val="120000"/>
+              </a:lnSpc>
+            </a:pPr>
+            <a:r>
+              <a:rPr lang="en-US" sz="1600" b="1" i="0" dirty="0">
+                <a:solidFill>
+                  <a:srgbClr val="161616"/>
+                </a:solidFill>
+                <a:effectLst/>
+                <a:latin typeface="+mj-lt"/>
+              </a:rPr>
+              <a:t>Azure </a:t>
+            </a:r>
+            <a:r>
+              <a:rPr lang="en-US" sz="1600" b="1" dirty="0">
+                <a:solidFill>
+                  <a:srgbClr val="161616"/>
+                </a:solidFill>
+                <a:latin typeface="+mj-lt"/>
+              </a:rPr>
+              <a:t>File Share</a:t>
+            </a:r>
+          </a:p>
+          <a:p>
+            <a:pPr>
+              <a:lnSpc>
+                <a:spcPct val="120000"/>
+              </a:lnSpc>
+            </a:pPr>
+            <a:endParaRPr lang="en-US" sz="1600" b="1" dirty="0">
+              <a:solidFill>
+                <a:srgbClr val="161616"/>
+              </a:solidFill>
+              <a:latin typeface="+mj-lt"/>
+            </a:endParaRPr>
+          </a:p>
+          <a:p>
+            <a:pPr marL="285750" indent="-285750">
+              <a:lnSpc>
+                <a:spcPct val="120000"/>
+              </a:lnSpc>
+              <a:buFontTx/>
+              <a:buChar char="-"/>
+            </a:pPr>
+            <a:r>
+              <a:rPr lang="en-US" sz="1400" i="0" dirty="0">
+                <a:solidFill>
+                  <a:srgbClr val="161616"/>
+                </a:solidFill>
+                <a:effectLst/>
+                <a:latin typeface="+mj-lt"/>
+              </a:rPr>
+              <a:t>Many on-premises systems comprising a network of in-house computers make use of file shares. A file share enables you to store a file on one computer, and grant access to that file to users and applications running on other computers. </a:t>
+            </a:r>
+            <a:endParaRPr lang="en-US" sz="1400" dirty="0">
+              <a:solidFill>
+                <a:srgbClr val="161616"/>
+              </a:solidFill>
+              <a:latin typeface="+mj-lt"/>
+            </a:endParaRPr>
+          </a:p>
+          <a:p>
+            <a:pPr marL="285750" indent="-285750">
+              <a:lnSpc>
+                <a:spcPct val="120000"/>
+              </a:lnSpc>
+              <a:buFontTx/>
+              <a:buChar char="-"/>
+            </a:pPr>
+            <a:endParaRPr lang="en-US" sz="1400" i="0" dirty="0">
+              <a:solidFill>
+                <a:srgbClr val="161616"/>
+              </a:solidFill>
+              <a:effectLst/>
+              <a:latin typeface="+mj-lt"/>
+            </a:endParaRPr>
+          </a:p>
+          <a:p>
+            <a:pPr marL="285750" indent="-285750">
+              <a:lnSpc>
+                <a:spcPct val="120000"/>
+              </a:lnSpc>
+              <a:buFontTx/>
+              <a:buChar char="-"/>
+            </a:pPr>
+            <a:r>
+              <a:rPr lang="en-US" sz="1400" dirty="0">
+                <a:solidFill>
+                  <a:srgbClr val="161616"/>
+                </a:solidFill>
+                <a:latin typeface="+mj-lt"/>
+              </a:rPr>
+              <a:t>Azure Files is essentially a way to create cloud-based network shares, such as you typically find in on-premises organizations to make documents and other files available to multiple users.</a:t>
+            </a:r>
+          </a:p>
+          <a:p>
+            <a:pPr marL="285750" indent="-285750">
+              <a:lnSpc>
+                <a:spcPct val="120000"/>
+              </a:lnSpc>
+              <a:buFontTx/>
+              <a:buChar char="-"/>
+            </a:pPr>
+            <a:endParaRPr lang="en-US" sz="1400" i="0" dirty="0">
+              <a:solidFill>
+                <a:srgbClr val="161616"/>
+              </a:solidFill>
+              <a:effectLst/>
+              <a:latin typeface="+mj-lt"/>
+            </a:endParaRPr>
+          </a:p>
+          <a:p>
+            <a:pPr marL="285750" indent="-285750">
+              <a:lnSpc>
+                <a:spcPct val="120000"/>
+              </a:lnSpc>
+              <a:buFontTx/>
+              <a:buChar char="-"/>
+            </a:pPr>
+            <a:r>
+              <a:rPr lang="en-US" sz="1400" i="0" dirty="0">
+                <a:solidFill>
+                  <a:srgbClr val="161616"/>
+                </a:solidFill>
+                <a:effectLst/>
+                <a:latin typeface="+mj-lt"/>
+              </a:rPr>
+              <a:t>Azure File Storage offers two performance tiers. The Standard tier uses hard disk-based hardware in a datacenter, and the Premium tier uses solid-state disks. </a:t>
+            </a:r>
+          </a:p>
+          <a:p>
+            <a:pPr marL="285750" indent="-285750">
+              <a:lnSpc>
+                <a:spcPct val="120000"/>
+              </a:lnSpc>
+              <a:buFontTx/>
+              <a:buChar char="-"/>
+            </a:pPr>
+            <a:endParaRPr lang="en-US" sz="1400" dirty="0">
+              <a:solidFill>
+                <a:srgbClr val="161616"/>
+              </a:solidFill>
+              <a:latin typeface="+mj-lt"/>
+            </a:endParaRPr>
+          </a:p>
+          <a:p>
+            <a:pPr marL="285750" indent="-285750">
+              <a:lnSpc>
+                <a:spcPct val="120000"/>
+              </a:lnSpc>
+              <a:buFontTx/>
+              <a:buChar char="-"/>
+            </a:pPr>
+            <a:r>
+              <a:rPr lang="en-US" sz="1400" i="0" dirty="0">
+                <a:solidFill>
+                  <a:srgbClr val="161616"/>
+                </a:solidFill>
+                <a:effectLst/>
+                <a:latin typeface="+mj-lt"/>
+              </a:rPr>
+              <a:t>Azure Files supports two common network file sharing protocols:</a:t>
+            </a:r>
+          </a:p>
+          <a:p>
+            <a:pPr marL="742950" lvl="1" indent="-285750">
+              <a:lnSpc>
+                <a:spcPct val="120000"/>
+              </a:lnSpc>
+              <a:buFont typeface="Arial" panose="020B0604020202020204" pitchFamily="34" charset="0"/>
+              <a:buChar char="•"/>
+            </a:pPr>
+            <a:r>
+              <a:rPr lang="en-US" sz="1400" i="0" dirty="0">
+                <a:solidFill>
+                  <a:srgbClr val="161616"/>
+                </a:solidFill>
+                <a:effectLst/>
+                <a:latin typeface="+mj-lt"/>
+              </a:rPr>
+              <a:t>Server Message Block (</a:t>
+            </a:r>
+            <a:r>
+              <a:rPr lang="en-US" sz="1400" b="1" i="0" dirty="0">
+                <a:solidFill>
+                  <a:srgbClr val="161616"/>
+                </a:solidFill>
+                <a:effectLst/>
+                <a:latin typeface="+mj-lt"/>
+              </a:rPr>
+              <a:t>SMB</a:t>
+            </a:r>
+            <a:r>
+              <a:rPr lang="en-US" sz="1400" i="0" dirty="0">
+                <a:solidFill>
+                  <a:srgbClr val="161616"/>
+                </a:solidFill>
+                <a:effectLst/>
+                <a:latin typeface="+mj-lt"/>
+              </a:rPr>
+              <a:t>) file sharing is commonly used across multiple operating systems (Windows, Linux, macOS).</a:t>
+            </a:r>
+          </a:p>
+          <a:p>
+            <a:pPr marL="742950" lvl="1" indent="-285750">
+              <a:lnSpc>
+                <a:spcPct val="120000"/>
+              </a:lnSpc>
+              <a:buFont typeface="Arial" panose="020B0604020202020204" pitchFamily="34" charset="0"/>
+              <a:buChar char="•"/>
+            </a:pPr>
+            <a:r>
+              <a:rPr lang="en-US" sz="1400" i="0" dirty="0">
+                <a:solidFill>
+                  <a:srgbClr val="161616"/>
+                </a:solidFill>
+                <a:effectLst/>
+                <a:latin typeface="+mj-lt"/>
+              </a:rPr>
+              <a:t>Network File System (</a:t>
+            </a:r>
+            <a:r>
+              <a:rPr lang="en-US" sz="1400" b="1" i="0" dirty="0">
+                <a:solidFill>
+                  <a:srgbClr val="161616"/>
+                </a:solidFill>
+                <a:effectLst/>
+                <a:latin typeface="+mj-lt"/>
+              </a:rPr>
+              <a:t>NFS</a:t>
+            </a:r>
+            <a:r>
+              <a:rPr lang="en-US" sz="1400" i="0" dirty="0">
+                <a:solidFill>
+                  <a:srgbClr val="161616"/>
+                </a:solidFill>
+                <a:effectLst/>
+                <a:latin typeface="+mj-lt"/>
+              </a:rPr>
+              <a:t>) shares are used by some Linux and macOS versions. To create an NFS share, you must use a premium tier storage account and create and configure a virtual network through which access to the share can be controlled.</a:t>
+            </a:r>
+          </a:p>
+          <a:p>
+            <a:pPr marL="285750" indent="-285750">
+              <a:lnSpc>
+                <a:spcPct val="120000"/>
+              </a:lnSpc>
+              <a:buFontTx/>
+              <a:buChar char="-"/>
+            </a:pPr>
+            <a:endParaRPr lang="en-US" sz="1400" i="0" dirty="0">
+              <a:solidFill>
+                <a:srgbClr val="161616"/>
+              </a:solidFill>
+              <a:effectLst/>
+              <a:latin typeface="+mj-lt"/>
+            </a:endParaRPr>
+          </a:p>
+        </p:txBody>
+      </p:sp>
+      <p:pic>
+        <p:nvPicPr>
+          <p:cNvPr id="2050" name="Picture 2" descr="An Azure storage account with an Azure Files share">
+            <a:extLst>
+              <a:ext uri="{FF2B5EF4-FFF2-40B4-BE49-F238E27FC236}">
+                <a16:creationId xmlns:a16="http://schemas.microsoft.com/office/drawing/2014/main" id="{BA6E11C0-03FC-0659-918F-3E327269BF2B}"/>
+              </a:ext>
+            </a:extLst>
+          </p:cNvPr>
+          <p:cNvPicPr>
+            <a:picLocks noChangeAspect="1" noChangeArrowheads="1"/>
+          </p:cNvPicPr>
+          <p:nvPr/>
+        </p:nvPicPr>
+        <p:blipFill>
+          <a:blip r:embed="rId3">
+            <a:extLst>
+              <a:ext uri="{28A0092B-C50C-407E-A947-70E740481C1C}">
+                <a14:useLocalDpi xmlns:a14="http://schemas.microsoft.com/office/drawing/2010/main" val="0"/>
+              </a:ext>
+            </a:extLst>
+          </a:blip>
+          <a:srcRect/>
+          <a:stretch>
+            <a:fillRect/>
+          </a:stretch>
+        </p:blipFill>
+        <p:spPr bwMode="auto">
+          <a:xfrm>
+            <a:off x="9278947" y="1361777"/>
+            <a:ext cx="2667267" cy="2773958"/>
+          </a:xfrm>
+          <a:prstGeom prst="rect">
+            <a:avLst/>
+          </a:prstGeom>
+          <a:noFill/>
+          <a:extLst>
+            <a:ext uri="{909E8E84-426E-40DD-AFC4-6F175D3DCCD1}">
+              <a14:hiddenFill xmlns:a14="http://schemas.microsoft.com/office/drawing/2010/main">
+                <a:solidFill>
+                  <a:srgbClr val="FFFFFF"/>
+                </a:solidFill>
+              </a14:hiddenFill>
+            </a:ext>
+          </a:extLst>
+        </p:spPr>
+      </p:pic>
+    </p:spTree>
+    <p:extLst>
+      <p:ext uri="{BB962C8B-B14F-4D97-AF65-F5344CB8AC3E}">
+        <p14:creationId xmlns:p14="http://schemas.microsoft.com/office/powerpoint/2010/main" val="236645560"/>
+      </p:ext>
+    </p:extLst>
+  </p:cSld>
+  <p:clrMapOvr>
+    <a:masterClrMapping/>
+  </p:clrMapOvr>
+</p:sld>
+</file>
+
+<file path=ppt/slides/slide24.xml><?xml version="1.0" encoding="utf-8"?>
+<p:sld xmlns:a="http://schemas.openxmlformats.org/drawingml/2006/main" xmlns:r="http://schemas.openxmlformats.org/officeDocument/2006/relationships" xmlns:p="http://schemas.openxmlformats.org/presentationml/2006/main">
+  <p:cSld>
+    <p:spTree>
+      <p:nvGrpSpPr>
+        <p:cNvPr id="1" name=""/>
+        <p:cNvGrpSpPr/>
+        <p:nvPr/>
+      </p:nvGrpSpPr>
+      <p:grpSpPr>
+        <a:xfrm>
+          <a:off x="0" y="0"/>
+          <a:ext cx="0" cy="0"/>
+          <a:chOff x="0" y="0"/>
+          <a:chExt cx="0" cy="0"/>
+        </a:xfrm>
+      </p:grpSpPr>
+      <p:grpSp>
+        <p:nvGrpSpPr>
+          <p:cNvPr id="18" name="Group 17">
+            <a:extLst>
+              <a:ext uri="{FF2B5EF4-FFF2-40B4-BE49-F238E27FC236}">
+                <a16:creationId xmlns:a16="http://schemas.microsoft.com/office/drawing/2014/main" id="{6185BE9B-87C8-4B46-9293-0E71CF17E76A}"/>
+              </a:ext>
+            </a:extLst>
+          </p:cNvPr>
+          <p:cNvGrpSpPr/>
+          <p:nvPr/>
+        </p:nvGrpSpPr>
+        <p:grpSpPr>
+          <a:xfrm>
+            <a:off x="99755" y="83129"/>
+            <a:ext cx="11953701" cy="872834"/>
+            <a:chOff x="99755" y="83129"/>
+            <a:chExt cx="11953701" cy="872834"/>
+          </a:xfrm>
+        </p:grpSpPr>
+        <p:cxnSp>
+          <p:nvCxnSpPr>
+            <p:cNvPr id="5" name="Straight Connector 4">
+              <a:extLst>
+                <a:ext uri="{FF2B5EF4-FFF2-40B4-BE49-F238E27FC236}">
+                  <a16:creationId xmlns:a16="http://schemas.microsoft.com/office/drawing/2014/main" id="{A8BE4EF8-406C-4035-940C-AB752B29BA18}"/>
+                </a:ext>
+              </a:extLst>
+            </p:cNvPr>
+            <p:cNvCxnSpPr/>
+            <p:nvPr/>
+          </p:nvCxnSpPr>
+          <p:spPr>
+            <a:xfrm>
+              <a:off x="99755" y="955963"/>
+              <a:ext cx="11953701" cy="0"/>
+            </a:xfrm>
+            <a:prstGeom prst="line">
+              <a:avLst/>
+            </a:prstGeom>
+            <a:ln w="19050">
+              <a:solidFill>
+                <a:srgbClr val="0072C6"/>
+              </a:solidFill>
+            </a:ln>
+          </p:spPr>
+          <p:style>
+            <a:lnRef idx="1">
+              <a:schemeClr val="accent1"/>
+            </a:lnRef>
+            <a:fillRef idx="0">
+              <a:schemeClr val="accent1"/>
+            </a:fillRef>
+            <a:effectRef idx="0">
+              <a:schemeClr val="accent1"/>
+            </a:effectRef>
+            <a:fontRef idx="minor">
+              <a:schemeClr val="tx1"/>
+            </a:fontRef>
+          </p:style>
+        </p:cxnSp>
+        <p:sp>
+          <p:nvSpPr>
+            <p:cNvPr id="8" name="TextBox 7">
+              <a:extLst>
+                <a:ext uri="{FF2B5EF4-FFF2-40B4-BE49-F238E27FC236}">
+                  <a16:creationId xmlns:a16="http://schemas.microsoft.com/office/drawing/2014/main" id="{C61B684E-FDA7-4625-9CC3-79C17CC59ED7}"/>
+                </a:ext>
+              </a:extLst>
+            </p:cNvPr>
+            <p:cNvSpPr txBox="1"/>
+            <p:nvPr/>
+          </p:nvSpPr>
+          <p:spPr>
+            <a:xfrm>
+              <a:off x="4372493" y="180818"/>
+              <a:ext cx="4989025" cy="646331"/>
+            </a:xfrm>
+            <a:prstGeom prst="rect">
+              <a:avLst/>
+            </a:prstGeom>
+            <a:noFill/>
+          </p:spPr>
+          <p:txBody>
+            <a:bodyPr wrap="square" rtlCol="0">
+              <a:spAutoFit/>
+            </a:bodyPr>
+            <a:lstStyle/>
+            <a:p>
+              <a:pPr marL="0" marR="0" lvl="0" indent="0" algn="l" defTabSz="914400" rtl="0" eaLnBrk="1" fontAlgn="auto" latinLnBrk="0" hangingPunct="1">
+                <a:lnSpc>
+                  <a:spcPct val="100000"/>
+                </a:lnSpc>
+                <a:spcBef>
+                  <a:spcPts val="0"/>
+                </a:spcBef>
+                <a:spcAft>
+                  <a:spcPts val="0"/>
+                </a:spcAft>
+                <a:buClrTx/>
+                <a:buSzTx/>
+                <a:buFontTx/>
+                <a:buNone/>
+                <a:tabLst/>
+                <a:defRPr/>
+              </a:pPr>
+              <a:r>
+                <a:rPr kumimoji="0" lang="en-GB" sz="1800" b="0" i="0" u="none" strike="noStrike" kern="1200" cap="none" spc="0" normalizeH="0" baseline="0" noProof="0" dirty="0">
+                  <a:ln>
+                    <a:noFill/>
+                  </a:ln>
+                  <a:solidFill>
+                    <a:prstClr val="black"/>
+                  </a:solidFill>
+                  <a:effectLst/>
+                  <a:uLnTx/>
+                  <a:uFillTx/>
+                  <a:latin typeface="Calibri" panose="020F0502020204030204"/>
+                  <a:ea typeface="+mn-ea"/>
+                  <a:cs typeface="+mn-cs"/>
+                </a:rPr>
+                <a:t>Microsoft Azure Data Fundamentals: Explore non-relational data in Azure</a:t>
+              </a:r>
+            </a:p>
+          </p:txBody>
+        </p:sp>
+        <p:sp>
+          <p:nvSpPr>
+            <p:cNvPr id="10" name="TextBox 9">
+              <a:extLst>
+                <a:ext uri="{FF2B5EF4-FFF2-40B4-BE49-F238E27FC236}">
+                  <a16:creationId xmlns:a16="http://schemas.microsoft.com/office/drawing/2014/main" id="{4E568F0D-7E90-4A0C-8070-6C806D992954}"/>
+                </a:ext>
+              </a:extLst>
+            </p:cNvPr>
+            <p:cNvSpPr txBox="1"/>
+            <p:nvPr/>
+          </p:nvSpPr>
+          <p:spPr>
+            <a:xfrm>
+              <a:off x="9534699" y="180818"/>
+              <a:ext cx="2155764" cy="369332"/>
+            </a:xfrm>
+            <a:prstGeom prst="rect">
+              <a:avLst/>
+            </a:prstGeom>
+            <a:noFill/>
+          </p:spPr>
+          <p:txBody>
+            <a:bodyPr wrap="square" rtlCol="0">
+              <a:spAutoFit/>
+            </a:bodyPr>
+            <a:lstStyle/>
+            <a:p>
+              <a:pPr marL="0" marR="0" lvl="0" indent="0" algn="l" defTabSz="914400" rtl="0" eaLnBrk="1" fontAlgn="auto" latinLnBrk="0" hangingPunct="1">
+                <a:lnSpc>
+                  <a:spcPct val="100000"/>
+                </a:lnSpc>
+                <a:spcBef>
+                  <a:spcPts val="0"/>
+                </a:spcBef>
+                <a:spcAft>
+                  <a:spcPts val="0"/>
+                </a:spcAft>
+                <a:buClrTx/>
+                <a:buSzTx/>
+                <a:buFontTx/>
+                <a:buNone/>
+                <a:tabLst/>
+                <a:defRPr/>
+              </a:pPr>
+              <a:r>
+                <a:rPr kumimoji="0" lang="en-GB" sz="1800" b="0" i="0" u="none" strike="noStrike" kern="1200" cap="none" spc="0" normalizeH="0" baseline="0" noProof="0" dirty="0">
+                  <a:ln>
+                    <a:noFill/>
+                  </a:ln>
+                  <a:solidFill>
+                    <a:prstClr val="black"/>
+                  </a:solidFill>
+                  <a:effectLst/>
+                  <a:uLnTx/>
+                  <a:uFillTx/>
+                  <a:latin typeface="Calibri" panose="020F0502020204030204"/>
+                  <a:ea typeface="+mn-ea"/>
+                  <a:cs typeface="+mn-cs"/>
+                </a:rPr>
+                <a:t>Date: 18/03/23 </a:t>
+              </a:r>
+            </a:p>
+          </p:txBody>
+        </p:sp>
+        <p:cxnSp>
+          <p:nvCxnSpPr>
+            <p:cNvPr id="11" name="Straight Connector 10">
+              <a:extLst>
+                <a:ext uri="{FF2B5EF4-FFF2-40B4-BE49-F238E27FC236}">
+                  <a16:creationId xmlns:a16="http://schemas.microsoft.com/office/drawing/2014/main" id="{F70ABCF3-BE60-426F-8C8C-059C854869C6}"/>
+                </a:ext>
+              </a:extLst>
+            </p:cNvPr>
+            <p:cNvCxnSpPr>
+              <a:cxnSpLocks/>
+            </p:cNvCxnSpPr>
+            <p:nvPr/>
+          </p:nvCxnSpPr>
+          <p:spPr>
+            <a:xfrm flipV="1">
+              <a:off x="4267202" y="93505"/>
+              <a:ext cx="1" cy="754394"/>
+            </a:xfrm>
+            <a:prstGeom prst="line">
+              <a:avLst/>
+            </a:prstGeom>
+            <a:ln w="19050">
+              <a:solidFill>
+                <a:srgbClr val="0072C6"/>
+              </a:solidFill>
+            </a:ln>
+          </p:spPr>
+          <p:style>
+            <a:lnRef idx="1">
+              <a:schemeClr val="accent1"/>
+            </a:lnRef>
+            <a:fillRef idx="0">
+              <a:schemeClr val="accent1"/>
+            </a:fillRef>
+            <a:effectRef idx="0">
+              <a:schemeClr val="accent1"/>
+            </a:effectRef>
+            <a:fontRef idx="minor">
+              <a:schemeClr val="tx1"/>
+            </a:fontRef>
+          </p:style>
+        </p:cxnSp>
+        <p:cxnSp>
+          <p:nvCxnSpPr>
+            <p:cNvPr id="16" name="Straight Connector 15">
+              <a:extLst>
+                <a:ext uri="{FF2B5EF4-FFF2-40B4-BE49-F238E27FC236}">
+                  <a16:creationId xmlns:a16="http://schemas.microsoft.com/office/drawing/2014/main" id="{90F03633-4CAB-4B57-BF94-CF91E87AB7AE}"/>
+                </a:ext>
+              </a:extLst>
+            </p:cNvPr>
+            <p:cNvCxnSpPr>
+              <a:cxnSpLocks/>
+            </p:cNvCxnSpPr>
+            <p:nvPr/>
+          </p:nvCxnSpPr>
+          <p:spPr>
+            <a:xfrm flipV="1">
+              <a:off x="9491750" y="83129"/>
+              <a:ext cx="1" cy="754394"/>
+            </a:xfrm>
+            <a:prstGeom prst="line">
+              <a:avLst/>
+            </a:prstGeom>
+            <a:ln w="19050">
+              <a:solidFill>
+                <a:srgbClr val="0072C6"/>
+              </a:solidFill>
+            </a:ln>
+          </p:spPr>
+          <p:style>
+            <a:lnRef idx="1">
+              <a:schemeClr val="accent1"/>
+            </a:lnRef>
+            <a:fillRef idx="0">
+              <a:schemeClr val="accent1"/>
+            </a:fillRef>
+            <a:effectRef idx="0">
+              <a:schemeClr val="accent1"/>
+            </a:effectRef>
+            <a:fontRef idx="minor">
+              <a:schemeClr val="tx1"/>
+            </a:fontRef>
+          </p:style>
+        </p:cxnSp>
+      </p:grpSp>
+      <p:pic>
+        <p:nvPicPr>
+          <p:cNvPr id="20" name="Picture 2">
+            <a:extLst>
+              <a:ext uri="{FF2B5EF4-FFF2-40B4-BE49-F238E27FC236}">
+                <a16:creationId xmlns:a16="http://schemas.microsoft.com/office/drawing/2014/main" id="{775211BE-DA3A-41DA-8578-4E52F07B6AB9}"/>
+              </a:ext>
+            </a:extLst>
+          </p:cNvPr>
+          <p:cNvPicPr>
+            <a:picLocks noChangeAspect="1" noChangeArrowheads="1"/>
+          </p:cNvPicPr>
+          <p:nvPr/>
+        </p:nvPicPr>
+        <p:blipFill>
+          <a:blip r:embed="rId2">
+            <a:extLst>
+              <a:ext uri="{28A0092B-C50C-407E-A947-70E740481C1C}">
+                <a14:useLocalDpi xmlns:a14="http://schemas.microsoft.com/office/drawing/2010/main" val="0"/>
+              </a:ext>
+            </a:extLst>
+          </a:blip>
+          <a:srcRect/>
+          <a:stretch>
+            <a:fillRect/>
+          </a:stretch>
+        </p:blipFill>
+        <p:spPr bwMode="auto">
+          <a:xfrm>
+            <a:off x="144770" y="111976"/>
+            <a:ext cx="725548" cy="725548"/>
+          </a:xfrm>
+          <a:prstGeom prst="rect">
+            <a:avLst/>
+          </a:prstGeom>
+          <a:noFill/>
+          <a:extLst>
+            <a:ext uri="{909E8E84-426E-40DD-AFC4-6F175D3DCCD1}">
+              <a14:hiddenFill xmlns:a14="http://schemas.microsoft.com/office/drawing/2010/main">
+                <a:solidFill>
+                  <a:srgbClr val="FFFFFF"/>
+                </a:solidFill>
+              </a14:hiddenFill>
+            </a:ext>
+          </a:extLst>
+        </p:spPr>
+      </p:pic>
+      <p:sp>
+        <p:nvSpPr>
+          <p:cNvPr id="21" name="TextBox 20">
+            <a:extLst>
+              <a:ext uri="{FF2B5EF4-FFF2-40B4-BE49-F238E27FC236}">
+                <a16:creationId xmlns:a16="http://schemas.microsoft.com/office/drawing/2014/main" id="{30404CBF-C3F9-43E0-81FA-E9D4D01BC004}"/>
+              </a:ext>
+            </a:extLst>
+          </p:cNvPr>
+          <p:cNvSpPr txBox="1"/>
+          <p:nvPr/>
+        </p:nvSpPr>
+        <p:spPr>
+          <a:xfrm>
+            <a:off x="914402" y="191193"/>
+            <a:ext cx="3483032" cy="646331"/>
+          </a:xfrm>
+          <a:prstGeom prst="rect">
+            <a:avLst/>
+          </a:prstGeom>
+          <a:noFill/>
+        </p:spPr>
+        <p:txBody>
+          <a:bodyPr wrap="square" rtlCol="0">
+            <a:spAutoFit/>
+          </a:bodyPr>
+          <a:lstStyle/>
+          <a:p>
+            <a:pPr marL="0" marR="0" lvl="0" indent="0" algn="l" defTabSz="914400" rtl="0" eaLnBrk="1" fontAlgn="auto" latinLnBrk="0" hangingPunct="1">
+              <a:lnSpc>
+                <a:spcPct val="100000"/>
+              </a:lnSpc>
+              <a:spcBef>
+                <a:spcPts val="0"/>
+              </a:spcBef>
+              <a:spcAft>
+                <a:spcPts val="0"/>
+              </a:spcAft>
+              <a:buClrTx/>
+              <a:buSzTx/>
+              <a:buFontTx/>
+              <a:buNone/>
+              <a:tabLst/>
+              <a:defRPr/>
+            </a:pPr>
+            <a:r>
+              <a:rPr lang="en-GB" dirty="0">
+                <a:solidFill>
+                  <a:prstClr val="black"/>
+                </a:solidFill>
+                <a:latin typeface="Calibri" panose="020F0502020204030204"/>
+              </a:rPr>
+              <a:t>DP</a:t>
+            </a:r>
+            <a:r>
+              <a:rPr kumimoji="0" lang="en-GB" sz="1800" b="0" i="0" u="none" strike="noStrike" kern="1200" cap="none" spc="0" normalizeH="0" baseline="0" noProof="0" dirty="0">
+                <a:ln>
+                  <a:noFill/>
+                </a:ln>
+                <a:solidFill>
+                  <a:prstClr val="black"/>
+                </a:solidFill>
+                <a:effectLst/>
+                <a:uLnTx/>
+                <a:uFillTx/>
+                <a:latin typeface="Calibri" panose="020F0502020204030204"/>
+                <a:ea typeface="+mn-ea"/>
+                <a:cs typeface="+mn-cs"/>
+              </a:rPr>
+              <a:t>-900 Microsoft Azure Fundamentals</a:t>
+            </a:r>
+          </a:p>
+        </p:txBody>
+      </p:sp>
+      <p:sp>
+        <p:nvSpPr>
+          <p:cNvPr id="2" name="TextBox 1">
+            <a:extLst>
+              <a:ext uri="{FF2B5EF4-FFF2-40B4-BE49-F238E27FC236}">
+                <a16:creationId xmlns:a16="http://schemas.microsoft.com/office/drawing/2014/main" id="{C29D28AF-352E-30D0-C1A2-0E75AC714F1E}"/>
+              </a:ext>
+            </a:extLst>
+          </p:cNvPr>
+          <p:cNvSpPr txBox="1"/>
+          <p:nvPr/>
+        </p:nvSpPr>
+        <p:spPr>
+          <a:xfrm>
+            <a:off x="208599" y="1178568"/>
+            <a:ext cx="7486746" cy="4285469"/>
+          </a:xfrm>
+          <a:prstGeom prst="rect">
+            <a:avLst/>
+          </a:prstGeom>
+          <a:noFill/>
+        </p:spPr>
+        <p:txBody>
+          <a:bodyPr wrap="square" rtlCol="0">
+            <a:spAutoFit/>
+          </a:bodyPr>
+          <a:lstStyle/>
+          <a:p>
+            <a:pPr>
+              <a:lnSpc>
+                <a:spcPct val="120000"/>
+              </a:lnSpc>
+            </a:pPr>
+            <a:r>
+              <a:rPr lang="en-US" sz="1600" b="1" i="0" dirty="0">
+                <a:solidFill>
+                  <a:srgbClr val="161616"/>
+                </a:solidFill>
+                <a:effectLst/>
+                <a:latin typeface="+mj-lt"/>
+              </a:rPr>
+              <a:t>Azure Tables </a:t>
+            </a:r>
+          </a:p>
+          <a:p>
+            <a:pPr>
+              <a:lnSpc>
+                <a:spcPct val="120000"/>
+              </a:lnSpc>
+            </a:pPr>
+            <a:endParaRPr lang="en-US" sz="1600" b="1" dirty="0">
+              <a:solidFill>
+                <a:srgbClr val="161616"/>
+              </a:solidFill>
+              <a:latin typeface="+mj-lt"/>
+            </a:endParaRPr>
+          </a:p>
+          <a:p>
+            <a:pPr marL="285750" indent="-285750">
+              <a:lnSpc>
+                <a:spcPct val="120000"/>
+              </a:lnSpc>
+              <a:buFontTx/>
+              <a:buChar char="-"/>
+            </a:pPr>
+            <a:r>
+              <a:rPr lang="en-US" sz="1400" i="0" dirty="0">
+                <a:solidFill>
+                  <a:srgbClr val="161616"/>
+                </a:solidFill>
+                <a:effectLst/>
+                <a:latin typeface="+mj-lt"/>
+              </a:rPr>
+              <a:t>Almost like </a:t>
+            </a:r>
+            <a:r>
+              <a:rPr lang="en-US" sz="1400" dirty="0">
+                <a:solidFill>
+                  <a:srgbClr val="161616"/>
+                </a:solidFill>
+                <a:latin typeface="+mj-lt"/>
+              </a:rPr>
+              <a:t>Microsoft Excel. </a:t>
+            </a:r>
+            <a:r>
+              <a:rPr lang="en-US" sz="1400" i="0" dirty="0">
+                <a:solidFill>
+                  <a:srgbClr val="161616"/>
+                </a:solidFill>
+                <a:effectLst/>
+                <a:latin typeface="+mj-lt"/>
+              </a:rPr>
+              <a:t>Azure Table Storage is a NoSQL storage solution that makes use of tables containing key/value data items. Each item is represented by a row that contains columns for the data fields that need to be stored. </a:t>
+            </a:r>
+          </a:p>
+          <a:p>
+            <a:pPr marL="285750" indent="-285750">
+              <a:lnSpc>
+                <a:spcPct val="120000"/>
+              </a:lnSpc>
+              <a:buFontTx/>
+              <a:buChar char="-"/>
+            </a:pPr>
+            <a:endParaRPr lang="en-US" sz="1400" dirty="0">
+              <a:solidFill>
+                <a:srgbClr val="161616"/>
+              </a:solidFill>
+              <a:latin typeface="+mj-lt"/>
+            </a:endParaRPr>
+          </a:p>
+          <a:p>
+            <a:pPr marL="285750" indent="-285750">
+              <a:lnSpc>
+                <a:spcPct val="120000"/>
+              </a:lnSpc>
+              <a:buFontTx/>
+              <a:buChar char="-"/>
+            </a:pPr>
+            <a:r>
+              <a:rPr lang="en-US" sz="1400" dirty="0">
+                <a:solidFill>
+                  <a:srgbClr val="161616"/>
+                </a:solidFill>
+                <a:latin typeface="+mj-lt"/>
+              </a:rPr>
+              <a:t>An Azure Table enables you to store semi-structured data. All rows in a table must have a unique key (composed of a partition key and a row key), and when you modify data in a table, a timestamp column records the date and time the modification was made; but other than that, the columns in each row can vary.</a:t>
+            </a:r>
+          </a:p>
+          <a:p>
+            <a:pPr marL="285750" indent="-285750">
+              <a:lnSpc>
+                <a:spcPct val="120000"/>
+              </a:lnSpc>
+              <a:buFontTx/>
+              <a:buChar char="-"/>
+            </a:pPr>
+            <a:endParaRPr lang="en-US" sz="1400" dirty="0">
+              <a:solidFill>
+                <a:srgbClr val="161616"/>
+              </a:solidFill>
+              <a:latin typeface="+mj-lt"/>
+            </a:endParaRPr>
+          </a:p>
+          <a:p>
+            <a:pPr marL="285750" indent="-285750">
+              <a:lnSpc>
+                <a:spcPct val="120000"/>
+              </a:lnSpc>
+              <a:buFontTx/>
+              <a:buChar char="-"/>
+            </a:pPr>
+            <a:r>
+              <a:rPr lang="en-US" sz="1400" i="0" dirty="0">
+                <a:solidFill>
+                  <a:srgbClr val="161616"/>
+                </a:solidFill>
+                <a:effectLst/>
+                <a:latin typeface="+mj-lt"/>
+              </a:rPr>
+              <a:t>To help ensure fast access, Azure Table Storage splits a table into partitions. Partitioning is a mechanism for grouping related rows, based on a common property or partition key. A table can contain any number of partitions. When you search for data, you can include the partition key in the search criteria. This helps to narrow down the volume of data to be examined and improves performance.</a:t>
+            </a:r>
+          </a:p>
+        </p:txBody>
+      </p:sp>
+      <p:pic>
+        <p:nvPicPr>
+          <p:cNvPr id="3074" name="Picture 2" descr="An Azure storage account with Azure tables">
+            <a:extLst>
+              <a:ext uri="{FF2B5EF4-FFF2-40B4-BE49-F238E27FC236}">
+                <a16:creationId xmlns:a16="http://schemas.microsoft.com/office/drawing/2014/main" id="{A34980FF-0A37-6AA4-9C5D-42AB7023517B}"/>
+              </a:ext>
+            </a:extLst>
+          </p:cNvPr>
+          <p:cNvPicPr>
+            <a:picLocks noChangeAspect="1" noChangeArrowheads="1"/>
+          </p:cNvPicPr>
+          <p:nvPr/>
+        </p:nvPicPr>
+        <p:blipFill>
+          <a:blip r:embed="rId3">
+            <a:extLst>
+              <a:ext uri="{28A0092B-C50C-407E-A947-70E740481C1C}">
+                <a14:useLocalDpi xmlns:a14="http://schemas.microsoft.com/office/drawing/2010/main" val="0"/>
+              </a:ext>
+            </a:extLst>
+          </a:blip>
+          <a:srcRect/>
+          <a:stretch>
+            <a:fillRect/>
+          </a:stretch>
+        </p:blipFill>
+        <p:spPr bwMode="auto">
+          <a:xfrm>
+            <a:off x="8054083" y="1243336"/>
+            <a:ext cx="3810000" cy="2714625"/>
+          </a:xfrm>
+          <a:prstGeom prst="rect">
+            <a:avLst/>
+          </a:prstGeom>
+          <a:noFill/>
+          <a:extLst>
+            <a:ext uri="{909E8E84-426E-40DD-AFC4-6F175D3DCCD1}">
+              <a14:hiddenFill xmlns:a14="http://schemas.microsoft.com/office/drawing/2010/main">
+                <a:solidFill>
+                  <a:srgbClr val="FFFFFF"/>
+                </a:solidFill>
+              </a14:hiddenFill>
+            </a:ext>
+          </a:extLst>
+        </p:spPr>
+      </p:pic>
+    </p:spTree>
+    <p:extLst>
+      <p:ext uri="{BB962C8B-B14F-4D97-AF65-F5344CB8AC3E}">
+        <p14:creationId xmlns:p14="http://schemas.microsoft.com/office/powerpoint/2010/main" val="404974620"/>
+      </p:ext>
+    </p:extLst>
+  </p:cSld>
+  <p:clrMapOvr>
+    <a:masterClrMapping/>
+  </p:clrMapOvr>
+</p:sld>
+</file>
+
+<file path=ppt/slides/slide25.xml><?xml version="1.0" encoding="utf-8"?>
 <p:sld xmlns:a="http://schemas.openxmlformats.org/drawingml/2006/main" xmlns:r="http://schemas.openxmlformats.org/officeDocument/2006/relationships" xmlns:p="http://schemas.openxmlformats.org/presentationml/2006/main">
   <p:cSld>
     <p:spTree>

</xml_diff>

<commit_message>
Azure DP900 Section 3 Module 2
</commit_message>
<xml_diff>
--- a/Azure_DP-900_Fundamentals/MJH_DP-900_Azure_Fundamentals_Notes.pptx
+++ b/Azure_DP-900_Fundamentals/MJH_DP-900_Azure_Fundamentals_Notes.pptx
@@ -29,9 +29,7 @@
     <p:sldId id="279" r:id="rId23"/>
     <p:sldId id="280" r:id="rId24"/>
     <p:sldId id="281" r:id="rId25"/>
-    <p:sldId id="282" r:id="rId26"/>
-    <p:sldId id="283" r:id="rId27"/>
-    <p:sldId id="261" r:id="rId28"/>
+    <p:sldId id="261" r:id="rId26"/>
   </p:sldIdLst>
   <p:sldSz cx="12192000" cy="6858000"/>
   <p:notesSz cx="6858000" cy="9144000"/>
@@ -287,7 +285,7 @@
           <a:p>
             <a:fld id="{655AA731-BE5F-44DA-AAEA-300254B29F16}" type="datetimeFigureOut">
               <a:rPr lang="en-GB" smtClean="0"/>
-              <a:t>23/03/2023</a:t>
+              <a:t>18/03/2023</a:t>
             </a:fld>
             <a:endParaRPr lang="en-GB"/>
           </a:p>
@@ -487,7 +485,7 @@
           <a:p>
             <a:fld id="{655AA731-BE5F-44DA-AAEA-300254B29F16}" type="datetimeFigureOut">
               <a:rPr lang="en-GB" smtClean="0"/>
-              <a:t>23/03/2023</a:t>
+              <a:t>18/03/2023</a:t>
             </a:fld>
             <a:endParaRPr lang="en-GB"/>
           </a:p>
@@ -697,7 +695,7 @@
           <a:p>
             <a:fld id="{655AA731-BE5F-44DA-AAEA-300254B29F16}" type="datetimeFigureOut">
               <a:rPr lang="en-GB" smtClean="0"/>
-              <a:t>23/03/2023</a:t>
+              <a:t>18/03/2023</a:t>
             </a:fld>
             <a:endParaRPr lang="en-GB"/>
           </a:p>
@@ -897,7 +895,7 @@
           <a:p>
             <a:fld id="{655AA731-BE5F-44DA-AAEA-300254B29F16}" type="datetimeFigureOut">
               <a:rPr lang="en-GB" smtClean="0"/>
-              <a:t>23/03/2023</a:t>
+              <a:t>18/03/2023</a:t>
             </a:fld>
             <a:endParaRPr lang="en-GB"/>
           </a:p>
@@ -1173,7 +1171,7 @@
           <a:p>
             <a:fld id="{655AA731-BE5F-44DA-AAEA-300254B29F16}" type="datetimeFigureOut">
               <a:rPr lang="en-GB" smtClean="0"/>
-              <a:t>23/03/2023</a:t>
+              <a:t>18/03/2023</a:t>
             </a:fld>
             <a:endParaRPr lang="en-GB"/>
           </a:p>
@@ -1441,7 +1439,7 @@
           <a:p>
             <a:fld id="{655AA731-BE5F-44DA-AAEA-300254B29F16}" type="datetimeFigureOut">
               <a:rPr lang="en-GB" smtClean="0"/>
-              <a:t>23/03/2023</a:t>
+              <a:t>18/03/2023</a:t>
             </a:fld>
             <a:endParaRPr lang="en-GB"/>
           </a:p>
@@ -1856,7 +1854,7 @@
           <a:p>
             <a:fld id="{655AA731-BE5F-44DA-AAEA-300254B29F16}" type="datetimeFigureOut">
               <a:rPr lang="en-GB" smtClean="0"/>
-              <a:t>23/03/2023</a:t>
+              <a:t>18/03/2023</a:t>
             </a:fld>
             <a:endParaRPr lang="en-GB"/>
           </a:p>
@@ -1998,7 +1996,7 @@
           <a:p>
             <a:fld id="{655AA731-BE5F-44DA-AAEA-300254B29F16}" type="datetimeFigureOut">
               <a:rPr lang="en-GB" smtClean="0"/>
-              <a:t>23/03/2023</a:t>
+              <a:t>18/03/2023</a:t>
             </a:fld>
             <a:endParaRPr lang="en-GB"/>
           </a:p>
@@ -2111,7 +2109,7 @@
           <a:p>
             <a:fld id="{655AA731-BE5F-44DA-AAEA-300254B29F16}" type="datetimeFigureOut">
               <a:rPr lang="en-GB" smtClean="0"/>
-              <a:t>23/03/2023</a:t>
+              <a:t>18/03/2023</a:t>
             </a:fld>
             <a:endParaRPr lang="en-GB"/>
           </a:p>
@@ -2424,7 +2422,7 @@
           <a:p>
             <a:fld id="{655AA731-BE5F-44DA-AAEA-300254B29F16}" type="datetimeFigureOut">
               <a:rPr lang="en-GB" smtClean="0"/>
-              <a:t>23/03/2023</a:t>
+              <a:t>18/03/2023</a:t>
             </a:fld>
             <a:endParaRPr lang="en-GB"/>
           </a:p>
@@ -2713,7 +2711,7 @@
           <a:p>
             <a:fld id="{655AA731-BE5F-44DA-AAEA-300254B29F16}" type="datetimeFigureOut">
               <a:rPr lang="en-GB" smtClean="0"/>
-              <a:t>23/03/2023</a:t>
+              <a:t>18/03/2023</a:t>
             </a:fld>
             <a:endParaRPr lang="en-GB"/>
           </a:p>
@@ -2956,7 +2954,7 @@
           <a:p>
             <a:fld id="{655AA731-BE5F-44DA-AAEA-300254B29F16}" type="datetimeFigureOut">
               <a:rPr lang="en-GB" smtClean="0"/>
-              <a:t>23/03/2023</a:t>
+              <a:t>18/03/2023</a:t>
             </a:fld>
             <a:endParaRPr lang="en-GB"/>
           </a:p>
@@ -14796,1613 +14794,6 @@
 </file>
 
 <file path=ppt/slides/slide25.xml><?xml version="1.0" encoding="utf-8"?>
-<p:sld xmlns:a="http://schemas.openxmlformats.org/drawingml/2006/main" xmlns:r="http://schemas.openxmlformats.org/officeDocument/2006/relationships" xmlns:p="http://schemas.openxmlformats.org/presentationml/2006/main">
-  <p:cSld>
-    <p:spTree>
-      <p:nvGrpSpPr>
-        <p:cNvPr id="1" name=""/>
-        <p:cNvGrpSpPr/>
-        <p:nvPr/>
-      </p:nvGrpSpPr>
-      <p:grpSpPr>
-        <a:xfrm>
-          <a:off x="0" y="0"/>
-          <a:ext cx="0" cy="0"/>
-          <a:chOff x="0" y="0"/>
-          <a:chExt cx="0" cy="0"/>
-        </a:xfrm>
-      </p:grpSpPr>
-      <p:grpSp>
-        <p:nvGrpSpPr>
-          <p:cNvPr id="18" name="Group 17">
-            <a:extLst>
-              <a:ext uri="{FF2B5EF4-FFF2-40B4-BE49-F238E27FC236}">
-                <a16:creationId xmlns:a16="http://schemas.microsoft.com/office/drawing/2014/main" id="{6185BE9B-87C8-4B46-9293-0E71CF17E76A}"/>
-              </a:ext>
-            </a:extLst>
-          </p:cNvPr>
-          <p:cNvGrpSpPr/>
-          <p:nvPr/>
-        </p:nvGrpSpPr>
-        <p:grpSpPr>
-          <a:xfrm>
-            <a:off x="99755" y="83129"/>
-            <a:ext cx="11953701" cy="872834"/>
-            <a:chOff x="99755" y="83129"/>
-            <a:chExt cx="11953701" cy="872834"/>
-          </a:xfrm>
-        </p:grpSpPr>
-        <p:cxnSp>
-          <p:nvCxnSpPr>
-            <p:cNvPr id="5" name="Straight Connector 4">
-              <a:extLst>
-                <a:ext uri="{FF2B5EF4-FFF2-40B4-BE49-F238E27FC236}">
-                  <a16:creationId xmlns:a16="http://schemas.microsoft.com/office/drawing/2014/main" id="{A8BE4EF8-406C-4035-940C-AB752B29BA18}"/>
-                </a:ext>
-              </a:extLst>
-            </p:cNvPr>
-            <p:cNvCxnSpPr/>
-            <p:nvPr/>
-          </p:nvCxnSpPr>
-          <p:spPr>
-            <a:xfrm>
-              <a:off x="99755" y="955963"/>
-              <a:ext cx="11953701" cy="0"/>
-            </a:xfrm>
-            <a:prstGeom prst="line">
-              <a:avLst/>
-            </a:prstGeom>
-            <a:ln w="19050">
-              <a:solidFill>
-                <a:srgbClr val="0072C6"/>
-              </a:solidFill>
-            </a:ln>
-          </p:spPr>
-          <p:style>
-            <a:lnRef idx="1">
-              <a:schemeClr val="accent1"/>
-            </a:lnRef>
-            <a:fillRef idx="0">
-              <a:schemeClr val="accent1"/>
-            </a:fillRef>
-            <a:effectRef idx="0">
-              <a:schemeClr val="accent1"/>
-            </a:effectRef>
-            <a:fontRef idx="minor">
-              <a:schemeClr val="tx1"/>
-            </a:fontRef>
-          </p:style>
-        </p:cxnSp>
-        <p:sp>
-          <p:nvSpPr>
-            <p:cNvPr id="8" name="TextBox 7">
-              <a:extLst>
-                <a:ext uri="{FF2B5EF4-FFF2-40B4-BE49-F238E27FC236}">
-                  <a16:creationId xmlns:a16="http://schemas.microsoft.com/office/drawing/2014/main" id="{C61B684E-FDA7-4625-9CC3-79C17CC59ED7}"/>
-                </a:ext>
-              </a:extLst>
-            </p:cNvPr>
-            <p:cNvSpPr txBox="1"/>
-            <p:nvPr/>
-          </p:nvSpPr>
-          <p:spPr>
-            <a:xfrm>
-              <a:off x="4372493" y="180818"/>
-              <a:ext cx="4989025" cy="646331"/>
-            </a:xfrm>
-            <a:prstGeom prst="rect">
-              <a:avLst/>
-            </a:prstGeom>
-            <a:noFill/>
-          </p:spPr>
-          <p:txBody>
-            <a:bodyPr wrap="square" rtlCol="0">
-              <a:spAutoFit/>
-            </a:bodyPr>
-            <a:lstStyle/>
-            <a:p>
-              <a:pPr marL="0" marR="0" lvl="0" indent="0" algn="l" defTabSz="914400" rtl="0" eaLnBrk="1" fontAlgn="auto" latinLnBrk="0" hangingPunct="1">
-                <a:lnSpc>
-                  <a:spcPct val="100000"/>
-                </a:lnSpc>
-                <a:spcBef>
-                  <a:spcPts val="0"/>
-                </a:spcBef>
-                <a:spcAft>
-                  <a:spcPts val="0"/>
-                </a:spcAft>
-                <a:buClrTx/>
-                <a:buSzTx/>
-                <a:buFontTx/>
-                <a:buNone/>
-                <a:tabLst/>
-                <a:defRPr/>
-              </a:pPr>
-              <a:r>
-                <a:rPr kumimoji="0" lang="en-GB" sz="1800" b="0" i="0" u="none" strike="noStrike" kern="1200" cap="none" spc="0" normalizeH="0" baseline="0" noProof="0" dirty="0">
-                  <a:ln>
-                    <a:noFill/>
-                  </a:ln>
-                  <a:solidFill>
-                    <a:prstClr val="black"/>
-                  </a:solidFill>
-                  <a:effectLst/>
-                  <a:uLnTx/>
-                  <a:uFillTx/>
-                  <a:latin typeface="Calibri" panose="020F0502020204030204"/>
-                  <a:ea typeface="+mn-ea"/>
-                  <a:cs typeface="+mn-cs"/>
-                </a:rPr>
-                <a:t>Microsoft Azure Data Fundamentals: Explore non-relational data in Azure</a:t>
-              </a:r>
-            </a:p>
-          </p:txBody>
-        </p:sp>
-        <p:sp>
-          <p:nvSpPr>
-            <p:cNvPr id="10" name="TextBox 9">
-              <a:extLst>
-                <a:ext uri="{FF2B5EF4-FFF2-40B4-BE49-F238E27FC236}">
-                  <a16:creationId xmlns:a16="http://schemas.microsoft.com/office/drawing/2014/main" id="{4E568F0D-7E90-4A0C-8070-6C806D992954}"/>
-                </a:ext>
-              </a:extLst>
-            </p:cNvPr>
-            <p:cNvSpPr txBox="1"/>
-            <p:nvPr/>
-          </p:nvSpPr>
-          <p:spPr>
-            <a:xfrm>
-              <a:off x="9534699" y="180818"/>
-              <a:ext cx="2155764" cy="369332"/>
-            </a:xfrm>
-            <a:prstGeom prst="rect">
-              <a:avLst/>
-            </a:prstGeom>
-            <a:noFill/>
-          </p:spPr>
-          <p:txBody>
-            <a:bodyPr wrap="square" rtlCol="0">
-              <a:spAutoFit/>
-            </a:bodyPr>
-            <a:lstStyle/>
-            <a:p>
-              <a:pPr marL="0" marR="0" lvl="0" indent="0" algn="l" defTabSz="914400" rtl="0" eaLnBrk="1" fontAlgn="auto" latinLnBrk="0" hangingPunct="1">
-                <a:lnSpc>
-                  <a:spcPct val="100000"/>
-                </a:lnSpc>
-                <a:spcBef>
-                  <a:spcPts val="0"/>
-                </a:spcBef>
-                <a:spcAft>
-                  <a:spcPts val="0"/>
-                </a:spcAft>
-                <a:buClrTx/>
-                <a:buSzTx/>
-                <a:buFontTx/>
-                <a:buNone/>
-                <a:tabLst/>
-                <a:defRPr/>
-              </a:pPr>
-              <a:r>
-                <a:rPr kumimoji="0" lang="en-GB" sz="1800" b="0" i="0" u="none" strike="noStrike" kern="1200" cap="none" spc="0" normalizeH="0" baseline="0" noProof="0" dirty="0">
-                  <a:ln>
-                    <a:noFill/>
-                  </a:ln>
-                  <a:solidFill>
-                    <a:prstClr val="black"/>
-                  </a:solidFill>
-                  <a:effectLst/>
-                  <a:uLnTx/>
-                  <a:uFillTx/>
-                  <a:latin typeface="Calibri" panose="020F0502020204030204"/>
-                  <a:ea typeface="+mn-ea"/>
-                  <a:cs typeface="+mn-cs"/>
-                </a:rPr>
-                <a:t>Date: </a:t>
-              </a:r>
-              <a:r>
-                <a:rPr lang="en-GB" dirty="0">
-                  <a:solidFill>
-                    <a:prstClr val="black"/>
-                  </a:solidFill>
-                  <a:latin typeface="Calibri" panose="020F0502020204030204"/>
-                </a:rPr>
-                <a:t>23</a:t>
-              </a:r>
-              <a:r>
-                <a:rPr kumimoji="0" lang="en-GB" sz="1800" b="0" i="0" u="none" strike="noStrike" kern="1200" cap="none" spc="0" normalizeH="0" baseline="0" noProof="0" dirty="0">
-                  <a:ln>
-                    <a:noFill/>
-                  </a:ln>
-                  <a:solidFill>
-                    <a:prstClr val="black"/>
-                  </a:solidFill>
-                  <a:effectLst/>
-                  <a:uLnTx/>
-                  <a:uFillTx/>
-                  <a:latin typeface="Calibri" panose="020F0502020204030204"/>
-                  <a:ea typeface="+mn-ea"/>
-                  <a:cs typeface="+mn-cs"/>
-                </a:rPr>
-                <a:t>/03/23 </a:t>
-              </a:r>
-            </a:p>
-          </p:txBody>
-        </p:sp>
-        <p:cxnSp>
-          <p:nvCxnSpPr>
-            <p:cNvPr id="11" name="Straight Connector 10">
-              <a:extLst>
-                <a:ext uri="{FF2B5EF4-FFF2-40B4-BE49-F238E27FC236}">
-                  <a16:creationId xmlns:a16="http://schemas.microsoft.com/office/drawing/2014/main" id="{F70ABCF3-BE60-426F-8C8C-059C854869C6}"/>
-                </a:ext>
-              </a:extLst>
-            </p:cNvPr>
-            <p:cNvCxnSpPr>
-              <a:cxnSpLocks/>
-            </p:cNvCxnSpPr>
-            <p:nvPr/>
-          </p:nvCxnSpPr>
-          <p:spPr>
-            <a:xfrm flipV="1">
-              <a:off x="4267202" y="93505"/>
-              <a:ext cx="1" cy="754394"/>
-            </a:xfrm>
-            <a:prstGeom prst="line">
-              <a:avLst/>
-            </a:prstGeom>
-            <a:ln w="19050">
-              <a:solidFill>
-                <a:srgbClr val="0072C6"/>
-              </a:solidFill>
-            </a:ln>
-          </p:spPr>
-          <p:style>
-            <a:lnRef idx="1">
-              <a:schemeClr val="accent1"/>
-            </a:lnRef>
-            <a:fillRef idx="0">
-              <a:schemeClr val="accent1"/>
-            </a:fillRef>
-            <a:effectRef idx="0">
-              <a:schemeClr val="accent1"/>
-            </a:effectRef>
-            <a:fontRef idx="minor">
-              <a:schemeClr val="tx1"/>
-            </a:fontRef>
-          </p:style>
-        </p:cxnSp>
-        <p:cxnSp>
-          <p:nvCxnSpPr>
-            <p:cNvPr id="16" name="Straight Connector 15">
-              <a:extLst>
-                <a:ext uri="{FF2B5EF4-FFF2-40B4-BE49-F238E27FC236}">
-                  <a16:creationId xmlns:a16="http://schemas.microsoft.com/office/drawing/2014/main" id="{90F03633-4CAB-4B57-BF94-CF91E87AB7AE}"/>
-                </a:ext>
-              </a:extLst>
-            </p:cNvPr>
-            <p:cNvCxnSpPr>
-              <a:cxnSpLocks/>
-            </p:cNvCxnSpPr>
-            <p:nvPr/>
-          </p:nvCxnSpPr>
-          <p:spPr>
-            <a:xfrm flipV="1">
-              <a:off x="9491750" y="83129"/>
-              <a:ext cx="1" cy="754394"/>
-            </a:xfrm>
-            <a:prstGeom prst="line">
-              <a:avLst/>
-            </a:prstGeom>
-            <a:ln w="19050">
-              <a:solidFill>
-                <a:srgbClr val="0072C6"/>
-              </a:solidFill>
-            </a:ln>
-          </p:spPr>
-          <p:style>
-            <a:lnRef idx="1">
-              <a:schemeClr val="accent1"/>
-            </a:lnRef>
-            <a:fillRef idx="0">
-              <a:schemeClr val="accent1"/>
-            </a:fillRef>
-            <a:effectRef idx="0">
-              <a:schemeClr val="accent1"/>
-            </a:effectRef>
-            <a:fontRef idx="minor">
-              <a:schemeClr val="tx1"/>
-            </a:fontRef>
-          </p:style>
-        </p:cxnSp>
-      </p:grpSp>
-      <p:pic>
-        <p:nvPicPr>
-          <p:cNvPr id="20" name="Picture 2">
-            <a:extLst>
-              <a:ext uri="{FF2B5EF4-FFF2-40B4-BE49-F238E27FC236}">
-                <a16:creationId xmlns:a16="http://schemas.microsoft.com/office/drawing/2014/main" id="{775211BE-DA3A-41DA-8578-4E52F07B6AB9}"/>
-              </a:ext>
-            </a:extLst>
-          </p:cNvPr>
-          <p:cNvPicPr>
-            <a:picLocks noChangeAspect="1" noChangeArrowheads="1"/>
-          </p:cNvPicPr>
-          <p:nvPr/>
-        </p:nvPicPr>
-        <p:blipFill>
-          <a:blip r:embed="rId2">
-            <a:extLst>
-              <a:ext uri="{28A0092B-C50C-407E-A947-70E740481C1C}">
-                <a14:useLocalDpi xmlns:a14="http://schemas.microsoft.com/office/drawing/2010/main" val="0"/>
-              </a:ext>
-            </a:extLst>
-          </a:blip>
-          <a:srcRect/>
-          <a:stretch>
-            <a:fillRect/>
-          </a:stretch>
-        </p:blipFill>
-        <p:spPr bwMode="auto">
-          <a:xfrm>
-            <a:off x="144770" y="111976"/>
-            <a:ext cx="725548" cy="725548"/>
-          </a:xfrm>
-          <a:prstGeom prst="rect">
-            <a:avLst/>
-          </a:prstGeom>
-          <a:noFill/>
-          <a:extLst>
-            <a:ext uri="{909E8E84-426E-40DD-AFC4-6F175D3DCCD1}">
-              <a14:hiddenFill xmlns:a14="http://schemas.microsoft.com/office/drawing/2010/main">
-                <a:solidFill>
-                  <a:srgbClr val="FFFFFF"/>
-                </a:solidFill>
-              </a14:hiddenFill>
-            </a:ext>
-          </a:extLst>
-        </p:spPr>
-      </p:pic>
-      <p:sp>
-        <p:nvSpPr>
-          <p:cNvPr id="21" name="TextBox 20">
-            <a:extLst>
-              <a:ext uri="{FF2B5EF4-FFF2-40B4-BE49-F238E27FC236}">
-                <a16:creationId xmlns:a16="http://schemas.microsoft.com/office/drawing/2014/main" id="{30404CBF-C3F9-43E0-81FA-E9D4D01BC004}"/>
-              </a:ext>
-            </a:extLst>
-          </p:cNvPr>
-          <p:cNvSpPr txBox="1"/>
-          <p:nvPr/>
-        </p:nvSpPr>
-        <p:spPr>
-          <a:xfrm>
-            <a:off x="914402" y="191193"/>
-            <a:ext cx="3483032" cy="646331"/>
-          </a:xfrm>
-          <a:prstGeom prst="rect">
-            <a:avLst/>
-          </a:prstGeom>
-          <a:noFill/>
-        </p:spPr>
-        <p:txBody>
-          <a:bodyPr wrap="square" rtlCol="0">
-            <a:spAutoFit/>
-          </a:bodyPr>
-          <a:lstStyle/>
-          <a:p>
-            <a:pPr marL="0" marR="0" lvl="0" indent="0" algn="l" defTabSz="914400" rtl="0" eaLnBrk="1" fontAlgn="auto" latinLnBrk="0" hangingPunct="1">
-              <a:lnSpc>
-                <a:spcPct val="100000"/>
-              </a:lnSpc>
-              <a:spcBef>
-                <a:spcPts val="0"/>
-              </a:spcBef>
-              <a:spcAft>
-                <a:spcPts val="0"/>
-              </a:spcAft>
-              <a:buClrTx/>
-              <a:buSzTx/>
-              <a:buFontTx/>
-              <a:buNone/>
-              <a:tabLst/>
-              <a:defRPr/>
-            </a:pPr>
-            <a:r>
-              <a:rPr lang="en-GB" dirty="0">
-                <a:solidFill>
-                  <a:prstClr val="black"/>
-                </a:solidFill>
-                <a:latin typeface="Calibri" panose="020F0502020204030204"/>
-              </a:rPr>
-              <a:t>DP</a:t>
-            </a:r>
-            <a:r>
-              <a:rPr kumimoji="0" lang="en-GB" sz="1800" b="0" i="0" u="none" strike="noStrike" kern="1200" cap="none" spc="0" normalizeH="0" baseline="0" noProof="0" dirty="0">
-                <a:ln>
-                  <a:noFill/>
-                </a:ln>
-                <a:solidFill>
-                  <a:prstClr val="black"/>
-                </a:solidFill>
-                <a:effectLst/>
-                <a:uLnTx/>
-                <a:uFillTx/>
-                <a:latin typeface="Calibri" panose="020F0502020204030204"/>
-                <a:ea typeface="+mn-ea"/>
-                <a:cs typeface="+mn-cs"/>
-              </a:rPr>
-              <a:t>-900 Microsoft Azure Fundamentals</a:t>
-            </a:r>
-          </a:p>
-        </p:txBody>
-      </p:sp>
-      <p:sp>
-        <p:nvSpPr>
-          <p:cNvPr id="2" name="TextBox 1">
-            <a:extLst>
-              <a:ext uri="{FF2B5EF4-FFF2-40B4-BE49-F238E27FC236}">
-                <a16:creationId xmlns:a16="http://schemas.microsoft.com/office/drawing/2014/main" id="{C29D28AF-352E-30D0-C1A2-0E75AC714F1E}"/>
-              </a:ext>
-            </a:extLst>
-          </p:cNvPr>
-          <p:cNvSpPr txBox="1"/>
-          <p:nvPr/>
-        </p:nvSpPr>
-        <p:spPr>
-          <a:xfrm>
-            <a:off x="208599" y="1178568"/>
-            <a:ext cx="7322358" cy="3251339"/>
-          </a:xfrm>
-          <a:prstGeom prst="rect">
-            <a:avLst/>
-          </a:prstGeom>
-          <a:noFill/>
-        </p:spPr>
-        <p:txBody>
-          <a:bodyPr wrap="square" rtlCol="0">
-            <a:spAutoFit/>
-          </a:bodyPr>
-          <a:lstStyle/>
-          <a:p>
-            <a:pPr>
-              <a:lnSpc>
-                <a:spcPct val="120000"/>
-              </a:lnSpc>
-            </a:pPr>
-            <a:r>
-              <a:rPr lang="en-US" sz="1600" b="1" i="0" dirty="0">
-                <a:solidFill>
-                  <a:srgbClr val="161616"/>
-                </a:solidFill>
-                <a:effectLst/>
-                <a:latin typeface="+mj-lt"/>
-              </a:rPr>
-              <a:t>Azure Cosmos DB</a:t>
-            </a:r>
-          </a:p>
-          <a:p>
-            <a:pPr>
-              <a:lnSpc>
-                <a:spcPct val="120000"/>
-              </a:lnSpc>
-            </a:pPr>
-            <a:endParaRPr lang="en-US" sz="1600" b="1" dirty="0">
-              <a:solidFill>
-                <a:srgbClr val="161616"/>
-              </a:solidFill>
-              <a:latin typeface="+mj-lt"/>
-            </a:endParaRPr>
-          </a:p>
-          <a:p>
-            <a:pPr marL="285750" indent="-285750">
-              <a:lnSpc>
-                <a:spcPct val="120000"/>
-              </a:lnSpc>
-              <a:buFontTx/>
-              <a:buChar char="-"/>
-            </a:pPr>
-            <a:r>
-              <a:rPr lang="en-US" sz="1400" i="0" dirty="0">
-                <a:solidFill>
-                  <a:srgbClr val="161616"/>
-                </a:solidFill>
-                <a:effectLst/>
-                <a:latin typeface="+mj-lt"/>
-              </a:rPr>
-              <a:t>Cosmos DB uses indexes and partitioning to provide fast read and write performance and can scale to massive volumes of data</a:t>
-            </a:r>
-          </a:p>
-          <a:p>
-            <a:pPr marL="285750" indent="-285750">
-              <a:lnSpc>
-                <a:spcPct val="120000"/>
-              </a:lnSpc>
-              <a:buFontTx/>
-              <a:buChar char="-"/>
-            </a:pPr>
-            <a:endParaRPr lang="en-US" sz="1400" dirty="0">
-              <a:solidFill>
-                <a:srgbClr val="161616"/>
-              </a:solidFill>
-              <a:latin typeface="+mj-lt"/>
-            </a:endParaRPr>
-          </a:p>
-          <a:p>
-            <a:pPr marL="285750" indent="-285750">
-              <a:lnSpc>
-                <a:spcPct val="120000"/>
-              </a:lnSpc>
-              <a:buFontTx/>
-              <a:buChar char="-"/>
-            </a:pPr>
-            <a:r>
-              <a:rPr lang="en-US" sz="1400" i="0" dirty="0">
-                <a:solidFill>
-                  <a:srgbClr val="161616"/>
-                </a:solidFill>
-                <a:effectLst/>
-                <a:latin typeface="+mj-lt"/>
-              </a:rPr>
-              <a:t>Cosmos DB is a highly scalable database management system. Cosmos DB automatically allocates space in a container for your partitions, and each partition can grow up to 10 GB in size. Indexes are created and maintained automatically. There's virtually no administrative overhead.</a:t>
-            </a:r>
-          </a:p>
-          <a:p>
-            <a:pPr marL="285750" indent="-285750">
-              <a:lnSpc>
-                <a:spcPct val="120000"/>
-              </a:lnSpc>
-              <a:buFontTx/>
-              <a:buChar char="-"/>
-            </a:pPr>
-            <a:endParaRPr lang="en-US" sz="1400" dirty="0">
-              <a:solidFill>
-                <a:srgbClr val="161616"/>
-              </a:solidFill>
-              <a:latin typeface="+mj-lt"/>
-            </a:endParaRPr>
-          </a:p>
-          <a:p>
-            <a:pPr marL="285750" indent="-285750">
-              <a:lnSpc>
-                <a:spcPct val="120000"/>
-              </a:lnSpc>
-              <a:buFontTx/>
-              <a:buChar char="-"/>
-            </a:pPr>
-            <a:r>
-              <a:rPr lang="en-US" sz="1400" i="0" dirty="0">
-                <a:solidFill>
-                  <a:srgbClr val="161616"/>
-                </a:solidFill>
-                <a:effectLst/>
-                <a:latin typeface="+mj-lt"/>
-              </a:rPr>
-              <a:t>Containers are schema-agnostic, which means that no schema is enforced when adding items.</a:t>
-            </a:r>
-          </a:p>
-          <a:p>
-            <a:pPr>
-              <a:lnSpc>
-                <a:spcPct val="120000"/>
-              </a:lnSpc>
-            </a:pPr>
-            <a:endParaRPr lang="en-US" sz="1400" dirty="0">
-              <a:solidFill>
-                <a:srgbClr val="161616"/>
-              </a:solidFill>
-              <a:latin typeface="+mj-lt"/>
-            </a:endParaRPr>
-          </a:p>
-        </p:txBody>
-      </p:sp>
-      <p:pic>
-        <p:nvPicPr>
-          <p:cNvPr id="1026" name="Picture 2" descr="Azure Cosmos DB as a store for multiple NoSQL formats">
-            <a:extLst>
-              <a:ext uri="{FF2B5EF4-FFF2-40B4-BE49-F238E27FC236}">
-                <a16:creationId xmlns:a16="http://schemas.microsoft.com/office/drawing/2014/main" id="{CC648836-7CCE-9E8C-8270-462409F1BF7B}"/>
-              </a:ext>
-            </a:extLst>
-          </p:cNvPr>
-          <p:cNvPicPr>
-            <a:picLocks noChangeAspect="1" noChangeArrowheads="1"/>
-          </p:cNvPicPr>
-          <p:nvPr/>
-        </p:nvPicPr>
-        <p:blipFill>
-          <a:blip r:embed="rId3">
-            <a:extLst>
-              <a:ext uri="{28A0092B-C50C-407E-A947-70E740481C1C}">
-                <a14:useLocalDpi xmlns:a14="http://schemas.microsoft.com/office/drawing/2010/main" val="0"/>
-              </a:ext>
-            </a:extLst>
-          </a:blip>
-          <a:srcRect/>
-          <a:stretch>
-            <a:fillRect/>
-          </a:stretch>
-        </p:blipFill>
-        <p:spPr bwMode="auto">
-          <a:xfrm>
-            <a:off x="7695345" y="1178569"/>
-            <a:ext cx="4220604" cy="3925162"/>
-          </a:xfrm>
-          <a:prstGeom prst="rect">
-            <a:avLst/>
-          </a:prstGeom>
-          <a:noFill/>
-          <a:extLst>
-            <a:ext uri="{909E8E84-426E-40DD-AFC4-6F175D3DCCD1}">
-              <a14:hiddenFill xmlns:a14="http://schemas.microsoft.com/office/drawing/2010/main">
-                <a:solidFill>
-                  <a:srgbClr val="FFFFFF"/>
-                </a:solidFill>
-              </a14:hiddenFill>
-            </a:ext>
-          </a:extLst>
-        </p:spPr>
-      </p:pic>
-    </p:spTree>
-    <p:extLst>
-      <p:ext uri="{BB962C8B-B14F-4D97-AF65-F5344CB8AC3E}">
-        <p14:creationId xmlns:p14="http://schemas.microsoft.com/office/powerpoint/2010/main" val="838288057"/>
-      </p:ext>
-    </p:extLst>
-  </p:cSld>
-  <p:clrMapOvr>
-    <a:masterClrMapping/>
-  </p:clrMapOvr>
-</p:sld>
-</file>
-
-<file path=ppt/slides/slide26.xml><?xml version="1.0" encoding="utf-8"?>
-<p:sld xmlns:a="http://schemas.openxmlformats.org/drawingml/2006/main" xmlns:r="http://schemas.openxmlformats.org/officeDocument/2006/relationships" xmlns:p="http://schemas.openxmlformats.org/presentationml/2006/main">
-  <p:cSld>
-    <p:spTree>
-      <p:nvGrpSpPr>
-        <p:cNvPr id="1" name=""/>
-        <p:cNvGrpSpPr/>
-        <p:nvPr/>
-      </p:nvGrpSpPr>
-      <p:grpSpPr>
-        <a:xfrm>
-          <a:off x="0" y="0"/>
-          <a:ext cx="0" cy="0"/>
-          <a:chOff x="0" y="0"/>
-          <a:chExt cx="0" cy="0"/>
-        </a:xfrm>
-      </p:grpSpPr>
-      <p:grpSp>
-        <p:nvGrpSpPr>
-          <p:cNvPr id="18" name="Group 17">
-            <a:extLst>
-              <a:ext uri="{FF2B5EF4-FFF2-40B4-BE49-F238E27FC236}">
-                <a16:creationId xmlns:a16="http://schemas.microsoft.com/office/drawing/2014/main" id="{6185BE9B-87C8-4B46-9293-0E71CF17E76A}"/>
-              </a:ext>
-            </a:extLst>
-          </p:cNvPr>
-          <p:cNvGrpSpPr/>
-          <p:nvPr/>
-        </p:nvGrpSpPr>
-        <p:grpSpPr>
-          <a:xfrm>
-            <a:off x="99755" y="83129"/>
-            <a:ext cx="11953701" cy="872834"/>
-            <a:chOff x="99755" y="83129"/>
-            <a:chExt cx="11953701" cy="872834"/>
-          </a:xfrm>
-        </p:grpSpPr>
-        <p:cxnSp>
-          <p:nvCxnSpPr>
-            <p:cNvPr id="5" name="Straight Connector 4">
-              <a:extLst>
-                <a:ext uri="{FF2B5EF4-FFF2-40B4-BE49-F238E27FC236}">
-                  <a16:creationId xmlns:a16="http://schemas.microsoft.com/office/drawing/2014/main" id="{A8BE4EF8-406C-4035-940C-AB752B29BA18}"/>
-                </a:ext>
-              </a:extLst>
-            </p:cNvPr>
-            <p:cNvCxnSpPr/>
-            <p:nvPr/>
-          </p:nvCxnSpPr>
-          <p:spPr>
-            <a:xfrm>
-              <a:off x="99755" y="955963"/>
-              <a:ext cx="11953701" cy="0"/>
-            </a:xfrm>
-            <a:prstGeom prst="line">
-              <a:avLst/>
-            </a:prstGeom>
-            <a:ln w="19050">
-              <a:solidFill>
-                <a:srgbClr val="0072C6"/>
-              </a:solidFill>
-            </a:ln>
-          </p:spPr>
-          <p:style>
-            <a:lnRef idx="1">
-              <a:schemeClr val="accent1"/>
-            </a:lnRef>
-            <a:fillRef idx="0">
-              <a:schemeClr val="accent1"/>
-            </a:fillRef>
-            <a:effectRef idx="0">
-              <a:schemeClr val="accent1"/>
-            </a:effectRef>
-            <a:fontRef idx="minor">
-              <a:schemeClr val="tx1"/>
-            </a:fontRef>
-          </p:style>
-        </p:cxnSp>
-        <p:sp>
-          <p:nvSpPr>
-            <p:cNvPr id="8" name="TextBox 7">
-              <a:extLst>
-                <a:ext uri="{FF2B5EF4-FFF2-40B4-BE49-F238E27FC236}">
-                  <a16:creationId xmlns:a16="http://schemas.microsoft.com/office/drawing/2014/main" id="{C61B684E-FDA7-4625-9CC3-79C17CC59ED7}"/>
-                </a:ext>
-              </a:extLst>
-            </p:cNvPr>
-            <p:cNvSpPr txBox="1"/>
-            <p:nvPr/>
-          </p:nvSpPr>
-          <p:spPr>
-            <a:xfrm>
-              <a:off x="4372493" y="180818"/>
-              <a:ext cx="4989025" cy="646331"/>
-            </a:xfrm>
-            <a:prstGeom prst="rect">
-              <a:avLst/>
-            </a:prstGeom>
-            <a:noFill/>
-          </p:spPr>
-          <p:txBody>
-            <a:bodyPr wrap="square" rtlCol="0">
-              <a:spAutoFit/>
-            </a:bodyPr>
-            <a:lstStyle/>
-            <a:p>
-              <a:pPr marL="0" marR="0" lvl="0" indent="0" algn="l" defTabSz="914400" rtl="0" eaLnBrk="1" fontAlgn="auto" latinLnBrk="0" hangingPunct="1">
-                <a:lnSpc>
-                  <a:spcPct val="100000"/>
-                </a:lnSpc>
-                <a:spcBef>
-                  <a:spcPts val="0"/>
-                </a:spcBef>
-                <a:spcAft>
-                  <a:spcPts val="0"/>
-                </a:spcAft>
-                <a:buClrTx/>
-                <a:buSzTx/>
-                <a:buFontTx/>
-                <a:buNone/>
-                <a:tabLst/>
-                <a:defRPr/>
-              </a:pPr>
-              <a:r>
-                <a:rPr kumimoji="0" lang="en-GB" sz="1800" b="0" i="0" u="none" strike="noStrike" kern="1200" cap="none" spc="0" normalizeH="0" baseline="0" noProof="0" dirty="0">
-                  <a:ln>
-                    <a:noFill/>
-                  </a:ln>
-                  <a:solidFill>
-                    <a:prstClr val="black"/>
-                  </a:solidFill>
-                  <a:effectLst/>
-                  <a:uLnTx/>
-                  <a:uFillTx/>
-                  <a:latin typeface="Calibri" panose="020F0502020204030204"/>
-                  <a:ea typeface="+mn-ea"/>
-                  <a:cs typeface="+mn-cs"/>
-                </a:rPr>
-                <a:t>Microsoft Azure Data Fundamentals: Explore non-relational data in Azure</a:t>
-              </a:r>
-            </a:p>
-          </p:txBody>
-        </p:sp>
-        <p:sp>
-          <p:nvSpPr>
-            <p:cNvPr id="10" name="TextBox 9">
-              <a:extLst>
-                <a:ext uri="{FF2B5EF4-FFF2-40B4-BE49-F238E27FC236}">
-                  <a16:creationId xmlns:a16="http://schemas.microsoft.com/office/drawing/2014/main" id="{4E568F0D-7E90-4A0C-8070-6C806D992954}"/>
-                </a:ext>
-              </a:extLst>
-            </p:cNvPr>
-            <p:cNvSpPr txBox="1"/>
-            <p:nvPr/>
-          </p:nvSpPr>
-          <p:spPr>
-            <a:xfrm>
-              <a:off x="9534699" y="180818"/>
-              <a:ext cx="2155764" cy="369332"/>
-            </a:xfrm>
-            <a:prstGeom prst="rect">
-              <a:avLst/>
-            </a:prstGeom>
-            <a:noFill/>
-          </p:spPr>
-          <p:txBody>
-            <a:bodyPr wrap="square" rtlCol="0">
-              <a:spAutoFit/>
-            </a:bodyPr>
-            <a:lstStyle/>
-            <a:p>
-              <a:pPr marL="0" marR="0" lvl="0" indent="0" algn="l" defTabSz="914400" rtl="0" eaLnBrk="1" fontAlgn="auto" latinLnBrk="0" hangingPunct="1">
-                <a:lnSpc>
-                  <a:spcPct val="100000"/>
-                </a:lnSpc>
-                <a:spcBef>
-                  <a:spcPts val="0"/>
-                </a:spcBef>
-                <a:spcAft>
-                  <a:spcPts val="0"/>
-                </a:spcAft>
-                <a:buClrTx/>
-                <a:buSzTx/>
-                <a:buFontTx/>
-                <a:buNone/>
-                <a:tabLst/>
-                <a:defRPr/>
-              </a:pPr>
-              <a:r>
-                <a:rPr kumimoji="0" lang="en-GB" sz="1800" b="0" i="0" u="none" strike="noStrike" kern="1200" cap="none" spc="0" normalizeH="0" baseline="0" noProof="0" dirty="0">
-                  <a:ln>
-                    <a:noFill/>
-                  </a:ln>
-                  <a:solidFill>
-                    <a:prstClr val="black"/>
-                  </a:solidFill>
-                  <a:effectLst/>
-                  <a:uLnTx/>
-                  <a:uFillTx/>
-                  <a:latin typeface="Calibri" panose="020F0502020204030204"/>
-                  <a:ea typeface="+mn-ea"/>
-                  <a:cs typeface="+mn-cs"/>
-                </a:rPr>
-                <a:t>Date: </a:t>
-              </a:r>
-              <a:r>
-                <a:rPr lang="en-GB" dirty="0">
-                  <a:solidFill>
-                    <a:prstClr val="black"/>
-                  </a:solidFill>
-                  <a:latin typeface="Calibri" panose="020F0502020204030204"/>
-                </a:rPr>
-                <a:t>23</a:t>
-              </a:r>
-              <a:r>
-                <a:rPr kumimoji="0" lang="en-GB" sz="1800" b="0" i="0" u="none" strike="noStrike" kern="1200" cap="none" spc="0" normalizeH="0" baseline="0" noProof="0" dirty="0">
-                  <a:ln>
-                    <a:noFill/>
-                  </a:ln>
-                  <a:solidFill>
-                    <a:prstClr val="black"/>
-                  </a:solidFill>
-                  <a:effectLst/>
-                  <a:uLnTx/>
-                  <a:uFillTx/>
-                  <a:latin typeface="Calibri" panose="020F0502020204030204"/>
-                  <a:ea typeface="+mn-ea"/>
-                  <a:cs typeface="+mn-cs"/>
-                </a:rPr>
-                <a:t>/03/23 </a:t>
-              </a:r>
-            </a:p>
-          </p:txBody>
-        </p:sp>
-        <p:cxnSp>
-          <p:nvCxnSpPr>
-            <p:cNvPr id="11" name="Straight Connector 10">
-              <a:extLst>
-                <a:ext uri="{FF2B5EF4-FFF2-40B4-BE49-F238E27FC236}">
-                  <a16:creationId xmlns:a16="http://schemas.microsoft.com/office/drawing/2014/main" id="{F70ABCF3-BE60-426F-8C8C-059C854869C6}"/>
-                </a:ext>
-              </a:extLst>
-            </p:cNvPr>
-            <p:cNvCxnSpPr>
-              <a:cxnSpLocks/>
-            </p:cNvCxnSpPr>
-            <p:nvPr/>
-          </p:nvCxnSpPr>
-          <p:spPr>
-            <a:xfrm flipV="1">
-              <a:off x="4267202" y="93505"/>
-              <a:ext cx="1" cy="754394"/>
-            </a:xfrm>
-            <a:prstGeom prst="line">
-              <a:avLst/>
-            </a:prstGeom>
-            <a:ln w="19050">
-              <a:solidFill>
-                <a:srgbClr val="0072C6"/>
-              </a:solidFill>
-            </a:ln>
-          </p:spPr>
-          <p:style>
-            <a:lnRef idx="1">
-              <a:schemeClr val="accent1"/>
-            </a:lnRef>
-            <a:fillRef idx="0">
-              <a:schemeClr val="accent1"/>
-            </a:fillRef>
-            <a:effectRef idx="0">
-              <a:schemeClr val="accent1"/>
-            </a:effectRef>
-            <a:fontRef idx="minor">
-              <a:schemeClr val="tx1"/>
-            </a:fontRef>
-          </p:style>
-        </p:cxnSp>
-        <p:cxnSp>
-          <p:nvCxnSpPr>
-            <p:cNvPr id="16" name="Straight Connector 15">
-              <a:extLst>
-                <a:ext uri="{FF2B5EF4-FFF2-40B4-BE49-F238E27FC236}">
-                  <a16:creationId xmlns:a16="http://schemas.microsoft.com/office/drawing/2014/main" id="{90F03633-4CAB-4B57-BF94-CF91E87AB7AE}"/>
-                </a:ext>
-              </a:extLst>
-            </p:cNvPr>
-            <p:cNvCxnSpPr>
-              <a:cxnSpLocks/>
-            </p:cNvCxnSpPr>
-            <p:nvPr/>
-          </p:nvCxnSpPr>
-          <p:spPr>
-            <a:xfrm flipV="1">
-              <a:off x="9491750" y="83129"/>
-              <a:ext cx="1" cy="754394"/>
-            </a:xfrm>
-            <a:prstGeom prst="line">
-              <a:avLst/>
-            </a:prstGeom>
-            <a:ln w="19050">
-              <a:solidFill>
-                <a:srgbClr val="0072C6"/>
-              </a:solidFill>
-            </a:ln>
-          </p:spPr>
-          <p:style>
-            <a:lnRef idx="1">
-              <a:schemeClr val="accent1"/>
-            </a:lnRef>
-            <a:fillRef idx="0">
-              <a:schemeClr val="accent1"/>
-            </a:fillRef>
-            <a:effectRef idx="0">
-              <a:schemeClr val="accent1"/>
-            </a:effectRef>
-            <a:fontRef idx="minor">
-              <a:schemeClr val="tx1"/>
-            </a:fontRef>
-          </p:style>
-        </p:cxnSp>
-      </p:grpSp>
-      <p:pic>
-        <p:nvPicPr>
-          <p:cNvPr id="20" name="Picture 2">
-            <a:extLst>
-              <a:ext uri="{FF2B5EF4-FFF2-40B4-BE49-F238E27FC236}">
-                <a16:creationId xmlns:a16="http://schemas.microsoft.com/office/drawing/2014/main" id="{775211BE-DA3A-41DA-8578-4E52F07B6AB9}"/>
-              </a:ext>
-            </a:extLst>
-          </p:cNvPr>
-          <p:cNvPicPr>
-            <a:picLocks noChangeAspect="1" noChangeArrowheads="1"/>
-          </p:cNvPicPr>
-          <p:nvPr/>
-        </p:nvPicPr>
-        <p:blipFill>
-          <a:blip r:embed="rId2">
-            <a:extLst>
-              <a:ext uri="{28A0092B-C50C-407E-A947-70E740481C1C}">
-                <a14:useLocalDpi xmlns:a14="http://schemas.microsoft.com/office/drawing/2010/main" val="0"/>
-              </a:ext>
-            </a:extLst>
-          </a:blip>
-          <a:srcRect/>
-          <a:stretch>
-            <a:fillRect/>
-          </a:stretch>
-        </p:blipFill>
-        <p:spPr bwMode="auto">
-          <a:xfrm>
-            <a:off x="144770" y="111976"/>
-            <a:ext cx="725548" cy="725548"/>
-          </a:xfrm>
-          <a:prstGeom prst="rect">
-            <a:avLst/>
-          </a:prstGeom>
-          <a:noFill/>
-          <a:extLst>
-            <a:ext uri="{909E8E84-426E-40DD-AFC4-6F175D3DCCD1}">
-              <a14:hiddenFill xmlns:a14="http://schemas.microsoft.com/office/drawing/2010/main">
-                <a:solidFill>
-                  <a:srgbClr val="FFFFFF"/>
-                </a:solidFill>
-              </a14:hiddenFill>
-            </a:ext>
-          </a:extLst>
-        </p:spPr>
-      </p:pic>
-      <p:sp>
-        <p:nvSpPr>
-          <p:cNvPr id="21" name="TextBox 20">
-            <a:extLst>
-              <a:ext uri="{FF2B5EF4-FFF2-40B4-BE49-F238E27FC236}">
-                <a16:creationId xmlns:a16="http://schemas.microsoft.com/office/drawing/2014/main" id="{30404CBF-C3F9-43E0-81FA-E9D4D01BC004}"/>
-              </a:ext>
-            </a:extLst>
-          </p:cNvPr>
-          <p:cNvSpPr txBox="1"/>
-          <p:nvPr/>
-        </p:nvSpPr>
-        <p:spPr>
-          <a:xfrm>
-            <a:off x="914402" y="191193"/>
-            <a:ext cx="3483032" cy="646331"/>
-          </a:xfrm>
-          <a:prstGeom prst="rect">
-            <a:avLst/>
-          </a:prstGeom>
-          <a:noFill/>
-        </p:spPr>
-        <p:txBody>
-          <a:bodyPr wrap="square" rtlCol="0">
-            <a:spAutoFit/>
-          </a:bodyPr>
-          <a:lstStyle/>
-          <a:p>
-            <a:pPr marL="0" marR="0" lvl="0" indent="0" algn="l" defTabSz="914400" rtl="0" eaLnBrk="1" fontAlgn="auto" latinLnBrk="0" hangingPunct="1">
-              <a:lnSpc>
-                <a:spcPct val="100000"/>
-              </a:lnSpc>
-              <a:spcBef>
-                <a:spcPts val="0"/>
-              </a:spcBef>
-              <a:spcAft>
-                <a:spcPts val="0"/>
-              </a:spcAft>
-              <a:buClrTx/>
-              <a:buSzTx/>
-              <a:buFontTx/>
-              <a:buNone/>
-              <a:tabLst/>
-              <a:defRPr/>
-            </a:pPr>
-            <a:r>
-              <a:rPr lang="en-GB" dirty="0">
-                <a:solidFill>
-                  <a:prstClr val="black"/>
-                </a:solidFill>
-                <a:latin typeface="Calibri" panose="020F0502020204030204"/>
-              </a:rPr>
-              <a:t>DP</a:t>
-            </a:r>
-            <a:r>
-              <a:rPr kumimoji="0" lang="en-GB" sz="1800" b="0" i="0" u="none" strike="noStrike" kern="1200" cap="none" spc="0" normalizeH="0" baseline="0" noProof="0" dirty="0">
-                <a:ln>
-                  <a:noFill/>
-                </a:ln>
-                <a:solidFill>
-                  <a:prstClr val="black"/>
-                </a:solidFill>
-                <a:effectLst/>
-                <a:uLnTx/>
-                <a:uFillTx/>
-                <a:latin typeface="Calibri" panose="020F0502020204030204"/>
-                <a:ea typeface="+mn-ea"/>
-                <a:cs typeface="+mn-cs"/>
-              </a:rPr>
-              <a:t>-900 Microsoft Azure Fundamentals</a:t>
-            </a:r>
-          </a:p>
-        </p:txBody>
-      </p:sp>
-      <p:sp>
-        <p:nvSpPr>
-          <p:cNvPr id="2" name="TextBox 1">
-            <a:extLst>
-              <a:ext uri="{FF2B5EF4-FFF2-40B4-BE49-F238E27FC236}">
-                <a16:creationId xmlns:a16="http://schemas.microsoft.com/office/drawing/2014/main" id="{C29D28AF-352E-30D0-C1A2-0E75AC714F1E}"/>
-              </a:ext>
-            </a:extLst>
-          </p:cNvPr>
-          <p:cNvSpPr txBox="1"/>
-          <p:nvPr/>
-        </p:nvSpPr>
-        <p:spPr>
-          <a:xfrm>
-            <a:off x="208599" y="1178568"/>
-            <a:ext cx="7322358" cy="5319598"/>
-          </a:xfrm>
-          <a:prstGeom prst="rect">
-            <a:avLst/>
-          </a:prstGeom>
-          <a:noFill/>
-        </p:spPr>
-        <p:txBody>
-          <a:bodyPr wrap="square" rtlCol="0">
-            <a:spAutoFit/>
-          </a:bodyPr>
-          <a:lstStyle/>
-          <a:p>
-            <a:pPr>
-              <a:lnSpc>
-                <a:spcPct val="120000"/>
-              </a:lnSpc>
-            </a:pPr>
-            <a:r>
-              <a:rPr lang="en-US" sz="1600" b="1" i="0" dirty="0">
-                <a:solidFill>
-                  <a:srgbClr val="161616"/>
-                </a:solidFill>
-                <a:effectLst/>
-                <a:latin typeface="+mj-lt"/>
-              </a:rPr>
-              <a:t>Azure Cosmos </a:t>
-            </a:r>
-            <a:r>
-              <a:rPr lang="en-US" sz="1600" b="1" i="0">
-                <a:solidFill>
-                  <a:srgbClr val="161616"/>
-                </a:solidFill>
-                <a:effectLst/>
-                <a:latin typeface="+mj-lt"/>
-              </a:rPr>
-              <a:t>DB APIs</a:t>
-            </a:r>
-            <a:endParaRPr lang="en-US" sz="1600" b="1" i="0" dirty="0">
-              <a:solidFill>
-                <a:srgbClr val="161616"/>
-              </a:solidFill>
-              <a:effectLst/>
-              <a:latin typeface="+mj-lt"/>
-            </a:endParaRPr>
-          </a:p>
-          <a:p>
-            <a:pPr>
-              <a:lnSpc>
-                <a:spcPct val="120000"/>
-              </a:lnSpc>
-            </a:pPr>
-            <a:endParaRPr lang="en-US" sz="1600" b="1" dirty="0">
-              <a:solidFill>
-                <a:srgbClr val="161616"/>
-              </a:solidFill>
-              <a:latin typeface="+mj-lt"/>
-            </a:endParaRPr>
-          </a:p>
-          <a:p>
-            <a:pPr>
-              <a:lnSpc>
-                <a:spcPct val="120000"/>
-              </a:lnSpc>
-            </a:pPr>
-            <a:r>
-              <a:rPr lang="en-US" sz="1400" dirty="0">
-                <a:solidFill>
-                  <a:srgbClr val="161616"/>
-                </a:solidFill>
-                <a:latin typeface="+mj-lt"/>
-              </a:rPr>
-              <a:t>T</a:t>
-            </a:r>
-            <a:r>
-              <a:rPr lang="en-US" sz="1400" i="0" dirty="0">
-                <a:solidFill>
-                  <a:srgbClr val="161616"/>
-                </a:solidFill>
-                <a:effectLst/>
-                <a:latin typeface="+mj-lt"/>
-              </a:rPr>
-              <a:t>his is a single managed service that’s effectively built out to handle both relational and non relational data. Within a single instance of Azure cosmos </a:t>
-            </a:r>
-            <a:r>
-              <a:rPr lang="en-US" sz="1400" i="0" dirty="0" err="1">
-                <a:solidFill>
-                  <a:srgbClr val="161616"/>
-                </a:solidFill>
-                <a:effectLst/>
-                <a:latin typeface="+mj-lt"/>
-              </a:rPr>
-              <a:t>db</a:t>
-            </a:r>
-            <a:r>
-              <a:rPr lang="en-US" sz="1400" i="0" dirty="0">
-                <a:solidFill>
-                  <a:srgbClr val="161616"/>
-                </a:solidFill>
-                <a:effectLst/>
-                <a:latin typeface="+mj-lt"/>
-              </a:rPr>
-              <a:t> we can now use:</a:t>
-            </a:r>
-          </a:p>
-          <a:p>
-            <a:pPr>
-              <a:lnSpc>
-                <a:spcPct val="120000"/>
-              </a:lnSpc>
-            </a:pPr>
-            <a:endParaRPr lang="en-US" sz="1400" dirty="0">
-              <a:solidFill>
-                <a:srgbClr val="161616"/>
-              </a:solidFill>
-              <a:latin typeface="+mj-lt"/>
-            </a:endParaRPr>
-          </a:p>
-          <a:p>
-            <a:pPr marL="285750" indent="-285750">
-              <a:lnSpc>
-                <a:spcPct val="120000"/>
-              </a:lnSpc>
-              <a:buFontTx/>
-              <a:buChar char="-"/>
-            </a:pPr>
-            <a:r>
-              <a:rPr lang="en-US" sz="1400" i="0" dirty="0">
-                <a:solidFill>
-                  <a:srgbClr val="161616"/>
-                </a:solidFill>
-                <a:effectLst/>
-                <a:latin typeface="+mj-lt"/>
-              </a:rPr>
-              <a:t>Azure Cosmos DB for </a:t>
-            </a:r>
-            <a:r>
-              <a:rPr lang="en-US" sz="1400" b="1" i="0" dirty="0">
-                <a:solidFill>
-                  <a:srgbClr val="161616"/>
-                </a:solidFill>
-                <a:effectLst/>
-                <a:latin typeface="+mj-lt"/>
-              </a:rPr>
-              <a:t>NoSQL</a:t>
-            </a:r>
-            <a:r>
-              <a:rPr lang="en-US" sz="1400" i="0" dirty="0">
-                <a:solidFill>
-                  <a:srgbClr val="161616"/>
-                </a:solidFill>
-                <a:effectLst/>
-                <a:latin typeface="+mj-lt"/>
-              </a:rPr>
-              <a:t> is Microsoft’s native non-relational service for working with the document data model</a:t>
-            </a:r>
-          </a:p>
-          <a:p>
-            <a:pPr marL="285750" indent="-285750">
-              <a:lnSpc>
-                <a:spcPct val="120000"/>
-              </a:lnSpc>
-              <a:buFontTx/>
-              <a:buChar char="-"/>
-            </a:pPr>
-            <a:endParaRPr lang="en-US" sz="1400" dirty="0">
-              <a:solidFill>
-                <a:srgbClr val="161616"/>
-              </a:solidFill>
-              <a:latin typeface="+mj-lt"/>
-            </a:endParaRPr>
-          </a:p>
-          <a:p>
-            <a:pPr marL="285750" indent="-285750">
-              <a:lnSpc>
-                <a:spcPct val="120000"/>
-              </a:lnSpc>
-              <a:buFontTx/>
-              <a:buChar char="-"/>
-            </a:pPr>
-            <a:r>
-              <a:rPr lang="en-US" sz="1400" i="0" dirty="0">
-                <a:solidFill>
-                  <a:srgbClr val="161616"/>
-                </a:solidFill>
-                <a:effectLst/>
-                <a:latin typeface="+mj-lt"/>
-              </a:rPr>
-              <a:t>Azure Cosmos DB for </a:t>
-            </a:r>
-            <a:r>
-              <a:rPr lang="en-US" sz="1400" b="1" i="0" dirty="0">
-                <a:solidFill>
-                  <a:srgbClr val="161616"/>
-                </a:solidFill>
-                <a:effectLst/>
-                <a:latin typeface="+mj-lt"/>
-              </a:rPr>
-              <a:t>MongoDB</a:t>
-            </a:r>
-            <a:r>
-              <a:rPr lang="en-US" sz="1400" i="0" dirty="0">
-                <a:solidFill>
-                  <a:srgbClr val="161616"/>
-                </a:solidFill>
-                <a:effectLst/>
-                <a:latin typeface="+mj-lt"/>
-              </a:rPr>
-              <a:t> is a popular open-source database in which data is stored in Binary JSON (BSON) format and queried using MongoDB Query Language (MQL).</a:t>
-            </a:r>
-          </a:p>
-          <a:p>
-            <a:pPr marL="285750" indent="-285750">
-              <a:lnSpc>
-                <a:spcPct val="120000"/>
-              </a:lnSpc>
-              <a:buFontTx/>
-              <a:buChar char="-"/>
-            </a:pPr>
-            <a:endParaRPr lang="en-US" sz="1400" dirty="0">
-              <a:solidFill>
-                <a:srgbClr val="161616"/>
-              </a:solidFill>
-              <a:latin typeface="+mj-lt"/>
-            </a:endParaRPr>
-          </a:p>
-          <a:p>
-            <a:pPr marL="285750" indent="-285750">
-              <a:lnSpc>
-                <a:spcPct val="120000"/>
-              </a:lnSpc>
-              <a:buFontTx/>
-              <a:buChar char="-"/>
-            </a:pPr>
-            <a:r>
-              <a:rPr lang="en-US" sz="1400" i="0" dirty="0">
-                <a:solidFill>
-                  <a:srgbClr val="161616"/>
-                </a:solidFill>
-                <a:effectLst/>
-                <a:latin typeface="+mj-lt"/>
-              </a:rPr>
-              <a:t>Azure Cosmos DB for </a:t>
-            </a:r>
-            <a:r>
-              <a:rPr lang="en-US" sz="1400" b="1" i="0" dirty="0">
-                <a:solidFill>
-                  <a:srgbClr val="161616"/>
-                </a:solidFill>
-                <a:effectLst/>
-                <a:latin typeface="+mj-lt"/>
-              </a:rPr>
-              <a:t>PostgreSQL</a:t>
-            </a:r>
-            <a:r>
-              <a:rPr lang="en-US" sz="1400" i="0" dirty="0">
-                <a:solidFill>
-                  <a:srgbClr val="161616"/>
-                </a:solidFill>
-                <a:effectLst/>
-                <a:latin typeface="+mj-lt"/>
-              </a:rPr>
-              <a:t> is a native PostgreSQL for relational data.</a:t>
-            </a:r>
-          </a:p>
-          <a:p>
-            <a:pPr marL="285750" indent="-285750">
-              <a:lnSpc>
-                <a:spcPct val="120000"/>
-              </a:lnSpc>
-              <a:buFontTx/>
-              <a:buChar char="-"/>
-            </a:pPr>
-            <a:endParaRPr lang="en-US" sz="1400" dirty="0">
-              <a:solidFill>
-                <a:srgbClr val="161616"/>
-              </a:solidFill>
-              <a:latin typeface="+mj-lt"/>
-            </a:endParaRPr>
-          </a:p>
-          <a:p>
-            <a:pPr marL="285750" indent="-285750">
-              <a:lnSpc>
-                <a:spcPct val="120000"/>
-              </a:lnSpc>
-              <a:buFontTx/>
-              <a:buChar char="-"/>
-            </a:pPr>
-            <a:r>
-              <a:rPr lang="en-US" sz="1400" i="0" dirty="0">
-                <a:solidFill>
-                  <a:srgbClr val="161616"/>
-                </a:solidFill>
-                <a:effectLst/>
-                <a:latin typeface="+mj-lt"/>
-              </a:rPr>
-              <a:t>Azure Cosmos DB for </a:t>
-            </a:r>
-            <a:r>
-              <a:rPr lang="en-US" sz="1400" b="1" i="0" dirty="0">
-                <a:solidFill>
-                  <a:srgbClr val="161616"/>
-                </a:solidFill>
-                <a:effectLst/>
-                <a:latin typeface="+mj-lt"/>
-              </a:rPr>
-              <a:t>Table</a:t>
-            </a:r>
-            <a:r>
-              <a:rPr lang="en-US" sz="1400" i="0" dirty="0">
-                <a:solidFill>
-                  <a:srgbClr val="161616"/>
-                </a:solidFill>
-                <a:effectLst/>
-                <a:latin typeface="+mj-lt"/>
-              </a:rPr>
-              <a:t> is used to work with data in key-value tables, similar to Azure Table Storage.</a:t>
-            </a:r>
-          </a:p>
-          <a:p>
-            <a:pPr marL="285750" indent="-285750">
-              <a:lnSpc>
-                <a:spcPct val="120000"/>
-              </a:lnSpc>
-              <a:buFontTx/>
-              <a:buChar char="-"/>
-            </a:pPr>
-            <a:endParaRPr lang="en-US" sz="1400" dirty="0">
-              <a:solidFill>
-                <a:srgbClr val="161616"/>
-              </a:solidFill>
-              <a:latin typeface="+mj-lt"/>
-            </a:endParaRPr>
-          </a:p>
-          <a:p>
-            <a:pPr marL="285750" indent="-285750">
-              <a:lnSpc>
-                <a:spcPct val="120000"/>
-              </a:lnSpc>
-              <a:buFontTx/>
-              <a:buChar char="-"/>
-            </a:pPr>
-            <a:r>
-              <a:rPr lang="en-US" sz="1400" i="0" dirty="0">
-                <a:solidFill>
-                  <a:srgbClr val="161616"/>
-                </a:solidFill>
-                <a:effectLst/>
-                <a:latin typeface="+mj-lt"/>
-              </a:rPr>
-              <a:t>Azure Cosmos DB for </a:t>
-            </a:r>
-            <a:r>
-              <a:rPr lang="en-US" sz="1400" b="1" i="0" dirty="0">
-                <a:solidFill>
-                  <a:srgbClr val="161616"/>
-                </a:solidFill>
-                <a:effectLst/>
-                <a:latin typeface="+mj-lt"/>
-              </a:rPr>
-              <a:t>Apache Cassandra</a:t>
-            </a:r>
-            <a:r>
-              <a:rPr lang="en-US" sz="1400" i="0" dirty="0">
-                <a:solidFill>
-                  <a:srgbClr val="161616"/>
-                </a:solidFill>
-                <a:effectLst/>
-                <a:latin typeface="+mj-lt"/>
-              </a:rPr>
-              <a:t> is compatible with Apache Cassandra, which is a popular open-source database that uses a column-family storage structure, queried using SQL.</a:t>
-            </a:r>
-          </a:p>
-          <a:p>
-            <a:pPr marL="285750" indent="-285750">
-              <a:lnSpc>
-                <a:spcPct val="120000"/>
-              </a:lnSpc>
-              <a:buFontTx/>
-              <a:buChar char="-"/>
-            </a:pPr>
-            <a:endParaRPr lang="en-US" sz="1400" dirty="0">
-              <a:solidFill>
-                <a:srgbClr val="161616"/>
-              </a:solidFill>
-              <a:latin typeface="+mj-lt"/>
-            </a:endParaRPr>
-          </a:p>
-          <a:p>
-            <a:pPr marL="285750" indent="-285750">
-              <a:lnSpc>
-                <a:spcPct val="120000"/>
-              </a:lnSpc>
-              <a:buFontTx/>
-              <a:buChar char="-"/>
-            </a:pPr>
-            <a:r>
-              <a:rPr lang="en-US" sz="1400" i="0" dirty="0">
-                <a:solidFill>
-                  <a:srgbClr val="161616"/>
-                </a:solidFill>
-                <a:effectLst/>
-                <a:latin typeface="+mj-lt"/>
-              </a:rPr>
-              <a:t>Azure Cosmos DB for </a:t>
-            </a:r>
-            <a:r>
-              <a:rPr lang="en-US" sz="1400" b="1" i="0" dirty="0">
-                <a:solidFill>
-                  <a:srgbClr val="161616"/>
-                </a:solidFill>
-                <a:effectLst/>
-                <a:latin typeface="+mj-lt"/>
-              </a:rPr>
-              <a:t>Apache Gremlin</a:t>
-            </a:r>
-            <a:r>
-              <a:rPr lang="en-US" sz="1400" i="0" dirty="0">
-                <a:solidFill>
-                  <a:srgbClr val="161616"/>
-                </a:solidFill>
-                <a:effectLst/>
-                <a:latin typeface="+mj-lt"/>
-              </a:rPr>
-              <a:t> is used with data in a graph structure.</a:t>
-            </a:r>
-          </a:p>
-        </p:txBody>
-      </p:sp>
-      <p:pic>
-        <p:nvPicPr>
-          <p:cNvPr id="1026" name="Picture 2" descr="Azure Cosmos DB as a store for multiple NoSQL formats">
-            <a:extLst>
-              <a:ext uri="{FF2B5EF4-FFF2-40B4-BE49-F238E27FC236}">
-                <a16:creationId xmlns:a16="http://schemas.microsoft.com/office/drawing/2014/main" id="{CC648836-7CCE-9E8C-8270-462409F1BF7B}"/>
-              </a:ext>
-            </a:extLst>
-          </p:cNvPr>
-          <p:cNvPicPr>
-            <a:picLocks noChangeAspect="1" noChangeArrowheads="1"/>
-          </p:cNvPicPr>
-          <p:nvPr/>
-        </p:nvPicPr>
-        <p:blipFill>
-          <a:blip r:embed="rId3">
-            <a:extLst>
-              <a:ext uri="{28A0092B-C50C-407E-A947-70E740481C1C}">
-                <a14:useLocalDpi xmlns:a14="http://schemas.microsoft.com/office/drawing/2010/main" val="0"/>
-              </a:ext>
-            </a:extLst>
-          </a:blip>
-          <a:srcRect/>
-          <a:stretch>
-            <a:fillRect/>
-          </a:stretch>
-        </p:blipFill>
-        <p:spPr bwMode="auto">
-          <a:xfrm>
-            <a:off x="7695345" y="1178569"/>
-            <a:ext cx="4220604" cy="3925162"/>
-          </a:xfrm>
-          <a:prstGeom prst="rect">
-            <a:avLst/>
-          </a:prstGeom>
-          <a:noFill/>
-          <a:extLst>
-            <a:ext uri="{909E8E84-426E-40DD-AFC4-6F175D3DCCD1}">
-              <a14:hiddenFill xmlns:a14="http://schemas.microsoft.com/office/drawing/2010/main">
-                <a:solidFill>
-                  <a:srgbClr val="FFFFFF"/>
-                </a:solidFill>
-              </a14:hiddenFill>
-            </a:ext>
-          </a:extLst>
-        </p:spPr>
-      </p:pic>
-    </p:spTree>
-    <p:extLst>
-      <p:ext uri="{BB962C8B-B14F-4D97-AF65-F5344CB8AC3E}">
-        <p14:creationId xmlns:p14="http://schemas.microsoft.com/office/powerpoint/2010/main" val="3644242546"/>
-      </p:ext>
-    </p:extLst>
-  </p:cSld>
-  <p:clrMapOvr>
-    <a:masterClrMapping/>
-  </p:clrMapOvr>
-</p:sld>
-</file>
-
-<file path=ppt/slides/slide27.xml><?xml version="1.0" encoding="utf-8"?>
 <p:sld xmlns:a="http://schemas.openxmlformats.org/drawingml/2006/main" xmlns:r="http://schemas.openxmlformats.org/officeDocument/2006/relationships" xmlns:p="http://schemas.openxmlformats.org/presentationml/2006/main">
   <p:cSld>
     <p:spTree>

</xml_diff>